<commit_message>
changed the framework figure changed chapter 3 structure added trash to store removed chapter 3 added the drawing pptx to git
</commit_message>
<xml_diff>
--- a/Drawings/Drawing.pptx
+++ b/Drawings/Drawing.pptx
@@ -107,7 +107,7 @@
   </p:defaultTextStyle>
   <p:extLst>
     <p:ext uri="{EFAFB233-063F-42B5-8137-9DF3F51BA10A}">
-      <p15:sldGuideLst xmlns:p15="http://schemas.microsoft.com/office/powerpoint/2012/main"/>
+      <p15:sldGuideLst xmlns="" xmlns:p15="http://schemas.microsoft.com/office/powerpoint/2012/main"/>
     </p:ext>
   </p:extLst>
 </p:presentation>
@@ -244,7 +244,7 @@
           <a:p>
             <a:fld id="{A8528DE2-31C9-49BB-A893-07DE5C7B4A44}" type="datetimeFigureOut">
               <a:rPr lang="en-US" smtClean="0"/>
-              <a:t>4/24/2015</a:t>
+              <a:t>24/04/15</a:t>
             </a:fld>
             <a:endParaRPr lang="en-US"/>
           </a:p>
@@ -414,7 +414,7 @@
           <a:p>
             <a:fld id="{A8528DE2-31C9-49BB-A893-07DE5C7B4A44}" type="datetimeFigureOut">
               <a:rPr lang="en-US" smtClean="0"/>
-              <a:t>4/24/2015</a:t>
+              <a:t>24/04/15</a:t>
             </a:fld>
             <a:endParaRPr lang="en-US"/>
           </a:p>
@@ -594,7 +594,7 @@
           <a:p>
             <a:fld id="{A8528DE2-31C9-49BB-A893-07DE5C7B4A44}" type="datetimeFigureOut">
               <a:rPr lang="en-US" smtClean="0"/>
-              <a:t>4/24/2015</a:t>
+              <a:t>24/04/15</a:t>
             </a:fld>
             <a:endParaRPr lang="en-US"/>
           </a:p>
@@ -764,7 +764,7 @@
           <a:p>
             <a:fld id="{A8528DE2-31C9-49BB-A893-07DE5C7B4A44}" type="datetimeFigureOut">
               <a:rPr lang="en-US" smtClean="0"/>
-              <a:t>4/24/2015</a:t>
+              <a:t>24/04/15</a:t>
             </a:fld>
             <a:endParaRPr lang="en-US"/>
           </a:p>
@@ -1010,7 +1010,7 @@
           <a:p>
             <a:fld id="{A8528DE2-31C9-49BB-A893-07DE5C7B4A44}" type="datetimeFigureOut">
               <a:rPr lang="en-US" smtClean="0"/>
-              <a:t>4/24/2015</a:t>
+              <a:t>24/04/15</a:t>
             </a:fld>
             <a:endParaRPr lang="en-US"/>
           </a:p>
@@ -1242,7 +1242,7 @@
           <a:p>
             <a:fld id="{A8528DE2-31C9-49BB-A893-07DE5C7B4A44}" type="datetimeFigureOut">
               <a:rPr lang="en-US" smtClean="0"/>
-              <a:t>4/24/2015</a:t>
+              <a:t>24/04/15</a:t>
             </a:fld>
             <a:endParaRPr lang="en-US"/>
           </a:p>
@@ -1609,7 +1609,7 @@
           <a:p>
             <a:fld id="{A8528DE2-31C9-49BB-A893-07DE5C7B4A44}" type="datetimeFigureOut">
               <a:rPr lang="en-US" smtClean="0"/>
-              <a:t>4/24/2015</a:t>
+              <a:t>24/04/15</a:t>
             </a:fld>
             <a:endParaRPr lang="en-US"/>
           </a:p>
@@ -1727,7 +1727,7 @@
           <a:p>
             <a:fld id="{A8528DE2-31C9-49BB-A893-07DE5C7B4A44}" type="datetimeFigureOut">
               <a:rPr lang="en-US" smtClean="0"/>
-              <a:t>4/24/2015</a:t>
+              <a:t>24/04/15</a:t>
             </a:fld>
             <a:endParaRPr lang="en-US"/>
           </a:p>
@@ -1822,7 +1822,7 @@
           <a:p>
             <a:fld id="{A8528DE2-31C9-49BB-A893-07DE5C7B4A44}" type="datetimeFigureOut">
               <a:rPr lang="en-US" smtClean="0"/>
-              <a:t>4/24/2015</a:t>
+              <a:t>24/04/15</a:t>
             </a:fld>
             <a:endParaRPr lang="en-US"/>
           </a:p>
@@ -2099,7 +2099,7 @@
           <a:p>
             <a:fld id="{A8528DE2-31C9-49BB-A893-07DE5C7B4A44}" type="datetimeFigureOut">
               <a:rPr lang="en-US" smtClean="0"/>
-              <a:t>4/24/2015</a:t>
+              <a:t>24/04/15</a:t>
             </a:fld>
             <a:endParaRPr lang="en-US"/>
           </a:p>
@@ -2352,7 +2352,7 @@
           <a:p>
             <a:fld id="{A8528DE2-31C9-49BB-A893-07DE5C7B4A44}" type="datetimeFigureOut">
               <a:rPr lang="en-US" smtClean="0"/>
-              <a:t>4/24/2015</a:t>
+              <a:t>24/04/15</a:t>
             </a:fld>
             <a:endParaRPr lang="en-US"/>
           </a:p>
@@ -2565,7 +2565,7 @@
           <a:p>
             <a:fld id="{A8528DE2-31C9-49BB-A893-07DE5C7B4A44}" type="datetimeFigureOut">
               <a:rPr lang="en-US" smtClean="0"/>
-              <a:t>4/24/2015</a:t>
+              <a:t>24/04/15</a:t>
             </a:fld>
             <a:endParaRPr lang="en-US"/>
           </a:p>
@@ -5630,9 +5630,9 @@
                   <a:solidFill>
                     <a:schemeClr val="tx1"/>
                   </a:solidFill>
-                  <a:latin typeface="Roboto Condensed" panose="02000000000000000000" pitchFamily="2" charset="0"/>
+                  <a:latin typeface="Roboto Condensed"/>
                   <a:ea typeface="Roboto Condensed" panose="02000000000000000000" pitchFamily="2" charset="0"/>
-                  <a:cs typeface="Roboto Condensed" panose="02000000000000000000" pitchFamily="2" charset="0"/>
+                  <a:cs typeface="Roboto Condensed"/>
                 </a:rPr>
                 <a:t>Social media</a:t>
               </a:r>
@@ -5640,9 +5640,9 @@
                 <a:solidFill>
                   <a:schemeClr val="tx1"/>
                 </a:solidFill>
-                <a:latin typeface="Roboto Condensed" panose="02000000000000000000" pitchFamily="2" charset="0"/>
+                <a:latin typeface="Roboto Condensed"/>
                 <a:ea typeface="Roboto Condensed" panose="02000000000000000000" pitchFamily="2" charset="0"/>
-                <a:cs typeface="Roboto Condensed" panose="02000000000000000000" pitchFamily="2" charset="0"/>
+                <a:cs typeface="Roboto Condensed"/>
               </a:endParaRPr>
             </a:p>
           </p:txBody>
@@ -7838,7 +7838,7 @@
     </a:clrScheme>
     <a:fontScheme name="Office">
       <a:majorFont>
-        <a:latin typeface="Calibri Light" panose="020F0302020204030204"/>
+        <a:latin typeface="Calibri Light"/>
         <a:ea typeface=""/>
         <a:cs typeface=""/>
         <a:font script="Jpan" typeface="ＭＳ Ｐゴシック"/>
@@ -7873,7 +7873,7 @@
         <a:font script="Geor" typeface="Sylfaen"/>
       </a:majorFont>
       <a:minorFont>
-        <a:latin typeface="Calibri" panose="020F0502020204030204"/>
+        <a:latin typeface="Calibri"/>
         <a:ea typeface=""/>
         <a:cs typeface=""/>
         <a:font script="Jpan" typeface="ＭＳ Ｐゴシック"/>
@@ -8050,7 +8050,7 @@
   <a:extraClrSchemeLst/>
   <a:extLst>
     <a:ext uri="{05A4C25C-085E-4340-85A3-A5531E510DB2}">
-      <thm15:themeFamily xmlns:thm15="http://schemas.microsoft.com/office/thememl/2012/main" name="Office Theme" id="{62F939B6-93AF-4DB8-9C6B-D6C7DFDC589F}" vid="{4A3C46E8-61CC-4603-A589-7422A47A8E4A}"/>
+      <thm15:themeFamily xmlns="" xmlns:thm15="http://schemas.microsoft.com/office/thememl/2012/main" name="Office Theme" id="{62F939B6-93AF-4DB8-9C6B-D6C7DFDC589F}" vid="{4A3C46E8-61CC-4603-A589-7422A47A8E4A}"/>
     </a:ext>
   </a:extLst>
 </a:theme>

</xml_diff>

<commit_message>
updated chap3 before addressing paris comments
</commit_message>
<xml_diff>
--- a/Drawings/Drawing.pptx
+++ b/Drawings/Drawing.pptx
@@ -7,6 +7,7 @@
   <p:sldIdLst>
     <p:sldId id="256" r:id="rId2"/>
     <p:sldId id="257" r:id="rId3"/>
+    <p:sldId id="258" r:id="rId4"/>
   </p:sldIdLst>
   <p:sldSz cx="12192000" cy="6858000"/>
   <p:notesSz cx="6858000" cy="9144000"/>
@@ -107,7 +108,7 @@
   </p:defaultTextStyle>
   <p:extLst>
     <p:ext uri="{EFAFB233-063F-42B5-8137-9DF3F51BA10A}">
-      <p15:sldGuideLst xmlns="" xmlns:p15="http://schemas.microsoft.com/office/powerpoint/2012/main"/>
+      <p15:sldGuideLst xmlns:p15="http://schemas.microsoft.com/office/powerpoint/2012/main" xmlns=""/>
     </p:ext>
   </p:extLst>
 </p:presentation>
@@ -244,7 +245,7 @@
           <a:p>
             <a:fld id="{A8528DE2-31C9-49BB-A893-07DE5C7B4A44}" type="datetimeFigureOut">
               <a:rPr lang="en-US" smtClean="0"/>
-              <a:t>24/04/15</a:t>
+              <a:t>29/04/15</a:t>
             </a:fld>
             <a:endParaRPr lang="en-US"/>
           </a:p>
@@ -414,7 +415,7 @@
           <a:p>
             <a:fld id="{A8528DE2-31C9-49BB-A893-07DE5C7B4A44}" type="datetimeFigureOut">
               <a:rPr lang="en-US" smtClean="0"/>
-              <a:t>24/04/15</a:t>
+              <a:t>29/04/15</a:t>
             </a:fld>
             <a:endParaRPr lang="en-US"/>
           </a:p>
@@ -594,7 +595,7 @@
           <a:p>
             <a:fld id="{A8528DE2-31C9-49BB-A893-07DE5C7B4A44}" type="datetimeFigureOut">
               <a:rPr lang="en-US" smtClean="0"/>
-              <a:t>24/04/15</a:t>
+              <a:t>29/04/15</a:t>
             </a:fld>
             <a:endParaRPr lang="en-US"/>
           </a:p>
@@ -764,7 +765,7 @@
           <a:p>
             <a:fld id="{A8528DE2-31C9-49BB-A893-07DE5C7B4A44}" type="datetimeFigureOut">
               <a:rPr lang="en-US" smtClean="0"/>
-              <a:t>24/04/15</a:t>
+              <a:t>29/04/15</a:t>
             </a:fld>
             <a:endParaRPr lang="en-US"/>
           </a:p>
@@ -1010,7 +1011,7 @@
           <a:p>
             <a:fld id="{A8528DE2-31C9-49BB-A893-07DE5C7B4A44}" type="datetimeFigureOut">
               <a:rPr lang="en-US" smtClean="0"/>
-              <a:t>24/04/15</a:t>
+              <a:t>29/04/15</a:t>
             </a:fld>
             <a:endParaRPr lang="en-US"/>
           </a:p>
@@ -1242,7 +1243,7 @@
           <a:p>
             <a:fld id="{A8528DE2-31C9-49BB-A893-07DE5C7B4A44}" type="datetimeFigureOut">
               <a:rPr lang="en-US" smtClean="0"/>
-              <a:t>24/04/15</a:t>
+              <a:t>29/04/15</a:t>
             </a:fld>
             <a:endParaRPr lang="en-US"/>
           </a:p>
@@ -1609,7 +1610,7 @@
           <a:p>
             <a:fld id="{A8528DE2-31C9-49BB-A893-07DE5C7B4A44}" type="datetimeFigureOut">
               <a:rPr lang="en-US" smtClean="0"/>
-              <a:t>24/04/15</a:t>
+              <a:t>29/04/15</a:t>
             </a:fld>
             <a:endParaRPr lang="en-US"/>
           </a:p>
@@ -1727,7 +1728,7 @@
           <a:p>
             <a:fld id="{A8528DE2-31C9-49BB-A893-07DE5C7B4A44}" type="datetimeFigureOut">
               <a:rPr lang="en-US" smtClean="0"/>
-              <a:t>24/04/15</a:t>
+              <a:t>29/04/15</a:t>
             </a:fld>
             <a:endParaRPr lang="en-US"/>
           </a:p>
@@ -1822,7 +1823,7 @@
           <a:p>
             <a:fld id="{A8528DE2-31C9-49BB-A893-07DE5C7B4A44}" type="datetimeFigureOut">
               <a:rPr lang="en-US" smtClean="0"/>
-              <a:t>24/04/15</a:t>
+              <a:t>29/04/15</a:t>
             </a:fld>
             <a:endParaRPr lang="en-US"/>
           </a:p>
@@ -2099,7 +2100,7 @@
           <a:p>
             <a:fld id="{A8528DE2-31C9-49BB-A893-07DE5C7B4A44}" type="datetimeFigureOut">
               <a:rPr lang="en-US" smtClean="0"/>
-              <a:t>24/04/15</a:t>
+              <a:t>29/04/15</a:t>
             </a:fld>
             <a:endParaRPr lang="en-US"/>
           </a:p>
@@ -2352,7 +2353,7 @@
           <a:p>
             <a:fld id="{A8528DE2-31C9-49BB-A893-07DE5C7B4A44}" type="datetimeFigureOut">
               <a:rPr lang="en-US" smtClean="0"/>
-              <a:t>24/04/15</a:t>
+              <a:t>29/04/15</a:t>
             </a:fld>
             <a:endParaRPr lang="en-US"/>
           </a:p>
@@ -2565,7 +2566,7 @@
           <a:p>
             <a:fld id="{A8528DE2-31C9-49BB-A893-07DE5C7B4A44}" type="datetimeFigureOut">
               <a:rPr lang="en-US" smtClean="0"/>
-              <a:t>24/04/15</a:t>
+              <a:t>29/04/15</a:t>
             </a:fld>
             <a:endParaRPr lang="en-US"/>
           </a:p>
@@ -5634,7 +5635,7 @@
                   <a:ea typeface="Roboto Condensed" panose="02000000000000000000" pitchFamily="2" charset="0"/>
                   <a:cs typeface="Roboto Condensed"/>
                 </a:rPr>
-                <a:t>Social media</a:t>
+                <a:t>Context data</a:t>
               </a:r>
               <a:endParaRPr lang="en-US" sz="1400" dirty="0">
                 <a:solidFill>
@@ -7104,67 +7105,14 @@
           </p:sp>
           <p:sp>
             <p:nvSpPr>
-              <p:cNvPr id="89" name="Rectangle 88"/>
-              <p:cNvSpPr/>
-              <p:nvPr/>
-            </p:nvSpPr>
-            <p:spPr>
-              <a:xfrm>
-                <a:off x="957940" y="0"/>
-                <a:ext cx="2090060" cy="473995"/>
-              </a:xfrm>
-              <a:prstGeom prst="rect">
-                <a:avLst/>
-              </a:prstGeom>
-              <a:ln>
-                <a:noFill/>
-              </a:ln>
-            </p:spPr>
-            <p:style>
-              <a:lnRef idx="3">
-                <a:schemeClr val="lt1"/>
-              </a:lnRef>
-              <a:fillRef idx="1">
-                <a:schemeClr val="accent1"/>
-              </a:fillRef>
-              <a:effectRef idx="1">
-                <a:schemeClr val="accent1"/>
-              </a:effectRef>
-              <a:fontRef idx="minor">
-                <a:schemeClr val="lt1"/>
-              </a:fontRef>
-            </p:style>
-            <p:txBody>
-              <a:bodyPr rtlCol="0" anchor="ctr"/>
-              <a:lstStyle/>
-              <a:p>
-                <a:pPr algn="ctr"/>
-                <a:r>
-                  <a:rPr lang="en-US" sz="1400" dirty="0" smtClean="0">
-                    <a:latin typeface="Roboto Condensed" panose="02000000000000000000" pitchFamily="2" charset="0"/>
-                    <a:ea typeface="Roboto Condensed" panose="02000000000000000000" pitchFamily="2" charset="0"/>
-                    <a:cs typeface="Roboto Condensed" panose="02000000000000000000" pitchFamily="2" charset="0"/>
-                  </a:rPr>
-                  <a:t>Facebook</a:t>
-                </a:r>
-                <a:endParaRPr lang="en-US" sz="1400" dirty="0">
-                  <a:latin typeface="Roboto Condensed" panose="02000000000000000000" pitchFamily="2" charset="0"/>
-                  <a:ea typeface="Roboto Condensed" panose="02000000000000000000" pitchFamily="2" charset="0"/>
-                  <a:cs typeface="Roboto Condensed" panose="02000000000000000000" pitchFamily="2" charset="0"/>
-                </a:endParaRPr>
-              </a:p>
-            </p:txBody>
-          </p:sp>
-          <p:sp>
-            <p:nvSpPr>
               <p:cNvPr id="90" name="Rectangle 89"/>
               <p:cNvSpPr/>
               <p:nvPr/>
             </p:nvSpPr>
             <p:spPr>
               <a:xfrm>
-                <a:off x="4229090" y="-13603"/>
-                <a:ext cx="2090060" cy="473995"/>
+                <a:off x="956326" y="-13603"/>
+                <a:ext cx="8634272" cy="473995"/>
               </a:xfrm>
               <a:prstGeom prst="rect">
                 <a:avLst/>
@@ -7199,59 +7147,6 @@
                     <a:cs typeface="Roboto Condensed" panose="02000000000000000000" pitchFamily="2" charset="0"/>
                   </a:rPr>
                   <a:t>Twitter</a:t>
-                </a:r>
-                <a:endParaRPr lang="en-US" sz="1400" dirty="0">
-                  <a:latin typeface="Roboto Condensed" panose="02000000000000000000" pitchFamily="2" charset="0"/>
-                  <a:ea typeface="Roboto Condensed" panose="02000000000000000000" pitchFamily="2" charset="0"/>
-                  <a:cs typeface="Roboto Condensed" panose="02000000000000000000" pitchFamily="2" charset="0"/>
-                </a:endParaRPr>
-              </a:p>
-            </p:txBody>
-          </p:sp>
-          <p:sp>
-            <p:nvSpPr>
-              <p:cNvPr id="91" name="Rectangle 90"/>
-              <p:cNvSpPr/>
-              <p:nvPr/>
-            </p:nvSpPr>
-            <p:spPr>
-              <a:xfrm>
-                <a:off x="7500651" y="0"/>
-                <a:ext cx="2090060" cy="473995"/>
-              </a:xfrm>
-              <a:prstGeom prst="rect">
-                <a:avLst/>
-              </a:prstGeom>
-              <a:ln>
-                <a:noFill/>
-              </a:ln>
-            </p:spPr>
-            <p:style>
-              <a:lnRef idx="3">
-                <a:schemeClr val="lt1"/>
-              </a:lnRef>
-              <a:fillRef idx="1">
-                <a:schemeClr val="accent1"/>
-              </a:fillRef>
-              <a:effectRef idx="1">
-                <a:schemeClr val="accent1"/>
-              </a:effectRef>
-              <a:fontRef idx="minor">
-                <a:schemeClr val="lt1"/>
-              </a:fontRef>
-            </p:style>
-            <p:txBody>
-              <a:bodyPr rtlCol="0" anchor="ctr"/>
-              <a:lstStyle/>
-              <a:p>
-                <a:pPr algn="ctr"/>
-                <a:r>
-                  <a:rPr lang="en-US" sz="1400" dirty="0" smtClean="0">
-                    <a:latin typeface="Roboto Condensed" panose="02000000000000000000" pitchFamily="2" charset="0"/>
-                    <a:ea typeface="Roboto Condensed" panose="02000000000000000000" pitchFamily="2" charset="0"/>
-                    <a:cs typeface="Roboto Condensed" panose="02000000000000000000" pitchFamily="2" charset="0"/>
-                  </a:rPr>
-                  <a:t>Forums</a:t>
                 </a:r>
                 <a:endParaRPr lang="en-US" sz="1400" dirty="0">
                   <a:latin typeface="Roboto Condensed" panose="02000000000000000000" pitchFamily="2" charset="0"/>
@@ -7792,6 +7687,620 @@
   <p:clrMapOvr>
     <a:masterClrMapping/>
   </p:clrMapOvr>
+</p:sld>
+</file>
+
+<file path=ppt/slides/slide3.xml><?xml version="1.0" encoding="utf-8"?>
+<p:sld xmlns:a="http://schemas.openxmlformats.org/drawingml/2006/main" xmlns:r="http://schemas.openxmlformats.org/officeDocument/2006/relationships" xmlns:p="http://schemas.openxmlformats.org/presentationml/2006/main">
+  <p:cSld>
+    <p:spTree>
+      <p:nvGrpSpPr>
+        <p:cNvPr id="1" name=""/>
+        <p:cNvGrpSpPr/>
+        <p:nvPr/>
+      </p:nvGrpSpPr>
+      <p:grpSpPr>
+        <a:xfrm>
+          <a:off x="0" y="0"/>
+          <a:ext cx="0" cy="0"/>
+          <a:chOff x="0" y="0"/>
+          <a:chExt cx="0" cy="0"/>
+        </a:xfrm>
+      </p:grpSpPr>
+      <p:grpSp>
+        <p:nvGrpSpPr>
+          <p:cNvPr id="24" name="Group 23"/>
+          <p:cNvGrpSpPr/>
+          <p:nvPr/>
+        </p:nvGrpSpPr>
+        <p:grpSpPr>
+          <a:xfrm>
+            <a:off x="710835" y="1014069"/>
+            <a:ext cx="7193647" cy="4378758"/>
+            <a:chOff x="710835" y="1014069"/>
+            <a:chExt cx="7193647" cy="4378758"/>
+          </a:xfrm>
+        </p:grpSpPr>
+        <p:sp>
+          <p:nvSpPr>
+            <p:cNvPr id="18" name="Right Arrow 17"/>
+            <p:cNvSpPr/>
+            <p:nvPr/>
+          </p:nvSpPr>
+          <p:spPr>
+            <a:xfrm>
+              <a:off x="4284719" y="1014832"/>
+              <a:ext cx="3222451" cy="4018369"/>
+            </a:xfrm>
+            <a:prstGeom prst="rightArrow">
+              <a:avLst>
+                <a:gd name="adj1" fmla="val 64779"/>
+                <a:gd name="adj2" fmla="val 53778"/>
+              </a:avLst>
+            </a:prstGeom>
+            <a:solidFill>
+              <a:schemeClr val="accent6">
+                <a:lumMod val="40000"/>
+                <a:lumOff val="60000"/>
+              </a:schemeClr>
+            </a:solidFill>
+            <a:ln/>
+          </p:spPr>
+          <p:style>
+            <a:lnRef idx="3">
+              <a:schemeClr val="lt1"/>
+            </a:lnRef>
+            <a:fillRef idx="1">
+              <a:schemeClr val="accent1"/>
+            </a:fillRef>
+            <a:effectRef idx="1">
+              <a:schemeClr val="accent1"/>
+            </a:effectRef>
+            <a:fontRef idx="minor">
+              <a:schemeClr val="lt1"/>
+            </a:fontRef>
+          </p:style>
+          <p:txBody>
+            <a:bodyPr/>
+            <a:lstStyle/>
+            <a:p>
+              <a:endParaRPr lang="en-US"/>
+            </a:p>
+          </p:txBody>
+        </p:sp>
+        <p:sp>
+          <p:nvSpPr>
+            <p:cNvPr id="11" name="Right Arrow 10"/>
+            <p:cNvSpPr/>
+            <p:nvPr/>
+          </p:nvSpPr>
+          <p:spPr>
+            <a:xfrm>
+              <a:off x="1525925" y="1014069"/>
+              <a:ext cx="3222451" cy="4018369"/>
+            </a:xfrm>
+            <a:prstGeom prst="rightArrow">
+              <a:avLst>
+                <a:gd name="adj1" fmla="val 64779"/>
+                <a:gd name="adj2" fmla="val 53778"/>
+              </a:avLst>
+            </a:prstGeom>
+            <a:solidFill>
+              <a:schemeClr val="accent1">
+                <a:lumMod val="40000"/>
+                <a:lumOff val="60000"/>
+              </a:schemeClr>
+            </a:solidFill>
+            <a:ln/>
+          </p:spPr>
+          <p:style>
+            <a:lnRef idx="3">
+              <a:schemeClr val="lt1"/>
+            </a:lnRef>
+            <a:fillRef idx="1">
+              <a:schemeClr val="accent1"/>
+            </a:fillRef>
+            <a:effectRef idx="1">
+              <a:schemeClr val="accent1"/>
+            </a:effectRef>
+            <a:fontRef idx="minor">
+              <a:schemeClr val="lt1"/>
+            </a:fontRef>
+          </p:style>
+          <p:txBody>
+            <a:bodyPr/>
+            <a:lstStyle/>
+            <a:p>
+              <a:endParaRPr lang="en-US"/>
+            </a:p>
+          </p:txBody>
+        </p:sp>
+        <p:sp>
+          <p:nvSpPr>
+            <p:cNvPr id="15" name="Rectangle 14"/>
+            <p:cNvSpPr/>
+            <p:nvPr/>
+          </p:nvSpPr>
+          <p:spPr>
+            <a:xfrm>
+              <a:off x="710835" y="1885980"/>
+              <a:ext cx="1876603" cy="2274548"/>
+            </a:xfrm>
+            <a:prstGeom prst="rect">
+              <a:avLst/>
+            </a:prstGeom>
+            <a:solidFill>
+              <a:schemeClr val="accent2"/>
+            </a:solidFill>
+            <a:ln>
+              <a:noFill/>
+            </a:ln>
+          </p:spPr>
+          <p:style>
+            <a:lnRef idx="3">
+              <a:schemeClr val="lt1"/>
+            </a:lnRef>
+            <a:fillRef idx="1">
+              <a:schemeClr val="accent1"/>
+            </a:fillRef>
+            <a:effectRef idx="1">
+              <a:schemeClr val="accent1"/>
+            </a:effectRef>
+            <a:fontRef idx="minor">
+              <a:schemeClr val="lt1"/>
+            </a:fontRef>
+          </p:style>
+          <p:txBody>
+            <a:bodyPr rtlCol="0" anchor="ctr"/>
+            <a:lstStyle/>
+            <a:p>
+              <a:pPr algn="ctr"/>
+              <a:r>
+                <a:rPr lang="en-US" dirty="0" smtClean="0">
+                  <a:latin typeface="Roboto Condensed" panose="02000000000000000000" pitchFamily="2" charset="0"/>
+                  <a:ea typeface="Roboto Condensed" panose="02000000000000000000" pitchFamily="2" charset="0"/>
+                  <a:cs typeface="Roboto Condensed" panose="02000000000000000000" pitchFamily="2" charset="0"/>
+                </a:rPr>
+                <a:t>Social media</a:t>
+              </a:r>
+              <a:endParaRPr lang="en-US" dirty="0">
+                <a:latin typeface="Roboto Condensed" panose="02000000000000000000" pitchFamily="2" charset="0"/>
+                <a:ea typeface="Roboto Condensed" panose="02000000000000000000" pitchFamily="2" charset="0"/>
+                <a:cs typeface="Roboto Condensed" panose="02000000000000000000" pitchFamily="2" charset="0"/>
+              </a:endParaRPr>
+            </a:p>
+          </p:txBody>
+        </p:sp>
+        <p:sp>
+          <p:nvSpPr>
+            <p:cNvPr id="16" name="Rectangle 15"/>
+            <p:cNvSpPr/>
+            <p:nvPr/>
+          </p:nvSpPr>
+          <p:spPr>
+            <a:xfrm>
+              <a:off x="3412007" y="1885979"/>
+              <a:ext cx="1819736" cy="2265071"/>
+            </a:xfrm>
+            <a:prstGeom prst="rect">
+              <a:avLst/>
+            </a:prstGeom>
+            <a:solidFill>
+              <a:schemeClr val="accent2"/>
+            </a:solidFill>
+            <a:ln>
+              <a:noFill/>
+            </a:ln>
+          </p:spPr>
+          <p:style>
+            <a:lnRef idx="3">
+              <a:schemeClr val="lt1"/>
+            </a:lnRef>
+            <a:fillRef idx="1">
+              <a:schemeClr val="accent1"/>
+            </a:fillRef>
+            <a:effectRef idx="1">
+              <a:schemeClr val="accent1"/>
+            </a:effectRef>
+            <a:fontRef idx="minor">
+              <a:schemeClr val="lt1"/>
+            </a:fontRef>
+          </p:style>
+          <p:txBody>
+            <a:bodyPr rtlCol="0" anchor="ctr"/>
+            <a:lstStyle/>
+            <a:p>
+              <a:pPr algn="ctr"/>
+              <a:r>
+                <a:rPr lang="en-US" dirty="0" smtClean="0">
+                  <a:latin typeface="Roboto Condensed" panose="02000000000000000000" pitchFamily="2" charset="0"/>
+                  <a:ea typeface="Roboto Condensed" panose="02000000000000000000" pitchFamily="2" charset="0"/>
+                  <a:cs typeface="Roboto Condensed" panose="02000000000000000000" pitchFamily="2" charset="0"/>
+                </a:rPr>
+                <a:t>Emotions</a:t>
+              </a:r>
+              <a:endParaRPr lang="en-US" dirty="0">
+                <a:latin typeface="Roboto Condensed" panose="02000000000000000000" pitchFamily="2" charset="0"/>
+                <a:ea typeface="Roboto Condensed" panose="02000000000000000000" pitchFamily="2" charset="0"/>
+                <a:cs typeface="Roboto Condensed" panose="02000000000000000000" pitchFamily="2" charset="0"/>
+              </a:endParaRPr>
+            </a:p>
+          </p:txBody>
+        </p:sp>
+        <p:sp>
+          <p:nvSpPr>
+            <p:cNvPr id="17" name="Rectangle 16"/>
+            <p:cNvSpPr/>
+            <p:nvPr/>
+          </p:nvSpPr>
+          <p:spPr>
+            <a:xfrm>
+              <a:off x="6094980" y="1885980"/>
+              <a:ext cx="1809502" cy="2255593"/>
+            </a:xfrm>
+            <a:prstGeom prst="rect">
+              <a:avLst/>
+            </a:prstGeom>
+            <a:solidFill>
+              <a:schemeClr val="accent2"/>
+            </a:solidFill>
+            <a:ln>
+              <a:noFill/>
+            </a:ln>
+          </p:spPr>
+          <p:style>
+            <a:lnRef idx="3">
+              <a:schemeClr val="lt1"/>
+            </a:lnRef>
+            <a:fillRef idx="1">
+              <a:schemeClr val="accent1"/>
+            </a:fillRef>
+            <a:effectRef idx="1">
+              <a:schemeClr val="accent1"/>
+            </a:effectRef>
+            <a:fontRef idx="minor">
+              <a:schemeClr val="lt1"/>
+            </a:fontRef>
+          </p:style>
+          <p:txBody>
+            <a:bodyPr rtlCol="0" anchor="ctr"/>
+            <a:lstStyle/>
+            <a:p>
+              <a:pPr algn="ctr"/>
+              <a:r>
+                <a:rPr lang="en-US" dirty="0" smtClean="0">
+                  <a:latin typeface="Roboto Condensed" panose="02000000000000000000" pitchFamily="2" charset="0"/>
+                  <a:ea typeface="Roboto Condensed" panose="02000000000000000000" pitchFamily="2" charset="0"/>
+                  <a:cs typeface="Roboto Condensed" panose="02000000000000000000" pitchFamily="2" charset="0"/>
+                </a:rPr>
+                <a:t>Crowd types</a:t>
+              </a:r>
+              <a:endParaRPr lang="en-US" dirty="0">
+                <a:latin typeface="Roboto Condensed" panose="02000000000000000000" pitchFamily="2" charset="0"/>
+                <a:ea typeface="Roboto Condensed" panose="02000000000000000000" pitchFamily="2" charset="0"/>
+                <a:cs typeface="Roboto Condensed" panose="02000000000000000000" pitchFamily="2" charset="0"/>
+              </a:endParaRPr>
+            </a:p>
+          </p:txBody>
+        </p:sp>
+        <p:sp>
+          <p:nvSpPr>
+            <p:cNvPr id="19" name="Rectangle 18"/>
+            <p:cNvSpPr/>
+            <p:nvPr/>
+          </p:nvSpPr>
+          <p:spPr>
+            <a:xfrm>
+              <a:off x="987306" y="1278028"/>
+              <a:ext cx="1175659" cy="473995"/>
+            </a:xfrm>
+            <a:prstGeom prst="rect">
+              <a:avLst/>
+            </a:prstGeom>
+            <a:noFill/>
+            <a:ln>
+              <a:noFill/>
+            </a:ln>
+          </p:spPr>
+          <p:style>
+            <a:lnRef idx="3">
+              <a:schemeClr val="lt1"/>
+            </a:lnRef>
+            <a:fillRef idx="1">
+              <a:schemeClr val="accent1"/>
+            </a:fillRef>
+            <a:effectRef idx="1">
+              <a:schemeClr val="accent1"/>
+            </a:effectRef>
+            <a:fontRef idx="minor">
+              <a:schemeClr val="lt1"/>
+            </a:fontRef>
+          </p:style>
+          <p:txBody>
+            <a:bodyPr rtlCol="0" anchor="ctr"/>
+            <a:lstStyle/>
+            <a:p>
+              <a:pPr algn="ctr"/>
+              <a:r>
+                <a:rPr lang="en-US" sz="1400" i="1" dirty="0" smtClean="0">
+                  <a:solidFill>
+                    <a:srgbClr val="000000"/>
+                  </a:solidFill>
+                  <a:latin typeface="Roboto Condensed" panose="02000000000000000000" pitchFamily="2" charset="0"/>
+                  <a:ea typeface="Roboto Condensed" panose="02000000000000000000" pitchFamily="2" charset="0"/>
+                  <a:cs typeface="Roboto Condensed" panose="02000000000000000000" pitchFamily="2" charset="0"/>
+                </a:rPr>
+                <a:t>Raw context data</a:t>
+              </a:r>
+              <a:endParaRPr lang="en-US" sz="1400" i="1" dirty="0">
+                <a:solidFill>
+                  <a:srgbClr val="000000"/>
+                </a:solidFill>
+                <a:latin typeface="Roboto Condensed" panose="02000000000000000000" pitchFamily="2" charset="0"/>
+                <a:ea typeface="Roboto Condensed" panose="02000000000000000000" pitchFamily="2" charset="0"/>
+                <a:cs typeface="Roboto Condensed" panose="02000000000000000000" pitchFamily="2" charset="0"/>
+              </a:endParaRPr>
+            </a:p>
+          </p:txBody>
+        </p:sp>
+        <p:sp>
+          <p:nvSpPr>
+            <p:cNvPr id="20" name="Rectangle 19"/>
+            <p:cNvSpPr/>
+            <p:nvPr/>
+          </p:nvSpPr>
+          <p:spPr>
+            <a:xfrm>
+              <a:off x="3727144" y="1278791"/>
+              <a:ext cx="1175659" cy="473995"/>
+            </a:xfrm>
+            <a:prstGeom prst="rect">
+              <a:avLst/>
+            </a:prstGeom>
+            <a:noFill/>
+            <a:ln>
+              <a:noFill/>
+            </a:ln>
+          </p:spPr>
+          <p:style>
+            <a:lnRef idx="3">
+              <a:schemeClr val="lt1"/>
+            </a:lnRef>
+            <a:fillRef idx="1">
+              <a:schemeClr val="accent1"/>
+            </a:fillRef>
+            <a:effectRef idx="1">
+              <a:schemeClr val="accent1"/>
+            </a:effectRef>
+            <a:fontRef idx="minor">
+              <a:schemeClr val="lt1"/>
+            </a:fontRef>
+          </p:style>
+          <p:txBody>
+            <a:bodyPr rtlCol="0" anchor="ctr"/>
+            <a:lstStyle/>
+            <a:p>
+              <a:pPr algn="ctr"/>
+              <a:r>
+                <a:rPr lang="en-US" sz="1400" i="1" dirty="0" smtClean="0">
+                  <a:solidFill>
+                    <a:srgbClr val="000000"/>
+                  </a:solidFill>
+                  <a:latin typeface="Roboto Condensed" panose="02000000000000000000" pitchFamily="2" charset="0"/>
+                  <a:ea typeface="Roboto Condensed" panose="02000000000000000000" pitchFamily="2" charset="0"/>
+                  <a:cs typeface="Roboto Condensed" panose="02000000000000000000" pitchFamily="2" charset="0"/>
+                </a:rPr>
+                <a:t>High level context data</a:t>
+              </a:r>
+              <a:endParaRPr lang="en-US" sz="1400" i="1" dirty="0">
+                <a:solidFill>
+                  <a:srgbClr val="000000"/>
+                </a:solidFill>
+                <a:latin typeface="Roboto Condensed" panose="02000000000000000000" pitchFamily="2" charset="0"/>
+                <a:ea typeface="Roboto Condensed" panose="02000000000000000000" pitchFamily="2" charset="0"/>
+                <a:cs typeface="Roboto Condensed" panose="02000000000000000000" pitchFamily="2" charset="0"/>
+              </a:endParaRPr>
+            </a:p>
+          </p:txBody>
+        </p:sp>
+        <p:sp>
+          <p:nvSpPr>
+            <p:cNvPr id="21" name="Rectangle 20"/>
+            <p:cNvSpPr/>
+            <p:nvPr/>
+          </p:nvSpPr>
+          <p:spPr>
+            <a:xfrm>
+              <a:off x="6410115" y="1279555"/>
+              <a:ext cx="1175659" cy="473995"/>
+            </a:xfrm>
+            <a:prstGeom prst="rect">
+              <a:avLst/>
+            </a:prstGeom>
+            <a:noFill/>
+            <a:ln>
+              <a:noFill/>
+            </a:ln>
+          </p:spPr>
+          <p:style>
+            <a:lnRef idx="3">
+              <a:schemeClr val="lt1"/>
+            </a:lnRef>
+            <a:fillRef idx="1">
+              <a:schemeClr val="accent1"/>
+            </a:fillRef>
+            <a:effectRef idx="1">
+              <a:schemeClr val="accent1"/>
+            </a:effectRef>
+            <a:fontRef idx="minor">
+              <a:schemeClr val="lt1"/>
+            </a:fontRef>
+          </p:style>
+          <p:txBody>
+            <a:bodyPr rtlCol="0" anchor="ctr"/>
+            <a:lstStyle/>
+            <a:p>
+              <a:pPr algn="ctr"/>
+              <a:r>
+                <a:rPr lang="en-US" sz="1400" i="1" dirty="0" smtClean="0">
+                  <a:solidFill>
+                    <a:srgbClr val="000000"/>
+                  </a:solidFill>
+                  <a:latin typeface="Roboto Condensed" panose="02000000000000000000" pitchFamily="2" charset="0"/>
+                  <a:ea typeface="Roboto Condensed" panose="02000000000000000000" pitchFamily="2" charset="0"/>
+                  <a:cs typeface="Roboto Condensed" panose="02000000000000000000" pitchFamily="2" charset="0"/>
+                </a:rPr>
+                <a:t>Output</a:t>
+              </a:r>
+              <a:endParaRPr lang="en-US" sz="1400" i="1" dirty="0">
+                <a:solidFill>
+                  <a:srgbClr val="000000"/>
+                </a:solidFill>
+                <a:latin typeface="Roboto Condensed" panose="02000000000000000000" pitchFamily="2" charset="0"/>
+                <a:ea typeface="Roboto Condensed" panose="02000000000000000000" pitchFamily="2" charset="0"/>
+                <a:cs typeface="Roboto Condensed" panose="02000000000000000000" pitchFamily="2" charset="0"/>
+              </a:endParaRPr>
+            </a:p>
+          </p:txBody>
+        </p:sp>
+        <p:sp>
+          <p:nvSpPr>
+            <p:cNvPr id="22" name="Rectangle 21"/>
+            <p:cNvSpPr/>
+            <p:nvPr/>
+          </p:nvSpPr>
+          <p:spPr>
+            <a:xfrm>
+              <a:off x="1980859" y="4918068"/>
+              <a:ext cx="2066159" cy="473995"/>
+            </a:xfrm>
+            <a:prstGeom prst="rect">
+              <a:avLst/>
+            </a:prstGeom>
+            <a:noFill/>
+            <a:ln>
+              <a:noFill/>
+            </a:ln>
+          </p:spPr>
+          <p:style>
+            <a:lnRef idx="3">
+              <a:schemeClr val="lt1"/>
+            </a:lnRef>
+            <a:fillRef idx="1">
+              <a:schemeClr val="accent1"/>
+            </a:fillRef>
+            <a:effectRef idx="1">
+              <a:schemeClr val="accent1"/>
+            </a:effectRef>
+            <a:fontRef idx="minor">
+              <a:schemeClr val="lt1"/>
+            </a:fontRef>
+          </p:style>
+          <p:txBody>
+            <a:bodyPr rtlCol="0" anchor="ctr"/>
+            <a:lstStyle/>
+            <a:p>
+              <a:pPr algn="ctr"/>
+              <a:r>
+                <a:rPr lang="en-US" dirty="0" smtClean="0">
+                  <a:solidFill>
+                    <a:srgbClr val="000000"/>
+                  </a:solidFill>
+                  <a:latin typeface="Roboto Condensed" panose="02000000000000000000" pitchFamily="2" charset="0"/>
+                  <a:ea typeface="Roboto Condensed" panose="02000000000000000000" pitchFamily="2" charset="0"/>
+                  <a:cs typeface="Roboto Condensed" panose="02000000000000000000" pitchFamily="2" charset="0"/>
+                </a:rPr>
+                <a:t>Emotion analysis</a:t>
+              </a:r>
+              <a:endParaRPr lang="en-US" dirty="0">
+                <a:solidFill>
+                  <a:srgbClr val="000000"/>
+                </a:solidFill>
+                <a:latin typeface="Roboto Condensed" panose="02000000000000000000" pitchFamily="2" charset="0"/>
+                <a:ea typeface="Roboto Condensed" panose="02000000000000000000" pitchFamily="2" charset="0"/>
+                <a:cs typeface="Roboto Condensed" panose="02000000000000000000" pitchFamily="2" charset="0"/>
+              </a:endParaRPr>
+            </a:p>
+          </p:txBody>
+        </p:sp>
+        <p:sp>
+          <p:nvSpPr>
+            <p:cNvPr id="23" name="Rectangle 22"/>
+            <p:cNvSpPr/>
+            <p:nvPr/>
+          </p:nvSpPr>
+          <p:spPr>
+            <a:xfrm>
+              <a:off x="4577776" y="4918832"/>
+              <a:ext cx="2511615" cy="473995"/>
+            </a:xfrm>
+            <a:prstGeom prst="rect">
+              <a:avLst/>
+            </a:prstGeom>
+            <a:noFill/>
+            <a:ln>
+              <a:noFill/>
+            </a:ln>
+          </p:spPr>
+          <p:style>
+            <a:lnRef idx="3">
+              <a:schemeClr val="lt1"/>
+            </a:lnRef>
+            <a:fillRef idx="1">
+              <a:schemeClr val="accent1"/>
+            </a:fillRef>
+            <a:effectRef idx="1">
+              <a:schemeClr val="accent1"/>
+            </a:effectRef>
+            <a:fontRef idx="minor">
+              <a:schemeClr val="lt1"/>
+            </a:fontRef>
+          </p:style>
+          <p:txBody>
+            <a:bodyPr rtlCol="0" anchor="ctr"/>
+            <a:lstStyle/>
+            <a:p>
+              <a:pPr algn="ctr"/>
+              <a:r>
+                <a:rPr lang="en-US" dirty="0" smtClean="0">
+                  <a:solidFill>
+                    <a:srgbClr val="000000"/>
+                  </a:solidFill>
+                  <a:latin typeface="Roboto Condensed" panose="02000000000000000000" pitchFamily="2" charset="0"/>
+                  <a:ea typeface="Roboto Condensed" panose="02000000000000000000" pitchFamily="2" charset="0"/>
+                  <a:cs typeface="Roboto Condensed" panose="02000000000000000000" pitchFamily="2" charset="0"/>
+                </a:rPr>
+                <a:t>Crowd type classification</a:t>
+              </a:r>
+              <a:endParaRPr lang="en-US" dirty="0">
+                <a:solidFill>
+                  <a:srgbClr val="000000"/>
+                </a:solidFill>
+                <a:latin typeface="Roboto Condensed" panose="02000000000000000000" pitchFamily="2" charset="0"/>
+                <a:ea typeface="Roboto Condensed" panose="02000000000000000000" pitchFamily="2" charset="0"/>
+                <a:cs typeface="Roboto Condensed" panose="02000000000000000000" pitchFamily="2" charset="0"/>
+              </a:endParaRPr>
+            </a:p>
+          </p:txBody>
+        </p:sp>
+      </p:grpSp>
+    </p:spTree>
+    <p:extLst>
+      <p:ext uri="{BB962C8B-B14F-4D97-AF65-F5344CB8AC3E}">
+        <p14:creationId xmlns:p14="http://schemas.microsoft.com/office/powerpoint/2010/main" val="210907470"/>
+      </p:ext>
+    </p:extLst>
+  </p:cSld>
+  <p:clrMapOvr>
+    <a:masterClrMapping/>
+  </p:clrMapOvr>
+  <p:timing>
+    <p:tnLst>
+      <p:par>
+        <p:cTn xmlns:p14="http://schemas.microsoft.com/office/powerpoint/2010/main" id="1" dur="indefinite" restart="never" nodeType="tmRoot"/>
+      </p:par>
+    </p:tnLst>
+  </p:timing>
 </p:sld>
 </file>
 
@@ -8050,7 +8559,7 @@
   <a:extraClrSchemeLst/>
   <a:extLst>
     <a:ext uri="{05A4C25C-085E-4340-85A3-A5531E510DB2}">
-      <thm15:themeFamily xmlns="" xmlns:thm15="http://schemas.microsoft.com/office/thememl/2012/main" name="Office Theme" id="{62F939B6-93AF-4DB8-9C6B-D6C7DFDC589F}" vid="{4A3C46E8-61CC-4603-A589-7422A47A8E4A}"/>
+      <thm15:themeFamily xmlns:thm15="http://schemas.microsoft.com/office/thememl/2012/main" xmlns="" name="Office Theme" id="{62F939B6-93AF-4DB8-9C6B-D6C7DFDC589F}" vid="{4A3C46E8-61CC-4603-A589-7422A47A8E4A}"/>
     </a:ext>
   </a:extLst>
 </a:theme>

</xml_diff>

<commit_message>
update ekman emotion model
</commit_message>
<xml_diff>
--- a/Drawings/Drawing.pptx
+++ b/Drawings/Drawing.pptx
@@ -8,8 +8,9 @@
     <p:sldId id="256" r:id="rId2"/>
     <p:sldId id="257" r:id="rId3"/>
     <p:sldId id="258" r:id="rId4"/>
+    <p:sldId id="259" r:id="rId5"/>
   </p:sldIdLst>
-  <p:sldSz cx="12192000" cy="6858000"/>
+  <p:sldSz cx="9906000" cy="6858000" type="A4"/>
   <p:notesSz cx="6858000" cy="9144000"/>
   <p:defaultTextStyle>
     <a:defPPr>
@@ -143,8 +144,8 @@
         </p:nvSpPr>
         <p:spPr>
           <a:xfrm>
-            <a:off x="1524000" y="1122363"/>
-            <a:ext cx="9144000" cy="2387600"/>
+            <a:off x="1238250" y="1122363"/>
+            <a:ext cx="7429500" cy="2387600"/>
           </a:xfrm>
         </p:spPr>
         <p:txBody>
@@ -175,8 +176,8 @@
         </p:nvSpPr>
         <p:spPr>
           <a:xfrm>
-            <a:off x="1524000" y="3602038"/>
-            <a:ext cx="9144000" cy="1655762"/>
+            <a:off x="1238250" y="3602038"/>
+            <a:ext cx="7429500" cy="1655762"/>
           </a:xfrm>
         </p:spPr>
         <p:txBody>
@@ -245,7 +246,7 @@
           <a:p>
             <a:fld id="{A8528DE2-31C9-49BB-A893-07DE5C7B4A44}" type="datetimeFigureOut">
               <a:rPr lang="en-US" smtClean="0"/>
-              <a:t>29/04/15</a:t>
+              <a:t>10/05/15</a:t>
             </a:fld>
             <a:endParaRPr lang="en-US"/>
           </a:p>
@@ -415,7 +416,7 @@
           <a:p>
             <a:fld id="{A8528DE2-31C9-49BB-A893-07DE5C7B4A44}" type="datetimeFigureOut">
               <a:rPr lang="en-US" smtClean="0"/>
-              <a:t>29/04/15</a:t>
+              <a:t>10/05/15</a:t>
             </a:fld>
             <a:endParaRPr lang="en-US"/>
           </a:p>
@@ -505,8 +506,8 @@
         </p:nvSpPr>
         <p:spPr>
           <a:xfrm>
-            <a:off x="8724900" y="365125"/>
-            <a:ext cx="2628900" cy="5811838"/>
+            <a:off x="7088981" y="365125"/>
+            <a:ext cx="2135981" cy="5811838"/>
           </a:xfrm>
         </p:spPr>
         <p:txBody>
@@ -533,8 +534,8 @@
         </p:nvSpPr>
         <p:spPr>
           <a:xfrm>
-            <a:off x="838200" y="365125"/>
-            <a:ext cx="7734300" cy="5811838"/>
+            <a:off x="681037" y="365125"/>
+            <a:ext cx="6284119" cy="5811838"/>
           </a:xfrm>
         </p:spPr>
         <p:txBody>
@@ -595,7 +596,7 @@
           <a:p>
             <a:fld id="{A8528DE2-31C9-49BB-A893-07DE5C7B4A44}" type="datetimeFigureOut">
               <a:rPr lang="en-US" smtClean="0"/>
-              <a:t>29/04/15</a:t>
+              <a:t>10/05/15</a:t>
             </a:fld>
             <a:endParaRPr lang="en-US"/>
           </a:p>
@@ -765,7 +766,7 @@
           <a:p>
             <a:fld id="{A8528DE2-31C9-49BB-A893-07DE5C7B4A44}" type="datetimeFigureOut">
               <a:rPr lang="en-US" smtClean="0"/>
-              <a:t>29/04/15</a:t>
+              <a:t>10/05/15</a:t>
             </a:fld>
             <a:endParaRPr lang="en-US"/>
           </a:p>
@@ -855,8 +856,8 @@
         </p:nvSpPr>
         <p:spPr>
           <a:xfrm>
-            <a:off x="831850" y="1709738"/>
-            <a:ext cx="10515600" cy="2852737"/>
+            <a:off x="675878" y="1709739"/>
+            <a:ext cx="8543925" cy="2852737"/>
           </a:xfrm>
         </p:spPr>
         <p:txBody>
@@ -887,8 +888,8 @@
         </p:nvSpPr>
         <p:spPr>
           <a:xfrm>
-            <a:off x="831850" y="4589463"/>
-            <a:ext cx="10515600" cy="1500187"/>
+            <a:off x="675878" y="4589464"/>
+            <a:ext cx="8543925" cy="1500187"/>
           </a:xfrm>
         </p:spPr>
         <p:txBody>
@@ -1011,7 +1012,7 @@
           <a:p>
             <a:fld id="{A8528DE2-31C9-49BB-A893-07DE5C7B4A44}" type="datetimeFigureOut">
               <a:rPr lang="en-US" smtClean="0"/>
-              <a:t>29/04/15</a:t>
+              <a:t>10/05/15</a:t>
             </a:fld>
             <a:endParaRPr lang="en-US"/>
           </a:p>
@@ -1124,8 +1125,8 @@
         </p:nvSpPr>
         <p:spPr>
           <a:xfrm>
-            <a:off x="838200" y="1825625"/>
-            <a:ext cx="5181600" cy="4351338"/>
+            <a:off x="681038" y="1825625"/>
+            <a:ext cx="4210050" cy="4351338"/>
           </a:xfrm>
         </p:spPr>
         <p:txBody>
@@ -1181,8 +1182,8 @@
         </p:nvSpPr>
         <p:spPr>
           <a:xfrm>
-            <a:off x="6172200" y="1825625"/>
-            <a:ext cx="5181600" cy="4351338"/>
+            <a:off x="5014913" y="1825625"/>
+            <a:ext cx="4210050" cy="4351338"/>
           </a:xfrm>
         </p:spPr>
         <p:txBody>
@@ -1243,7 +1244,7 @@
           <a:p>
             <a:fld id="{A8528DE2-31C9-49BB-A893-07DE5C7B4A44}" type="datetimeFigureOut">
               <a:rPr lang="en-US" smtClean="0"/>
-              <a:t>29/04/15</a:t>
+              <a:t>10/05/15</a:t>
             </a:fld>
             <a:endParaRPr lang="en-US"/>
           </a:p>
@@ -1333,8 +1334,8 @@
         </p:nvSpPr>
         <p:spPr>
           <a:xfrm>
-            <a:off x="839788" y="365125"/>
-            <a:ext cx="10515600" cy="1325563"/>
+            <a:off x="682328" y="365126"/>
+            <a:ext cx="8543925" cy="1325563"/>
           </a:xfrm>
         </p:spPr>
         <p:txBody>
@@ -1361,8 +1362,8 @@
         </p:nvSpPr>
         <p:spPr>
           <a:xfrm>
-            <a:off x="839788" y="1681163"/>
-            <a:ext cx="5157787" cy="823912"/>
+            <a:off x="682328" y="1681163"/>
+            <a:ext cx="4190702" cy="823912"/>
           </a:xfrm>
         </p:spPr>
         <p:txBody>
@@ -1426,8 +1427,8 @@
         </p:nvSpPr>
         <p:spPr>
           <a:xfrm>
-            <a:off x="839788" y="2505075"/>
-            <a:ext cx="5157787" cy="3684588"/>
+            <a:off x="682328" y="2505075"/>
+            <a:ext cx="4190702" cy="3684588"/>
           </a:xfrm>
         </p:spPr>
         <p:txBody>
@@ -1483,8 +1484,8 @@
         </p:nvSpPr>
         <p:spPr>
           <a:xfrm>
-            <a:off x="6172200" y="1681163"/>
-            <a:ext cx="5183188" cy="823912"/>
+            <a:off x="5014913" y="1681163"/>
+            <a:ext cx="4211340" cy="823912"/>
           </a:xfrm>
         </p:spPr>
         <p:txBody>
@@ -1548,8 +1549,8 @@
         </p:nvSpPr>
         <p:spPr>
           <a:xfrm>
-            <a:off x="6172200" y="2505075"/>
-            <a:ext cx="5183188" cy="3684588"/>
+            <a:off x="5014913" y="2505075"/>
+            <a:ext cx="4211340" cy="3684588"/>
           </a:xfrm>
         </p:spPr>
         <p:txBody>
@@ -1610,7 +1611,7 @@
           <a:p>
             <a:fld id="{A8528DE2-31C9-49BB-A893-07DE5C7B4A44}" type="datetimeFigureOut">
               <a:rPr lang="en-US" smtClean="0"/>
-              <a:t>29/04/15</a:t>
+              <a:t>10/05/15</a:t>
             </a:fld>
             <a:endParaRPr lang="en-US"/>
           </a:p>
@@ -1728,7 +1729,7 @@
           <a:p>
             <a:fld id="{A8528DE2-31C9-49BB-A893-07DE5C7B4A44}" type="datetimeFigureOut">
               <a:rPr lang="en-US" smtClean="0"/>
-              <a:t>29/04/15</a:t>
+              <a:t>10/05/15</a:t>
             </a:fld>
             <a:endParaRPr lang="en-US"/>
           </a:p>
@@ -1823,7 +1824,7 @@
           <a:p>
             <a:fld id="{A8528DE2-31C9-49BB-A893-07DE5C7B4A44}" type="datetimeFigureOut">
               <a:rPr lang="en-US" smtClean="0"/>
-              <a:t>29/04/15</a:t>
+              <a:t>10/05/15</a:t>
             </a:fld>
             <a:endParaRPr lang="en-US"/>
           </a:p>
@@ -1913,8 +1914,8 @@
         </p:nvSpPr>
         <p:spPr>
           <a:xfrm>
-            <a:off x="839788" y="457200"/>
-            <a:ext cx="3932237" cy="1600200"/>
+            <a:off x="682328" y="457200"/>
+            <a:ext cx="3194943" cy="1600200"/>
           </a:xfrm>
         </p:spPr>
         <p:txBody>
@@ -1945,8 +1946,8 @@
         </p:nvSpPr>
         <p:spPr>
           <a:xfrm>
-            <a:off x="5183188" y="987425"/>
-            <a:ext cx="6172200" cy="4873625"/>
+            <a:off x="4211340" y="987426"/>
+            <a:ext cx="5014913" cy="4873625"/>
           </a:xfrm>
         </p:spPr>
         <p:txBody>
@@ -2030,8 +2031,8 @@
         </p:nvSpPr>
         <p:spPr>
           <a:xfrm>
-            <a:off x="839788" y="2057400"/>
-            <a:ext cx="3932237" cy="3811588"/>
+            <a:off x="682328" y="2057400"/>
+            <a:ext cx="3194943" cy="3811588"/>
           </a:xfrm>
         </p:spPr>
         <p:txBody>
@@ -2100,7 +2101,7 @@
           <a:p>
             <a:fld id="{A8528DE2-31C9-49BB-A893-07DE5C7B4A44}" type="datetimeFigureOut">
               <a:rPr lang="en-US" smtClean="0"/>
-              <a:t>29/04/15</a:t>
+              <a:t>10/05/15</a:t>
             </a:fld>
             <a:endParaRPr lang="en-US"/>
           </a:p>
@@ -2190,8 +2191,8 @@
         </p:nvSpPr>
         <p:spPr>
           <a:xfrm>
-            <a:off x="839788" y="457200"/>
-            <a:ext cx="3932237" cy="1600200"/>
+            <a:off x="682328" y="457200"/>
+            <a:ext cx="3194943" cy="1600200"/>
           </a:xfrm>
         </p:spPr>
         <p:txBody>
@@ -2222,8 +2223,8 @@
         </p:nvSpPr>
         <p:spPr>
           <a:xfrm>
-            <a:off x="5183188" y="987425"/>
-            <a:ext cx="6172200" cy="4873625"/>
+            <a:off x="4211340" y="987426"/>
+            <a:ext cx="5014913" cy="4873625"/>
           </a:xfrm>
         </p:spPr>
         <p:txBody>
@@ -2283,8 +2284,8 @@
         </p:nvSpPr>
         <p:spPr>
           <a:xfrm>
-            <a:off x="839788" y="2057400"/>
-            <a:ext cx="3932237" cy="3811588"/>
+            <a:off x="682328" y="2057400"/>
+            <a:ext cx="3194943" cy="3811588"/>
           </a:xfrm>
         </p:spPr>
         <p:txBody>
@@ -2353,7 +2354,7 @@
           <a:p>
             <a:fld id="{A8528DE2-31C9-49BB-A893-07DE5C7B4A44}" type="datetimeFigureOut">
               <a:rPr lang="en-US" smtClean="0"/>
-              <a:t>29/04/15</a:t>
+              <a:t>10/05/15</a:t>
             </a:fld>
             <a:endParaRPr lang="en-US"/>
           </a:p>
@@ -2448,8 +2449,8 @@
         </p:nvSpPr>
         <p:spPr>
           <a:xfrm>
-            <a:off x="838200" y="365125"/>
-            <a:ext cx="10515600" cy="1325563"/>
+            <a:off x="681038" y="365126"/>
+            <a:ext cx="8543925" cy="1325563"/>
           </a:xfrm>
           <a:prstGeom prst="rect">
             <a:avLst/>
@@ -2481,8 +2482,8 @@
         </p:nvSpPr>
         <p:spPr>
           <a:xfrm>
-            <a:off x="838200" y="1825625"/>
-            <a:ext cx="10515600" cy="4351338"/>
+            <a:off x="681038" y="1825625"/>
+            <a:ext cx="8543925" cy="4351338"/>
           </a:xfrm>
           <a:prstGeom prst="rect">
             <a:avLst/>
@@ -2543,8 +2544,8 @@
         </p:nvSpPr>
         <p:spPr>
           <a:xfrm>
-            <a:off x="838200" y="6356350"/>
-            <a:ext cx="2743200" cy="365125"/>
+            <a:off x="681038" y="6356351"/>
+            <a:ext cx="2228850" cy="365125"/>
           </a:xfrm>
           <a:prstGeom prst="rect">
             <a:avLst/>
@@ -2566,7 +2567,7 @@
           <a:p>
             <a:fld id="{A8528DE2-31C9-49BB-A893-07DE5C7B4A44}" type="datetimeFigureOut">
               <a:rPr lang="en-US" smtClean="0"/>
-              <a:t>29/04/15</a:t>
+              <a:t>10/05/15</a:t>
             </a:fld>
             <a:endParaRPr lang="en-US"/>
           </a:p>
@@ -2584,8 +2585,8 @@
         </p:nvSpPr>
         <p:spPr>
           <a:xfrm>
-            <a:off x="4038600" y="6356350"/>
-            <a:ext cx="4114800" cy="365125"/>
+            <a:off x="3281363" y="6356351"/>
+            <a:ext cx="3343275" cy="365125"/>
           </a:xfrm>
           <a:prstGeom prst="rect">
             <a:avLst/>
@@ -2621,8 +2622,8 @@
         </p:nvSpPr>
         <p:spPr>
           <a:xfrm>
-            <a:off x="8610600" y="6356350"/>
-            <a:ext cx="2743200" cy="365125"/>
+            <a:off x="6996113" y="6356351"/>
+            <a:ext cx="2228850" cy="365125"/>
           </a:xfrm>
           <a:prstGeom prst="rect">
             <a:avLst/>
@@ -2979,8 +2980,8 @@
         </p:nvGrpSpPr>
         <p:grpSpPr>
           <a:xfrm>
-            <a:off x="3480650" y="-502465"/>
-            <a:ext cx="8204474" cy="7860945"/>
+            <a:off x="2828028" y="-502465"/>
+            <a:ext cx="6666135" cy="7860945"/>
             <a:chOff x="3480650" y="-502465"/>
             <a:chExt cx="8204474" cy="7860945"/>
           </a:xfrm>
@@ -4944,16 +4945,16 @@
       </p:grpSpPr>
       <p:grpSp>
         <p:nvGrpSpPr>
-          <p:cNvPr id="14" name="Group 13"/>
+          <p:cNvPr id="15" name="Group 14"/>
           <p:cNvGrpSpPr/>
           <p:nvPr/>
         </p:nvGrpSpPr>
         <p:grpSpPr>
           <a:xfrm>
-            <a:off x="893251" y="-239735"/>
-            <a:ext cx="9772935" cy="7353551"/>
-            <a:chOff x="67751" y="-328635"/>
-            <a:chExt cx="9772935" cy="7353551"/>
+            <a:off x="733777" y="410895"/>
+            <a:ext cx="7487628" cy="6312863"/>
+            <a:chOff x="733777" y="410895"/>
+            <a:chExt cx="7487628" cy="6312863"/>
           </a:xfrm>
         </p:grpSpPr>
         <p:sp>
@@ -4964,8 +4965,8 @@
           </p:nvSpPr>
           <p:spPr>
             <a:xfrm rot="16200000">
-              <a:off x="-162987" y="1057811"/>
-              <a:ext cx="1133072" cy="609600"/>
+              <a:off x="555754" y="1591419"/>
+              <a:ext cx="941756" cy="531641"/>
             </a:xfrm>
             <a:prstGeom prst="rect">
               <a:avLst/>
@@ -4995,7 +4996,7 @@
             <a:p>
               <a:pPr algn="ctr"/>
               <a:r>
-                <a:rPr lang="en-US" sz="1400" dirty="0" smtClean="0">
+                <a:rPr lang="en-US" dirty="0" smtClean="0">
                   <a:solidFill>
                     <a:schemeClr val="tx1"/>
                   </a:solidFill>
@@ -5005,7 +5006,7 @@
                 </a:rPr>
                 <a:t>Emotion analysis</a:t>
               </a:r>
-              <a:endParaRPr lang="en-US" sz="1400" dirty="0">
+              <a:endParaRPr lang="en-US" dirty="0">
                 <a:solidFill>
                   <a:schemeClr val="tx1"/>
                 </a:solidFill>
@@ -5024,10 +5025,10 @@
           </p:nvGrpSpPr>
           <p:grpSpPr>
             <a:xfrm>
-              <a:off x="736566" y="2049964"/>
-              <a:ext cx="5513116" cy="1529016"/>
+              <a:off x="1317061" y="2428536"/>
+              <a:ext cx="4808064" cy="774589"/>
               <a:chOff x="736566" y="2049964"/>
-              <a:chExt cx="5513116" cy="1529016"/>
+              <a:chExt cx="5513116" cy="931945"/>
             </a:xfrm>
           </p:grpSpPr>
           <p:sp>
@@ -5039,7 +5040,7 @@
             <p:spPr>
               <a:xfrm>
                 <a:off x="736566" y="2049964"/>
-                <a:ext cx="5513116" cy="1529016"/>
+                <a:ext cx="5513116" cy="931945"/>
               </a:xfrm>
               <a:prstGeom prst="roundRect">
                 <a:avLst>
@@ -5071,7 +5072,7 @@
               <a:lstStyle/>
               <a:p>
                 <a:pPr algn="ctr"/>
-                <a:endParaRPr lang="en-US" sz="1400">
+                <a:endParaRPr lang="en-US">
                   <a:latin typeface="Roboto Condensed" panose="02000000000000000000" pitchFamily="2" charset="0"/>
                   <a:ea typeface="Roboto Condensed" panose="02000000000000000000" pitchFamily="2" charset="0"/>
                   <a:cs typeface="Roboto Condensed" panose="02000000000000000000" pitchFamily="2" charset="0"/>
@@ -5120,70 +5121,14 @@
               <a:p>
                 <a:pPr algn="ctr"/>
                 <a:r>
-                  <a:rPr lang="en-US" sz="1400" dirty="0" smtClean="0">
+                  <a:rPr lang="en-US" dirty="0" smtClean="0">
                     <a:latin typeface="Roboto Condensed" panose="02000000000000000000" pitchFamily="2" charset="0"/>
                     <a:ea typeface="Roboto Condensed" panose="02000000000000000000" pitchFamily="2" charset="0"/>
                     <a:cs typeface="Roboto Condensed" panose="02000000000000000000" pitchFamily="2" charset="0"/>
                   </a:rPr>
                   <a:t>Anger</a:t>
                 </a:r>
-                <a:endParaRPr lang="en-US" sz="1400" dirty="0">
-                  <a:latin typeface="Roboto Condensed" panose="02000000000000000000" pitchFamily="2" charset="0"/>
-                  <a:ea typeface="Roboto Condensed" panose="02000000000000000000" pitchFamily="2" charset="0"/>
-                  <a:cs typeface="Roboto Condensed" panose="02000000000000000000" pitchFamily="2" charset="0"/>
-                </a:endParaRPr>
-              </a:p>
-            </p:txBody>
-          </p:sp>
-          <p:sp>
-            <p:nvSpPr>
-              <p:cNvPr id="37" name="Rectangle 36"/>
-              <p:cNvSpPr/>
-              <p:nvPr/>
-            </p:nvSpPr>
-            <p:spPr>
-              <a:xfrm>
-                <a:off x="2263820" y="2241106"/>
-                <a:ext cx="1175658" cy="473995"/>
-              </a:xfrm>
-              <a:prstGeom prst="rect">
-                <a:avLst/>
-              </a:prstGeom>
-              <a:solidFill>
-                <a:schemeClr val="accent2"/>
-              </a:solidFill>
-              <a:ln>
-                <a:noFill/>
-              </a:ln>
-            </p:spPr>
-            <p:style>
-              <a:lnRef idx="3">
-                <a:schemeClr val="lt1"/>
-              </a:lnRef>
-              <a:fillRef idx="1">
-                <a:schemeClr val="accent1"/>
-              </a:fillRef>
-              <a:effectRef idx="1">
-                <a:schemeClr val="accent1"/>
-              </a:effectRef>
-              <a:fontRef idx="minor">
-                <a:schemeClr val="lt1"/>
-              </a:fontRef>
-            </p:style>
-            <p:txBody>
-              <a:bodyPr rtlCol="0" anchor="ctr"/>
-              <a:lstStyle/>
-              <a:p>
-                <a:pPr algn="ctr"/>
-                <a:r>
-                  <a:rPr lang="en-US" sz="1400" dirty="0" smtClean="0">
-                    <a:latin typeface="Roboto Condensed" panose="02000000000000000000" pitchFamily="2" charset="0"/>
-                    <a:ea typeface="Roboto Condensed" panose="02000000000000000000" pitchFamily="2" charset="0"/>
-                    <a:cs typeface="Roboto Condensed" panose="02000000000000000000" pitchFamily="2" charset="0"/>
-                  </a:rPr>
-                  <a:t>Anticipation</a:t>
-                </a:r>
-                <a:endParaRPr lang="en-US" sz="1400" dirty="0">
+                <a:endParaRPr lang="en-US" dirty="0">
                   <a:latin typeface="Roboto Condensed" panose="02000000000000000000" pitchFamily="2" charset="0"/>
                   <a:ea typeface="Roboto Condensed" panose="02000000000000000000" pitchFamily="2" charset="0"/>
                   <a:cs typeface="Roboto Condensed" panose="02000000000000000000" pitchFamily="2" charset="0"/>
@@ -5199,7 +5144,7 @@
             </p:nvSpPr>
             <p:spPr>
               <a:xfrm>
-                <a:off x="3569698" y="2241107"/>
+                <a:off x="3580406" y="2252341"/>
                 <a:ext cx="1175659" cy="473995"/>
               </a:xfrm>
               <a:prstGeom prst="rect">
@@ -5232,70 +5177,14 @@
               <a:p>
                 <a:pPr algn="ctr"/>
                 <a:r>
-                  <a:rPr lang="en-US" sz="1400" dirty="0" smtClean="0">
+                  <a:rPr lang="en-US" dirty="0" smtClean="0">
                     <a:latin typeface="Roboto Condensed" panose="02000000000000000000" pitchFamily="2" charset="0"/>
                     <a:ea typeface="Roboto Condensed" panose="02000000000000000000" pitchFamily="2" charset="0"/>
                     <a:cs typeface="Roboto Condensed" panose="02000000000000000000" pitchFamily="2" charset="0"/>
                   </a:rPr>
                   <a:t>Joy</a:t>
                 </a:r>
-                <a:endParaRPr lang="en-US" sz="1400" dirty="0">
-                  <a:latin typeface="Roboto Condensed" panose="02000000000000000000" pitchFamily="2" charset="0"/>
-                  <a:ea typeface="Roboto Condensed" panose="02000000000000000000" pitchFamily="2" charset="0"/>
-                  <a:cs typeface="Roboto Condensed" panose="02000000000000000000" pitchFamily="2" charset="0"/>
-                </a:endParaRPr>
-              </a:p>
-            </p:txBody>
-          </p:sp>
-          <p:sp>
-            <p:nvSpPr>
-              <p:cNvPr id="40" name="Rectangle 39"/>
-              <p:cNvSpPr/>
-              <p:nvPr/>
-            </p:nvSpPr>
-            <p:spPr>
-              <a:xfrm>
-                <a:off x="4875577" y="2241106"/>
-                <a:ext cx="1175658" cy="473995"/>
-              </a:xfrm>
-              <a:prstGeom prst="rect">
-                <a:avLst/>
-              </a:prstGeom>
-              <a:solidFill>
-                <a:schemeClr val="accent2"/>
-              </a:solidFill>
-              <a:ln>
-                <a:noFill/>
-              </a:ln>
-            </p:spPr>
-            <p:style>
-              <a:lnRef idx="3">
-                <a:schemeClr val="lt1"/>
-              </a:lnRef>
-              <a:fillRef idx="1">
-                <a:schemeClr val="accent1"/>
-              </a:fillRef>
-              <a:effectRef idx="1">
-                <a:schemeClr val="accent1"/>
-              </a:effectRef>
-              <a:fontRef idx="minor">
-                <a:schemeClr val="lt1"/>
-              </a:fontRef>
-            </p:style>
-            <p:txBody>
-              <a:bodyPr rtlCol="0" anchor="ctr"/>
-              <a:lstStyle/>
-              <a:p>
-                <a:pPr algn="ctr"/>
-                <a:r>
-                  <a:rPr lang="en-US" sz="1400" dirty="0" smtClean="0">
-                    <a:latin typeface="Roboto Condensed" panose="02000000000000000000" pitchFamily="2" charset="0"/>
-                    <a:ea typeface="Roboto Condensed" panose="02000000000000000000" pitchFamily="2" charset="0"/>
-                    <a:cs typeface="Roboto Condensed" panose="02000000000000000000" pitchFamily="2" charset="0"/>
-                  </a:rPr>
-                  <a:t>Trust</a:t>
-                </a:r>
-                <a:endParaRPr lang="en-US" sz="1400" dirty="0">
+                <a:endParaRPr lang="en-US" dirty="0">
                   <a:latin typeface="Roboto Condensed" panose="02000000000000000000" pitchFamily="2" charset="0"/>
                   <a:ea typeface="Roboto Condensed" panose="02000000000000000000" pitchFamily="2" charset="0"/>
                   <a:cs typeface="Roboto Condensed" panose="02000000000000000000" pitchFamily="2" charset="0"/>
@@ -5311,7 +5200,7 @@
             </p:nvSpPr>
             <p:spPr>
               <a:xfrm>
-                <a:off x="957940" y="2862339"/>
+                <a:off x="2275034" y="2244377"/>
                 <a:ext cx="1175659" cy="473995"/>
               </a:xfrm>
               <a:prstGeom prst="rect">
@@ -5344,70 +5233,14 @@
               <a:p>
                 <a:pPr algn="ctr"/>
                 <a:r>
-                  <a:rPr lang="en-US" sz="1400" dirty="0" smtClean="0">
+                  <a:rPr lang="en-US" dirty="0" smtClean="0">
                     <a:latin typeface="Roboto Condensed" panose="02000000000000000000" pitchFamily="2" charset="0"/>
                     <a:ea typeface="Roboto Condensed" panose="02000000000000000000" pitchFamily="2" charset="0"/>
                     <a:cs typeface="Roboto Condensed" panose="02000000000000000000" pitchFamily="2" charset="0"/>
                   </a:rPr>
                   <a:t>Fear</a:t>
                 </a:r>
-                <a:endParaRPr lang="en-US" sz="1400" dirty="0">
-                  <a:latin typeface="Roboto Condensed" panose="02000000000000000000" pitchFamily="2" charset="0"/>
-                  <a:ea typeface="Roboto Condensed" panose="02000000000000000000" pitchFamily="2" charset="0"/>
-                  <a:cs typeface="Roboto Condensed" panose="02000000000000000000" pitchFamily="2" charset="0"/>
-                </a:endParaRPr>
-              </a:p>
-            </p:txBody>
-          </p:sp>
-          <p:sp>
-            <p:nvSpPr>
-              <p:cNvPr id="42" name="Rectangle 41"/>
-              <p:cNvSpPr/>
-              <p:nvPr/>
-            </p:nvSpPr>
-            <p:spPr>
-              <a:xfrm>
-                <a:off x="2263820" y="2871185"/>
-                <a:ext cx="1175658" cy="473995"/>
-              </a:xfrm>
-              <a:prstGeom prst="rect">
-                <a:avLst/>
-              </a:prstGeom>
-              <a:solidFill>
-                <a:schemeClr val="accent2"/>
-              </a:solidFill>
-              <a:ln>
-                <a:noFill/>
-              </a:ln>
-            </p:spPr>
-            <p:style>
-              <a:lnRef idx="3">
-                <a:schemeClr val="lt1"/>
-              </a:lnRef>
-              <a:fillRef idx="1">
-                <a:schemeClr val="accent1"/>
-              </a:fillRef>
-              <a:effectRef idx="1">
-                <a:schemeClr val="accent1"/>
-              </a:effectRef>
-              <a:fontRef idx="minor">
-                <a:schemeClr val="lt1"/>
-              </a:fontRef>
-            </p:style>
-            <p:txBody>
-              <a:bodyPr rtlCol="0" anchor="ctr"/>
-              <a:lstStyle/>
-              <a:p>
-                <a:pPr algn="ctr"/>
-                <a:r>
-                  <a:rPr lang="en-US" sz="1400" dirty="0" smtClean="0">
-                    <a:latin typeface="Roboto Condensed" panose="02000000000000000000" pitchFamily="2" charset="0"/>
-                    <a:ea typeface="Roboto Condensed" panose="02000000000000000000" pitchFamily="2" charset="0"/>
-                    <a:cs typeface="Roboto Condensed" panose="02000000000000000000" pitchFamily="2" charset="0"/>
-                  </a:rPr>
-                  <a:t>Surprise</a:t>
-                </a:r>
-                <a:endParaRPr lang="en-US" sz="1400" dirty="0">
+                <a:endParaRPr lang="en-US" dirty="0">
                   <a:latin typeface="Roboto Condensed" panose="02000000000000000000" pitchFamily="2" charset="0"/>
                   <a:ea typeface="Roboto Condensed" panose="02000000000000000000" pitchFamily="2" charset="0"/>
                   <a:cs typeface="Roboto Condensed" panose="02000000000000000000" pitchFamily="2" charset="0"/>
@@ -5423,7 +5256,7 @@
             </p:nvSpPr>
             <p:spPr>
               <a:xfrm>
-                <a:off x="3569697" y="2877674"/>
+                <a:off x="4897501" y="2248477"/>
                 <a:ext cx="1175659" cy="473995"/>
               </a:xfrm>
               <a:prstGeom prst="rect">
@@ -5456,70 +5289,14 @@
               <a:p>
                 <a:pPr algn="ctr"/>
                 <a:r>
-                  <a:rPr lang="en-US" sz="1400" dirty="0" smtClean="0">
+                  <a:rPr lang="en-US" dirty="0" smtClean="0">
                     <a:latin typeface="Roboto Condensed" panose="02000000000000000000" pitchFamily="2" charset="0"/>
                     <a:ea typeface="Roboto Condensed" panose="02000000000000000000" pitchFamily="2" charset="0"/>
                     <a:cs typeface="Roboto Condensed" panose="02000000000000000000" pitchFamily="2" charset="0"/>
                   </a:rPr>
                   <a:t>Sadness</a:t>
                 </a:r>
-                <a:endParaRPr lang="en-US" sz="1400" dirty="0">
-                  <a:latin typeface="Roboto Condensed" panose="02000000000000000000" pitchFamily="2" charset="0"/>
-                  <a:ea typeface="Roboto Condensed" panose="02000000000000000000" pitchFamily="2" charset="0"/>
-                  <a:cs typeface="Roboto Condensed" panose="02000000000000000000" pitchFamily="2" charset="0"/>
-                </a:endParaRPr>
-              </a:p>
-            </p:txBody>
-          </p:sp>
-          <p:sp>
-            <p:nvSpPr>
-              <p:cNvPr id="44" name="Rectangle 43"/>
-              <p:cNvSpPr/>
-              <p:nvPr/>
-            </p:nvSpPr>
-            <p:spPr>
-              <a:xfrm>
-                <a:off x="4875577" y="2871185"/>
-                <a:ext cx="1175658" cy="473995"/>
-              </a:xfrm>
-              <a:prstGeom prst="rect">
-                <a:avLst/>
-              </a:prstGeom>
-              <a:solidFill>
-                <a:schemeClr val="accent2"/>
-              </a:solidFill>
-              <a:ln>
-                <a:noFill/>
-              </a:ln>
-            </p:spPr>
-            <p:style>
-              <a:lnRef idx="3">
-                <a:schemeClr val="lt1"/>
-              </a:lnRef>
-              <a:fillRef idx="1">
-                <a:schemeClr val="accent1"/>
-              </a:fillRef>
-              <a:effectRef idx="1">
-                <a:schemeClr val="accent1"/>
-              </a:effectRef>
-              <a:fontRef idx="minor">
-                <a:schemeClr val="lt1"/>
-              </a:fontRef>
-            </p:style>
-            <p:txBody>
-              <a:bodyPr rtlCol="0" anchor="ctr"/>
-              <a:lstStyle/>
-              <a:p>
-                <a:pPr algn="ctr"/>
-                <a:r>
-                  <a:rPr lang="en-US" sz="1400" dirty="0" smtClean="0">
-                    <a:latin typeface="Roboto Condensed" panose="02000000000000000000" pitchFamily="2" charset="0"/>
-                    <a:ea typeface="Roboto Condensed" panose="02000000000000000000" pitchFamily="2" charset="0"/>
-                    <a:cs typeface="Roboto Condensed" panose="02000000000000000000" pitchFamily="2" charset="0"/>
-                  </a:rPr>
-                  <a:t>Disgust</a:t>
-                </a:r>
-                <a:endParaRPr lang="en-US" sz="1400" dirty="0">
+                <a:endParaRPr lang="en-US" dirty="0">
                   <a:latin typeface="Roboto Condensed" panose="02000000000000000000" pitchFamily="2" charset="0"/>
                   <a:ea typeface="Roboto Condensed" panose="02000000000000000000" pitchFamily="2" charset="0"/>
                   <a:cs typeface="Roboto Condensed" panose="02000000000000000000" pitchFamily="2" charset="0"/>
@@ -5536,8 +5313,8 @@
           </p:nvSpPr>
           <p:spPr>
             <a:xfrm rot="16200000">
-              <a:off x="-193985" y="5721022"/>
-              <a:ext cx="1133072" cy="609600"/>
+              <a:off x="528720" y="5467262"/>
+              <a:ext cx="941756" cy="531641"/>
             </a:xfrm>
             <a:prstGeom prst="rect">
               <a:avLst/>
@@ -5567,7 +5344,7 @@
             <a:p>
               <a:pPr algn="ctr"/>
               <a:r>
-                <a:rPr lang="en-US" sz="1400" dirty="0" smtClean="0">
+                <a:rPr lang="en-US" dirty="0" smtClean="0">
                   <a:solidFill>
                     <a:schemeClr val="tx1"/>
                   </a:solidFill>
@@ -5577,7 +5354,7 @@
                 </a:rPr>
                 <a:t>Crowd model</a:t>
               </a:r>
-              <a:endParaRPr lang="en-US" sz="1400" dirty="0">
+              <a:endParaRPr lang="en-US" dirty="0">
                 <a:solidFill>
                   <a:schemeClr val="tx1"/>
                 </a:solidFill>
@@ -5596,8 +5373,8 @@
           </p:nvSpPr>
           <p:spPr>
             <a:xfrm rot="16200000">
-              <a:off x="-131428" y="-124229"/>
-              <a:ext cx="1018411" cy="609600"/>
+              <a:off x="560599" y="588632"/>
+              <a:ext cx="887115" cy="531641"/>
             </a:xfrm>
             <a:prstGeom prst="rect">
               <a:avLst/>
@@ -5627,7 +5404,7 @@
             <a:p>
               <a:pPr algn="ctr"/>
               <a:r>
-                <a:rPr lang="en-US" sz="1400" dirty="0" smtClean="0">
+                <a:rPr lang="en-US" dirty="0" smtClean="0">
                   <a:solidFill>
                     <a:schemeClr val="tx1"/>
                   </a:solidFill>
@@ -5637,7 +5414,7 @@
                 </a:rPr>
                 <a:t>Context data</a:t>
               </a:r>
-              <a:endParaRPr lang="en-US" sz="1400" dirty="0">
+              <a:endParaRPr lang="en-US" dirty="0">
                 <a:solidFill>
                   <a:schemeClr val="tx1"/>
                 </a:solidFill>
@@ -5656,8 +5433,8 @@
           </p:nvGrpSpPr>
           <p:grpSpPr>
             <a:xfrm>
-              <a:off x="736566" y="3806901"/>
-              <a:ext cx="5513116" cy="914333"/>
+              <a:off x="1317061" y="3393852"/>
+              <a:ext cx="4808064" cy="759951"/>
               <a:chOff x="736566" y="3806901"/>
               <a:chExt cx="5513116" cy="914333"/>
             </a:xfrm>
@@ -5698,7 +5475,7 @@
               <a:lstStyle/>
               <a:p>
                 <a:pPr algn="ctr"/>
-                <a:endParaRPr lang="en-US" sz="1400">
+                <a:endParaRPr lang="en-US">
                   <a:latin typeface="Roboto Condensed" panose="02000000000000000000" pitchFamily="2" charset="0"/>
                   <a:ea typeface="Roboto Condensed" panose="02000000000000000000" pitchFamily="2" charset="0"/>
                   <a:cs typeface="Roboto Condensed" panose="02000000000000000000" pitchFamily="2" charset="0"/>
@@ -5744,14 +5521,14 @@
               <a:p>
                 <a:pPr algn="ctr"/>
                 <a:r>
-                  <a:rPr lang="en-US" sz="1400" dirty="0" smtClean="0">
+                  <a:rPr lang="en-US" dirty="0" smtClean="0">
                     <a:latin typeface="Roboto Condensed" panose="02000000000000000000" pitchFamily="2" charset="0"/>
                     <a:ea typeface="Roboto Condensed" panose="02000000000000000000" pitchFamily="2" charset="0"/>
                     <a:cs typeface="Roboto Condensed" panose="02000000000000000000" pitchFamily="2" charset="0"/>
                   </a:rPr>
                   <a:t>Emotion - Crowd type Mapping Model</a:t>
                 </a:r>
-                <a:endParaRPr lang="en-US" sz="1400" dirty="0">
+                <a:endParaRPr lang="en-US" dirty="0">
                   <a:latin typeface="Roboto Condensed" panose="02000000000000000000" pitchFamily="2" charset="0"/>
                   <a:ea typeface="Roboto Condensed" panose="02000000000000000000" pitchFamily="2" charset="0"/>
                   <a:cs typeface="Roboto Condensed" panose="02000000000000000000" pitchFamily="2" charset="0"/>
@@ -5768,8 +5545,8 @@
           </p:nvSpPr>
           <p:spPr>
             <a:xfrm rot="16200000">
-              <a:off x="-385362" y="2509673"/>
-              <a:ext cx="1529018" cy="609600"/>
+              <a:off x="487064" y="2531076"/>
+              <a:ext cx="1036580" cy="531641"/>
             </a:xfrm>
             <a:prstGeom prst="rect">
               <a:avLst/>
@@ -5799,7 +5576,7 @@
             <a:p>
               <a:pPr algn="ctr"/>
               <a:r>
-                <a:rPr lang="en-US" sz="1400" dirty="0" smtClean="0">
+                <a:rPr lang="en-US" dirty="0" smtClean="0">
                   <a:solidFill>
                     <a:schemeClr val="tx1"/>
                   </a:solidFill>
@@ -5809,7 +5586,7 @@
                 </a:rPr>
                 <a:t>Emotion model</a:t>
               </a:r>
-              <a:endParaRPr lang="en-US" sz="1400" dirty="0">
+              <a:endParaRPr lang="en-US" dirty="0">
                 <a:solidFill>
                   <a:schemeClr val="tx1"/>
                 </a:solidFill>
@@ -5822,16 +5599,16 @@
         </p:sp>
         <p:grpSp>
           <p:nvGrpSpPr>
-            <p:cNvPr id="9" name="Group 8"/>
+            <p:cNvPr id="6" name="Group 5"/>
             <p:cNvGrpSpPr/>
             <p:nvPr/>
           </p:nvGrpSpPr>
           <p:grpSpPr>
             <a:xfrm>
-              <a:off x="736566" y="4949155"/>
-              <a:ext cx="5513116" cy="2075760"/>
-              <a:chOff x="736566" y="4949155"/>
-              <a:chExt cx="5513116" cy="2075760"/>
+              <a:off x="1328871" y="4224539"/>
+              <a:ext cx="4808064" cy="2498019"/>
+              <a:chOff x="1328871" y="4224539"/>
+              <a:chExt cx="4808064" cy="2498019"/>
             </a:xfrm>
           </p:grpSpPr>
           <p:sp>
@@ -5842,12 +5619,12 @@
             </p:nvSpPr>
             <p:spPr>
               <a:xfrm>
-                <a:off x="736566" y="4949155"/>
-                <a:ext cx="5513116" cy="2075760"/>
+                <a:off x="1328871" y="4224539"/>
+                <a:ext cx="4808064" cy="2498019"/>
               </a:xfrm>
               <a:prstGeom prst="roundRect">
                 <a:avLst>
-                  <a:gd name="adj" fmla="val 7361"/>
+                  <a:gd name="adj" fmla="val 3758"/>
                 </a:avLst>
               </a:prstGeom>
               <a:ln>
@@ -5875,7 +5652,7 @@
               <a:lstStyle/>
               <a:p>
                 <a:pPr algn="ctr"/>
-                <a:endParaRPr lang="en-US" sz="1400">
+                <a:endParaRPr lang="en-US">
                   <a:latin typeface="Roboto Condensed" panose="02000000000000000000" pitchFamily="2" charset="0"/>
                   <a:ea typeface="Roboto Condensed" panose="02000000000000000000" pitchFamily="2" charset="0"/>
                   <a:cs typeface="Roboto Condensed" panose="02000000000000000000" pitchFamily="2" charset="0"/>
@@ -5891,8 +5668,8 @@
             </p:nvSpPr>
             <p:spPr>
               <a:xfrm>
-                <a:off x="973228" y="5167593"/>
-                <a:ext cx="1175659" cy="473995"/>
+                <a:off x="1514119" y="4370443"/>
+                <a:ext cx="1439548" cy="495661"/>
               </a:xfrm>
               <a:prstGeom prst="rect">
                 <a:avLst/>
@@ -5924,14 +5701,14 @@
               <a:p>
                 <a:pPr algn="ctr"/>
                 <a:r>
-                  <a:rPr lang="en-US" sz="1400" dirty="0" smtClean="0">
+                  <a:rPr lang="en-US" dirty="0" smtClean="0">
                     <a:latin typeface="Roboto Condensed" panose="02000000000000000000" pitchFamily="2" charset="0"/>
                     <a:ea typeface="Roboto Condensed" panose="02000000000000000000" pitchFamily="2" charset="0"/>
                     <a:cs typeface="Roboto Condensed" panose="02000000000000000000" pitchFamily="2" charset="0"/>
                   </a:rPr>
                   <a:t>Ambulatory</a:t>
                 </a:r>
-                <a:endParaRPr lang="en-US" sz="1400" dirty="0">
+                <a:endParaRPr lang="en-US" dirty="0">
                   <a:latin typeface="Roboto Condensed" panose="02000000000000000000" pitchFamily="2" charset="0"/>
                   <a:ea typeface="Roboto Condensed" panose="02000000000000000000" pitchFamily="2" charset="0"/>
                   <a:cs typeface="Roboto Condensed" panose="02000000000000000000" pitchFamily="2" charset="0"/>
@@ -5947,8 +5724,8 @@
             </p:nvSpPr>
             <p:spPr>
               <a:xfrm>
-                <a:off x="2279107" y="5167592"/>
-                <a:ext cx="1175658" cy="473995"/>
+                <a:off x="3006749" y="4375400"/>
+                <a:ext cx="1444141" cy="490705"/>
               </a:xfrm>
               <a:prstGeom prst="rect">
                 <a:avLst/>
@@ -5980,14 +5757,14 @@
               <a:p>
                 <a:pPr algn="ctr"/>
                 <a:r>
-                  <a:rPr lang="en-US" sz="1400" dirty="0" smtClean="0">
+                  <a:rPr lang="en-US" dirty="0" smtClean="0">
                     <a:latin typeface="Roboto Condensed" panose="02000000000000000000" pitchFamily="2" charset="0"/>
                     <a:ea typeface="Roboto Condensed" panose="02000000000000000000" pitchFamily="2" charset="0"/>
                     <a:cs typeface="Roboto Condensed" panose="02000000000000000000" pitchFamily="2" charset="0"/>
                   </a:rPr>
                   <a:t>Limited movement</a:t>
                 </a:r>
-                <a:endParaRPr lang="en-US" sz="1400" dirty="0">
+                <a:endParaRPr lang="en-US" dirty="0">
                   <a:latin typeface="Roboto Condensed" panose="02000000000000000000" pitchFamily="2" charset="0"/>
                   <a:ea typeface="Roboto Condensed" panose="02000000000000000000" pitchFamily="2" charset="0"/>
                   <a:cs typeface="Roboto Condensed" panose="02000000000000000000" pitchFamily="2" charset="0"/>
@@ -6003,8 +5780,8 @@
             </p:nvSpPr>
             <p:spPr>
               <a:xfrm>
-                <a:off x="3584985" y="5167593"/>
-                <a:ext cx="1175659" cy="473995"/>
+                <a:off x="4514975" y="4375401"/>
+                <a:ext cx="1443099" cy="490703"/>
               </a:xfrm>
               <a:prstGeom prst="rect">
                 <a:avLst/>
@@ -6036,14 +5813,14 @@
               <a:p>
                 <a:pPr algn="ctr"/>
                 <a:r>
-                  <a:rPr lang="en-US" sz="1400" dirty="0" smtClean="0">
+                  <a:rPr lang="en-US" dirty="0" smtClean="0">
                     <a:latin typeface="Roboto Condensed" panose="02000000000000000000" pitchFamily="2" charset="0"/>
                     <a:ea typeface="Roboto Condensed" panose="02000000000000000000" pitchFamily="2" charset="0"/>
                     <a:cs typeface="Roboto Condensed" panose="02000000000000000000" pitchFamily="2" charset="0"/>
                   </a:rPr>
                   <a:t>Spectator</a:t>
                 </a:r>
-                <a:endParaRPr lang="en-US" sz="1400" dirty="0">
+                <a:endParaRPr lang="en-US" dirty="0">
                   <a:latin typeface="Roboto Condensed" panose="02000000000000000000" pitchFamily="2" charset="0"/>
                   <a:ea typeface="Roboto Condensed" panose="02000000000000000000" pitchFamily="2" charset="0"/>
                   <a:cs typeface="Roboto Condensed" panose="02000000000000000000" pitchFamily="2" charset="0"/>
@@ -6059,8 +5836,8 @@
             </p:nvSpPr>
             <p:spPr>
               <a:xfrm>
-                <a:off x="4890864" y="5167592"/>
-                <a:ext cx="1175658" cy="473995"/>
+                <a:off x="3011687" y="4950771"/>
+                <a:ext cx="1439203" cy="494633"/>
               </a:xfrm>
               <a:prstGeom prst="rect">
                 <a:avLst/>
@@ -6092,14 +5869,14 @@
               <a:p>
                 <a:pPr algn="ctr"/>
                 <a:r>
-                  <a:rPr lang="en-US" sz="1400" dirty="0" smtClean="0">
+                  <a:rPr lang="en-US" dirty="0" smtClean="0">
                     <a:latin typeface="Roboto Condensed" panose="02000000000000000000" pitchFamily="2" charset="0"/>
                     <a:ea typeface="Roboto Condensed" panose="02000000000000000000" pitchFamily="2" charset="0"/>
                     <a:cs typeface="Roboto Condensed" panose="02000000000000000000" pitchFamily="2" charset="0"/>
                   </a:rPr>
                   <a:t>Participatory</a:t>
                 </a:r>
-                <a:endParaRPr lang="en-US" sz="1400" dirty="0">
+                <a:endParaRPr lang="en-US" dirty="0">
                   <a:latin typeface="Roboto Condensed" panose="02000000000000000000" pitchFamily="2" charset="0"/>
                   <a:ea typeface="Roboto Condensed" panose="02000000000000000000" pitchFamily="2" charset="0"/>
                   <a:cs typeface="Roboto Condensed" panose="02000000000000000000" pitchFamily="2" charset="0"/>
@@ -6115,8 +5892,8 @@
             </p:nvSpPr>
             <p:spPr>
               <a:xfrm>
-                <a:off x="973227" y="5788825"/>
-                <a:ext cx="1175659" cy="473995"/>
+                <a:off x="1511875" y="4951546"/>
+                <a:ext cx="1441792" cy="493857"/>
               </a:xfrm>
               <a:prstGeom prst="rect">
                 <a:avLst/>
@@ -6148,14 +5925,14 @@
               <a:p>
                 <a:pPr algn="ctr"/>
                 <a:r>
-                  <a:rPr lang="en-US" sz="1400" dirty="0" smtClean="0">
+                  <a:rPr lang="en-US" dirty="0" smtClean="0">
                     <a:latin typeface="Roboto Condensed" panose="02000000000000000000" pitchFamily="2" charset="0"/>
                     <a:ea typeface="Roboto Condensed" panose="02000000000000000000" pitchFamily="2" charset="0"/>
                     <a:cs typeface="Roboto Condensed" panose="02000000000000000000" pitchFamily="2" charset="0"/>
                   </a:rPr>
                   <a:t>Expressive</a:t>
                 </a:r>
-                <a:endParaRPr lang="en-US" sz="1400" dirty="0">
+                <a:endParaRPr lang="en-US" dirty="0">
                   <a:latin typeface="Roboto Condensed" panose="02000000000000000000" pitchFamily="2" charset="0"/>
                   <a:ea typeface="Roboto Condensed" panose="02000000000000000000" pitchFamily="2" charset="0"/>
                   <a:cs typeface="Roboto Condensed" panose="02000000000000000000" pitchFamily="2" charset="0"/>
@@ -6171,8 +5948,8 @@
             </p:nvSpPr>
             <p:spPr>
               <a:xfrm>
-                <a:off x="2279107" y="5797671"/>
-                <a:ext cx="1175658" cy="473995"/>
+                <a:off x="4520800" y="4950772"/>
+                <a:ext cx="1437275" cy="494632"/>
               </a:xfrm>
               <a:prstGeom prst="rect">
                 <a:avLst/>
@@ -6204,14 +5981,14 @@
               <a:p>
                 <a:pPr algn="ctr"/>
                 <a:r>
-                  <a:rPr lang="en-US" sz="1400" dirty="0" smtClean="0">
+                  <a:rPr lang="en-US" dirty="0" smtClean="0">
                     <a:latin typeface="Roboto Condensed" panose="02000000000000000000" pitchFamily="2" charset="0"/>
                     <a:ea typeface="Roboto Condensed" panose="02000000000000000000" pitchFamily="2" charset="0"/>
                     <a:cs typeface="Roboto Condensed" panose="02000000000000000000" pitchFamily="2" charset="0"/>
                   </a:rPr>
                   <a:t>Aggressive</a:t>
                 </a:r>
-                <a:endParaRPr lang="en-US" sz="1400" dirty="0">
+                <a:endParaRPr lang="en-US" dirty="0">
                   <a:latin typeface="Roboto Condensed" panose="02000000000000000000" pitchFamily="2" charset="0"/>
                   <a:ea typeface="Roboto Condensed" panose="02000000000000000000" pitchFamily="2" charset="0"/>
                   <a:cs typeface="Roboto Condensed" panose="02000000000000000000" pitchFamily="2" charset="0"/>
@@ -6227,8 +6004,8 @@
             </p:nvSpPr>
             <p:spPr>
               <a:xfrm>
-                <a:off x="3584984" y="5804160"/>
-                <a:ext cx="1175659" cy="473995"/>
+                <a:off x="1508875" y="5525020"/>
+                <a:ext cx="1444792" cy="492660"/>
               </a:xfrm>
               <a:prstGeom prst="rect">
                 <a:avLst/>
@@ -6260,14 +6037,14 @@
               <a:p>
                 <a:pPr algn="ctr"/>
                 <a:r>
-                  <a:rPr lang="en-US" sz="1400" dirty="0" smtClean="0">
+                  <a:rPr lang="en-US" dirty="0" smtClean="0">
                     <a:latin typeface="Roboto Condensed" panose="02000000000000000000" pitchFamily="2" charset="0"/>
                     <a:ea typeface="Roboto Condensed" panose="02000000000000000000" pitchFamily="2" charset="0"/>
                     <a:cs typeface="Roboto Condensed" panose="02000000000000000000" pitchFamily="2" charset="0"/>
                   </a:rPr>
                   <a:t>Demonstrator</a:t>
                 </a:r>
-                <a:endParaRPr lang="en-US" sz="1400" dirty="0">
+                <a:endParaRPr lang="en-US" dirty="0">
                   <a:latin typeface="Roboto Condensed" panose="02000000000000000000" pitchFamily="2" charset="0"/>
                   <a:ea typeface="Roboto Condensed" panose="02000000000000000000" pitchFamily="2" charset="0"/>
                   <a:cs typeface="Roboto Condensed" panose="02000000000000000000" pitchFamily="2" charset="0"/>
@@ -6283,8 +6060,8 @@
             </p:nvSpPr>
             <p:spPr>
               <a:xfrm>
-                <a:off x="4890864" y="5797671"/>
-                <a:ext cx="1175658" cy="473995"/>
+                <a:off x="3011925" y="5525380"/>
+                <a:ext cx="1438965" cy="492299"/>
               </a:xfrm>
               <a:prstGeom prst="rect">
                 <a:avLst/>
@@ -6316,14 +6093,14 @@
               <a:p>
                 <a:pPr algn="ctr"/>
                 <a:r>
-                  <a:rPr lang="en-US" sz="1400" dirty="0" smtClean="0">
+                  <a:rPr lang="en-US" dirty="0" smtClean="0">
                     <a:latin typeface="Roboto Condensed" panose="02000000000000000000" pitchFamily="2" charset="0"/>
                     <a:ea typeface="Roboto Condensed" panose="02000000000000000000" pitchFamily="2" charset="0"/>
                     <a:cs typeface="Roboto Condensed" panose="02000000000000000000" pitchFamily="2" charset="0"/>
                   </a:rPr>
                   <a:t>Escaping</a:t>
                 </a:r>
-                <a:endParaRPr lang="en-US" sz="1400" dirty="0">
+                <a:endParaRPr lang="en-US" dirty="0">
                   <a:latin typeface="Roboto Condensed" panose="02000000000000000000" pitchFamily="2" charset="0"/>
                   <a:ea typeface="Roboto Condensed" panose="02000000000000000000" pitchFamily="2" charset="0"/>
                   <a:cs typeface="Roboto Condensed" panose="02000000000000000000" pitchFamily="2" charset="0"/>
@@ -6339,8 +6116,8 @@
             </p:nvSpPr>
             <p:spPr>
               <a:xfrm>
-                <a:off x="973227" y="6410057"/>
-                <a:ext cx="1175659" cy="473995"/>
+                <a:off x="4520800" y="5522518"/>
+                <a:ext cx="1435345" cy="495162"/>
               </a:xfrm>
               <a:prstGeom prst="rect">
                 <a:avLst/>
@@ -6372,14 +6149,14 @@
               <a:p>
                 <a:pPr algn="ctr"/>
                 <a:r>
-                  <a:rPr lang="en-US" sz="1400" dirty="0" smtClean="0">
+                  <a:rPr lang="en-US" dirty="0" smtClean="0">
                     <a:latin typeface="Roboto Condensed" panose="02000000000000000000" pitchFamily="2" charset="0"/>
                     <a:ea typeface="Roboto Condensed" panose="02000000000000000000" pitchFamily="2" charset="0"/>
                     <a:cs typeface="Roboto Condensed" panose="02000000000000000000" pitchFamily="2" charset="0"/>
                   </a:rPr>
                   <a:t>Dense</a:t>
                 </a:r>
-                <a:endParaRPr lang="en-US" sz="1400" dirty="0">
+                <a:endParaRPr lang="en-US" dirty="0">
                   <a:latin typeface="Roboto Condensed" panose="02000000000000000000" pitchFamily="2" charset="0"/>
                   <a:ea typeface="Roboto Condensed" panose="02000000000000000000" pitchFamily="2" charset="0"/>
                   <a:cs typeface="Roboto Condensed" panose="02000000000000000000" pitchFamily="2" charset="0"/>
@@ -6395,8 +6172,8 @@
             </p:nvSpPr>
             <p:spPr>
               <a:xfrm>
-                <a:off x="2279107" y="6427750"/>
-                <a:ext cx="1175659" cy="473995"/>
+                <a:off x="1513985" y="6100625"/>
+                <a:ext cx="1439682" cy="493773"/>
               </a:xfrm>
               <a:prstGeom prst="rect">
                 <a:avLst/>
@@ -6428,14 +6205,14 @@
               <a:p>
                 <a:pPr algn="ctr"/>
                 <a:r>
-                  <a:rPr lang="en-US" sz="1400" dirty="0" smtClean="0">
+                  <a:rPr lang="en-US" dirty="0" smtClean="0">
                     <a:latin typeface="Roboto Condensed" panose="02000000000000000000" pitchFamily="2" charset="0"/>
                     <a:ea typeface="Roboto Condensed" panose="02000000000000000000" pitchFamily="2" charset="0"/>
                     <a:cs typeface="Roboto Condensed" panose="02000000000000000000" pitchFamily="2" charset="0"/>
                   </a:rPr>
                   <a:t>Rushing</a:t>
                 </a:r>
-                <a:endParaRPr lang="en-US" sz="1400" dirty="0">
+                <a:endParaRPr lang="en-US" dirty="0">
                   <a:latin typeface="Roboto Condensed" panose="02000000000000000000" pitchFamily="2" charset="0"/>
                   <a:ea typeface="Roboto Condensed" panose="02000000000000000000" pitchFamily="2" charset="0"/>
                   <a:cs typeface="Roboto Condensed" panose="02000000000000000000" pitchFamily="2" charset="0"/>
@@ -6451,8 +6228,8 @@
             </p:nvSpPr>
             <p:spPr>
               <a:xfrm>
-                <a:off x="3584983" y="6427750"/>
-                <a:ext cx="1175659" cy="473995"/>
+                <a:off x="3011925" y="6099235"/>
+                <a:ext cx="1438966" cy="495163"/>
               </a:xfrm>
               <a:prstGeom prst="rect">
                 <a:avLst/>
@@ -6484,14 +6261,14 @@
               <a:p>
                 <a:pPr algn="ctr"/>
                 <a:r>
-                  <a:rPr lang="en-US" sz="1400" dirty="0" smtClean="0">
+                  <a:rPr lang="en-US" dirty="0" smtClean="0">
                     <a:latin typeface="Roboto Condensed" panose="02000000000000000000" pitchFamily="2" charset="0"/>
                     <a:ea typeface="Roboto Condensed" panose="02000000000000000000" pitchFamily="2" charset="0"/>
                     <a:cs typeface="Roboto Condensed" panose="02000000000000000000" pitchFamily="2" charset="0"/>
                   </a:rPr>
                   <a:t>Violent</a:t>
                 </a:r>
-                <a:endParaRPr lang="en-US" sz="1400" dirty="0">
+                <a:endParaRPr lang="en-US" dirty="0">
                   <a:latin typeface="Roboto Condensed" panose="02000000000000000000" pitchFamily="2" charset="0"/>
                   <a:ea typeface="Roboto Condensed" panose="02000000000000000000" pitchFamily="2" charset="0"/>
                   <a:cs typeface="Roboto Condensed" panose="02000000000000000000" pitchFamily="2" charset="0"/>
@@ -6507,8 +6284,8 @@
             </p:nvSpPr>
             <p:spPr>
               <a:xfrm>
-                <a:off x="4922969" y="6343490"/>
-                <a:ext cx="1133072" cy="609600"/>
+                <a:off x="4520800" y="6099235"/>
+                <a:ext cx="1433141" cy="495163"/>
               </a:xfrm>
               <a:prstGeom prst="rect">
                 <a:avLst/>
@@ -6538,7 +6315,7 @@
               <a:p>
                 <a:pPr algn="ctr"/>
                 <a:r>
-                  <a:rPr lang="en-US" sz="1400" dirty="0" smtClean="0">
+                  <a:rPr lang="en-US" dirty="0" smtClean="0">
                     <a:solidFill>
                       <a:schemeClr val="tx1"/>
                     </a:solidFill>
@@ -6548,7 +6325,7 @@
                   </a:rPr>
                   <a:t>Crowd types</a:t>
                 </a:r>
-                <a:endParaRPr lang="en-US" sz="1400" dirty="0">
+                <a:endParaRPr lang="en-US" dirty="0">
                   <a:solidFill>
                     <a:schemeClr val="tx1"/>
                   </a:solidFill>
@@ -6562,16 +6339,16 @@
         </p:grpSp>
         <p:grpSp>
           <p:nvGrpSpPr>
-            <p:cNvPr id="10" name="Group 9"/>
+            <p:cNvPr id="11" name="Group 10"/>
             <p:cNvGrpSpPr/>
             <p:nvPr/>
           </p:nvGrpSpPr>
           <p:grpSpPr>
             <a:xfrm>
-              <a:off x="6471056" y="2047796"/>
-              <a:ext cx="3369630" cy="4977120"/>
-              <a:chOff x="6471056" y="2047796"/>
-              <a:chExt cx="3369630" cy="4977120"/>
+              <a:off x="6318188" y="2426733"/>
+              <a:ext cx="1903217" cy="4297025"/>
+              <a:chOff x="6318188" y="2426733"/>
+              <a:chExt cx="1903217" cy="4297025"/>
             </a:xfrm>
           </p:grpSpPr>
           <p:sp>
@@ -6582,12 +6359,12 @@
             </p:nvSpPr>
             <p:spPr>
               <a:xfrm>
-                <a:off x="6471056" y="2047796"/>
-                <a:ext cx="3369630" cy="4977120"/>
+                <a:off x="6318188" y="2426733"/>
+                <a:ext cx="1470267" cy="4297025"/>
               </a:xfrm>
               <a:prstGeom prst="roundRect">
                 <a:avLst>
-                  <a:gd name="adj" fmla="val 7361"/>
+                  <a:gd name="adj" fmla="val 2912"/>
                 </a:avLst>
               </a:prstGeom>
             </p:spPr>
@@ -6610,7 +6387,7 @@
               <a:lstStyle/>
               <a:p>
                 <a:pPr algn="ctr"/>
-                <a:endParaRPr lang="en-US" sz="1400">
+                <a:endParaRPr lang="en-US">
                   <a:latin typeface="Roboto Condensed" panose="02000000000000000000" pitchFamily="2" charset="0"/>
                   <a:ea typeface="Roboto Condensed" panose="02000000000000000000" pitchFamily="2" charset="0"/>
                   <a:cs typeface="Roboto Condensed" panose="02000000000000000000" pitchFamily="2" charset="0"/>
@@ -6626,8 +6403,8 @@
             </p:nvSpPr>
             <p:spPr>
               <a:xfrm>
-                <a:off x="6668170" y="2579476"/>
-                <a:ext cx="1251500" cy="469992"/>
+                <a:off x="6499432" y="2588485"/>
+                <a:ext cx="1091450" cy="390635"/>
               </a:xfrm>
               <a:prstGeom prst="rect">
                 <a:avLst/>
@@ -6656,14 +6433,14 @@
               <a:p>
                 <a:pPr algn="ctr"/>
                 <a:r>
-                  <a:rPr lang="en-US" sz="1400" dirty="0" err="1" smtClean="0">
+                  <a:rPr lang="en-US" dirty="0" err="1" smtClean="0">
                     <a:latin typeface="Roboto Condensed" panose="02000000000000000000" pitchFamily="2" charset="0"/>
                     <a:ea typeface="Roboto Condensed" panose="02000000000000000000" pitchFamily="2" charset="0"/>
                     <a:cs typeface="Roboto Condensed" panose="02000000000000000000" pitchFamily="2" charset="0"/>
                   </a:rPr>
                   <a:t>Fuzzifier</a:t>
                 </a:r>
-                <a:endParaRPr lang="en-US" sz="1400" dirty="0">
+                <a:endParaRPr lang="en-US" dirty="0">
                   <a:latin typeface="Roboto Condensed" panose="02000000000000000000" pitchFamily="2" charset="0"/>
                   <a:ea typeface="Roboto Condensed" panose="02000000000000000000" pitchFamily="2" charset="0"/>
                   <a:cs typeface="Roboto Condensed" panose="02000000000000000000" pitchFamily="2" charset="0"/>
@@ -6679,8 +6456,8 @@
             </p:nvSpPr>
             <p:spPr>
               <a:xfrm>
-                <a:off x="6684135" y="3695539"/>
-                <a:ext cx="1251500" cy="1137629"/>
+                <a:off x="6504017" y="3567328"/>
+                <a:ext cx="1091450" cy="1242028"/>
               </a:xfrm>
               <a:prstGeom prst="rect">
                 <a:avLst/>
@@ -6709,14 +6486,14 @@
               <a:p>
                 <a:pPr algn="ctr"/>
                 <a:r>
-                  <a:rPr lang="en-US" sz="1400" dirty="0" smtClean="0">
+                  <a:rPr lang="en-US" dirty="0" smtClean="0">
                     <a:latin typeface="Roboto Condensed" panose="02000000000000000000" pitchFamily="2" charset="0"/>
                     <a:ea typeface="Roboto Condensed" panose="02000000000000000000" pitchFamily="2" charset="0"/>
                     <a:cs typeface="Roboto Condensed" panose="02000000000000000000" pitchFamily="2" charset="0"/>
                   </a:rPr>
                   <a:t>Inference Engine</a:t>
                 </a:r>
-                <a:endParaRPr lang="en-US" sz="1400" dirty="0">
+                <a:endParaRPr lang="en-US" dirty="0">
                   <a:latin typeface="Roboto Condensed" panose="02000000000000000000" pitchFamily="2" charset="0"/>
                   <a:ea typeface="Roboto Condensed" panose="02000000000000000000" pitchFamily="2" charset="0"/>
                   <a:cs typeface="Roboto Condensed" panose="02000000000000000000" pitchFamily="2" charset="0"/>
@@ -6732,8 +6509,8 @@
             </p:nvSpPr>
             <p:spPr>
               <a:xfrm>
-                <a:off x="8545681" y="3791564"/>
-                <a:ext cx="1044620" cy="1008031"/>
+                <a:off x="6502567" y="5397683"/>
+                <a:ext cx="1089776" cy="1139304"/>
               </a:xfrm>
               <a:prstGeom prst="flowChartMagneticDisk">
                 <a:avLst/>
@@ -6764,67 +6541,14 @@
               <a:p>
                 <a:pPr algn="ctr"/>
                 <a:r>
-                  <a:rPr lang="en-US" sz="1400" dirty="0" smtClean="0">
+                  <a:rPr lang="en-US" dirty="0" smtClean="0">
                     <a:latin typeface="Roboto Condensed" panose="02000000000000000000" pitchFamily="2" charset="0"/>
                     <a:ea typeface="Roboto Condensed" panose="02000000000000000000" pitchFamily="2" charset="0"/>
                     <a:cs typeface="Roboto Condensed" panose="02000000000000000000" pitchFamily="2" charset="0"/>
                   </a:rPr>
                   <a:t>Rule repository</a:t>
                 </a:r>
-                <a:endParaRPr lang="en-US" sz="1400" dirty="0">
-                  <a:latin typeface="Roboto Condensed" panose="02000000000000000000" pitchFamily="2" charset="0"/>
-                  <a:ea typeface="Roboto Condensed" panose="02000000000000000000" pitchFamily="2" charset="0"/>
-                  <a:cs typeface="Roboto Condensed" panose="02000000000000000000" pitchFamily="2" charset="0"/>
-                </a:endParaRPr>
-              </a:p>
-            </p:txBody>
-          </p:sp>
-          <p:sp>
-            <p:nvSpPr>
-              <p:cNvPr id="76" name="Rectangle 75"/>
-              <p:cNvSpPr/>
-              <p:nvPr/>
-            </p:nvSpPr>
-            <p:spPr>
-              <a:xfrm>
-                <a:off x="6664306" y="5480069"/>
-                <a:ext cx="1251500" cy="469992"/>
-              </a:xfrm>
-              <a:prstGeom prst="rect">
-                <a:avLst/>
-              </a:prstGeom>
-              <a:ln>
-                <a:noFill/>
-              </a:ln>
-            </p:spPr>
-            <p:style>
-              <a:lnRef idx="3">
-                <a:schemeClr val="lt1"/>
-              </a:lnRef>
-              <a:fillRef idx="1">
-                <a:schemeClr val="accent1"/>
-              </a:fillRef>
-              <a:effectRef idx="1">
-                <a:schemeClr val="accent1"/>
-              </a:effectRef>
-              <a:fontRef idx="minor">
-                <a:schemeClr val="lt1"/>
-              </a:fontRef>
-            </p:style>
-            <p:txBody>
-              <a:bodyPr rtlCol="0" anchor="ctr"/>
-              <a:lstStyle/>
-              <a:p>
-                <a:pPr algn="ctr"/>
-                <a:r>
-                  <a:rPr lang="en-US" sz="1400" dirty="0" smtClean="0">
-                    <a:latin typeface="Roboto Condensed" panose="02000000000000000000" pitchFamily="2" charset="0"/>
-                    <a:ea typeface="Roboto Condensed" panose="02000000000000000000" pitchFamily="2" charset="0"/>
-                    <a:cs typeface="Roboto Condensed" panose="02000000000000000000" pitchFamily="2" charset="0"/>
-                  </a:rPr>
-                  <a:t>Output processor</a:t>
-                </a:r>
-                <a:endParaRPr lang="en-US" sz="1400" dirty="0">
+                <a:endParaRPr lang="en-US" dirty="0">
                   <a:latin typeface="Roboto Condensed" panose="02000000000000000000" pitchFamily="2" charset="0"/>
                   <a:ea typeface="Roboto Condensed" panose="02000000000000000000" pitchFamily="2" charset="0"/>
                   <a:cs typeface="Roboto Condensed" panose="02000000000000000000" pitchFamily="2" charset="0"/>
@@ -6840,8 +6564,8 @@
             </p:nvSpPr>
             <p:spPr>
               <a:xfrm>
-                <a:off x="6972192" y="3133432"/>
-                <a:ext cx="675386" cy="478972"/>
+                <a:off x="6764574" y="3076921"/>
+                <a:ext cx="589013" cy="398099"/>
               </a:xfrm>
               <a:prstGeom prst="downArrow">
                 <a:avLst/>
@@ -6872,7 +6596,7 @@
               <a:lstStyle/>
               <a:p>
                 <a:pPr algn="ctr"/>
-                <a:endParaRPr lang="en-US" sz="1400">
+                <a:endParaRPr lang="en-US">
                   <a:latin typeface="Roboto Condensed" panose="02000000000000000000" pitchFamily="2" charset="0"/>
                   <a:ea typeface="Roboto Condensed" panose="02000000000000000000" pitchFamily="2" charset="0"/>
                   <a:cs typeface="Roboto Condensed" panose="02000000000000000000" pitchFamily="2" charset="0"/>
@@ -6882,14 +6606,14 @@
           </p:sp>
           <p:sp>
             <p:nvSpPr>
-              <p:cNvPr id="78" name="Down Arrow 77"/>
+              <p:cNvPr id="79" name="Down Arrow 78"/>
               <p:cNvSpPr/>
               <p:nvPr/>
             </p:nvSpPr>
             <p:spPr>
-              <a:xfrm>
-                <a:off x="6952363" y="4917133"/>
-                <a:ext cx="675386" cy="478972"/>
+              <a:xfrm rot="10800000">
+                <a:off x="6764759" y="4889241"/>
+                <a:ext cx="561349" cy="417718"/>
               </a:xfrm>
               <a:prstGeom prst="downArrow">
                 <a:avLst/>
@@ -6920,55 +6644,7 @@
               <a:lstStyle/>
               <a:p>
                 <a:pPr algn="ctr"/>
-                <a:endParaRPr lang="en-US" sz="1400">
-                  <a:latin typeface="Roboto Condensed" panose="02000000000000000000" pitchFamily="2" charset="0"/>
-                  <a:ea typeface="Roboto Condensed" panose="02000000000000000000" pitchFamily="2" charset="0"/>
-                  <a:cs typeface="Roboto Condensed" panose="02000000000000000000" pitchFamily="2" charset="0"/>
-                </a:endParaRPr>
-              </a:p>
-            </p:txBody>
-          </p:sp>
-          <p:sp>
-            <p:nvSpPr>
-              <p:cNvPr id="79" name="Down Arrow 78"/>
-              <p:cNvSpPr/>
-              <p:nvPr/>
-            </p:nvSpPr>
-            <p:spPr>
-              <a:xfrm rot="5400000">
-                <a:off x="7898854" y="4056093"/>
-                <a:ext cx="675386" cy="478972"/>
-              </a:xfrm>
-              <a:prstGeom prst="downArrow">
-                <a:avLst/>
-              </a:prstGeom>
-              <a:solidFill>
-                <a:schemeClr val="accent1">
-                  <a:lumMod val="60000"/>
-                  <a:lumOff val="40000"/>
-                </a:schemeClr>
-              </a:solidFill>
-            </p:spPr>
-            <p:style>
-              <a:lnRef idx="3">
-                <a:schemeClr val="lt1"/>
-              </a:lnRef>
-              <a:fillRef idx="1">
-                <a:schemeClr val="accent3"/>
-              </a:fillRef>
-              <a:effectRef idx="1">
-                <a:schemeClr val="accent3"/>
-              </a:effectRef>
-              <a:fontRef idx="minor">
-                <a:schemeClr val="lt1"/>
-              </a:fontRef>
-            </p:style>
-            <p:txBody>
-              <a:bodyPr rtlCol="0" anchor="ctr"/>
-              <a:lstStyle/>
-              <a:p>
-                <a:pPr algn="ctr"/>
-                <a:endParaRPr lang="en-US" sz="1400">
+                <a:endParaRPr lang="en-US">
                   <a:latin typeface="Roboto Condensed" panose="02000000000000000000" pitchFamily="2" charset="0"/>
                   <a:ea typeface="Roboto Condensed" panose="02000000000000000000" pitchFamily="2" charset="0"/>
                   <a:cs typeface="Roboto Condensed" panose="02000000000000000000" pitchFamily="2" charset="0"/>
@@ -6983,9 +6659,9 @@
               <p:nvPr/>
             </p:nvSpPr>
             <p:spPr>
-              <a:xfrm>
-                <a:off x="6664306" y="6343490"/>
-                <a:ext cx="2925995" cy="609600"/>
+              <a:xfrm rot="5400000">
+                <a:off x="5823422" y="4325774"/>
+                <a:ext cx="4289296" cy="506671"/>
               </a:xfrm>
               <a:prstGeom prst="rect">
                 <a:avLst/>
@@ -7015,7 +6691,7 @@
               <a:p>
                 <a:pPr algn="ctr"/>
                 <a:r>
-                  <a:rPr lang="en-US" sz="1400" dirty="0" smtClean="0">
+                  <a:rPr lang="en-US" dirty="0" smtClean="0">
                     <a:solidFill>
                       <a:schemeClr val="tx1"/>
                     </a:solidFill>
@@ -7025,7 +6701,7 @@
                   </a:rPr>
                   <a:t>Rule-based reasoning</a:t>
                 </a:r>
-                <a:endParaRPr lang="en-US" sz="1400" dirty="0">
+                <a:endParaRPr lang="en-US" dirty="0">
                   <a:solidFill>
                     <a:schemeClr val="tx1"/>
                   </a:solidFill>
@@ -7045,10 +6721,10 @@
           </p:nvGrpSpPr>
           <p:grpSpPr>
             <a:xfrm>
-              <a:off x="734120" y="-228401"/>
-              <a:ext cx="9106566" cy="918177"/>
+              <a:off x="1314928" y="534865"/>
+              <a:ext cx="6473527" cy="763146"/>
               <a:chOff x="734120" y="-228401"/>
-              <a:chExt cx="9106566" cy="918177"/>
+              <a:chExt cx="7422802" cy="918177"/>
             </a:xfrm>
           </p:grpSpPr>
           <p:sp>
@@ -7060,7 +6736,7 @@
             <p:spPr>
               <a:xfrm>
                 <a:off x="734120" y="-228401"/>
-                <a:ext cx="9106566" cy="918177"/>
+                <a:ext cx="7422802" cy="918177"/>
               </a:xfrm>
               <a:prstGeom prst="roundRect">
                 <a:avLst>
@@ -7095,7 +6771,7 @@
               <a:lstStyle/>
               <a:p>
                 <a:pPr algn="ctr"/>
-                <a:endParaRPr lang="en-US" sz="1400">
+                <a:endParaRPr lang="en-US">
                   <a:latin typeface="Roboto Condensed" panose="02000000000000000000" pitchFamily="2" charset="0"/>
                   <a:ea typeface="Roboto Condensed" panose="02000000000000000000" pitchFamily="2" charset="0"/>
                   <a:cs typeface="Roboto Condensed" panose="02000000000000000000" pitchFamily="2" charset="0"/>
@@ -7112,7 +6788,7 @@
             <p:spPr>
               <a:xfrm>
                 <a:off x="956326" y="-13603"/>
-                <a:ext cx="8634272" cy="473995"/>
+                <a:ext cx="6975726" cy="473995"/>
               </a:xfrm>
               <a:prstGeom prst="rect">
                 <a:avLst/>
@@ -7141,14 +6817,14 @@
               <a:p>
                 <a:pPr algn="ctr"/>
                 <a:r>
-                  <a:rPr lang="en-US" sz="1400" dirty="0" smtClean="0">
+                  <a:rPr lang="en-US" dirty="0" smtClean="0">
                     <a:latin typeface="Roboto Condensed" panose="02000000000000000000" pitchFamily="2" charset="0"/>
                     <a:ea typeface="Roboto Condensed" panose="02000000000000000000" pitchFamily="2" charset="0"/>
                     <a:cs typeface="Roboto Condensed" panose="02000000000000000000" pitchFamily="2" charset="0"/>
                   </a:rPr>
-                  <a:t>Twitter</a:t>
+                  <a:t>Social media</a:t>
                 </a:r>
-                <a:endParaRPr lang="en-US" sz="1400" dirty="0">
+                <a:endParaRPr lang="en-US" dirty="0">
                   <a:latin typeface="Roboto Condensed" panose="02000000000000000000" pitchFamily="2" charset="0"/>
                   <a:ea typeface="Roboto Condensed" panose="02000000000000000000" pitchFamily="2" charset="0"/>
                   <a:cs typeface="Roboto Condensed" panose="02000000000000000000" pitchFamily="2" charset="0"/>
@@ -7165,8 +6841,8 @@
           </p:nvGrpSpPr>
           <p:grpSpPr>
             <a:xfrm>
-              <a:off x="734120" y="909697"/>
-              <a:ext cx="9106566" cy="918177"/>
+              <a:off x="1314929" y="1480799"/>
+              <a:ext cx="6473526" cy="763146"/>
               <a:chOff x="734120" y="909697"/>
               <a:chExt cx="9106566" cy="918177"/>
             </a:xfrm>
@@ -7207,7 +6883,7 @@
               <a:lstStyle/>
               <a:p>
                 <a:pPr algn="ctr"/>
-                <a:endParaRPr lang="en-US" sz="1400">
+                <a:endParaRPr lang="en-US">
                   <a:latin typeface="Roboto Condensed" panose="02000000000000000000" pitchFamily="2" charset="0"/>
                   <a:ea typeface="Roboto Condensed" panose="02000000000000000000" pitchFamily="2" charset="0"/>
                   <a:cs typeface="Roboto Condensed" panose="02000000000000000000" pitchFamily="2" charset="0"/>
@@ -7223,8 +6899,8 @@
             </p:nvSpPr>
             <p:spPr>
               <a:xfrm>
-                <a:off x="957940" y="1131787"/>
-                <a:ext cx="5093295" cy="473995"/>
+                <a:off x="957939" y="1131787"/>
+                <a:ext cx="4168592" cy="473995"/>
               </a:xfrm>
               <a:prstGeom prst="rect">
                 <a:avLst/>
@@ -7256,14 +6932,14 @@
               <a:p>
                 <a:pPr algn="ctr"/>
                 <a:r>
-                  <a:rPr lang="en-US" sz="1400" dirty="0" smtClean="0">
+                  <a:rPr lang="en-US" dirty="0" smtClean="0">
                     <a:latin typeface="Roboto Condensed" panose="02000000000000000000" pitchFamily="2" charset="0"/>
                     <a:ea typeface="Roboto Condensed" panose="02000000000000000000" pitchFamily="2" charset="0"/>
                     <a:cs typeface="Roboto Condensed" panose="02000000000000000000" pitchFamily="2" charset="0"/>
                   </a:rPr>
                   <a:t>Emotion Analysis</a:t>
                 </a:r>
-                <a:endParaRPr lang="en-US" sz="1400" dirty="0">
+                <a:endParaRPr lang="en-US" dirty="0">
                   <a:latin typeface="Roboto Condensed" panose="02000000000000000000" pitchFamily="2" charset="0"/>
                   <a:ea typeface="Roboto Condensed" panose="02000000000000000000" pitchFamily="2" charset="0"/>
                   <a:cs typeface="Roboto Condensed" panose="02000000000000000000" pitchFamily="2" charset="0"/>
@@ -7279,8 +6955,8 @@
             </p:nvSpPr>
             <p:spPr>
               <a:xfrm>
-                <a:off x="6664306" y="1133585"/>
-                <a:ext cx="2925995" cy="473995"/>
+                <a:off x="5983178" y="1133585"/>
+                <a:ext cx="3581628" cy="473995"/>
               </a:xfrm>
               <a:prstGeom prst="rect">
                 <a:avLst/>
@@ -7312,14 +6988,14 @@
               <a:p>
                 <a:pPr algn="ctr"/>
                 <a:r>
-                  <a:rPr lang="en-US" sz="1400" dirty="0" smtClean="0">
+                  <a:rPr lang="en-US" dirty="0" smtClean="0">
                     <a:latin typeface="Roboto Condensed" panose="02000000000000000000" pitchFamily="2" charset="0"/>
                     <a:ea typeface="Roboto Condensed" panose="02000000000000000000" pitchFamily="2" charset="0"/>
                     <a:cs typeface="Roboto Condensed" panose="02000000000000000000" pitchFamily="2" charset="0"/>
                   </a:rPr>
-                  <a:t>Emotion Word Association</a:t>
+                  <a:t>Emotional Word Corpus</a:t>
                 </a:r>
-                <a:endParaRPr lang="en-US" sz="1400" dirty="0">
+                <a:endParaRPr lang="en-US" dirty="0">
                   <a:latin typeface="Roboto Condensed" panose="02000000000000000000" pitchFamily="2" charset="0"/>
                   <a:ea typeface="Roboto Condensed" panose="02000000000000000000" pitchFamily="2" charset="0"/>
                   <a:cs typeface="Roboto Condensed" panose="02000000000000000000" pitchFamily="2" charset="0"/>
@@ -7335,8 +7011,8 @@
             </p:nvSpPr>
             <p:spPr>
               <a:xfrm rot="5400000">
-                <a:off x="6017069" y="1123124"/>
-                <a:ext cx="675386" cy="478972"/>
+                <a:off x="5192546" y="1123126"/>
+                <a:ext cx="675385" cy="478972"/>
               </a:xfrm>
               <a:prstGeom prst="downArrow">
                 <a:avLst/>
@@ -7367,7 +7043,7 @@
               <a:lstStyle/>
               <a:p>
                 <a:pPr algn="ctr"/>
-                <a:endParaRPr lang="en-US" sz="1400">
+                <a:endParaRPr lang="en-US">
                   <a:latin typeface="Roboto Condensed" panose="02000000000000000000" pitchFamily="2" charset="0"/>
                   <a:ea typeface="Roboto Condensed" panose="02000000000000000000" pitchFamily="2" charset="0"/>
                   <a:cs typeface="Roboto Condensed" panose="02000000000000000000" pitchFamily="2" charset="0"/>
@@ -7384,8 +7060,8 @@
           </p:nvSpPr>
           <p:spPr>
             <a:xfrm rot="16200000">
-              <a:off x="6022676" y="4003138"/>
-              <a:ext cx="675386" cy="478972"/>
+              <a:off x="5940982" y="3547145"/>
+              <a:ext cx="561349" cy="417718"/>
             </a:xfrm>
             <a:prstGeom prst="downArrow">
               <a:avLst/>
@@ -7416,7 +7092,7 @@
             <a:lstStyle/>
             <a:p>
               <a:pPr algn="ctr"/>
-              <a:endParaRPr lang="en-US" sz="1400">
+              <a:endParaRPr lang="en-US">
                 <a:latin typeface="Roboto Condensed" panose="02000000000000000000" pitchFamily="2" charset="0"/>
                 <a:ea typeface="Roboto Condensed" panose="02000000000000000000" pitchFamily="2" charset="0"/>
                 <a:cs typeface="Roboto Condensed" panose="02000000000000000000" pitchFamily="2" charset="0"/>
@@ -7432,8 +7108,8 @@
           </p:nvSpPr>
           <p:spPr>
             <a:xfrm rot="16200000">
-              <a:off x="-193985" y="3977320"/>
-              <a:ext cx="1133072" cy="609600"/>
+              <a:off x="499309" y="3493600"/>
+              <a:ext cx="1000579" cy="531641"/>
             </a:xfrm>
             <a:prstGeom prst="rect">
               <a:avLst/>
@@ -7463,7 +7139,7 @@
             <a:p>
               <a:pPr algn="ctr"/>
               <a:r>
-                <a:rPr lang="en-US" sz="1400" dirty="0" smtClean="0">
+                <a:rPr lang="en-US" dirty="0" smtClean="0">
                   <a:solidFill>
                     <a:schemeClr val="tx1"/>
                   </a:solidFill>
@@ -7473,7 +7149,7 @@
                 </a:rPr>
                 <a:t>Mapping</a:t>
               </a:r>
-              <a:endParaRPr lang="en-US" sz="1400" dirty="0">
+              <a:endParaRPr lang="en-US" dirty="0">
                 <a:solidFill>
                   <a:schemeClr val="tx1"/>
                 </a:solidFill>
@@ -7492,8 +7168,8 @@
           </p:nvSpPr>
           <p:spPr>
             <a:xfrm rot="5400000">
-              <a:off x="6021912" y="5494312"/>
-              <a:ext cx="675386" cy="478972"/>
+              <a:off x="5949655" y="4413022"/>
+              <a:ext cx="561349" cy="417718"/>
             </a:xfrm>
             <a:prstGeom prst="downArrow">
               <a:avLst/>
@@ -7524,7 +7200,7 @@
             <a:lstStyle/>
             <a:p>
               <a:pPr algn="ctr"/>
-              <a:endParaRPr lang="en-US" sz="1400">
+              <a:endParaRPr lang="en-US">
                 <a:latin typeface="Roboto Condensed" panose="02000000000000000000" pitchFamily="2" charset="0"/>
                 <a:ea typeface="Roboto Condensed" panose="02000000000000000000" pitchFamily="2" charset="0"/>
                 <a:cs typeface="Roboto Condensed" panose="02000000000000000000" pitchFamily="2" charset="0"/>
@@ -7540,8 +7216,8 @@
           </p:nvSpPr>
           <p:spPr>
             <a:xfrm>
-              <a:off x="4936427" y="572465"/>
-              <a:ext cx="675386" cy="478972"/>
+              <a:off x="2654464" y="1181829"/>
+              <a:ext cx="589013" cy="398099"/>
             </a:xfrm>
             <a:prstGeom prst="downArrow">
               <a:avLst/>
@@ -7572,7 +7248,7 @@
             <a:lstStyle/>
             <a:p>
               <a:pPr algn="ctr"/>
-              <a:endParaRPr lang="en-US" sz="1400">
+              <a:endParaRPr lang="en-US">
                 <a:latin typeface="Roboto Condensed" panose="02000000000000000000" pitchFamily="2" charset="0"/>
                 <a:ea typeface="Roboto Condensed" panose="02000000000000000000" pitchFamily="2" charset="0"/>
                 <a:cs typeface="Roboto Condensed" panose="02000000000000000000" pitchFamily="2" charset="0"/>
@@ -7588,8 +7264,8 @@
           </p:nvSpPr>
           <p:spPr>
             <a:xfrm rot="16200000">
-              <a:off x="6011213" y="2548788"/>
-              <a:ext cx="675386" cy="478972"/>
+              <a:off x="5930985" y="2571833"/>
+              <a:ext cx="561349" cy="417718"/>
             </a:xfrm>
             <a:prstGeom prst="downArrow">
               <a:avLst/>
@@ -7620,7 +7296,7 @@
             <a:lstStyle/>
             <a:p>
               <a:pPr algn="ctr"/>
-              <a:endParaRPr lang="en-US" sz="1400">
+              <a:endParaRPr lang="en-US">
                 <a:latin typeface="Roboto Condensed" panose="02000000000000000000" pitchFamily="2" charset="0"/>
                 <a:ea typeface="Roboto Condensed" panose="02000000000000000000" pitchFamily="2" charset="0"/>
                 <a:cs typeface="Roboto Condensed" panose="02000000000000000000" pitchFamily="2" charset="0"/>
@@ -7636,8 +7312,8 @@
           </p:nvSpPr>
           <p:spPr>
             <a:xfrm>
-              <a:off x="3166895" y="1666430"/>
-              <a:ext cx="675386" cy="478972"/>
+              <a:off x="2661474" y="2128437"/>
+              <a:ext cx="589013" cy="398099"/>
             </a:xfrm>
             <a:prstGeom prst="downArrow">
               <a:avLst/>
@@ -7668,7 +7344,7 @@
             <a:lstStyle/>
             <a:p>
               <a:pPr algn="ctr"/>
-              <a:endParaRPr lang="en-US" sz="1400">
+              <a:endParaRPr lang="en-US">
                 <a:latin typeface="Roboto Condensed" panose="02000000000000000000" pitchFamily="2" charset="0"/>
                 <a:ea typeface="Roboto Condensed" panose="02000000000000000000" pitchFamily="2" charset="0"/>
                 <a:cs typeface="Roboto Condensed" panose="02000000000000000000" pitchFamily="2" charset="0"/>
@@ -7715,10 +7391,10 @@
         </p:nvGrpSpPr>
         <p:grpSpPr>
           <a:xfrm>
-            <a:off x="710835" y="1014069"/>
-            <a:ext cx="7193647" cy="4378758"/>
+            <a:off x="577554" y="1014069"/>
+            <a:ext cx="5844838" cy="4416114"/>
             <a:chOff x="710835" y="1014069"/>
-            <a:chExt cx="7193647" cy="4378758"/>
+            <a:chExt cx="7193647" cy="4416114"/>
           </a:xfrm>
         </p:grpSpPr>
         <p:sp>
@@ -7856,14 +7532,14 @@
             <a:p>
               <a:pPr algn="ctr"/>
               <a:r>
-                <a:rPr lang="en-US" dirty="0" smtClean="0">
+                <a:rPr lang="en-US" sz="2400" dirty="0" smtClean="0">
                   <a:latin typeface="Roboto Condensed" panose="02000000000000000000" pitchFamily="2" charset="0"/>
                   <a:ea typeface="Roboto Condensed" panose="02000000000000000000" pitchFamily="2" charset="0"/>
                   <a:cs typeface="Roboto Condensed" panose="02000000000000000000" pitchFamily="2" charset="0"/>
                 </a:rPr>
                 <a:t>Social media</a:t>
               </a:r>
-              <a:endParaRPr lang="en-US" dirty="0">
+              <a:endParaRPr lang="en-US" sz="2400" dirty="0">
                 <a:latin typeface="Roboto Condensed" panose="02000000000000000000" pitchFamily="2" charset="0"/>
                 <a:ea typeface="Roboto Condensed" panose="02000000000000000000" pitchFamily="2" charset="0"/>
                 <a:cs typeface="Roboto Condensed" panose="02000000000000000000" pitchFamily="2" charset="0"/>
@@ -7912,14 +7588,14 @@
             <a:p>
               <a:pPr algn="ctr"/>
               <a:r>
-                <a:rPr lang="en-US" dirty="0" smtClean="0">
+                <a:rPr lang="en-US" sz="2400" dirty="0" smtClean="0">
                   <a:latin typeface="Roboto Condensed" panose="02000000000000000000" pitchFamily="2" charset="0"/>
                   <a:ea typeface="Roboto Condensed" panose="02000000000000000000" pitchFamily="2" charset="0"/>
                   <a:cs typeface="Roboto Condensed" panose="02000000000000000000" pitchFamily="2" charset="0"/>
                 </a:rPr>
                 <a:t>Emotions</a:t>
               </a:r>
-              <a:endParaRPr lang="en-US" dirty="0">
+              <a:endParaRPr lang="en-US" sz="2400" dirty="0">
                 <a:latin typeface="Roboto Condensed" panose="02000000000000000000" pitchFamily="2" charset="0"/>
                 <a:ea typeface="Roboto Condensed" panose="02000000000000000000" pitchFamily="2" charset="0"/>
                 <a:cs typeface="Roboto Condensed" panose="02000000000000000000" pitchFamily="2" charset="0"/>
@@ -7968,14 +7644,14 @@
             <a:p>
               <a:pPr algn="ctr"/>
               <a:r>
-                <a:rPr lang="en-US" dirty="0" smtClean="0">
+                <a:rPr lang="en-US" sz="2400" dirty="0" smtClean="0">
                   <a:latin typeface="Roboto Condensed" panose="02000000000000000000" pitchFamily="2" charset="0"/>
                   <a:ea typeface="Roboto Condensed" panose="02000000000000000000" pitchFamily="2" charset="0"/>
                   <a:cs typeface="Roboto Condensed" panose="02000000000000000000" pitchFamily="2" charset="0"/>
                 </a:rPr>
                 <a:t>Crowd types</a:t>
               </a:r>
-              <a:endParaRPr lang="en-US" dirty="0">
+              <a:endParaRPr lang="en-US" sz="2400" dirty="0">
                 <a:latin typeface="Roboto Condensed" panose="02000000000000000000" pitchFamily="2" charset="0"/>
                 <a:ea typeface="Roboto Condensed" panose="02000000000000000000" pitchFamily="2" charset="0"/>
                 <a:cs typeface="Roboto Condensed" panose="02000000000000000000" pitchFamily="2" charset="0"/>
@@ -7991,8 +7667,8 @@
           </p:nvSpPr>
           <p:spPr>
             <a:xfrm>
-              <a:off x="987306" y="1278028"/>
-              <a:ext cx="1175659" cy="473995"/>
+              <a:off x="712612" y="1240672"/>
+              <a:ext cx="1873481" cy="473995"/>
             </a:xfrm>
             <a:prstGeom prst="rect">
               <a:avLst/>
@@ -8022,7 +7698,7 @@
             <a:p>
               <a:pPr algn="ctr"/>
               <a:r>
-                <a:rPr lang="en-US" sz="1400" i="1" dirty="0" smtClean="0">
+                <a:rPr lang="en-US" sz="2000" i="1" dirty="0" smtClean="0">
                   <a:solidFill>
                     <a:srgbClr val="000000"/>
                   </a:solidFill>
@@ -8032,7 +7708,7 @@
                 </a:rPr>
                 <a:t>Raw context data</a:t>
               </a:r>
-              <a:endParaRPr lang="en-US" sz="1400" i="1" dirty="0">
+              <a:endParaRPr lang="en-US" sz="2000" i="1" dirty="0">
                 <a:solidFill>
                   <a:srgbClr val="000000"/>
                 </a:solidFill>
@@ -8051,8 +7727,8 @@
           </p:nvSpPr>
           <p:spPr>
             <a:xfrm>
-              <a:off x="3727144" y="1278791"/>
-              <a:ext cx="1175659" cy="473995"/>
+              <a:off x="3310201" y="1241435"/>
+              <a:ext cx="1930950" cy="473995"/>
             </a:xfrm>
             <a:prstGeom prst="rect">
               <a:avLst/>
@@ -8082,7 +7758,7 @@
             <a:p>
               <a:pPr algn="ctr"/>
               <a:r>
-                <a:rPr lang="en-US" sz="1400" i="1" dirty="0" smtClean="0">
+                <a:rPr lang="en-US" sz="2000" i="1" dirty="0" smtClean="0">
                   <a:solidFill>
                     <a:srgbClr val="000000"/>
                   </a:solidFill>
@@ -8092,7 +7768,7 @@
                 </a:rPr>
                 <a:t>High level context data</a:t>
               </a:r>
-              <a:endParaRPr lang="en-US" sz="1400" i="1" dirty="0">
+              <a:endParaRPr lang="en-US" sz="2000" i="1" dirty="0">
                 <a:solidFill>
                   <a:srgbClr val="000000"/>
                 </a:solidFill>
@@ -8111,7 +7787,7 @@
           </p:nvSpPr>
           <p:spPr>
             <a:xfrm>
-              <a:off x="6410115" y="1279555"/>
+              <a:off x="6410115" y="1242199"/>
               <a:ext cx="1175659" cy="473995"/>
             </a:xfrm>
             <a:prstGeom prst="rect">
@@ -8142,7 +7818,7 @@
             <a:p>
               <a:pPr algn="ctr"/>
               <a:r>
-                <a:rPr lang="en-US" sz="1400" i="1" dirty="0" smtClean="0">
+                <a:rPr lang="en-US" sz="2000" i="1" dirty="0" smtClean="0">
                   <a:solidFill>
                     <a:srgbClr val="000000"/>
                   </a:solidFill>
@@ -8152,7 +7828,7 @@
                 </a:rPr>
                 <a:t>Output</a:t>
               </a:r>
-              <a:endParaRPr lang="en-US" sz="1400" i="1" dirty="0">
+              <a:endParaRPr lang="en-US" sz="2000" i="1" dirty="0">
                 <a:solidFill>
                   <a:srgbClr val="000000"/>
                 </a:solidFill>
@@ -8171,8 +7847,8 @@
           </p:nvSpPr>
           <p:spPr>
             <a:xfrm>
-              <a:off x="1980859" y="4918068"/>
-              <a:ext cx="2066159" cy="473995"/>
+              <a:off x="1804519" y="4955424"/>
+              <a:ext cx="2310245" cy="473995"/>
             </a:xfrm>
             <a:prstGeom prst="rect">
               <a:avLst/>
@@ -8202,7 +7878,7 @@
             <a:p>
               <a:pPr algn="ctr"/>
               <a:r>
-                <a:rPr lang="en-US" dirty="0" smtClean="0">
+                <a:rPr lang="en-US" sz="2000" dirty="0" smtClean="0">
                   <a:solidFill>
                     <a:srgbClr val="000000"/>
                   </a:solidFill>
@@ -8212,7 +7888,7 @@
                 </a:rPr>
                 <a:t>Emotion analysis</a:t>
               </a:r>
-              <a:endParaRPr lang="en-US" dirty="0">
+              <a:endParaRPr lang="en-US" sz="2000" dirty="0">
                 <a:solidFill>
                   <a:srgbClr val="000000"/>
                 </a:solidFill>
@@ -8231,8 +7907,8 @@
           </p:nvSpPr>
           <p:spPr>
             <a:xfrm>
-              <a:off x="4577776" y="4918832"/>
-              <a:ext cx="2511615" cy="473995"/>
+              <a:off x="4287170" y="4956188"/>
+              <a:ext cx="3298708" cy="473995"/>
             </a:xfrm>
             <a:prstGeom prst="rect">
               <a:avLst/>
@@ -8262,7 +7938,7 @@
             <a:p>
               <a:pPr algn="ctr"/>
               <a:r>
-                <a:rPr lang="en-US" dirty="0" smtClean="0">
+                <a:rPr lang="en-US" sz="2000" dirty="0" smtClean="0">
                   <a:solidFill>
                     <a:srgbClr val="000000"/>
                   </a:solidFill>
@@ -8272,7 +7948,7 @@
                 </a:rPr>
                 <a:t>Crowd type classification</a:t>
               </a:r>
-              <a:endParaRPr lang="en-US" dirty="0">
+              <a:endParaRPr lang="en-US" sz="2000" dirty="0">
                 <a:solidFill>
                   <a:srgbClr val="000000"/>
                 </a:solidFill>
@@ -8301,6 +7977,604 @@
       </p:par>
     </p:tnLst>
   </p:timing>
+</p:sld>
+</file>
+
+<file path=ppt/slides/slide4.xml><?xml version="1.0" encoding="utf-8"?>
+<p:sld xmlns:a="http://schemas.openxmlformats.org/drawingml/2006/main" xmlns:r="http://schemas.openxmlformats.org/officeDocument/2006/relationships" xmlns:p="http://schemas.openxmlformats.org/presentationml/2006/main">
+  <p:cSld>
+    <p:spTree>
+      <p:nvGrpSpPr>
+        <p:cNvPr id="1" name=""/>
+        <p:cNvGrpSpPr/>
+        <p:nvPr/>
+      </p:nvGrpSpPr>
+      <p:grpSpPr>
+        <a:xfrm>
+          <a:off x="0" y="0"/>
+          <a:ext cx="0" cy="0"/>
+          <a:chOff x="0" y="0"/>
+          <a:chExt cx="0" cy="0"/>
+        </a:xfrm>
+      </p:grpSpPr>
+      <p:grpSp>
+        <p:nvGrpSpPr>
+          <p:cNvPr id="70" name="Group 69"/>
+          <p:cNvGrpSpPr/>
+          <p:nvPr/>
+        </p:nvGrpSpPr>
+        <p:grpSpPr>
+          <a:xfrm>
+            <a:off x="1830380" y="494943"/>
+            <a:ext cx="6891943" cy="5948659"/>
+            <a:chOff x="1830380" y="494943"/>
+            <a:chExt cx="6891943" cy="5948659"/>
+          </a:xfrm>
+        </p:grpSpPr>
+        <p:grpSp>
+          <p:nvGrpSpPr>
+            <p:cNvPr id="62" name="Group 61"/>
+            <p:cNvGrpSpPr/>
+            <p:nvPr/>
+          </p:nvGrpSpPr>
+          <p:grpSpPr>
+            <a:xfrm>
+              <a:off x="1830380" y="494943"/>
+              <a:ext cx="6891943" cy="5948659"/>
+              <a:chOff x="1662284" y="569652"/>
+              <a:chExt cx="6891943" cy="5948659"/>
+            </a:xfrm>
+            <a:solidFill>
+              <a:srgbClr val="ED7D31"/>
+            </a:solidFill>
+          </p:grpSpPr>
+          <p:sp>
+            <p:nvSpPr>
+              <p:cNvPr id="55" name="Isosceles Triangle 54"/>
+              <p:cNvSpPr/>
+              <p:nvPr/>
+            </p:nvSpPr>
+            <p:spPr>
+              <a:xfrm>
+                <a:off x="3147134" y="3539313"/>
+                <a:ext cx="3931581" cy="2978998"/>
+              </a:xfrm>
+              <a:prstGeom prst="triangle">
+                <a:avLst>
+                  <a:gd name="adj" fmla="val 49525"/>
+                </a:avLst>
+              </a:prstGeom>
+              <a:solidFill>
+                <a:schemeClr val="accent1"/>
+              </a:solidFill>
+            </p:spPr>
+            <p:style>
+              <a:lnRef idx="3">
+                <a:schemeClr val="lt1"/>
+              </a:lnRef>
+              <a:fillRef idx="1">
+                <a:schemeClr val="accent2"/>
+              </a:fillRef>
+              <a:effectRef idx="1">
+                <a:schemeClr val="accent2"/>
+              </a:effectRef>
+              <a:fontRef idx="minor">
+                <a:schemeClr val="lt1"/>
+              </a:fontRef>
+            </p:style>
+            <p:txBody>
+              <a:bodyPr rtlCol="0" anchor="ctr"/>
+              <a:lstStyle/>
+              <a:p>
+                <a:pPr algn="ctr"/>
+                <a:endParaRPr lang="en-US" dirty="0"/>
+              </a:p>
+            </p:txBody>
+          </p:sp>
+          <p:sp>
+            <p:nvSpPr>
+              <p:cNvPr id="56" name="Isosceles Triangle 55"/>
+              <p:cNvSpPr/>
+              <p:nvPr/>
+            </p:nvSpPr>
+            <p:spPr>
+              <a:xfrm rot="10800000">
+                <a:off x="3131437" y="572635"/>
+                <a:ext cx="3922243" cy="2978998"/>
+              </a:xfrm>
+              <a:prstGeom prst="triangle">
+                <a:avLst>
+                  <a:gd name="adj" fmla="val 49762"/>
+                </a:avLst>
+              </a:prstGeom>
+              <a:solidFill>
+                <a:srgbClr val="FF6600"/>
+              </a:solidFill>
+            </p:spPr>
+            <p:style>
+              <a:lnRef idx="3">
+                <a:schemeClr val="lt1"/>
+              </a:lnRef>
+              <a:fillRef idx="1">
+                <a:schemeClr val="accent1"/>
+              </a:fillRef>
+              <a:effectRef idx="1">
+                <a:schemeClr val="accent1"/>
+              </a:effectRef>
+              <a:fontRef idx="minor">
+                <a:schemeClr val="lt1"/>
+              </a:fontRef>
+            </p:style>
+            <p:txBody>
+              <a:bodyPr rtlCol="0" anchor="ctr"/>
+              <a:lstStyle/>
+              <a:p>
+                <a:pPr algn="ctr"/>
+                <a:endParaRPr lang="en-US" dirty="0"/>
+              </a:p>
+            </p:txBody>
+          </p:sp>
+          <p:sp>
+            <p:nvSpPr>
+              <p:cNvPr id="58" name="Isosceles Triangle 57"/>
+              <p:cNvSpPr/>
+              <p:nvPr/>
+            </p:nvSpPr>
+            <p:spPr>
+              <a:xfrm>
+                <a:off x="1665266" y="578990"/>
+                <a:ext cx="3442990" cy="2963306"/>
+              </a:xfrm>
+              <a:prstGeom prst="triangle">
+                <a:avLst>
+                  <a:gd name="adj" fmla="val 42439"/>
+                </a:avLst>
+              </a:prstGeom>
+              <a:solidFill>
+                <a:schemeClr val="accent4">
+                  <a:lumMod val="60000"/>
+                  <a:lumOff val="40000"/>
+                </a:schemeClr>
+              </a:solidFill>
+            </p:spPr>
+            <p:style>
+              <a:lnRef idx="3">
+                <a:schemeClr val="lt1"/>
+              </a:lnRef>
+              <a:fillRef idx="1">
+                <a:schemeClr val="accent4"/>
+              </a:fillRef>
+              <a:effectRef idx="1">
+                <a:schemeClr val="accent4"/>
+              </a:effectRef>
+              <a:fontRef idx="minor">
+                <a:schemeClr val="lt1"/>
+              </a:fontRef>
+            </p:style>
+            <p:txBody>
+              <a:bodyPr rtlCol="0" anchor="ctr"/>
+              <a:lstStyle/>
+              <a:p>
+                <a:pPr algn="ctr"/>
+                <a:endParaRPr lang="en-US" dirty="0"/>
+              </a:p>
+            </p:txBody>
+          </p:sp>
+          <p:sp>
+            <p:nvSpPr>
+              <p:cNvPr id="59" name="Isosceles Triangle 58"/>
+              <p:cNvSpPr/>
+              <p:nvPr/>
+            </p:nvSpPr>
+            <p:spPr>
+              <a:xfrm rot="10800000">
+                <a:off x="5089578" y="3542294"/>
+                <a:ext cx="3464649" cy="2963306"/>
+              </a:xfrm>
+              <a:prstGeom prst="triangle">
+                <a:avLst>
+                  <a:gd name="adj" fmla="val 42978"/>
+                </a:avLst>
+              </a:prstGeom>
+              <a:solidFill>
+                <a:schemeClr val="bg2">
+                  <a:lumMod val="90000"/>
+                </a:schemeClr>
+              </a:solidFill>
+            </p:spPr>
+            <p:style>
+              <a:lnRef idx="3">
+                <a:schemeClr val="lt1"/>
+              </a:lnRef>
+              <a:fillRef idx="1">
+                <a:schemeClr val="accent5"/>
+              </a:fillRef>
+              <a:effectRef idx="1">
+                <a:schemeClr val="accent5"/>
+              </a:effectRef>
+              <a:fontRef idx="minor">
+                <a:schemeClr val="lt1"/>
+              </a:fontRef>
+            </p:style>
+            <p:txBody>
+              <a:bodyPr rtlCol="0" anchor="ctr"/>
+              <a:lstStyle/>
+              <a:p>
+                <a:pPr algn="ctr"/>
+                <a:endParaRPr lang="en-US"/>
+              </a:p>
+            </p:txBody>
+          </p:sp>
+          <p:sp>
+            <p:nvSpPr>
+              <p:cNvPr id="60" name="Isosceles Triangle 59"/>
+              <p:cNvSpPr/>
+              <p:nvPr/>
+            </p:nvSpPr>
+            <p:spPr>
+              <a:xfrm rot="10800000">
+                <a:off x="1662284" y="3548650"/>
+                <a:ext cx="3427294" cy="2969660"/>
+              </a:xfrm>
+              <a:prstGeom prst="triangle">
+                <a:avLst>
+                  <a:gd name="adj" fmla="val 56874"/>
+                </a:avLst>
+              </a:prstGeom>
+              <a:solidFill>
+                <a:schemeClr val="accent2">
+                  <a:lumMod val="75000"/>
+                </a:schemeClr>
+              </a:solidFill>
+            </p:spPr>
+            <p:style>
+              <a:lnRef idx="3">
+                <a:schemeClr val="lt1"/>
+              </a:lnRef>
+              <a:fillRef idx="1">
+                <a:schemeClr val="accent3"/>
+              </a:fillRef>
+              <a:effectRef idx="1">
+                <a:schemeClr val="accent3"/>
+              </a:effectRef>
+              <a:fontRef idx="minor">
+                <a:schemeClr val="lt1"/>
+              </a:fontRef>
+            </p:style>
+            <p:txBody>
+              <a:bodyPr rtlCol="0" anchor="ctr"/>
+              <a:lstStyle/>
+              <a:p>
+                <a:pPr algn="ctr"/>
+                <a:endParaRPr lang="en-US"/>
+              </a:p>
+            </p:txBody>
+          </p:sp>
+          <p:sp>
+            <p:nvSpPr>
+              <p:cNvPr id="61" name="Isosceles Triangle 60"/>
+              <p:cNvSpPr/>
+              <p:nvPr/>
+            </p:nvSpPr>
+            <p:spPr>
+              <a:xfrm>
+                <a:off x="5108255" y="569652"/>
+                <a:ext cx="3445971" cy="2966289"/>
+              </a:xfrm>
+              <a:prstGeom prst="triangle">
+                <a:avLst>
+                  <a:gd name="adj" fmla="val 56531"/>
+                </a:avLst>
+              </a:prstGeom>
+              <a:solidFill>
+                <a:schemeClr val="accent6"/>
+              </a:solidFill>
+            </p:spPr>
+            <p:style>
+              <a:lnRef idx="3">
+                <a:schemeClr val="lt1"/>
+              </a:lnRef>
+              <a:fillRef idx="1">
+                <a:schemeClr val="accent6"/>
+              </a:fillRef>
+              <a:effectRef idx="1">
+                <a:schemeClr val="accent6"/>
+              </a:effectRef>
+              <a:fontRef idx="minor">
+                <a:schemeClr val="lt1"/>
+              </a:fontRef>
+            </p:style>
+            <p:txBody>
+              <a:bodyPr rtlCol="0" anchor="ctr"/>
+              <a:lstStyle/>
+              <a:p>
+                <a:pPr algn="ctr"/>
+                <a:endParaRPr lang="en-US" dirty="0"/>
+              </a:p>
+            </p:txBody>
+          </p:sp>
+        </p:grpSp>
+        <p:sp>
+          <p:nvSpPr>
+            <p:cNvPr id="64" name="TextBox 63"/>
+            <p:cNvSpPr txBox="1"/>
+            <p:nvPr/>
+          </p:nvSpPr>
+          <p:spPr>
+            <a:xfrm>
+              <a:off x="4809419" y="1214012"/>
+              <a:ext cx="902811" cy="461665"/>
+            </a:xfrm>
+            <a:prstGeom prst="rect">
+              <a:avLst/>
+            </a:prstGeom>
+            <a:noFill/>
+            <a:ln>
+              <a:noFill/>
+            </a:ln>
+          </p:spPr>
+          <p:txBody>
+            <a:bodyPr wrap="none" rtlCol="0">
+              <a:spAutoFit/>
+            </a:bodyPr>
+            <a:lstStyle/>
+            <a:p>
+              <a:r>
+                <a:rPr lang="en-US" sz="2400" dirty="0" smtClean="0">
+                  <a:solidFill>
+                    <a:schemeClr val="bg1"/>
+                  </a:solidFill>
+                  <a:latin typeface="Roboto Condensed"/>
+                  <a:cs typeface="Roboto Condensed"/>
+                </a:rPr>
+                <a:t>Anger</a:t>
+              </a:r>
+              <a:endParaRPr lang="en-US" sz="2400" dirty="0">
+                <a:solidFill>
+                  <a:schemeClr val="bg1"/>
+                </a:solidFill>
+                <a:latin typeface="Roboto Condensed"/>
+                <a:cs typeface="Roboto Condensed"/>
+              </a:endParaRPr>
+            </a:p>
+          </p:txBody>
+        </p:sp>
+        <p:sp>
+          <p:nvSpPr>
+            <p:cNvPr id="65" name="TextBox 64"/>
+            <p:cNvSpPr txBox="1"/>
+            <p:nvPr/>
+          </p:nvSpPr>
+          <p:spPr>
+            <a:xfrm>
+              <a:off x="4812400" y="5297943"/>
+              <a:ext cx="714559" cy="461665"/>
+            </a:xfrm>
+            <a:prstGeom prst="rect">
+              <a:avLst/>
+            </a:prstGeom>
+            <a:noFill/>
+            <a:ln>
+              <a:noFill/>
+            </a:ln>
+          </p:spPr>
+          <p:txBody>
+            <a:bodyPr wrap="none" rtlCol="0">
+              <a:spAutoFit/>
+            </a:bodyPr>
+            <a:lstStyle/>
+            <a:p>
+              <a:r>
+                <a:rPr lang="en-US" sz="2400" dirty="0" smtClean="0">
+                  <a:solidFill>
+                    <a:schemeClr val="bg1"/>
+                  </a:solidFill>
+                  <a:latin typeface="Roboto Condensed"/>
+                  <a:cs typeface="Roboto Condensed"/>
+                </a:rPr>
+                <a:t>Fear</a:t>
+              </a:r>
+              <a:endParaRPr lang="en-US" sz="2400" dirty="0">
+                <a:solidFill>
+                  <a:schemeClr val="bg1"/>
+                </a:solidFill>
+                <a:latin typeface="Roboto Condensed"/>
+                <a:cs typeface="Roboto Condensed"/>
+              </a:endParaRPr>
+            </a:p>
+          </p:txBody>
+        </p:sp>
+        <p:sp>
+          <p:nvSpPr>
+            <p:cNvPr id="66" name="TextBox 65"/>
+            <p:cNvSpPr txBox="1"/>
+            <p:nvPr/>
+          </p:nvSpPr>
+          <p:spPr>
+            <a:xfrm>
+              <a:off x="6627084" y="2293913"/>
+              <a:ext cx="1186743" cy="461665"/>
+            </a:xfrm>
+            <a:prstGeom prst="rect">
+              <a:avLst/>
+            </a:prstGeom>
+            <a:noFill/>
+            <a:ln>
+              <a:noFill/>
+            </a:ln>
+          </p:spPr>
+          <p:txBody>
+            <a:bodyPr wrap="none" rtlCol="0">
+              <a:spAutoFit/>
+            </a:bodyPr>
+            <a:lstStyle/>
+            <a:p>
+              <a:r>
+                <a:rPr lang="en-US" sz="2400" dirty="0" smtClean="0">
+                  <a:solidFill>
+                    <a:schemeClr val="bg1"/>
+                  </a:solidFill>
+                  <a:latin typeface="Roboto Condensed"/>
+                  <a:cs typeface="Roboto Condensed"/>
+                </a:rPr>
+                <a:t>Surprise</a:t>
+              </a:r>
+              <a:endParaRPr lang="en-US" sz="2400" dirty="0">
+                <a:solidFill>
+                  <a:schemeClr val="bg1"/>
+                </a:solidFill>
+                <a:latin typeface="Roboto Condensed"/>
+                <a:cs typeface="Roboto Condensed"/>
+              </a:endParaRPr>
+            </a:p>
+          </p:txBody>
+        </p:sp>
+        <p:sp>
+          <p:nvSpPr>
+            <p:cNvPr id="67" name="TextBox 66"/>
+            <p:cNvSpPr txBox="1"/>
+            <p:nvPr/>
+          </p:nvSpPr>
+          <p:spPr>
+            <a:xfrm>
+              <a:off x="2938308" y="2293911"/>
+              <a:ext cx="613870" cy="461665"/>
+            </a:xfrm>
+            <a:prstGeom prst="rect">
+              <a:avLst/>
+            </a:prstGeom>
+            <a:noFill/>
+            <a:ln>
+              <a:noFill/>
+            </a:ln>
+          </p:spPr>
+          <p:txBody>
+            <a:bodyPr wrap="none" rtlCol="0">
+              <a:spAutoFit/>
+            </a:bodyPr>
+            <a:lstStyle/>
+            <a:p>
+              <a:r>
+                <a:rPr lang="en-US" sz="2400" dirty="0" smtClean="0">
+                  <a:solidFill>
+                    <a:srgbClr val="000000"/>
+                  </a:solidFill>
+                  <a:latin typeface="Roboto Condensed"/>
+                  <a:cs typeface="Roboto Condensed"/>
+                </a:rPr>
+                <a:t>Joy</a:t>
+              </a:r>
+              <a:endParaRPr lang="en-US" sz="2400" dirty="0">
+                <a:solidFill>
+                  <a:srgbClr val="000000"/>
+                </a:solidFill>
+                <a:latin typeface="Roboto Condensed"/>
+                <a:cs typeface="Roboto Condensed"/>
+              </a:endParaRPr>
+            </a:p>
+          </p:txBody>
+        </p:sp>
+        <p:sp>
+          <p:nvSpPr>
+            <p:cNvPr id="68" name="TextBox 67"/>
+            <p:cNvSpPr txBox="1"/>
+            <p:nvPr/>
+          </p:nvSpPr>
+          <p:spPr>
+            <a:xfrm>
+              <a:off x="6639404" y="4332701"/>
+              <a:ext cx="1217701" cy="461665"/>
+            </a:xfrm>
+            <a:prstGeom prst="rect">
+              <a:avLst/>
+            </a:prstGeom>
+            <a:noFill/>
+            <a:ln>
+              <a:noFill/>
+            </a:ln>
+          </p:spPr>
+          <p:txBody>
+            <a:bodyPr wrap="none" rtlCol="0">
+              <a:spAutoFit/>
+            </a:bodyPr>
+            <a:lstStyle/>
+            <a:p>
+              <a:r>
+                <a:rPr lang="en-US" sz="2400" dirty="0" smtClean="0">
+                  <a:solidFill>
+                    <a:srgbClr val="000000"/>
+                  </a:solidFill>
+                  <a:latin typeface="Roboto Condensed"/>
+                  <a:cs typeface="Roboto Condensed"/>
+                </a:rPr>
+                <a:t>Sadness</a:t>
+              </a:r>
+              <a:endParaRPr lang="en-US" sz="2400" dirty="0">
+                <a:solidFill>
+                  <a:srgbClr val="000000"/>
+                </a:solidFill>
+                <a:latin typeface="Roboto Condensed"/>
+                <a:cs typeface="Roboto Condensed"/>
+              </a:endParaRPr>
+            </a:p>
+          </p:txBody>
+        </p:sp>
+        <p:sp>
+          <p:nvSpPr>
+            <p:cNvPr id="69" name="TextBox 68"/>
+            <p:cNvSpPr txBox="1"/>
+            <p:nvPr/>
+          </p:nvSpPr>
+          <p:spPr>
+            <a:xfrm>
+              <a:off x="2707821" y="4332700"/>
+              <a:ext cx="1102585" cy="461665"/>
+            </a:xfrm>
+            <a:prstGeom prst="rect">
+              <a:avLst/>
+            </a:prstGeom>
+            <a:noFill/>
+            <a:ln>
+              <a:noFill/>
+            </a:ln>
+          </p:spPr>
+          <p:txBody>
+            <a:bodyPr wrap="none" rtlCol="0">
+              <a:spAutoFit/>
+            </a:bodyPr>
+            <a:lstStyle/>
+            <a:p>
+              <a:r>
+                <a:rPr lang="en-US" sz="2400" dirty="0" smtClean="0">
+                  <a:solidFill>
+                    <a:schemeClr val="bg1"/>
+                  </a:solidFill>
+                  <a:latin typeface="Roboto Condensed"/>
+                  <a:cs typeface="Roboto Condensed"/>
+                </a:rPr>
+                <a:t>Disgust</a:t>
+              </a:r>
+              <a:endParaRPr lang="en-US" sz="2400" dirty="0">
+                <a:solidFill>
+                  <a:schemeClr val="bg1"/>
+                </a:solidFill>
+                <a:latin typeface="Roboto Condensed"/>
+                <a:cs typeface="Roboto Condensed"/>
+              </a:endParaRPr>
+            </a:p>
+          </p:txBody>
+        </p:sp>
+      </p:grpSp>
+    </p:spTree>
+    <p:extLst>
+      <p:ext uri="{BB962C8B-B14F-4D97-AF65-F5344CB8AC3E}">
+        <p14:creationId xmlns:p14="http://schemas.microsoft.com/office/powerpoint/2010/main" val="3177950757"/>
+      </p:ext>
+    </p:extLst>
+  </p:cSld>
+  <p:clrMapOvr>
+    <a:masterClrMapping/>
+  </p:clrMapOvr>
 </p:sld>
 </file>
 

</xml_diff>

<commit_message>
added 1 more figure to drawing collection
</commit_message>
<xml_diff>
--- a/Drawings/Drawing.pptx
+++ b/Drawings/Drawing.pptx
@@ -9,6 +9,7 @@
     <p:sldId id="257" r:id="rId3"/>
     <p:sldId id="258" r:id="rId4"/>
     <p:sldId id="259" r:id="rId5"/>
+    <p:sldId id="260" r:id="rId6"/>
   </p:sldIdLst>
   <p:sldSz cx="9906000" cy="6858000" type="A4"/>
   <p:notesSz cx="6858000" cy="9144000"/>
@@ -109,7 +110,7 @@
   </p:defaultTextStyle>
   <p:extLst>
     <p:ext uri="{EFAFB233-063F-42B5-8137-9DF3F51BA10A}">
-      <p15:sldGuideLst xmlns:p15="http://schemas.microsoft.com/office/powerpoint/2012/main" xmlns=""/>
+      <p15:sldGuideLst xmlns="" xmlns:p15="http://schemas.microsoft.com/office/powerpoint/2012/main"/>
     </p:ext>
   </p:extLst>
 </p:presentation>
@@ -7391,7 +7392,7 @@
         </p:nvGrpSpPr>
         <p:grpSpPr>
           <a:xfrm>
-            <a:off x="577554" y="1014069"/>
+            <a:off x="1969020" y="827298"/>
             <a:ext cx="5844838" cy="4416114"/>
             <a:chOff x="710835" y="1014069"/>
             <a:chExt cx="7193647" cy="4416114"/>
@@ -8578,6 +8579,1131 @@
 </p:sld>
 </file>
 
+<file path=ppt/slides/slide5.xml><?xml version="1.0" encoding="utf-8"?>
+<p:sld xmlns:a="http://schemas.openxmlformats.org/drawingml/2006/main" xmlns:r="http://schemas.openxmlformats.org/officeDocument/2006/relationships" xmlns:p="http://schemas.openxmlformats.org/presentationml/2006/main">
+  <p:cSld>
+    <p:spTree>
+      <p:nvGrpSpPr>
+        <p:cNvPr id="1" name=""/>
+        <p:cNvGrpSpPr/>
+        <p:nvPr/>
+      </p:nvGrpSpPr>
+      <p:grpSpPr>
+        <a:xfrm>
+          <a:off x="0" y="0"/>
+          <a:ext cx="0" cy="0"/>
+          <a:chOff x="0" y="0"/>
+          <a:chExt cx="0" cy="0"/>
+        </a:xfrm>
+      </p:grpSpPr>
+      <p:grpSp>
+        <p:nvGrpSpPr>
+          <p:cNvPr id="70" name="Group 69"/>
+          <p:cNvGrpSpPr/>
+          <p:nvPr/>
+        </p:nvGrpSpPr>
+        <p:grpSpPr>
+          <a:xfrm>
+            <a:off x="1076357" y="494940"/>
+            <a:ext cx="7991506" cy="2602084"/>
+            <a:chOff x="1076357" y="494940"/>
+            <a:chExt cx="7991506" cy="2602084"/>
+          </a:xfrm>
+        </p:grpSpPr>
+        <p:sp>
+          <p:nvSpPr>
+            <p:cNvPr id="2" name="TextBox 1"/>
+            <p:cNvSpPr txBox="1"/>
+            <p:nvPr/>
+          </p:nvSpPr>
+          <p:spPr>
+            <a:xfrm>
+              <a:off x="1961122" y="1531522"/>
+              <a:ext cx="6266251" cy="369332"/>
+            </a:xfrm>
+            <a:prstGeom prst="rect">
+              <a:avLst/>
+            </a:prstGeom>
+            <a:noFill/>
+          </p:spPr>
+          <p:txBody>
+            <a:bodyPr wrap="square" rtlCol="0">
+              <a:spAutoFit/>
+            </a:bodyPr>
+            <a:lstStyle/>
+            <a:p>
+              <a:pPr algn="ctr"/>
+              <a:r>
+                <a:rPr lang="en-US" dirty="0" smtClean="0">
+                  <a:latin typeface="Roboto Condensed"/>
+                  <a:cs typeface="Roboto Condensed"/>
+                </a:rPr>
+                <a:t>I am feeling very scared. The crowd is too packed and aggressive</a:t>
+              </a:r>
+              <a:endParaRPr lang="en-US" dirty="0">
+                <a:latin typeface="Roboto Condensed"/>
+                <a:cs typeface="Roboto Condensed"/>
+              </a:endParaRPr>
+            </a:p>
+          </p:txBody>
+        </p:sp>
+        <p:sp>
+          <p:nvSpPr>
+            <p:cNvPr id="3" name="Oval 2"/>
+            <p:cNvSpPr/>
+            <p:nvPr/>
+          </p:nvSpPr>
+          <p:spPr>
+            <a:xfrm>
+              <a:off x="2017159" y="859140"/>
+              <a:ext cx="597672" cy="597672"/>
+            </a:xfrm>
+            <a:prstGeom prst="ellipse">
+              <a:avLst/>
+            </a:prstGeom>
+            <a:ln>
+              <a:solidFill>
+                <a:schemeClr val="tx1"/>
+              </a:solidFill>
+            </a:ln>
+          </p:spPr>
+          <p:style>
+            <a:lnRef idx="2">
+              <a:schemeClr val="dk1"/>
+            </a:lnRef>
+            <a:fillRef idx="1">
+              <a:schemeClr val="lt1"/>
+            </a:fillRef>
+            <a:effectRef idx="0">
+              <a:schemeClr val="dk1"/>
+            </a:effectRef>
+            <a:fontRef idx="minor">
+              <a:schemeClr val="dk1"/>
+            </a:fontRef>
+          </p:style>
+          <p:txBody>
+            <a:bodyPr/>
+            <a:lstStyle/>
+            <a:p>
+              <a:pPr algn="ctr"/>
+              <a:r>
+                <a:rPr lang="en-US" dirty="0"/>
+                <a:t>i</a:t>
+              </a:r>
+              <a:endParaRPr lang="en-US" dirty="0"/>
+            </a:p>
+          </p:txBody>
+        </p:sp>
+        <p:sp>
+          <p:nvSpPr>
+            <p:cNvPr id="5" name="Oval 4"/>
+            <p:cNvSpPr/>
+            <p:nvPr/>
+          </p:nvSpPr>
+          <p:spPr>
+            <a:xfrm>
+              <a:off x="3177555" y="588326"/>
+              <a:ext cx="822960" cy="597668"/>
+            </a:xfrm>
+            <a:prstGeom prst="ellipse">
+              <a:avLst/>
+            </a:prstGeom>
+            <a:ln>
+              <a:solidFill>
+                <a:schemeClr val="tx1"/>
+              </a:solidFill>
+            </a:ln>
+          </p:spPr>
+          <p:style>
+            <a:lnRef idx="2">
+              <a:schemeClr val="dk1"/>
+            </a:lnRef>
+            <a:fillRef idx="1">
+              <a:schemeClr val="lt1"/>
+            </a:fillRef>
+            <a:effectRef idx="0">
+              <a:schemeClr val="dk1"/>
+            </a:effectRef>
+            <a:fontRef idx="minor">
+              <a:schemeClr val="dk1"/>
+            </a:fontRef>
+          </p:style>
+          <p:txBody>
+            <a:bodyPr/>
+            <a:lstStyle/>
+            <a:p>
+              <a:pPr algn="ctr"/>
+              <a:r>
+                <a:rPr lang="en-US" dirty="0" smtClean="0"/>
+                <a:t>am</a:t>
+              </a:r>
+              <a:endParaRPr lang="en-US" dirty="0"/>
+            </a:p>
+          </p:txBody>
+        </p:sp>
+        <p:sp>
+          <p:nvSpPr>
+            <p:cNvPr id="6" name="Oval 5"/>
+            <p:cNvSpPr/>
+            <p:nvPr/>
+          </p:nvSpPr>
+          <p:spPr>
+            <a:xfrm>
+              <a:off x="4460515" y="494940"/>
+              <a:ext cx="1152032" cy="597668"/>
+            </a:xfrm>
+            <a:prstGeom prst="ellipse">
+              <a:avLst/>
+            </a:prstGeom>
+            <a:ln>
+              <a:solidFill>
+                <a:schemeClr val="tx1"/>
+              </a:solidFill>
+            </a:ln>
+          </p:spPr>
+          <p:style>
+            <a:lnRef idx="2">
+              <a:schemeClr val="dk1"/>
+            </a:lnRef>
+            <a:fillRef idx="1">
+              <a:schemeClr val="lt1"/>
+            </a:fillRef>
+            <a:effectRef idx="0">
+              <a:schemeClr val="dk1"/>
+            </a:effectRef>
+            <a:fontRef idx="minor">
+              <a:schemeClr val="dk1"/>
+            </a:fontRef>
+          </p:style>
+          <p:txBody>
+            <a:bodyPr/>
+            <a:lstStyle/>
+            <a:p>
+              <a:pPr algn="ctr"/>
+              <a:r>
+                <a:rPr lang="en-US" dirty="0" smtClean="0"/>
+                <a:t>feeling</a:t>
+              </a:r>
+              <a:endParaRPr lang="en-US" dirty="0"/>
+            </a:p>
+          </p:txBody>
+        </p:sp>
+        <p:sp>
+          <p:nvSpPr>
+            <p:cNvPr id="7" name="Oval 6"/>
+            <p:cNvSpPr/>
+            <p:nvPr/>
+          </p:nvSpPr>
+          <p:spPr>
+            <a:xfrm>
+              <a:off x="5923126" y="635019"/>
+              <a:ext cx="822960" cy="597668"/>
+            </a:xfrm>
+            <a:prstGeom prst="ellipse">
+              <a:avLst/>
+            </a:prstGeom>
+            <a:ln>
+              <a:solidFill>
+                <a:schemeClr val="tx1"/>
+              </a:solidFill>
+            </a:ln>
+          </p:spPr>
+          <p:style>
+            <a:lnRef idx="2">
+              <a:schemeClr val="dk1"/>
+            </a:lnRef>
+            <a:fillRef idx="1">
+              <a:schemeClr val="lt1"/>
+            </a:fillRef>
+            <a:effectRef idx="0">
+              <a:schemeClr val="dk1"/>
+            </a:effectRef>
+            <a:fontRef idx="minor">
+              <a:schemeClr val="dk1"/>
+            </a:fontRef>
+          </p:style>
+          <p:txBody>
+            <a:bodyPr/>
+            <a:lstStyle/>
+            <a:p>
+              <a:pPr algn="ctr"/>
+              <a:r>
+                <a:rPr lang="en-US" dirty="0" smtClean="0"/>
+                <a:t>very</a:t>
+              </a:r>
+              <a:endParaRPr lang="en-US" dirty="0"/>
+            </a:p>
+          </p:txBody>
+        </p:sp>
+        <p:sp>
+          <p:nvSpPr>
+            <p:cNvPr id="8" name="Oval 7"/>
+            <p:cNvSpPr/>
+            <p:nvPr/>
+          </p:nvSpPr>
+          <p:spPr>
+            <a:xfrm>
+              <a:off x="7103361" y="924514"/>
+              <a:ext cx="1208059" cy="597667"/>
+            </a:xfrm>
+            <a:prstGeom prst="ellipse">
+              <a:avLst/>
+            </a:prstGeom>
+            <a:ln>
+              <a:solidFill>
+                <a:schemeClr val="tx1"/>
+              </a:solidFill>
+            </a:ln>
+          </p:spPr>
+          <p:style>
+            <a:lnRef idx="2">
+              <a:schemeClr val="dk1"/>
+            </a:lnRef>
+            <a:fillRef idx="1">
+              <a:schemeClr val="lt1"/>
+            </a:fillRef>
+            <a:effectRef idx="0">
+              <a:schemeClr val="dk1"/>
+            </a:effectRef>
+            <a:fontRef idx="minor">
+              <a:schemeClr val="dk1"/>
+            </a:fontRef>
+          </p:style>
+          <p:txBody>
+            <a:bodyPr/>
+            <a:lstStyle/>
+            <a:p>
+              <a:pPr algn="ctr"/>
+              <a:r>
+                <a:rPr lang="en-US" dirty="0" smtClean="0"/>
+                <a:t>scared</a:t>
+              </a:r>
+              <a:endParaRPr lang="en-US" dirty="0"/>
+            </a:p>
+          </p:txBody>
+        </p:sp>
+        <p:sp>
+          <p:nvSpPr>
+            <p:cNvPr id="9" name="Oval 8"/>
+            <p:cNvSpPr/>
+            <p:nvPr/>
+          </p:nvSpPr>
+          <p:spPr>
+            <a:xfrm>
+              <a:off x="1076357" y="1898122"/>
+              <a:ext cx="822960" cy="595269"/>
+            </a:xfrm>
+            <a:prstGeom prst="ellipse">
+              <a:avLst/>
+            </a:prstGeom>
+            <a:ln>
+              <a:solidFill>
+                <a:schemeClr val="tx1"/>
+              </a:solidFill>
+            </a:ln>
+          </p:spPr>
+          <p:style>
+            <a:lnRef idx="2">
+              <a:schemeClr val="dk1"/>
+            </a:lnRef>
+            <a:fillRef idx="1">
+              <a:schemeClr val="lt1"/>
+            </a:fillRef>
+            <a:effectRef idx="0">
+              <a:schemeClr val="dk1"/>
+            </a:effectRef>
+            <a:fontRef idx="minor">
+              <a:schemeClr val="dk1"/>
+            </a:fontRef>
+          </p:style>
+          <p:txBody>
+            <a:bodyPr/>
+            <a:lstStyle/>
+            <a:p>
+              <a:pPr algn="ctr"/>
+              <a:r>
+                <a:rPr lang="en-US" dirty="0"/>
+                <a:t>t</a:t>
+              </a:r>
+              <a:r>
+                <a:rPr lang="en-US" dirty="0" smtClean="0"/>
+                <a:t>he</a:t>
+              </a:r>
+              <a:endParaRPr lang="en-US" dirty="0"/>
+            </a:p>
+          </p:txBody>
+        </p:sp>
+        <p:sp>
+          <p:nvSpPr>
+            <p:cNvPr id="10" name="Oval 9"/>
+            <p:cNvSpPr/>
+            <p:nvPr/>
+          </p:nvSpPr>
+          <p:spPr>
+            <a:xfrm>
+              <a:off x="1939081" y="2371989"/>
+              <a:ext cx="1133340" cy="597667"/>
+            </a:xfrm>
+            <a:prstGeom prst="ellipse">
+              <a:avLst/>
+            </a:prstGeom>
+            <a:ln>
+              <a:solidFill>
+                <a:schemeClr val="tx1"/>
+              </a:solidFill>
+            </a:ln>
+          </p:spPr>
+          <p:style>
+            <a:lnRef idx="2">
+              <a:schemeClr val="dk1"/>
+            </a:lnRef>
+            <a:fillRef idx="1">
+              <a:schemeClr val="lt1"/>
+            </a:fillRef>
+            <a:effectRef idx="0">
+              <a:schemeClr val="dk1"/>
+            </a:effectRef>
+            <a:fontRef idx="minor">
+              <a:schemeClr val="dk1"/>
+            </a:fontRef>
+          </p:style>
+          <p:txBody>
+            <a:bodyPr/>
+            <a:lstStyle/>
+            <a:p>
+              <a:pPr algn="ctr"/>
+              <a:r>
+                <a:rPr lang="en-US" dirty="0" smtClean="0"/>
+                <a:t>crowd</a:t>
+              </a:r>
+              <a:endParaRPr lang="en-US" dirty="0"/>
+            </a:p>
+          </p:txBody>
+        </p:sp>
+        <p:sp>
+          <p:nvSpPr>
+            <p:cNvPr id="11" name="Oval 10"/>
+            <p:cNvSpPr/>
+            <p:nvPr/>
+          </p:nvSpPr>
+          <p:spPr>
+            <a:xfrm>
+              <a:off x="3208564" y="2442740"/>
+              <a:ext cx="582951" cy="595269"/>
+            </a:xfrm>
+            <a:prstGeom prst="ellipse">
+              <a:avLst/>
+            </a:prstGeom>
+            <a:ln>
+              <a:solidFill>
+                <a:schemeClr val="tx1"/>
+              </a:solidFill>
+            </a:ln>
+          </p:spPr>
+          <p:style>
+            <a:lnRef idx="2">
+              <a:schemeClr val="dk1"/>
+            </a:lnRef>
+            <a:fillRef idx="1">
+              <a:schemeClr val="lt1"/>
+            </a:fillRef>
+            <a:effectRef idx="0">
+              <a:schemeClr val="dk1"/>
+            </a:effectRef>
+            <a:fontRef idx="minor">
+              <a:schemeClr val="dk1"/>
+            </a:fontRef>
+          </p:style>
+          <p:txBody>
+            <a:bodyPr/>
+            <a:lstStyle/>
+            <a:p>
+              <a:pPr algn="ctr"/>
+              <a:r>
+                <a:rPr lang="en-US" dirty="0" smtClean="0"/>
+                <a:t>is</a:t>
+              </a:r>
+              <a:endParaRPr lang="en-US" dirty="0"/>
+            </a:p>
+          </p:txBody>
+        </p:sp>
+        <p:sp>
+          <p:nvSpPr>
+            <p:cNvPr id="12" name="Oval 11"/>
+            <p:cNvSpPr/>
+            <p:nvPr/>
+          </p:nvSpPr>
+          <p:spPr>
+            <a:xfrm>
+              <a:off x="4089381" y="2501755"/>
+              <a:ext cx="776078" cy="595269"/>
+            </a:xfrm>
+            <a:prstGeom prst="ellipse">
+              <a:avLst/>
+            </a:prstGeom>
+            <a:ln>
+              <a:solidFill>
+                <a:schemeClr val="tx1"/>
+              </a:solidFill>
+            </a:ln>
+          </p:spPr>
+          <p:style>
+            <a:lnRef idx="2">
+              <a:schemeClr val="dk1"/>
+            </a:lnRef>
+            <a:fillRef idx="1">
+              <a:schemeClr val="lt1"/>
+            </a:fillRef>
+            <a:effectRef idx="0">
+              <a:schemeClr val="dk1"/>
+            </a:effectRef>
+            <a:fontRef idx="minor">
+              <a:schemeClr val="dk1"/>
+            </a:fontRef>
+          </p:style>
+          <p:txBody>
+            <a:bodyPr/>
+            <a:lstStyle/>
+            <a:p>
+              <a:pPr algn="ctr"/>
+              <a:r>
+                <a:rPr lang="en-US" dirty="0" smtClean="0"/>
+                <a:t>too</a:t>
+              </a:r>
+              <a:endParaRPr lang="en-US" dirty="0"/>
+            </a:p>
+          </p:txBody>
+        </p:sp>
+        <p:sp>
+          <p:nvSpPr>
+            <p:cNvPr id="13" name="Oval 12"/>
+            <p:cNvSpPr/>
+            <p:nvPr/>
+          </p:nvSpPr>
+          <p:spPr>
+            <a:xfrm>
+              <a:off x="5153989" y="2501755"/>
+              <a:ext cx="1196318" cy="595269"/>
+            </a:xfrm>
+            <a:prstGeom prst="ellipse">
+              <a:avLst/>
+            </a:prstGeom>
+            <a:ln>
+              <a:solidFill>
+                <a:schemeClr val="tx1"/>
+              </a:solidFill>
+            </a:ln>
+          </p:spPr>
+          <p:style>
+            <a:lnRef idx="2">
+              <a:schemeClr val="dk1"/>
+            </a:lnRef>
+            <a:fillRef idx="1">
+              <a:schemeClr val="lt1"/>
+            </a:fillRef>
+            <a:effectRef idx="0">
+              <a:schemeClr val="dk1"/>
+            </a:effectRef>
+            <a:fontRef idx="minor">
+              <a:schemeClr val="dk1"/>
+            </a:fontRef>
+          </p:style>
+          <p:txBody>
+            <a:bodyPr/>
+            <a:lstStyle/>
+            <a:p>
+              <a:pPr algn="ctr"/>
+              <a:r>
+                <a:rPr lang="en-US" dirty="0" smtClean="0"/>
+                <a:t>packed</a:t>
+              </a:r>
+              <a:endParaRPr lang="en-US" dirty="0"/>
+            </a:p>
+          </p:txBody>
+        </p:sp>
+        <p:sp>
+          <p:nvSpPr>
+            <p:cNvPr id="14" name="Oval 13"/>
+            <p:cNvSpPr/>
+            <p:nvPr/>
+          </p:nvSpPr>
+          <p:spPr>
+            <a:xfrm>
+              <a:off x="6470743" y="2361676"/>
+              <a:ext cx="869465" cy="595269"/>
+            </a:xfrm>
+            <a:prstGeom prst="ellipse">
+              <a:avLst/>
+            </a:prstGeom>
+            <a:ln>
+              <a:solidFill>
+                <a:schemeClr val="tx1"/>
+              </a:solidFill>
+            </a:ln>
+          </p:spPr>
+          <p:style>
+            <a:lnRef idx="2">
+              <a:schemeClr val="dk1"/>
+            </a:lnRef>
+            <a:fillRef idx="1">
+              <a:schemeClr val="lt1"/>
+            </a:fillRef>
+            <a:effectRef idx="0">
+              <a:schemeClr val="dk1"/>
+            </a:effectRef>
+            <a:fontRef idx="minor">
+              <a:schemeClr val="dk1"/>
+            </a:fontRef>
+          </p:style>
+          <p:txBody>
+            <a:bodyPr/>
+            <a:lstStyle/>
+            <a:p>
+              <a:pPr algn="ctr"/>
+              <a:r>
+                <a:rPr lang="en-US" dirty="0" smtClean="0"/>
+                <a:t>and</a:t>
+              </a:r>
+              <a:endParaRPr lang="en-US" dirty="0"/>
+            </a:p>
+          </p:txBody>
+        </p:sp>
+        <p:sp>
+          <p:nvSpPr>
+            <p:cNvPr id="15" name="Oval 14"/>
+            <p:cNvSpPr/>
+            <p:nvPr/>
+          </p:nvSpPr>
+          <p:spPr>
+            <a:xfrm>
+              <a:off x="7423288" y="1941442"/>
+              <a:ext cx="1644575" cy="595269"/>
+            </a:xfrm>
+            <a:prstGeom prst="ellipse">
+              <a:avLst/>
+            </a:prstGeom>
+            <a:ln>
+              <a:solidFill>
+                <a:schemeClr val="tx1"/>
+              </a:solidFill>
+            </a:ln>
+          </p:spPr>
+          <p:style>
+            <a:lnRef idx="2">
+              <a:schemeClr val="dk1"/>
+            </a:lnRef>
+            <a:fillRef idx="1">
+              <a:schemeClr val="lt1"/>
+            </a:fillRef>
+            <a:effectRef idx="0">
+              <a:schemeClr val="dk1"/>
+            </a:effectRef>
+            <a:fontRef idx="minor">
+              <a:schemeClr val="dk1"/>
+            </a:fontRef>
+          </p:style>
+          <p:txBody>
+            <a:bodyPr/>
+            <a:lstStyle/>
+            <a:p>
+              <a:pPr algn="ctr"/>
+              <a:r>
+                <a:rPr lang="en-US" dirty="0" smtClean="0"/>
+                <a:t>aggressive</a:t>
+              </a:r>
+              <a:endParaRPr lang="en-US" dirty="0"/>
+            </a:p>
+          </p:txBody>
+        </p:sp>
+        <p:cxnSp>
+          <p:nvCxnSpPr>
+            <p:cNvPr id="20" name="Straight Arrow Connector 19"/>
+            <p:cNvCxnSpPr>
+              <a:stCxn id="2" idx="0"/>
+              <a:endCxn id="3" idx="6"/>
+            </p:cNvCxnSpPr>
+            <p:nvPr/>
+          </p:nvCxnSpPr>
+          <p:spPr>
+            <a:xfrm flipH="1" flipV="1">
+              <a:off x="2614831" y="1157976"/>
+              <a:ext cx="2479417" cy="373546"/>
+            </a:xfrm>
+            <a:prstGeom prst="straightConnector1">
+              <a:avLst/>
+            </a:prstGeom>
+            <a:ln>
+              <a:solidFill>
+                <a:schemeClr val="tx1"/>
+              </a:solidFill>
+              <a:tailEnd type="arrow"/>
+            </a:ln>
+          </p:spPr>
+          <p:style>
+            <a:lnRef idx="2">
+              <a:schemeClr val="accent1"/>
+            </a:lnRef>
+            <a:fillRef idx="0">
+              <a:schemeClr val="accent1"/>
+            </a:fillRef>
+            <a:effectRef idx="1">
+              <a:schemeClr val="accent1"/>
+            </a:effectRef>
+            <a:fontRef idx="minor">
+              <a:schemeClr val="tx1"/>
+            </a:fontRef>
+          </p:style>
+        </p:cxnSp>
+        <p:cxnSp>
+          <p:nvCxnSpPr>
+            <p:cNvPr id="22" name="Straight Arrow Connector 21"/>
+            <p:cNvCxnSpPr>
+              <a:stCxn id="2" idx="0"/>
+              <a:endCxn id="5" idx="5"/>
+            </p:cNvCxnSpPr>
+            <p:nvPr/>
+          </p:nvCxnSpPr>
+          <p:spPr>
+            <a:xfrm flipH="1" flipV="1">
+              <a:off x="3879995" y="1098468"/>
+              <a:ext cx="1214253" cy="433054"/>
+            </a:xfrm>
+            <a:prstGeom prst="straightConnector1">
+              <a:avLst/>
+            </a:prstGeom>
+            <a:ln>
+              <a:solidFill>
+                <a:schemeClr val="tx1"/>
+              </a:solidFill>
+              <a:tailEnd type="arrow"/>
+            </a:ln>
+          </p:spPr>
+          <p:style>
+            <a:lnRef idx="2">
+              <a:schemeClr val="accent1"/>
+            </a:lnRef>
+            <a:fillRef idx="0">
+              <a:schemeClr val="accent1"/>
+            </a:fillRef>
+            <a:effectRef idx="1">
+              <a:schemeClr val="accent1"/>
+            </a:effectRef>
+            <a:fontRef idx="minor">
+              <a:schemeClr val="tx1"/>
+            </a:fontRef>
+          </p:style>
+        </p:cxnSp>
+        <p:cxnSp>
+          <p:nvCxnSpPr>
+            <p:cNvPr id="24" name="Straight Arrow Connector 23"/>
+            <p:cNvCxnSpPr>
+              <a:stCxn id="2" idx="0"/>
+              <a:endCxn id="6" idx="4"/>
+            </p:cNvCxnSpPr>
+            <p:nvPr/>
+          </p:nvCxnSpPr>
+          <p:spPr>
+            <a:xfrm flipH="1" flipV="1">
+              <a:off x="5036531" y="1092608"/>
+              <a:ext cx="57717" cy="438914"/>
+            </a:xfrm>
+            <a:prstGeom prst="straightConnector1">
+              <a:avLst/>
+            </a:prstGeom>
+            <a:ln>
+              <a:solidFill>
+                <a:schemeClr val="tx1"/>
+              </a:solidFill>
+              <a:tailEnd type="arrow"/>
+            </a:ln>
+          </p:spPr>
+          <p:style>
+            <a:lnRef idx="2">
+              <a:schemeClr val="accent1"/>
+            </a:lnRef>
+            <a:fillRef idx="0">
+              <a:schemeClr val="accent1"/>
+            </a:fillRef>
+            <a:effectRef idx="1">
+              <a:schemeClr val="accent1"/>
+            </a:effectRef>
+            <a:fontRef idx="minor">
+              <a:schemeClr val="tx1"/>
+            </a:fontRef>
+          </p:style>
+        </p:cxnSp>
+        <p:cxnSp>
+          <p:nvCxnSpPr>
+            <p:cNvPr id="26" name="Straight Arrow Connector 25"/>
+            <p:cNvCxnSpPr>
+              <a:stCxn id="2" idx="0"/>
+              <a:endCxn id="7" idx="3"/>
+            </p:cNvCxnSpPr>
+            <p:nvPr/>
+          </p:nvCxnSpPr>
+          <p:spPr>
+            <a:xfrm flipV="1">
+              <a:off x="5094248" y="1145161"/>
+              <a:ext cx="949398" cy="386361"/>
+            </a:xfrm>
+            <a:prstGeom prst="straightConnector1">
+              <a:avLst/>
+            </a:prstGeom>
+            <a:ln>
+              <a:solidFill>
+                <a:schemeClr val="tx1"/>
+              </a:solidFill>
+              <a:tailEnd type="arrow"/>
+            </a:ln>
+          </p:spPr>
+          <p:style>
+            <a:lnRef idx="2">
+              <a:schemeClr val="accent1"/>
+            </a:lnRef>
+            <a:fillRef idx="0">
+              <a:schemeClr val="accent1"/>
+            </a:fillRef>
+            <a:effectRef idx="1">
+              <a:schemeClr val="accent1"/>
+            </a:effectRef>
+            <a:fontRef idx="minor">
+              <a:schemeClr val="tx1"/>
+            </a:fontRef>
+          </p:style>
+        </p:cxnSp>
+        <p:cxnSp>
+          <p:nvCxnSpPr>
+            <p:cNvPr id="28" name="Straight Arrow Connector 27"/>
+            <p:cNvCxnSpPr>
+              <a:stCxn id="2" idx="0"/>
+              <a:endCxn id="8" idx="2"/>
+            </p:cNvCxnSpPr>
+            <p:nvPr/>
+          </p:nvCxnSpPr>
+          <p:spPr>
+            <a:xfrm flipV="1">
+              <a:off x="5094248" y="1223348"/>
+              <a:ext cx="2009113" cy="308174"/>
+            </a:xfrm>
+            <a:prstGeom prst="straightConnector1">
+              <a:avLst/>
+            </a:prstGeom>
+            <a:ln>
+              <a:solidFill>
+                <a:schemeClr val="tx1"/>
+              </a:solidFill>
+              <a:tailEnd type="arrow"/>
+            </a:ln>
+          </p:spPr>
+          <p:style>
+            <a:lnRef idx="2">
+              <a:schemeClr val="accent1"/>
+            </a:lnRef>
+            <a:fillRef idx="0">
+              <a:schemeClr val="accent1"/>
+            </a:fillRef>
+            <a:effectRef idx="1">
+              <a:schemeClr val="accent1"/>
+            </a:effectRef>
+            <a:fontRef idx="minor">
+              <a:schemeClr val="tx1"/>
+            </a:fontRef>
+          </p:style>
+        </p:cxnSp>
+        <p:cxnSp>
+          <p:nvCxnSpPr>
+            <p:cNvPr id="30" name="Straight Arrow Connector 29"/>
+            <p:cNvCxnSpPr>
+              <a:stCxn id="2" idx="2"/>
+              <a:endCxn id="9" idx="6"/>
+            </p:cNvCxnSpPr>
+            <p:nvPr/>
+          </p:nvCxnSpPr>
+          <p:spPr>
+            <a:xfrm flipH="1">
+              <a:off x="1899317" y="1900854"/>
+              <a:ext cx="3194931" cy="294903"/>
+            </a:xfrm>
+            <a:prstGeom prst="straightConnector1">
+              <a:avLst/>
+            </a:prstGeom>
+            <a:ln>
+              <a:solidFill>
+                <a:schemeClr val="tx1"/>
+              </a:solidFill>
+              <a:tailEnd type="arrow"/>
+            </a:ln>
+          </p:spPr>
+          <p:style>
+            <a:lnRef idx="2">
+              <a:schemeClr val="accent1"/>
+            </a:lnRef>
+            <a:fillRef idx="0">
+              <a:schemeClr val="accent1"/>
+            </a:fillRef>
+            <a:effectRef idx="1">
+              <a:schemeClr val="accent1"/>
+            </a:effectRef>
+            <a:fontRef idx="minor">
+              <a:schemeClr val="tx1"/>
+            </a:fontRef>
+          </p:style>
+        </p:cxnSp>
+        <p:cxnSp>
+          <p:nvCxnSpPr>
+            <p:cNvPr id="47" name="Straight Arrow Connector 46"/>
+            <p:cNvCxnSpPr>
+              <a:stCxn id="2" idx="2"/>
+              <a:endCxn id="10" idx="7"/>
+            </p:cNvCxnSpPr>
+            <p:nvPr/>
+          </p:nvCxnSpPr>
+          <p:spPr>
+            <a:xfrm flipH="1">
+              <a:off x="2906447" y="1900854"/>
+              <a:ext cx="2187801" cy="558661"/>
+            </a:xfrm>
+            <a:prstGeom prst="straightConnector1">
+              <a:avLst/>
+            </a:prstGeom>
+            <a:ln>
+              <a:solidFill>
+                <a:schemeClr val="tx1"/>
+              </a:solidFill>
+              <a:tailEnd type="arrow"/>
+            </a:ln>
+          </p:spPr>
+          <p:style>
+            <a:lnRef idx="2">
+              <a:schemeClr val="accent1"/>
+            </a:lnRef>
+            <a:fillRef idx="0">
+              <a:schemeClr val="accent1"/>
+            </a:fillRef>
+            <a:effectRef idx="1">
+              <a:schemeClr val="accent1"/>
+            </a:effectRef>
+            <a:fontRef idx="minor">
+              <a:schemeClr val="tx1"/>
+            </a:fontRef>
+          </p:style>
+        </p:cxnSp>
+        <p:cxnSp>
+          <p:nvCxnSpPr>
+            <p:cNvPr id="49" name="Straight Arrow Connector 48"/>
+            <p:cNvCxnSpPr>
+              <a:stCxn id="2" idx="2"/>
+              <a:endCxn id="11" idx="7"/>
+            </p:cNvCxnSpPr>
+            <p:nvPr/>
+          </p:nvCxnSpPr>
+          <p:spPr>
+            <a:xfrm flipH="1">
+              <a:off x="3706144" y="1900854"/>
+              <a:ext cx="1388104" cy="629061"/>
+            </a:xfrm>
+            <a:prstGeom prst="straightConnector1">
+              <a:avLst/>
+            </a:prstGeom>
+            <a:ln>
+              <a:solidFill>
+                <a:schemeClr val="tx1"/>
+              </a:solidFill>
+              <a:tailEnd type="arrow"/>
+            </a:ln>
+          </p:spPr>
+          <p:style>
+            <a:lnRef idx="2">
+              <a:schemeClr val="accent1"/>
+            </a:lnRef>
+            <a:fillRef idx="0">
+              <a:schemeClr val="accent1"/>
+            </a:fillRef>
+            <a:effectRef idx="1">
+              <a:schemeClr val="accent1"/>
+            </a:effectRef>
+            <a:fontRef idx="minor">
+              <a:schemeClr val="tx1"/>
+            </a:fontRef>
+          </p:style>
+        </p:cxnSp>
+        <p:cxnSp>
+          <p:nvCxnSpPr>
+            <p:cNvPr id="51" name="Straight Arrow Connector 50"/>
+            <p:cNvCxnSpPr>
+              <a:stCxn id="2" idx="2"/>
+              <a:endCxn id="12" idx="0"/>
+            </p:cNvCxnSpPr>
+            <p:nvPr/>
+          </p:nvCxnSpPr>
+          <p:spPr>
+            <a:xfrm flipH="1">
+              <a:off x="4477420" y="1900854"/>
+              <a:ext cx="616828" cy="600901"/>
+            </a:xfrm>
+            <a:prstGeom prst="straightConnector1">
+              <a:avLst/>
+            </a:prstGeom>
+            <a:ln>
+              <a:solidFill>
+                <a:schemeClr val="tx1"/>
+              </a:solidFill>
+              <a:tailEnd type="arrow"/>
+            </a:ln>
+          </p:spPr>
+          <p:style>
+            <a:lnRef idx="2">
+              <a:schemeClr val="accent1"/>
+            </a:lnRef>
+            <a:fillRef idx="0">
+              <a:schemeClr val="accent1"/>
+            </a:fillRef>
+            <a:effectRef idx="1">
+              <a:schemeClr val="accent1"/>
+            </a:effectRef>
+            <a:fontRef idx="minor">
+              <a:schemeClr val="tx1"/>
+            </a:fontRef>
+          </p:style>
+        </p:cxnSp>
+        <p:cxnSp>
+          <p:nvCxnSpPr>
+            <p:cNvPr id="53" name="Straight Arrow Connector 52"/>
+            <p:cNvCxnSpPr>
+              <a:stCxn id="2" idx="2"/>
+              <a:endCxn id="13" idx="0"/>
+            </p:cNvCxnSpPr>
+            <p:nvPr/>
+          </p:nvCxnSpPr>
+          <p:spPr>
+            <a:xfrm>
+              <a:off x="5094248" y="1900854"/>
+              <a:ext cx="657900" cy="600901"/>
+            </a:xfrm>
+            <a:prstGeom prst="straightConnector1">
+              <a:avLst/>
+            </a:prstGeom>
+            <a:ln>
+              <a:solidFill>
+                <a:schemeClr val="tx1"/>
+              </a:solidFill>
+              <a:tailEnd type="arrow"/>
+            </a:ln>
+          </p:spPr>
+          <p:style>
+            <a:lnRef idx="2">
+              <a:schemeClr val="accent1"/>
+            </a:lnRef>
+            <a:fillRef idx="0">
+              <a:schemeClr val="accent1"/>
+            </a:fillRef>
+            <a:effectRef idx="1">
+              <a:schemeClr val="accent1"/>
+            </a:effectRef>
+            <a:fontRef idx="minor">
+              <a:schemeClr val="tx1"/>
+            </a:fontRef>
+          </p:style>
+        </p:cxnSp>
+        <p:cxnSp>
+          <p:nvCxnSpPr>
+            <p:cNvPr id="55" name="Straight Arrow Connector 54"/>
+            <p:cNvCxnSpPr>
+              <a:stCxn id="2" idx="2"/>
+              <a:endCxn id="14" idx="1"/>
+            </p:cNvCxnSpPr>
+            <p:nvPr/>
+          </p:nvCxnSpPr>
+          <p:spPr>
+            <a:xfrm>
+              <a:off x="5094248" y="1900854"/>
+              <a:ext cx="1503825" cy="547997"/>
+            </a:xfrm>
+            <a:prstGeom prst="straightConnector1">
+              <a:avLst/>
+            </a:prstGeom>
+            <a:ln>
+              <a:solidFill>
+                <a:schemeClr val="tx1"/>
+              </a:solidFill>
+              <a:tailEnd type="arrow"/>
+            </a:ln>
+          </p:spPr>
+          <p:style>
+            <a:lnRef idx="2">
+              <a:schemeClr val="accent1"/>
+            </a:lnRef>
+            <a:fillRef idx="0">
+              <a:schemeClr val="accent1"/>
+            </a:fillRef>
+            <a:effectRef idx="1">
+              <a:schemeClr val="accent1"/>
+            </a:effectRef>
+            <a:fontRef idx="minor">
+              <a:schemeClr val="tx1"/>
+            </a:fontRef>
+          </p:style>
+        </p:cxnSp>
+        <p:cxnSp>
+          <p:nvCxnSpPr>
+            <p:cNvPr id="57" name="Straight Arrow Connector 56"/>
+            <p:cNvCxnSpPr>
+              <a:stCxn id="2" idx="2"/>
+              <a:endCxn id="15" idx="2"/>
+            </p:cNvCxnSpPr>
+            <p:nvPr/>
+          </p:nvCxnSpPr>
+          <p:spPr>
+            <a:xfrm>
+              <a:off x="5094248" y="1900854"/>
+              <a:ext cx="2329040" cy="338223"/>
+            </a:xfrm>
+            <a:prstGeom prst="straightConnector1">
+              <a:avLst/>
+            </a:prstGeom>
+            <a:ln>
+              <a:solidFill>
+                <a:schemeClr val="tx1"/>
+              </a:solidFill>
+              <a:tailEnd type="arrow"/>
+            </a:ln>
+          </p:spPr>
+          <p:style>
+            <a:lnRef idx="2">
+              <a:schemeClr val="accent1"/>
+            </a:lnRef>
+            <a:fillRef idx="0">
+              <a:schemeClr val="accent1"/>
+            </a:fillRef>
+            <a:effectRef idx="1">
+              <a:schemeClr val="accent1"/>
+            </a:effectRef>
+            <a:fontRef idx="minor">
+              <a:schemeClr val="tx1"/>
+            </a:fontRef>
+          </p:style>
+        </p:cxnSp>
+      </p:grpSp>
+    </p:spTree>
+    <p:extLst>
+      <p:ext uri="{BB962C8B-B14F-4D97-AF65-F5344CB8AC3E}">
+        <p14:creationId xmlns:p14="http://schemas.microsoft.com/office/powerpoint/2010/main" val="1743320711"/>
+      </p:ext>
+    </p:extLst>
+  </p:cSld>
+  <p:clrMapOvr>
+    <a:masterClrMapping/>
+  </p:clrMapOvr>
+  <p:timing>
+    <p:tnLst>
+      <p:par>
+        <p:cTn xmlns:p14="http://schemas.microsoft.com/office/powerpoint/2010/main" id="1" dur="indefinite" restart="never" nodeType="tmRoot"/>
+      </p:par>
+    </p:tnLst>
+  </p:timing>
+</p:sld>
+</file>
+
 <file path=ppt/theme/theme1.xml><?xml version="1.0" encoding="utf-8"?>
 <a:theme xmlns:a="http://schemas.openxmlformats.org/drawingml/2006/main" name="Office Theme">
   <a:themeElements>
@@ -8833,7 +9959,7 @@
   <a:extraClrSchemeLst/>
   <a:extLst>
     <a:ext uri="{05A4C25C-085E-4340-85A3-A5531E510DB2}">
-      <thm15:themeFamily xmlns:thm15="http://schemas.microsoft.com/office/thememl/2012/main" xmlns="" name="Office Theme" id="{62F939B6-93AF-4DB8-9C6B-D6C7DFDC589F}" vid="{4A3C46E8-61CC-4603-A589-7422A47A8E4A}"/>
+      <thm15:themeFamily xmlns="" xmlns:thm15="http://schemas.microsoft.com/office/thememl/2012/main" name="Office Theme" id="{62F939B6-93AF-4DB8-9C6B-D6C7DFDC589F}" vid="{4A3C46E8-61CC-4603-A589-7422A47A8E4A}"/>
     </a:ext>
   </a:extLst>
 </a:theme>

</xml_diff>

<commit_message>
reduce font size in diagram
</commit_message>
<xml_diff>
--- a/Drawings/Drawing.pptx
+++ b/Drawings/Drawing.pptx
@@ -110,7 +110,7 @@
   </p:defaultTextStyle>
   <p:extLst>
     <p:ext uri="{EFAFB233-063F-42B5-8137-9DF3F51BA10A}">
-      <p15:sldGuideLst xmlns="" xmlns:p15="http://schemas.microsoft.com/office/powerpoint/2012/main"/>
+      <p15:sldGuideLst xmlns:p15="http://schemas.microsoft.com/office/powerpoint/2012/main" xmlns=""/>
     </p:ext>
   </p:extLst>
 </p:presentation>
@@ -247,7 +247,7 @@
           <a:p>
             <a:fld id="{A8528DE2-31C9-49BB-A893-07DE5C7B4A44}" type="datetimeFigureOut">
               <a:rPr lang="en-US" smtClean="0"/>
-              <a:t>10/05/15</a:t>
+              <a:t>11/05/15</a:t>
             </a:fld>
             <a:endParaRPr lang="en-US"/>
           </a:p>
@@ -417,7 +417,7 @@
           <a:p>
             <a:fld id="{A8528DE2-31C9-49BB-A893-07DE5C7B4A44}" type="datetimeFigureOut">
               <a:rPr lang="en-US" smtClean="0"/>
-              <a:t>10/05/15</a:t>
+              <a:t>11/05/15</a:t>
             </a:fld>
             <a:endParaRPr lang="en-US"/>
           </a:p>
@@ -597,7 +597,7 @@
           <a:p>
             <a:fld id="{A8528DE2-31C9-49BB-A893-07DE5C7B4A44}" type="datetimeFigureOut">
               <a:rPr lang="en-US" smtClean="0"/>
-              <a:t>10/05/15</a:t>
+              <a:t>11/05/15</a:t>
             </a:fld>
             <a:endParaRPr lang="en-US"/>
           </a:p>
@@ -767,7 +767,7 @@
           <a:p>
             <a:fld id="{A8528DE2-31C9-49BB-A893-07DE5C7B4A44}" type="datetimeFigureOut">
               <a:rPr lang="en-US" smtClean="0"/>
-              <a:t>10/05/15</a:t>
+              <a:t>11/05/15</a:t>
             </a:fld>
             <a:endParaRPr lang="en-US"/>
           </a:p>
@@ -1013,7 +1013,7 @@
           <a:p>
             <a:fld id="{A8528DE2-31C9-49BB-A893-07DE5C7B4A44}" type="datetimeFigureOut">
               <a:rPr lang="en-US" smtClean="0"/>
-              <a:t>10/05/15</a:t>
+              <a:t>11/05/15</a:t>
             </a:fld>
             <a:endParaRPr lang="en-US"/>
           </a:p>
@@ -1245,7 +1245,7 @@
           <a:p>
             <a:fld id="{A8528DE2-31C9-49BB-A893-07DE5C7B4A44}" type="datetimeFigureOut">
               <a:rPr lang="en-US" smtClean="0"/>
-              <a:t>10/05/15</a:t>
+              <a:t>11/05/15</a:t>
             </a:fld>
             <a:endParaRPr lang="en-US"/>
           </a:p>
@@ -1612,7 +1612,7 @@
           <a:p>
             <a:fld id="{A8528DE2-31C9-49BB-A893-07DE5C7B4A44}" type="datetimeFigureOut">
               <a:rPr lang="en-US" smtClean="0"/>
-              <a:t>10/05/15</a:t>
+              <a:t>11/05/15</a:t>
             </a:fld>
             <a:endParaRPr lang="en-US"/>
           </a:p>
@@ -1730,7 +1730,7 @@
           <a:p>
             <a:fld id="{A8528DE2-31C9-49BB-A893-07DE5C7B4A44}" type="datetimeFigureOut">
               <a:rPr lang="en-US" smtClean="0"/>
-              <a:t>10/05/15</a:t>
+              <a:t>11/05/15</a:t>
             </a:fld>
             <a:endParaRPr lang="en-US"/>
           </a:p>
@@ -1825,7 +1825,7 @@
           <a:p>
             <a:fld id="{A8528DE2-31C9-49BB-A893-07DE5C7B4A44}" type="datetimeFigureOut">
               <a:rPr lang="en-US" smtClean="0"/>
-              <a:t>10/05/15</a:t>
+              <a:t>11/05/15</a:t>
             </a:fld>
             <a:endParaRPr lang="en-US"/>
           </a:p>
@@ -2102,7 +2102,7 @@
           <a:p>
             <a:fld id="{A8528DE2-31C9-49BB-A893-07DE5C7B4A44}" type="datetimeFigureOut">
               <a:rPr lang="en-US" smtClean="0"/>
-              <a:t>10/05/15</a:t>
+              <a:t>11/05/15</a:t>
             </a:fld>
             <a:endParaRPr lang="en-US"/>
           </a:p>
@@ -2355,7 +2355,7 @@
           <a:p>
             <a:fld id="{A8528DE2-31C9-49BB-A893-07DE5C7B4A44}" type="datetimeFigureOut">
               <a:rPr lang="en-US" smtClean="0"/>
-              <a:t>10/05/15</a:t>
+              <a:t>11/05/15</a:t>
             </a:fld>
             <a:endParaRPr lang="en-US"/>
           </a:p>
@@ -2568,7 +2568,7 @@
           <a:p>
             <a:fld id="{A8528DE2-31C9-49BB-A893-07DE5C7B4A44}" type="datetimeFigureOut">
               <a:rPr lang="en-US" smtClean="0"/>
-              <a:t>10/05/15</a:t>
+              <a:t>11/05/15</a:t>
             </a:fld>
             <a:endParaRPr lang="en-US"/>
           </a:p>
@@ -4997,7 +4997,7 @@
             <a:p>
               <a:pPr algn="ctr"/>
               <a:r>
-                <a:rPr lang="en-US" dirty="0" smtClean="0">
+                <a:rPr lang="en-US" sz="1600" dirty="0" smtClean="0">
                   <a:solidFill>
                     <a:schemeClr val="tx1"/>
                   </a:solidFill>
@@ -5007,7 +5007,7 @@
                 </a:rPr>
                 <a:t>Emotion analysis</a:t>
               </a:r>
-              <a:endParaRPr lang="en-US" dirty="0">
+              <a:endParaRPr lang="en-US" sz="1600" dirty="0">
                 <a:solidFill>
                   <a:schemeClr val="tx1"/>
                 </a:solidFill>
@@ -5073,7 +5073,7 @@
               <a:lstStyle/>
               <a:p>
                 <a:pPr algn="ctr"/>
-                <a:endParaRPr lang="en-US">
+                <a:endParaRPr lang="en-US" sz="1600">
                   <a:latin typeface="Roboto Condensed" panose="02000000000000000000" pitchFamily="2" charset="0"/>
                   <a:ea typeface="Roboto Condensed" panose="02000000000000000000" pitchFamily="2" charset="0"/>
                   <a:cs typeface="Roboto Condensed" panose="02000000000000000000" pitchFamily="2" charset="0"/>
@@ -5122,14 +5122,14 @@
               <a:p>
                 <a:pPr algn="ctr"/>
                 <a:r>
-                  <a:rPr lang="en-US" dirty="0" smtClean="0">
+                  <a:rPr lang="en-US" sz="1600" dirty="0" smtClean="0">
                     <a:latin typeface="Roboto Condensed" panose="02000000000000000000" pitchFamily="2" charset="0"/>
                     <a:ea typeface="Roboto Condensed" panose="02000000000000000000" pitchFamily="2" charset="0"/>
                     <a:cs typeface="Roboto Condensed" panose="02000000000000000000" pitchFamily="2" charset="0"/>
                   </a:rPr>
                   <a:t>Anger</a:t>
                 </a:r>
-                <a:endParaRPr lang="en-US" dirty="0">
+                <a:endParaRPr lang="en-US" sz="1600" dirty="0">
                   <a:latin typeface="Roboto Condensed" panose="02000000000000000000" pitchFamily="2" charset="0"/>
                   <a:ea typeface="Roboto Condensed" panose="02000000000000000000" pitchFamily="2" charset="0"/>
                   <a:cs typeface="Roboto Condensed" panose="02000000000000000000" pitchFamily="2" charset="0"/>
@@ -5178,14 +5178,14 @@
               <a:p>
                 <a:pPr algn="ctr"/>
                 <a:r>
-                  <a:rPr lang="en-US" dirty="0" smtClean="0">
+                  <a:rPr lang="en-US" sz="1600" dirty="0" smtClean="0">
                     <a:latin typeface="Roboto Condensed" panose="02000000000000000000" pitchFamily="2" charset="0"/>
                     <a:ea typeface="Roboto Condensed" panose="02000000000000000000" pitchFamily="2" charset="0"/>
                     <a:cs typeface="Roboto Condensed" panose="02000000000000000000" pitchFamily="2" charset="0"/>
                   </a:rPr>
                   <a:t>Joy</a:t>
                 </a:r>
-                <a:endParaRPr lang="en-US" dirty="0">
+                <a:endParaRPr lang="en-US" sz="1600" dirty="0">
                   <a:latin typeface="Roboto Condensed" panose="02000000000000000000" pitchFamily="2" charset="0"/>
                   <a:ea typeface="Roboto Condensed" panose="02000000000000000000" pitchFamily="2" charset="0"/>
                   <a:cs typeface="Roboto Condensed" panose="02000000000000000000" pitchFamily="2" charset="0"/>
@@ -5234,14 +5234,14 @@
               <a:p>
                 <a:pPr algn="ctr"/>
                 <a:r>
-                  <a:rPr lang="en-US" dirty="0" smtClean="0">
+                  <a:rPr lang="en-US" sz="1600" dirty="0" smtClean="0">
                     <a:latin typeface="Roboto Condensed" panose="02000000000000000000" pitchFamily="2" charset="0"/>
                     <a:ea typeface="Roboto Condensed" panose="02000000000000000000" pitchFamily="2" charset="0"/>
                     <a:cs typeface="Roboto Condensed" panose="02000000000000000000" pitchFamily="2" charset="0"/>
                   </a:rPr>
                   <a:t>Fear</a:t>
                 </a:r>
-                <a:endParaRPr lang="en-US" dirty="0">
+                <a:endParaRPr lang="en-US" sz="1600" dirty="0">
                   <a:latin typeface="Roboto Condensed" panose="02000000000000000000" pitchFamily="2" charset="0"/>
                   <a:ea typeface="Roboto Condensed" panose="02000000000000000000" pitchFamily="2" charset="0"/>
                   <a:cs typeface="Roboto Condensed" panose="02000000000000000000" pitchFamily="2" charset="0"/>
@@ -5290,14 +5290,14 @@
               <a:p>
                 <a:pPr algn="ctr"/>
                 <a:r>
-                  <a:rPr lang="en-US" dirty="0" smtClean="0">
+                  <a:rPr lang="en-US" sz="1600" dirty="0" smtClean="0">
                     <a:latin typeface="Roboto Condensed" panose="02000000000000000000" pitchFamily="2" charset="0"/>
                     <a:ea typeface="Roboto Condensed" panose="02000000000000000000" pitchFamily="2" charset="0"/>
                     <a:cs typeface="Roboto Condensed" panose="02000000000000000000" pitchFamily="2" charset="0"/>
                   </a:rPr>
                   <a:t>Sadness</a:t>
                 </a:r>
-                <a:endParaRPr lang="en-US" dirty="0">
+                <a:endParaRPr lang="en-US" sz="1600" dirty="0">
                   <a:latin typeface="Roboto Condensed" panose="02000000000000000000" pitchFamily="2" charset="0"/>
                   <a:ea typeface="Roboto Condensed" panose="02000000000000000000" pitchFamily="2" charset="0"/>
                   <a:cs typeface="Roboto Condensed" panose="02000000000000000000" pitchFamily="2" charset="0"/>
@@ -5345,7 +5345,7 @@
             <a:p>
               <a:pPr algn="ctr"/>
               <a:r>
-                <a:rPr lang="en-US" dirty="0" smtClean="0">
+                <a:rPr lang="en-US" sz="1600" dirty="0" smtClean="0">
                   <a:solidFill>
                     <a:schemeClr val="tx1"/>
                   </a:solidFill>
@@ -5355,7 +5355,7 @@
                 </a:rPr>
                 <a:t>Crowd model</a:t>
               </a:r>
-              <a:endParaRPr lang="en-US" dirty="0">
+              <a:endParaRPr lang="en-US" sz="1600" dirty="0">
                 <a:solidFill>
                   <a:schemeClr val="tx1"/>
                 </a:solidFill>
@@ -5405,7 +5405,7 @@
             <a:p>
               <a:pPr algn="ctr"/>
               <a:r>
-                <a:rPr lang="en-US" dirty="0" smtClean="0">
+                <a:rPr lang="en-US" sz="1600" dirty="0" smtClean="0">
                   <a:solidFill>
                     <a:schemeClr val="tx1"/>
                   </a:solidFill>
@@ -5415,7 +5415,7 @@
                 </a:rPr>
                 <a:t>Context data</a:t>
               </a:r>
-              <a:endParaRPr lang="en-US" dirty="0">
+              <a:endParaRPr lang="en-US" sz="1600" dirty="0">
                 <a:solidFill>
                   <a:schemeClr val="tx1"/>
                 </a:solidFill>
@@ -5476,7 +5476,7 @@
               <a:lstStyle/>
               <a:p>
                 <a:pPr algn="ctr"/>
-                <a:endParaRPr lang="en-US">
+                <a:endParaRPr lang="en-US" sz="1600">
                   <a:latin typeface="Roboto Condensed" panose="02000000000000000000" pitchFamily="2" charset="0"/>
                   <a:ea typeface="Roboto Condensed" panose="02000000000000000000" pitchFamily="2" charset="0"/>
                   <a:cs typeface="Roboto Condensed" panose="02000000000000000000" pitchFamily="2" charset="0"/>
@@ -5522,14 +5522,14 @@
               <a:p>
                 <a:pPr algn="ctr"/>
                 <a:r>
-                  <a:rPr lang="en-US" dirty="0" smtClean="0">
+                  <a:rPr lang="en-US" sz="1600" dirty="0" smtClean="0">
                     <a:latin typeface="Roboto Condensed" panose="02000000000000000000" pitchFamily="2" charset="0"/>
                     <a:ea typeface="Roboto Condensed" panose="02000000000000000000" pitchFamily="2" charset="0"/>
                     <a:cs typeface="Roboto Condensed" panose="02000000000000000000" pitchFamily="2" charset="0"/>
                   </a:rPr>
                   <a:t>Emotion - Crowd type Mapping Model</a:t>
                 </a:r>
-                <a:endParaRPr lang="en-US" dirty="0">
+                <a:endParaRPr lang="en-US" sz="1600" dirty="0">
                   <a:latin typeface="Roboto Condensed" panose="02000000000000000000" pitchFamily="2" charset="0"/>
                   <a:ea typeface="Roboto Condensed" panose="02000000000000000000" pitchFamily="2" charset="0"/>
                   <a:cs typeface="Roboto Condensed" panose="02000000000000000000" pitchFamily="2" charset="0"/>
@@ -5577,7 +5577,7 @@
             <a:p>
               <a:pPr algn="ctr"/>
               <a:r>
-                <a:rPr lang="en-US" dirty="0" smtClean="0">
+                <a:rPr lang="en-US" sz="1600" dirty="0" smtClean="0">
                   <a:solidFill>
                     <a:schemeClr val="tx1"/>
                   </a:solidFill>
@@ -5587,7 +5587,7 @@
                 </a:rPr>
                 <a:t>Emotion model</a:t>
               </a:r>
-              <a:endParaRPr lang="en-US" dirty="0">
+              <a:endParaRPr lang="en-US" sz="1600" dirty="0">
                 <a:solidFill>
                   <a:schemeClr val="tx1"/>
                 </a:solidFill>
@@ -5653,7 +5653,7 @@
               <a:lstStyle/>
               <a:p>
                 <a:pPr algn="ctr"/>
-                <a:endParaRPr lang="en-US">
+                <a:endParaRPr lang="en-US" sz="1600">
                   <a:latin typeface="Roboto Condensed" panose="02000000000000000000" pitchFamily="2" charset="0"/>
                   <a:ea typeface="Roboto Condensed" panose="02000000000000000000" pitchFamily="2" charset="0"/>
                   <a:cs typeface="Roboto Condensed" panose="02000000000000000000" pitchFamily="2" charset="0"/>
@@ -5702,14 +5702,14 @@
               <a:p>
                 <a:pPr algn="ctr"/>
                 <a:r>
-                  <a:rPr lang="en-US" dirty="0" smtClean="0">
+                  <a:rPr lang="en-US" sz="1600" dirty="0" smtClean="0">
                     <a:latin typeface="Roboto Condensed" panose="02000000000000000000" pitchFamily="2" charset="0"/>
                     <a:ea typeface="Roboto Condensed" panose="02000000000000000000" pitchFamily="2" charset="0"/>
                     <a:cs typeface="Roboto Condensed" panose="02000000000000000000" pitchFamily="2" charset="0"/>
                   </a:rPr>
                   <a:t>Ambulatory</a:t>
                 </a:r>
-                <a:endParaRPr lang="en-US" dirty="0">
+                <a:endParaRPr lang="en-US" sz="1600" dirty="0">
                   <a:latin typeface="Roboto Condensed" panose="02000000000000000000" pitchFamily="2" charset="0"/>
                   <a:ea typeface="Roboto Condensed" panose="02000000000000000000" pitchFamily="2" charset="0"/>
                   <a:cs typeface="Roboto Condensed" panose="02000000000000000000" pitchFamily="2" charset="0"/>
@@ -5758,14 +5758,14 @@
               <a:p>
                 <a:pPr algn="ctr"/>
                 <a:r>
-                  <a:rPr lang="en-US" dirty="0" smtClean="0">
+                  <a:rPr lang="en-US" sz="1600" dirty="0" smtClean="0">
                     <a:latin typeface="Roboto Condensed" panose="02000000000000000000" pitchFamily="2" charset="0"/>
                     <a:ea typeface="Roboto Condensed" panose="02000000000000000000" pitchFamily="2" charset="0"/>
                     <a:cs typeface="Roboto Condensed" panose="02000000000000000000" pitchFamily="2" charset="0"/>
                   </a:rPr>
                   <a:t>Limited movement</a:t>
                 </a:r>
-                <a:endParaRPr lang="en-US" dirty="0">
+                <a:endParaRPr lang="en-US" sz="1600" dirty="0">
                   <a:latin typeface="Roboto Condensed" panose="02000000000000000000" pitchFamily="2" charset="0"/>
                   <a:ea typeface="Roboto Condensed" panose="02000000000000000000" pitchFamily="2" charset="0"/>
                   <a:cs typeface="Roboto Condensed" panose="02000000000000000000" pitchFamily="2" charset="0"/>
@@ -5814,14 +5814,14 @@
               <a:p>
                 <a:pPr algn="ctr"/>
                 <a:r>
-                  <a:rPr lang="en-US" dirty="0" smtClean="0">
+                  <a:rPr lang="en-US" sz="1600" dirty="0" smtClean="0">
                     <a:latin typeface="Roboto Condensed" panose="02000000000000000000" pitchFamily="2" charset="0"/>
                     <a:ea typeface="Roboto Condensed" panose="02000000000000000000" pitchFamily="2" charset="0"/>
                     <a:cs typeface="Roboto Condensed" panose="02000000000000000000" pitchFamily="2" charset="0"/>
                   </a:rPr>
                   <a:t>Spectator</a:t>
                 </a:r>
-                <a:endParaRPr lang="en-US" dirty="0">
+                <a:endParaRPr lang="en-US" sz="1600" dirty="0">
                   <a:latin typeface="Roboto Condensed" panose="02000000000000000000" pitchFamily="2" charset="0"/>
                   <a:ea typeface="Roboto Condensed" panose="02000000000000000000" pitchFamily="2" charset="0"/>
                   <a:cs typeface="Roboto Condensed" panose="02000000000000000000" pitchFamily="2" charset="0"/>
@@ -5870,14 +5870,14 @@
               <a:p>
                 <a:pPr algn="ctr"/>
                 <a:r>
-                  <a:rPr lang="en-US" dirty="0" smtClean="0">
+                  <a:rPr lang="en-US" sz="1600" dirty="0" smtClean="0">
                     <a:latin typeface="Roboto Condensed" panose="02000000000000000000" pitchFamily="2" charset="0"/>
                     <a:ea typeface="Roboto Condensed" panose="02000000000000000000" pitchFamily="2" charset="0"/>
                     <a:cs typeface="Roboto Condensed" panose="02000000000000000000" pitchFamily="2" charset="0"/>
                   </a:rPr>
                   <a:t>Participatory</a:t>
                 </a:r>
-                <a:endParaRPr lang="en-US" dirty="0">
+                <a:endParaRPr lang="en-US" sz="1600" dirty="0">
                   <a:latin typeface="Roboto Condensed" panose="02000000000000000000" pitchFamily="2" charset="0"/>
                   <a:ea typeface="Roboto Condensed" panose="02000000000000000000" pitchFamily="2" charset="0"/>
                   <a:cs typeface="Roboto Condensed" panose="02000000000000000000" pitchFamily="2" charset="0"/>
@@ -5926,14 +5926,14 @@
               <a:p>
                 <a:pPr algn="ctr"/>
                 <a:r>
-                  <a:rPr lang="en-US" dirty="0" smtClean="0">
+                  <a:rPr lang="en-US" sz="1600" dirty="0" smtClean="0">
                     <a:latin typeface="Roboto Condensed" panose="02000000000000000000" pitchFamily="2" charset="0"/>
                     <a:ea typeface="Roboto Condensed" panose="02000000000000000000" pitchFamily="2" charset="0"/>
                     <a:cs typeface="Roboto Condensed" panose="02000000000000000000" pitchFamily="2" charset="0"/>
                   </a:rPr>
                   <a:t>Expressive</a:t>
                 </a:r>
-                <a:endParaRPr lang="en-US" dirty="0">
+                <a:endParaRPr lang="en-US" sz="1600" dirty="0">
                   <a:latin typeface="Roboto Condensed" panose="02000000000000000000" pitchFamily="2" charset="0"/>
                   <a:ea typeface="Roboto Condensed" panose="02000000000000000000" pitchFamily="2" charset="0"/>
                   <a:cs typeface="Roboto Condensed" panose="02000000000000000000" pitchFamily="2" charset="0"/>
@@ -5982,14 +5982,14 @@
               <a:p>
                 <a:pPr algn="ctr"/>
                 <a:r>
-                  <a:rPr lang="en-US" dirty="0" smtClean="0">
+                  <a:rPr lang="en-US" sz="1600" dirty="0" smtClean="0">
                     <a:latin typeface="Roboto Condensed" panose="02000000000000000000" pitchFamily="2" charset="0"/>
                     <a:ea typeface="Roboto Condensed" panose="02000000000000000000" pitchFamily="2" charset="0"/>
                     <a:cs typeface="Roboto Condensed" panose="02000000000000000000" pitchFamily="2" charset="0"/>
                   </a:rPr>
                   <a:t>Aggressive</a:t>
                 </a:r>
-                <a:endParaRPr lang="en-US" dirty="0">
+                <a:endParaRPr lang="en-US" sz="1600" dirty="0">
                   <a:latin typeface="Roboto Condensed" panose="02000000000000000000" pitchFamily="2" charset="0"/>
                   <a:ea typeface="Roboto Condensed" panose="02000000000000000000" pitchFamily="2" charset="0"/>
                   <a:cs typeface="Roboto Condensed" panose="02000000000000000000" pitchFamily="2" charset="0"/>
@@ -6038,14 +6038,14 @@
               <a:p>
                 <a:pPr algn="ctr"/>
                 <a:r>
-                  <a:rPr lang="en-US" dirty="0" smtClean="0">
+                  <a:rPr lang="en-US" sz="1600" dirty="0" smtClean="0">
                     <a:latin typeface="Roboto Condensed" panose="02000000000000000000" pitchFamily="2" charset="0"/>
                     <a:ea typeface="Roboto Condensed" panose="02000000000000000000" pitchFamily="2" charset="0"/>
                     <a:cs typeface="Roboto Condensed" panose="02000000000000000000" pitchFamily="2" charset="0"/>
                   </a:rPr>
                   <a:t>Demonstrator</a:t>
                 </a:r>
-                <a:endParaRPr lang="en-US" dirty="0">
+                <a:endParaRPr lang="en-US" sz="1600" dirty="0">
                   <a:latin typeface="Roboto Condensed" panose="02000000000000000000" pitchFamily="2" charset="0"/>
                   <a:ea typeface="Roboto Condensed" panose="02000000000000000000" pitchFamily="2" charset="0"/>
                   <a:cs typeface="Roboto Condensed" panose="02000000000000000000" pitchFamily="2" charset="0"/>
@@ -6094,14 +6094,14 @@
               <a:p>
                 <a:pPr algn="ctr"/>
                 <a:r>
-                  <a:rPr lang="en-US" dirty="0" smtClean="0">
+                  <a:rPr lang="en-US" sz="1600" dirty="0" smtClean="0">
                     <a:latin typeface="Roboto Condensed" panose="02000000000000000000" pitchFamily="2" charset="0"/>
                     <a:ea typeface="Roboto Condensed" panose="02000000000000000000" pitchFamily="2" charset="0"/>
                     <a:cs typeface="Roboto Condensed" panose="02000000000000000000" pitchFamily="2" charset="0"/>
                   </a:rPr>
                   <a:t>Escaping</a:t>
                 </a:r>
-                <a:endParaRPr lang="en-US" dirty="0">
+                <a:endParaRPr lang="en-US" sz="1600" dirty="0">
                   <a:latin typeface="Roboto Condensed" panose="02000000000000000000" pitchFamily="2" charset="0"/>
                   <a:ea typeface="Roboto Condensed" panose="02000000000000000000" pitchFamily="2" charset="0"/>
                   <a:cs typeface="Roboto Condensed" panose="02000000000000000000" pitchFamily="2" charset="0"/>
@@ -6150,14 +6150,14 @@
               <a:p>
                 <a:pPr algn="ctr"/>
                 <a:r>
-                  <a:rPr lang="en-US" dirty="0" smtClean="0">
+                  <a:rPr lang="en-US" sz="1600" dirty="0" smtClean="0">
                     <a:latin typeface="Roboto Condensed" panose="02000000000000000000" pitchFamily="2" charset="0"/>
                     <a:ea typeface="Roboto Condensed" panose="02000000000000000000" pitchFamily="2" charset="0"/>
                     <a:cs typeface="Roboto Condensed" panose="02000000000000000000" pitchFamily="2" charset="0"/>
                   </a:rPr>
                   <a:t>Dense</a:t>
                 </a:r>
-                <a:endParaRPr lang="en-US" dirty="0">
+                <a:endParaRPr lang="en-US" sz="1600" dirty="0">
                   <a:latin typeface="Roboto Condensed" panose="02000000000000000000" pitchFamily="2" charset="0"/>
                   <a:ea typeface="Roboto Condensed" panose="02000000000000000000" pitchFamily="2" charset="0"/>
                   <a:cs typeface="Roboto Condensed" panose="02000000000000000000" pitchFamily="2" charset="0"/>
@@ -6206,14 +6206,14 @@
               <a:p>
                 <a:pPr algn="ctr"/>
                 <a:r>
-                  <a:rPr lang="en-US" dirty="0" smtClean="0">
+                  <a:rPr lang="en-US" sz="1600" dirty="0" smtClean="0">
                     <a:latin typeface="Roboto Condensed" panose="02000000000000000000" pitchFamily="2" charset="0"/>
                     <a:ea typeface="Roboto Condensed" panose="02000000000000000000" pitchFamily="2" charset="0"/>
                     <a:cs typeface="Roboto Condensed" panose="02000000000000000000" pitchFamily="2" charset="0"/>
                   </a:rPr>
                   <a:t>Rushing</a:t>
                 </a:r>
-                <a:endParaRPr lang="en-US" dirty="0">
+                <a:endParaRPr lang="en-US" sz="1600" dirty="0">
                   <a:latin typeface="Roboto Condensed" panose="02000000000000000000" pitchFamily="2" charset="0"/>
                   <a:ea typeface="Roboto Condensed" panose="02000000000000000000" pitchFamily="2" charset="0"/>
                   <a:cs typeface="Roboto Condensed" panose="02000000000000000000" pitchFamily="2" charset="0"/>
@@ -6262,14 +6262,14 @@
               <a:p>
                 <a:pPr algn="ctr"/>
                 <a:r>
-                  <a:rPr lang="en-US" dirty="0" smtClean="0">
+                  <a:rPr lang="en-US" sz="1600" dirty="0" smtClean="0">
                     <a:latin typeface="Roboto Condensed" panose="02000000000000000000" pitchFamily="2" charset="0"/>
                     <a:ea typeface="Roboto Condensed" panose="02000000000000000000" pitchFamily="2" charset="0"/>
                     <a:cs typeface="Roboto Condensed" panose="02000000000000000000" pitchFamily="2" charset="0"/>
                   </a:rPr>
                   <a:t>Violent</a:t>
                 </a:r>
-                <a:endParaRPr lang="en-US" dirty="0">
+                <a:endParaRPr lang="en-US" sz="1600" dirty="0">
                   <a:latin typeface="Roboto Condensed" panose="02000000000000000000" pitchFamily="2" charset="0"/>
                   <a:ea typeface="Roboto Condensed" panose="02000000000000000000" pitchFamily="2" charset="0"/>
                   <a:cs typeface="Roboto Condensed" panose="02000000000000000000" pitchFamily="2" charset="0"/>
@@ -6316,7 +6316,7 @@
               <a:p>
                 <a:pPr algn="ctr"/>
                 <a:r>
-                  <a:rPr lang="en-US" dirty="0" smtClean="0">
+                  <a:rPr lang="en-US" sz="1600" dirty="0" smtClean="0">
                     <a:solidFill>
                       <a:schemeClr val="tx1"/>
                     </a:solidFill>
@@ -6326,7 +6326,7 @@
                   </a:rPr>
                   <a:t>Crowd types</a:t>
                 </a:r>
-                <a:endParaRPr lang="en-US" dirty="0">
+                <a:endParaRPr lang="en-US" sz="1600" dirty="0">
                   <a:solidFill>
                     <a:schemeClr val="tx1"/>
                   </a:solidFill>
@@ -6388,7 +6388,7 @@
               <a:lstStyle/>
               <a:p>
                 <a:pPr algn="ctr"/>
-                <a:endParaRPr lang="en-US">
+                <a:endParaRPr lang="en-US" sz="1600">
                   <a:latin typeface="Roboto Condensed" panose="02000000000000000000" pitchFamily="2" charset="0"/>
                   <a:ea typeface="Roboto Condensed" panose="02000000000000000000" pitchFamily="2" charset="0"/>
                   <a:cs typeface="Roboto Condensed" panose="02000000000000000000" pitchFamily="2" charset="0"/>
@@ -6434,14 +6434,14 @@
               <a:p>
                 <a:pPr algn="ctr"/>
                 <a:r>
-                  <a:rPr lang="en-US" dirty="0" err="1" smtClean="0">
+                  <a:rPr lang="en-US" sz="1600" dirty="0" err="1" smtClean="0">
                     <a:latin typeface="Roboto Condensed" panose="02000000000000000000" pitchFamily="2" charset="0"/>
                     <a:ea typeface="Roboto Condensed" panose="02000000000000000000" pitchFamily="2" charset="0"/>
                     <a:cs typeface="Roboto Condensed" panose="02000000000000000000" pitchFamily="2" charset="0"/>
                   </a:rPr>
                   <a:t>Fuzzifier</a:t>
                 </a:r>
-                <a:endParaRPr lang="en-US" dirty="0">
+                <a:endParaRPr lang="en-US" sz="1600" dirty="0">
                   <a:latin typeface="Roboto Condensed" panose="02000000000000000000" pitchFamily="2" charset="0"/>
                   <a:ea typeface="Roboto Condensed" panose="02000000000000000000" pitchFamily="2" charset="0"/>
                   <a:cs typeface="Roboto Condensed" panose="02000000000000000000" pitchFamily="2" charset="0"/>
@@ -6487,14 +6487,14 @@
               <a:p>
                 <a:pPr algn="ctr"/>
                 <a:r>
-                  <a:rPr lang="en-US" dirty="0" smtClean="0">
+                  <a:rPr lang="en-US" sz="1600" dirty="0" smtClean="0">
                     <a:latin typeface="Roboto Condensed" panose="02000000000000000000" pitchFamily="2" charset="0"/>
                     <a:ea typeface="Roboto Condensed" panose="02000000000000000000" pitchFamily="2" charset="0"/>
                     <a:cs typeface="Roboto Condensed" panose="02000000000000000000" pitchFamily="2" charset="0"/>
                   </a:rPr>
                   <a:t>Inference Engine</a:t>
                 </a:r>
-                <a:endParaRPr lang="en-US" dirty="0">
+                <a:endParaRPr lang="en-US" sz="1600" dirty="0">
                   <a:latin typeface="Roboto Condensed" panose="02000000000000000000" pitchFamily="2" charset="0"/>
                   <a:ea typeface="Roboto Condensed" panose="02000000000000000000" pitchFamily="2" charset="0"/>
                   <a:cs typeface="Roboto Condensed" panose="02000000000000000000" pitchFamily="2" charset="0"/>
@@ -6542,14 +6542,14 @@
               <a:p>
                 <a:pPr algn="ctr"/>
                 <a:r>
-                  <a:rPr lang="en-US" dirty="0" smtClean="0">
+                  <a:rPr lang="en-US" sz="1600" dirty="0" smtClean="0">
                     <a:latin typeface="Roboto Condensed" panose="02000000000000000000" pitchFamily="2" charset="0"/>
                     <a:ea typeface="Roboto Condensed" panose="02000000000000000000" pitchFamily="2" charset="0"/>
                     <a:cs typeface="Roboto Condensed" panose="02000000000000000000" pitchFamily="2" charset="0"/>
                   </a:rPr>
                   <a:t>Rule repository</a:t>
                 </a:r>
-                <a:endParaRPr lang="en-US" dirty="0">
+                <a:endParaRPr lang="en-US" sz="1600" dirty="0">
                   <a:latin typeface="Roboto Condensed" panose="02000000000000000000" pitchFamily="2" charset="0"/>
                   <a:ea typeface="Roboto Condensed" panose="02000000000000000000" pitchFamily="2" charset="0"/>
                   <a:cs typeface="Roboto Condensed" panose="02000000000000000000" pitchFamily="2" charset="0"/>
@@ -6597,7 +6597,7 @@
               <a:lstStyle/>
               <a:p>
                 <a:pPr algn="ctr"/>
-                <a:endParaRPr lang="en-US">
+                <a:endParaRPr lang="en-US" sz="1600">
                   <a:latin typeface="Roboto Condensed" panose="02000000000000000000" pitchFamily="2" charset="0"/>
                   <a:ea typeface="Roboto Condensed" panose="02000000000000000000" pitchFamily="2" charset="0"/>
                   <a:cs typeface="Roboto Condensed" panose="02000000000000000000" pitchFamily="2" charset="0"/>
@@ -6645,7 +6645,7 @@
               <a:lstStyle/>
               <a:p>
                 <a:pPr algn="ctr"/>
-                <a:endParaRPr lang="en-US">
+                <a:endParaRPr lang="en-US" sz="1600">
                   <a:latin typeface="Roboto Condensed" panose="02000000000000000000" pitchFamily="2" charset="0"/>
                   <a:ea typeface="Roboto Condensed" panose="02000000000000000000" pitchFamily="2" charset="0"/>
                   <a:cs typeface="Roboto Condensed" panose="02000000000000000000" pitchFamily="2" charset="0"/>
@@ -6692,7 +6692,7 @@
               <a:p>
                 <a:pPr algn="ctr"/>
                 <a:r>
-                  <a:rPr lang="en-US" dirty="0" smtClean="0">
+                  <a:rPr lang="en-US" sz="1600" dirty="0" smtClean="0">
                     <a:solidFill>
                       <a:schemeClr val="tx1"/>
                     </a:solidFill>
@@ -6702,7 +6702,7 @@
                   </a:rPr>
                   <a:t>Rule-based reasoning</a:t>
                 </a:r>
-                <a:endParaRPr lang="en-US" dirty="0">
+                <a:endParaRPr lang="en-US" sz="1600" dirty="0">
                   <a:solidFill>
                     <a:schemeClr val="tx1"/>
                   </a:solidFill>
@@ -6772,7 +6772,7 @@
               <a:lstStyle/>
               <a:p>
                 <a:pPr algn="ctr"/>
-                <a:endParaRPr lang="en-US">
+                <a:endParaRPr lang="en-US" sz="1600">
                   <a:latin typeface="Roboto Condensed" panose="02000000000000000000" pitchFamily="2" charset="0"/>
                   <a:ea typeface="Roboto Condensed" panose="02000000000000000000" pitchFamily="2" charset="0"/>
                   <a:cs typeface="Roboto Condensed" panose="02000000000000000000" pitchFamily="2" charset="0"/>
@@ -6818,14 +6818,14 @@
               <a:p>
                 <a:pPr algn="ctr"/>
                 <a:r>
-                  <a:rPr lang="en-US" dirty="0" smtClean="0">
+                  <a:rPr lang="en-US" sz="1600" dirty="0" smtClean="0">
                     <a:latin typeface="Roboto Condensed" panose="02000000000000000000" pitchFamily="2" charset="0"/>
                     <a:ea typeface="Roboto Condensed" panose="02000000000000000000" pitchFamily="2" charset="0"/>
                     <a:cs typeface="Roboto Condensed" panose="02000000000000000000" pitchFamily="2" charset="0"/>
                   </a:rPr>
                   <a:t>Social media</a:t>
                 </a:r>
-                <a:endParaRPr lang="en-US" dirty="0">
+                <a:endParaRPr lang="en-US" sz="1600" dirty="0">
                   <a:latin typeface="Roboto Condensed" panose="02000000000000000000" pitchFamily="2" charset="0"/>
                   <a:ea typeface="Roboto Condensed" panose="02000000000000000000" pitchFamily="2" charset="0"/>
                   <a:cs typeface="Roboto Condensed" panose="02000000000000000000" pitchFamily="2" charset="0"/>
@@ -6884,7 +6884,7 @@
               <a:lstStyle/>
               <a:p>
                 <a:pPr algn="ctr"/>
-                <a:endParaRPr lang="en-US">
+                <a:endParaRPr lang="en-US" sz="1600">
                   <a:latin typeface="Roboto Condensed" panose="02000000000000000000" pitchFamily="2" charset="0"/>
                   <a:ea typeface="Roboto Condensed" panose="02000000000000000000" pitchFamily="2" charset="0"/>
                   <a:cs typeface="Roboto Condensed" panose="02000000000000000000" pitchFamily="2" charset="0"/>
@@ -6933,14 +6933,14 @@
               <a:p>
                 <a:pPr algn="ctr"/>
                 <a:r>
-                  <a:rPr lang="en-US" dirty="0" smtClean="0">
+                  <a:rPr lang="en-US" sz="1600" dirty="0" smtClean="0">
                     <a:latin typeface="Roboto Condensed" panose="02000000000000000000" pitchFamily="2" charset="0"/>
                     <a:ea typeface="Roboto Condensed" panose="02000000000000000000" pitchFamily="2" charset="0"/>
                     <a:cs typeface="Roboto Condensed" panose="02000000000000000000" pitchFamily="2" charset="0"/>
                   </a:rPr>
                   <a:t>Emotion Analysis</a:t>
                 </a:r>
-                <a:endParaRPr lang="en-US" dirty="0">
+                <a:endParaRPr lang="en-US" sz="1600" dirty="0">
                   <a:latin typeface="Roboto Condensed" panose="02000000000000000000" pitchFamily="2" charset="0"/>
                   <a:ea typeface="Roboto Condensed" panose="02000000000000000000" pitchFamily="2" charset="0"/>
                   <a:cs typeface="Roboto Condensed" panose="02000000000000000000" pitchFamily="2" charset="0"/>
@@ -6989,14 +6989,14 @@
               <a:p>
                 <a:pPr algn="ctr"/>
                 <a:r>
-                  <a:rPr lang="en-US" dirty="0" smtClean="0">
+                  <a:rPr lang="en-US" sz="1600" dirty="0" smtClean="0">
                     <a:latin typeface="Roboto Condensed" panose="02000000000000000000" pitchFamily="2" charset="0"/>
                     <a:ea typeface="Roboto Condensed" panose="02000000000000000000" pitchFamily="2" charset="0"/>
                     <a:cs typeface="Roboto Condensed" panose="02000000000000000000" pitchFamily="2" charset="0"/>
                   </a:rPr>
                   <a:t>Emotional Word Corpus</a:t>
                 </a:r>
-                <a:endParaRPr lang="en-US" dirty="0">
+                <a:endParaRPr lang="en-US" sz="1600" dirty="0">
                   <a:latin typeface="Roboto Condensed" panose="02000000000000000000" pitchFamily="2" charset="0"/>
                   <a:ea typeface="Roboto Condensed" panose="02000000000000000000" pitchFamily="2" charset="0"/>
                   <a:cs typeface="Roboto Condensed" panose="02000000000000000000" pitchFamily="2" charset="0"/>
@@ -7044,7 +7044,7 @@
               <a:lstStyle/>
               <a:p>
                 <a:pPr algn="ctr"/>
-                <a:endParaRPr lang="en-US">
+                <a:endParaRPr lang="en-US" sz="1600">
                   <a:latin typeface="Roboto Condensed" panose="02000000000000000000" pitchFamily="2" charset="0"/>
                   <a:ea typeface="Roboto Condensed" panose="02000000000000000000" pitchFamily="2" charset="0"/>
                   <a:cs typeface="Roboto Condensed" panose="02000000000000000000" pitchFamily="2" charset="0"/>
@@ -7093,7 +7093,7 @@
             <a:lstStyle/>
             <a:p>
               <a:pPr algn="ctr"/>
-              <a:endParaRPr lang="en-US">
+              <a:endParaRPr lang="en-US" sz="1600">
                 <a:latin typeface="Roboto Condensed" panose="02000000000000000000" pitchFamily="2" charset="0"/>
                 <a:ea typeface="Roboto Condensed" panose="02000000000000000000" pitchFamily="2" charset="0"/>
                 <a:cs typeface="Roboto Condensed" panose="02000000000000000000" pitchFamily="2" charset="0"/>
@@ -7140,7 +7140,7 @@
             <a:p>
               <a:pPr algn="ctr"/>
               <a:r>
-                <a:rPr lang="en-US" dirty="0" smtClean="0">
+                <a:rPr lang="en-US" sz="1600" dirty="0" smtClean="0">
                   <a:solidFill>
                     <a:schemeClr val="tx1"/>
                   </a:solidFill>
@@ -7150,7 +7150,7 @@
                 </a:rPr>
                 <a:t>Mapping</a:t>
               </a:r>
-              <a:endParaRPr lang="en-US" dirty="0">
+              <a:endParaRPr lang="en-US" sz="1600" dirty="0">
                 <a:solidFill>
                   <a:schemeClr val="tx1"/>
                 </a:solidFill>
@@ -7201,7 +7201,7 @@
             <a:lstStyle/>
             <a:p>
               <a:pPr algn="ctr"/>
-              <a:endParaRPr lang="en-US">
+              <a:endParaRPr lang="en-US" sz="1600">
                 <a:latin typeface="Roboto Condensed" panose="02000000000000000000" pitchFamily="2" charset="0"/>
                 <a:ea typeface="Roboto Condensed" panose="02000000000000000000" pitchFamily="2" charset="0"/>
                 <a:cs typeface="Roboto Condensed" panose="02000000000000000000" pitchFamily="2" charset="0"/>
@@ -7249,7 +7249,7 @@
             <a:lstStyle/>
             <a:p>
               <a:pPr algn="ctr"/>
-              <a:endParaRPr lang="en-US">
+              <a:endParaRPr lang="en-US" sz="1600">
                 <a:latin typeface="Roboto Condensed" panose="02000000000000000000" pitchFamily="2" charset="0"/>
                 <a:ea typeface="Roboto Condensed" panose="02000000000000000000" pitchFamily="2" charset="0"/>
                 <a:cs typeface="Roboto Condensed" panose="02000000000000000000" pitchFamily="2" charset="0"/>
@@ -7297,7 +7297,7 @@
             <a:lstStyle/>
             <a:p>
               <a:pPr algn="ctr"/>
-              <a:endParaRPr lang="en-US">
+              <a:endParaRPr lang="en-US" sz="1600">
                 <a:latin typeface="Roboto Condensed" panose="02000000000000000000" pitchFamily="2" charset="0"/>
                 <a:ea typeface="Roboto Condensed" panose="02000000000000000000" pitchFamily="2" charset="0"/>
                 <a:cs typeface="Roboto Condensed" panose="02000000000000000000" pitchFamily="2" charset="0"/>
@@ -7345,7 +7345,7 @@
             <a:lstStyle/>
             <a:p>
               <a:pPr algn="ctr"/>
-              <a:endParaRPr lang="en-US">
+              <a:endParaRPr lang="en-US" sz="1600">
                 <a:latin typeface="Roboto Condensed" panose="02000000000000000000" pitchFamily="2" charset="0"/>
                 <a:ea typeface="Roboto Condensed" panose="02000000000000000000" pitchFamily="2" charset="0"/>
                 <a:cs typeface="Roboto Condensed" panose="02000000000000000000" pitchFamily="2" charset="0"/>
@@ -8690,7 +8690,6 @@
                 <a:rPr lang="en-US" dirty="0"/>
                 <a:t>i</a:t>
               </a:r>
-              <a:endParaRPr lang="en-US" dirty="0"/>
             </a:p>
           </p:txBody>
         </p:sp>
@@ -9959,7 +9958,7 @@
   <a:extraClrSchemeLst/>
   <a:extLst>
     <a:ext uri="{05A4C25C-085E-4340-85A3-A5531E510DB2}">
-      <thm15:themeFamily xmlns="" xmlns:thm15="http://schemas.microsoft.com/office/thememl/2012/main" name="Office Theme" id="{62F939B6-93AF-4DB8-9C6B-D6C7DFDC589F}" vid="{4A3C46E8-61CC-4603-A589-7422A47A8E4A}"/>
+      <thm15:themeFamily xmlns:thm15="http://schemas.microsoft.com/office/thememl/2012/main" xmlns="" name="Office Theme" id="{62F939B6-93AF-4DB8-9C6B-D6C7DFDC589F}" vid="{4A3C46E8-61CC-4603-A589-7422A47A8E4A}"/>
     </a:ext>
   </a:extLst>
 </a:theme>

</xml_diff>

<commit_message>
rewrite emotion analysis to commment
</commit_message>
<xml_diff>
--- a/Drawings/Drawing.pptx
+++ b/Drawings/Drawing.pptx
@@ -10,6 +10,7 @@
     <p:sldId id="258" r:id="rId4"/>
     <p:sldId id="259" r:id="rId5"/>
     <p:sldId id="260" r:id="rId6"/>
+    <p:sldId id="261" r:id="rId7"/>
   </p:sldIdLst>
   <p:sldSz cx="9906000" cy="6858000" type="A4"/>
   <p:notesSz cx="6858000" cy="9144000"/>
@@ -247,7 +248,7 @@
           <a:p>
             <a:fld id="{A8528DE2-31C9-49BB-A893-07DE5C7B4A44}" type="datetimeFigureOut">
               <a:rPr lang="en-US" smtClean="0"/>
-              <a:t>11/05/15</a:t>
+              <a:t>15/05/15</a:t>
             </a:fld>
             <a:endParaRPr lang="en-US"/>
           </a:p>
@@ -417,7 +418,7 @@
           <a:p>
             <a:fld id="{A8528DE2-31C9-49BB-A893-07DE5C7B4A44}" type="datetimeFigureOut">
               <a:rPr lang="en-US" smtClean="0"/>
-              <a:t>11/05/15</a:t>
+              <a:t>15/05/15</a:t>
             </a:fld>
             <a:endParaRPr lang="en-US"/>
           </a:p>
@@ -597,7 +598,7 @@
           <a:p>
             <a:fld id="{A8528DE2-31C9-49BB-A893-07DE5C7B4A44}" type="datetimeFigureOut">
               <a:rPr lang="en-US" smtClean="0"/>
-              <a:t>11/05/15</a:t>
+              <a:t>15/05/15</a:t>
             </a:fld>
             <a:endParaRPr lang="en-US"/>
           </a:p>
@@ -767,7 +768,7 @@
           <a:p>
             <a:fld id="{A8528DE2-31C9-49BB-A893-07DE5C7B4A44}" type="datetimeFigureOut">
               <a:rPr lang="en-US" smtClean="0"/>
-              <a:t>11/05/15</a:t>
+              <a:t>15/05/15</a:t>
             </a:fld>
             <a:endParaRPr lang="en-US"/>
           </a:p>
@@ -1013,7 +1014,7 @@
           <a:p>
             <a:fld id="{A8528DE2-31C9-49BB-A893-07DE5C7B4A44}" type="datetimeFigureOut">
               <a:rPr lang="en-US" smtClean="0"/>
-              <a:t>11/05/15</a:t>
+              <a:t>15/05/15</a:t>
             </a:fld>
             <a:endParaRPr lang="en-US"/>
           </a:p>
@@ -1245,7 +1246,7 @@
           <a:p>
             <a:fld id="{A8528DE2-31C9-49BB-A893-07DE5C7B4A44}" type="datetimeFigureOut">
               <a:rPr lang="en-US" smtClean="0"/>
-              <a:t>11/05/15</a:t>
+              <a:t>15/05/15</a:t>
             </a:fld>
             <a:endParaRPr lang="en-US"/>
           </a:p>
@@ -1612,7 +1613,7 @@
           <a:p>
             <a:fld id="{A8528DE2-31C9-49BB-A893-07DE5C7B4A44}" type="datetimeFigureOut">
               <a:rPr lang="en-US" smtClean="0"/>
-              <a:t>11/05/15</a:t>
+              <a:t>15/05/15</a:t>
             </a:fld>
             <a:endParaRPr lang="en-US"/>
           </a:p>
@@ -1730,7 +1731,7 @@
           <a:p>
             <a:fld id="{A8528DE2-31C9-49BB-A893-07DE5C7B4A44}" type="datetimeFigureOut">
               <a:rPr lang="en-US" smtClean="0"/>
-              <a:t>11/05/15</a:t>
+              <a:t>15/05/15</a:t>
             </a:fld>
             <a:endParaRPr lang="en-US"/>
           </a:p>
@@ -1825,7 +1826,7 @@
           <a:p>
             <a:fld id="{A8528DE2-31C9-49BB-A893-07DE5C7B4A44}" type="datetimeFigureOut">
               <a:rPr lang="en-US" smtClean="0"/>
-              <a:t>11/05/15</a:t>
+              <a:t>15/05/15</a:t>
             </a:fld>
             <a:endParaRPr lang="en-US"/>
           </a:p>
@@ -2102,7 +2103,7 @@
           <a:p>
             <a:fld id="{A8528DE2-31C9-49BB-A893-07DE5C7B4A44}" type="datetimeFigureOut">
               <a:rPr lang="en-US" smtClean="0"/>
-              <a:t>11/05/15</a:t>
+              <a:t>15/05/15</a:t>
             </a:fld>
             <a:endParaRPr lang="en-US"/>
           </a:p>
@@ -2355,7 +2356,7 @@
           <a:p>
             <a:fld id="{A8528DE2-31C9-49BB-A893-07DE5C7B4A44}" type="datetimeFigureOut">
               <a:rPr lang="en-US" smtClean="0"/>
-              <a:t>11/05/15</a:t>
+              <a:t>15/05/15</a:t>
             </a:fld>
             <a:endParaRPr lang="en-US"/>
           </a:p>
@@ -2568,7 +2569,7 @@
           <a:p>
             <a:fld id="{A8528DE2-31C9-49BB-A893-07DE5C7B4A44}" type="datetimeFigureOut">
               <a:rPr lang="en-US" smtClean="0"/>
-              <a:t>11/05/15</a:t>
+              <a:t>15/05/15</a:t>
             </a:fld>
             <a:endParaRPr lang="en-US"/>
           </a:p>
@@ -4946,7 +4947,7 @@
       </p:grpSpPr>
       <p:grpSp>
         <p:nvGrpSpPr>
-          <p:cNvPr id="15" name="Group 14"/>
+          <p:cNvPr id="19" name="Group 18"/>
           <p:cNvGrpSpPr/>
           <p:nvPr/>
         </p:nvGrpSpPr>
@@ -4997,30 +4998,30 @@
             <a:p>
               <a:pPr algn="ctr"/>
               <a:r>
-                <a:rPr lang="en-US" sz="1600" dirty="0" smtClean="0">
+                <a:rPr lang="en-US" sz="1500" dirty="0" smtClean="0">
                   <a:solidFill>
                     <a:schemeClr val="tx1"/>
                   </a:solidFill>
-                  <a:latin typeface="Roboto Condensed" panose="02000000000000000000" pitchFamily="2" charset="0"/>
+                  <a:latin typeface="Roboto Condensed"/>
                   <a:ea typeface="Roboto Condensed" panose="02000000000000000000" pitchFamily="2" charset="0"/>
-                  <a:cs typeface="Roboto Condensed" panose="02000000000000000000" pitchFamily="2" charset="0"/>
+                  <a:cs typeface="Roboto Condensed"/>
                 </a:rPr>
                 <a:t>Emotion analysis</a:t>
               </a:r>
-              <a:endParaRPr lang="en-US" sz="1600" dirty="0">
+              <a:endParaRPr lang="en-US" sz="1500" dirty="0">
                 <a:solidFill>
                   <a:schemeClr val="tx1"/>
                 </a:solidFill>
-                <a:latin typeface="Roboto Condensed" panose="02000000000000000000" pitchFamily="2" charset="0"/>
+                <a:latin typeface="Roboto Condensed"/>
                 <a:ea typeface="Roboto Condensed" panose="02000000000000000000" pitchFamily="2" charset="0"/>
-                <a:cs typeface="Roboto Condensed" panose="02000000000000000000" pitchFamily="2" charset="0"/>
+                <a:cs typeface="Roboto Condensed"/>
               </a:endParaRPr>
             </a:p>
           </p:txBody>
         </p:sp>
         <p:grpSp>
           <p:nvGrpSpPr>
-            <p:cNvPr id="7" name="Group 6"/>
+            <p:cNvPr id="16" name="Group 15"/>
             <p:cNvGrpSpPr/>
             <p:nvPr/>
           </p:nvGrpSpPr>
@@ -5028,8 +5029,8 @@
             <a:xfrm>
               <a:off x="1317061" y="2428536"/>
               <a:ext cx="4808064" cy="774589"/>
-              <a:chOff x="736566" y="2049964"/>
-              <a:chExt cx="5513116" cy="931945"/>
+              <a:chOff x="1317061" y="2428536"/>
+              <a:chExt cx="4808064" cy="774589"/>
             </a:xfrm>
           </p:grpSpPr>
           <p:sp>
@@ -5040,8 +5041,8 @@
             </p:nvSpPr>
             <p:spPr>
               <a:xfrm>
-                <a:off x="736566" y="2049964"/>
-                <a:ext cx="5513116" cy="931945"/>
+                <a:off x="1317061" y="2428536"/>
+                <a:ext cx="4808064" cy="774589"/>
               </a:xfrm>
               <a:prstGeom prst="roundRect">
                 <a:avLst>
@@ -5073,10 +5074,10 @@
               <a:lstStyle/>
               <a:p>
                 <a:pPr algn="ctr"/>
-                <a:endParaRPr lang="en-US" sz="1600">
-                  <a:latin typeface="Roboto Condensed" panose="02000000000000000000" pitchFamily="2" charset="0"/>
+                <a:endParaRPr lang="en-US" sz="1500">
+                  <a:latin typeface="Roboto Condensed"/>
                   <a:ea typeface="Roboto Condensed" panose="02000000000000000000" pitchFamily="2" charset="0"/>
-                  <a:cs typeface="Roboto Condensed" panose="02000000000000000000" pitchFamily="2" charset="0"/>
+                  <a:cs typeface="Roboto Condensed"/>
                 </a:endParaRPr>
               </a:p>
             </p:txBody>
@@ -5089,8 +5090,8 @@
             </p:nvSpPr>
             <p:spPr>
               <a:xfrm>
-                <a:off x="957941" y="2241107"/>
-                <a:ext cx="1175659" cy="473995"/>
+                <a:off x="1510125" y="2587405"/>
+                <a:ext cx="1025308" cy="438286"/>
               </a:xfrm>
               <a:prstGeom prst="rect">
                 <a:avLst/>
@@ -5122,17 +5123,17 @@
               <a:p>
                 <a:pPr algn="ctr"/>
                 <a:r>
-                  <a:rPr lang="en-US" sz="1600" dirty="0" smtClean="0">
-                    <a:latin typeface="Roboto Condensed" panose="02000000000000000000" pitchFamily="2" charset="0"/>
+                  <a:rPr lang="en-US" sz="1500" dirty="0" smtClean="0">
+                    <a:latin typeface="Roboto Condensed"/>
                     <a:ea typeface="Roboto Condensed" panose="02000000000000000000" pitchFamily="2" charset="0"/>
-                    <a:cs typeface="Roboto Condensed" panose="02000000000000000000" pitchFamily="2" charset="0"/>
+                    <a:cs typeface="Roboto Condensed"/>
                   </a:rPr>
                   <a:t>Anger</a:t>
                 </a:r>
-                <a:endParaRPr lang="en-US" sz="1600" dirty="0">
-                  <a:latin typeface="Roboto Condensed" panose="02000000000000000000" pitchFamily="2" charset="0"/>
+                <a:endParaRPr lang="en-US" sz="1500" dirty="0">
+                  <a:latin typeface="Roboto Condensed"/>
                   <a:ea typeface="Roboto Condensed" panose="02000000000000000000" pitchFamily="2" charset="0"/>
-                  <a:cs typeface="Roboto Condensed" panose="02000000000000000000" pitchFamily="2" charset="0"/>
+                  <a:cs typeface="Roboto Condensed"/>
                 </a:endParaRPr>
               </a:p>
             </p:txBody>
@@ -5145,8 +5146,8 @@
             </p:nvSpPr>
             <p:spPr>
               <a:xfrm>
-                <a:off x="3580406" y="2252341"/>
-                <a:ext cx="1175659" cy="473995"/>
+                <a:off x="3797213" y="2596741"/>
+                <a:ext cx="1025308" cy="428949"/>
               </a:xfrm>
               <a:prstGeom prst="rect">
                 <a:avLst/>
@@ -5178,17 +5179,17 @@
               <a:p>
                 <a:pPr algn="ctr"/>
                 <a:r>
-                  <a:rPr lang="en-US" sz="1600" dirty="0" smtClean="0">
-                    <a:latin typeface="Roboto Condensed" panose="02000000000000000000" pitchFamily="2" charset="0"/>
+                  <a:rPr lang="en-US" sz="1500" dirty="0" smtClean="0">
+                    <a:latin typeface="Roboto Condensed"/>
                     <a:ea typeface="Roboto Condensed" panose="02000000000000000000" pitchFamily="2" charset="0"/>
-                    <a:cs typeface="Roboto Condensed" panose="02000000000000000000" pitchFamily="2" charset="0"/>
+                    <a:cs typeface="Roboto Condensed"/>
                   </a:rPr>
-                  <a:t>Joy</a:t>
+                  <a:t>Happiness</a:t>
                 </a:r>
-                <a:endParaRPr lang="en-US" sz="1600" dirty="0">
-                  <a:latin typeface="Roboto Condensed" panose="02000000000000000000" pitchFamily="2" charset="0"/>
+                <a:endParaRPr lang="en-US" sz="1500" dirty="0">
+                  <a:latin typeface="Roboto Condensed"/>
                   <a:ea typeface="Roboto Condensed" panose="02000000000000000000" pitchFamily="2" charset="0"/>
-                  <a:cs typeface="Roboto Condensed" panose="02000000000000000000" pitchFamily="2" charset="0"/>
+                  <a:cs typeface="Roboto Condensed"/>
                 </a:endParaRPr>
               </a:p>
             </p:txBody>
@@ -5201,8 +5202,8 @@
             </p:nvSpPr>
             <p:spPr>
               <a:xfrm>
-                <a:off x="2275034" y="2244377"/>
-                <a:ext cx="1175659" cy="473995"/>
+                <a:off x="2658780" y="2590123"/>
+                <a:ext cx="1025308" cy="435568"/>
               </a:xfrm>
               <a:prstGeom prst="rect">
                 <a:avLst/>
@@ -5234,17 +5235,17 @@
               <a:p>
                 <a:pPr algn="ctr"/>
                 <a:r>
-                  <a:rPr lang="en-US" sz="1600" dirty="0" smtClean="0">
-                    <a:latin typeface="Roboto Condensed" panose="02000000000000000000" pitchFamily="2" charset="0"/>
+                  <a:rPr lang="en-US" sz="1500" dirty="0" smtClean="0">
+                    <a:latin typeface="Roboto Condensed"/>
                     <a:ea typeface="Roboto Condensed" panose="02000000000000000000" pitchFamily="2" charset="0"/>
-                    <a:cs typeface="Roboto Condensed" panose="02000000000000000000" pitchFamily="2" charset="0"/>
+                    <a:cs typeface="Roboto Condensed"/>
                   </a:rPr>
                   <a:t>Fear</a:t>
                 </a:r>
-                <a:endParaRPr lang="en-US" sz="1600" dirty="0">
-                  <a:latin typeface="Roboto Condensed" panose="02000000000000000000" pitchFamily="2" charset="0"/>
+                <a:endParaRPr lang="en-US" sz="1500" dirty="0">
+                  <a:latin typeface="Roboto Condensed"/>
                   <a:ea typeface="Roboto Condensed" panose="02000000000000000000" pitchFamily="2" charset="0"/>
-                  <a:cs typeface="Roboto Condensed" panose="02000000000000000000" pitchFamily="2" charset="0"/>
+                  <a:cs typeface="Roboto Condensed"/>
                 </a:endParaRPr>
               </a:p>
             </p:txBody>
@@ -5257,8 +5258,8 @@
             </p:nvSpPr>
             <p:spPr>
               <a:xfrm>
-                <a:off x="4897501" y="2248477"/>
-                <a:ext cx="1175659" cy="473995"/>
+                <a:off x="4945869" y="2593531"/>
+                <a:ext cx="1025308" cy="432160"/>
               </a:xfrm>
               <a:prstGeom prst="rect">
                 <a:avLst/>
@@ -5290,17 +5291,17 @@
               <a:p>
                 <a:pPr algn="ctr"/>
                 <a:r>
-                  <a:rPr lang="en-US" sz="1600" dirty="0" smtClean="0">
-                    <a:latin typeface="Roboto Condensed" panose="02000000000000000000" pitchFamily="2" charset="0"/>
+                  <a:rPr lang="en-US" sz="1500" dirty="0" smtClean="0">
+                    <a:latin typeface="Roboto Condensed"/>
                     <a:ea typeface="Roboto Condensed" panose="02000000000000000000" pitchFamily="2" charset="0"/>
-                    <a:cs typeface="Roboto Condensed" panose="02000000000000000000" pitchFamily="2" charset="0"/>
+                    <a:cs typeface="Roboto Condensed"/>
                   </a:rPr>
                   <a:t>Sadness</a:t>
                 </a:r>
-                <a:endParaRPr lang="en-US" sz="1600" dirty="0">
-                  <a:latin typeface="Roboto Condensed" panose="02000000000000000000" pitchFamily="2" charset="0"/>
+                <a:endParaRPr lang="en-US" sz="1500" dirty="0">
+                  <a:latin typeface="Roboto Condensed"/>
                   <a:ea typeface="Roboto Condensed" panose="02000000000000000000" pitchFamily="2" charset="0"/>
-                  <a:cs typeface="Roboto Condensed" panose="02000000000000000000" pitchFamily="2" charset="0"/>
+                  <a:cs typeface="Roboto Condensed"/>
                 </a:endParaRPr>
               </a:p>
             </p:txBody>
@@ -5345,23 +5346,23 @@
             <a:p>
               <a:pPr algn="ctr"/>
               <a:r>
-                <a:rPr lang="en-US" sz="1600" dirty="0" smtClean="0">
+                <a:rPr lang="en-US" sz="1500" dirty="0" smtClean="0">
                   <a:solidFill>
                     <a:schemeClr val="tx1"/>
                   </a:solidFill>
-                  <a:latin typeface="Roboto Condensed" panose="02000000000000000000" pitchFamily="2" charset="0"/>
+                  <a:latin typeface="Roboto Condensed"/>
                   <a:ea typeface="Roboto Condensed" panose="02000000000000000000" pitchFamily="2" charset="0"/>
-                  <a:cs typeface="Roboto Condensed" panose="02000000000000000000" pitchFamily="2" charset="0"/>
+                  <a:cs typeface="Roboto Condensed"/>
                 </a:rPr>
                 <a:t>Crowd model</a:t>
               </a:r>
-              <a:endParaRPr lang="en-US" sz="1600" dirty="0">
+              <a:endParaRPr lang="en-US" sz="1500" dirty="0">
                 <a:solidFill>
                   <a:schemeClr val="tx1"/>
                 </a:solidFill>
-                <a:latin typeface="Roboto Condensed" panose="02000000000000000000" pitchFamily="2" charset="0"/>
+                <a:latin typeface="Roboto Condensed"/>
                 <a:ea typeface="Roboto Condensed" panose="02000000000000000000" pitchFamily="2" charset="0"/>
-                <a:cs typeface="Roboto Condensed" panose="02000000000000000000" pitchFamily="2" charset="0"/>
+                <a:cs typeface="Roboto Condensed"/>
               </a:endParaRPr>
             </a:p>
           </p:txBody>
@@ -5405,7 +5406,7 @@
             <a:p>
               <a:pPr algn="ctr"/>
               <a:r>
-                <a:rPr lang="en-US" sz="1600" dirty="0" smtClean="0">
+                <a:rPr lang="en-US" sz="1500" dirty="0" smtClean="0">
                   <a:solidFill>
                     <a:schemeClr val="tx1"/>
                   </a:solidFill>
@@ -5415,7 +5416,7 @@
                 </a:rPr>
                 <a:t>Context data</a:t>
               </a:r>
-              <a:endParaRPr lang="en-US" sz="1600" dirty="0">
+              <a:endParaRPr lang="en-US" sz="1500" dirty="0">
                 <a:solidFill>
                   <a:schemeClr val="tx1"/>
                 </a:solidFill>
@@ -5434,7 +5435,7 @@
           </p:nvGrpSpPr>
           <p:grpSpPr>
             <a:xfrm>
-              <a:off x="1317061" y="3393852"/>
+              <a:off x="1317061" y="3328479"/>
               <a:ext cx="4808064" cy="759951"/>
               <a:chOff x="736566" y="3806901"/>
               <a:chExt cx="5513116" cy="914333"/>
@@ -5476,10 +5477,10 @@
               <a:lstStyle/>
               <a:p>
                 <a:pPr algn="ctr"/>
-                <a:endParaRPr lang="en-US" sz="1600">
-                  <a:latin typeface="Roboto Condensed" panose="02000000000000000000" pitchFamily="2" charset="0"/>
+                <a:endParaRPr lang="en-US" sz="1500">
+                  <a:latin typeface="Roboto Condensed"/>
                   <a:ea typeface="Roboto Condensed" panose="02000000000000000000" pitchFamily="2" charset="0"/>
-                  <a:cs typeface="Roboto Condensed" panose="02000000000000000000" pitchFamily="2" charset="0"/>
+                  <a:cs typeface="Roboto Condensed"/>
                 </a:endParaRPr>
               </a:p>
             </p:txBody>
@@ -5522,17 +5523,17 @@
               <a:p>
                 <a:pPr algn="ctr"/>
                 <a:r>
-                  <a:rPr lang="en-US" sz="1600" dirty="0" smtClean="0">
-                    <a:latin typeface="Roboto Condensed" panose="02000000000000000000" pitchFamily="2" charset="0"/>
+                  <a:rPr lang="en-US" sz="1500" dirty="0" smtClean="0">
+                    <a:latin typeface="Roboto Condensed"/>
                     <a:ea typeface="Roboto Condensed" panose="02000000000000000000" pitchFamily="2" charset="0"/>
-                    <a:cs typeface="Roboto Condensed" panose="02000000000000000000" pitchFamily="2" charset="0"/>
+                    <a:cs typeface="Roboto Condensed"/>
                   </a:rPr>
                   <a:t>Emotion - Crowd type Mapping Model</a:t>
                 </a:r>
-                <a:endParaRPr lang="en-US" sz="1600" dirty="0">
-                  <a:latin typeface="Roboto Condensed" panose="02000000000000000000" pitchFamily="2" charset="0"/>
+                <a:endParaRPr lang="en-US" sz="1500" dirty="0">
+                  <a:latin typeface="Roboto Condensed"/>
                   <a:ea typeface="Roboto Condensed" panose="02000000000000000000" pitchFamily="2" charset="0"/>
-                  <a:cs typeface="Roboto Condensed" panose="02000000000000000000" pitchFamily="2" charset="0"/>
+                  <a:cs typeface="Roboto Condensed"/>
                 </a:endParaRPr>
               </a:p>
             </p:txBody>
@@ -5577,23 +5578,23 @@
             <a:p>
               <a:pPr algn="ctr"/>
               <a:r>
-                <a:rPr lang="en-US" sz="1600" dirty="0" smtClean="0">
+                <a:rPr lang="en-US" sz="1500" dirty="0" smtClean="0">
                   <a:solidFill>
                     <a:schemeClr val="tx1"/>
                   </a:solidFill>
-                  <a:latin typeface="Roboto Condensed" panose="02000000000000000000" pitchFamily="2" charset="0"/>
+                  <a:latin typeface="Roboto Condensed"/>
                   <a:ea typeface="Roboto Condensed" panose="02000000000000000000" pitchFamily="2" charset="0"/>
-                  <a:cs typeface="Roboto Condensed" panose="02000000000000000000" pitchFamily="2" charset="0"/>
+                  <a:cs typeface="Roboto Condensed"/>
                 </a:rPr>
                 <a:t>Emotion model</a:t>
               </a:r>
-              <a:endParaRPr lang="en-US" sz="1600" dirty="0">
+              <a:endParaRPr lang="en-US" sz="1500" dirty="0">
                 <a:solidFill>
                   <a:schemeClr val="tx1"/>
                 </a:solidFill>
-                <a:latin typeface="Roboto Condensed" panose="02000000000000000000" pitchFamily="2" charset="0"/>
+                <a:latin typeface="Roboto Condensed"/>
                 <a:ea typeface="Roboto Condensed" panose="02000000000000000000" pitchFamily="2" charset="0"/>
-                <a:cs typeface="Roboto Condensed" panose="02000000000000000000" pitchFamily="2" charset="0"/>
+                <a:cs typeface="Roboto Condensed"/>
               </a:endParaRPr>
             </a:p>
           </p:txBody>
@@ -5653,10 +5654,10 @@
               <a:lstStyle/>
               <a:p>
                 <a:pPr algn="ctr"/>
-                <a:endParaRPr lang="en-US" sz="1600">
-                  <a:latin typeface="Roboto Condensed" panose="02000000000000000000" pitchFamily="2" charset="0"/>
+                <a:endParaRPr lang="en-US" sz="1500">
+                  <a:latin typeface="Roboto Condensed"/>
                   <a:ea typeface="Roboto Condensed" panose="02000000000000000000" pitchFamily="2" charset="0"/>
-                  <a:cs typeface="Roboto Condensed" panose="02000000000000000000" pitchFamily="2" charset="0"/>
+                  <a:cs typeface="Roboto Condensed"/>
                 </a:endParaRPr>
               </a:p>
             </p:txBody>
@@ -5702,17 +5703,17 @@
               <a:p>
                 <a:pPr algn="ctr"/>
                 <a:r>
-                  <a:rPr lang="en-US" sz="1600" dirty="0" smtClean="0">
-                    <a:latin typeface="Roboto Condensed" panose="02000000000000000000" pitchFamily="2" charset="0"/>
+                  <a:rPr lang="en-US" sz="1500" dirty="0" smtClean="0">
+                    <a:latin typeface="Roboto Condensed"/>
                     <a:ea typeface="Roboto Condensed" panose="02000000000000000000" pitchFamily="2" charset="0"/>
-                    <a:cs typeface="Roboto Condensed" panose="02000000000000000000" pitchFamily="2" charset="0"/>
+                    <a:cs typeface="Roboto Condensed"/>
                   </a:rPr>
                   <a:t>Ambulatory</a:t>
                 </a:r>
-                <a:endParaRPr lang="en-US" sz="1600" dirty="0">
-                  <a:latin typeface="Roboto Condensed" panose="02000000000000000000" pitchFamily="2" charset="0"/>
+                <a:endParaRPr lang="en-US" sz="1500" dirty="0">
+                  <a:latin typeface="Roboto Condensed"/>
                   <a:ea typeface="Roboto Condensed" panose="02000000000000000000" pitchFamily="2" charset="0"/>
-                  <a:cs typeface="Roboto Condensed" panose="02000000000000000000" pitchFamily="2" charset="0"/>
+                  <a:cs typeface="Roboto Condensed"/>
                 </a:endParaRPr>
               </a:p>
             </p:txBody>
@@ -5758,17 +5759,17 @@
               <a:p>
                 <a:pPr algn="ctr"/>
                 <a:r>
-                  <a:rPr lang="en-US" sz="1600" dirty="0" smtClean="0">
-                    <a:latin typeface="Roboto Condensed" panose="02000000000000000000" pitchFamily="2" charset="0"/>
+                  <a:rPr lang="en-US" sz="1500" dirty="0" smtClean="0">
+                    <a:latin typeface="Roboto Condensed"/>
                     <a:ea typeface="Roboto Condensed" panose="02000000000000000000" pitchFamily="2" charset="0"/>
-                    <a:cs typeface="Roboto Condensed" panose="02000000000000000000" pitchFamily="2" charset="0"/>
+                    <a:cs typeface="Roboto Condensed"/>
                   </a:rPr>
                   <a:t>Limited movement</a:t>
                 </a:r>
-                <a:endParaRPr lang="en-US" sz="1600" dirty="0">
-                  <a:latin typeface="Roboto Condensed" panose="02000000000000000000" pitchFamily="2" charset="0"/>
+                <a:endParaRPr lang="en-US" sz="1500" dirty="0">
+                  <a:latin typeface="Roboto Condensed"/>
                   <a:ea typeface="Roboto Condensed" panose="02000000000000000000" pitchFamily="2" charset="0"/>
-                  <a:cs typeface="Roboto Condensed" panose="02000000000000000000" pitchFamily="2" charset="0"/>
+                  <a:cs typeface="Roboto Condensed"/>
                 </a:endParaRPr>
               </a:p>
             </p:txBody>
@@ -5814,17 +5815,17 @@
               <a:p>
                 <a:pPr algn="ctr"/>
                 <a:r>
-                  <a:rPr lang="en-US" sz="1600" dirty="0" smtClean="0">
-                    <a:latin typeface="Roboto Condensed" panose="02000000000000000000" pitchFamily="2" charset="0"/>
+                  <a:rPr lang="en-US" sz="1500" dirty="0" smtClean="0">
+                    <a:latin typeface="Roboto Condensed"/>
                     <a:ea typeface="Roboto Condensed" panose="02000000000000000000" pitchFamily="2" charset="0"/>
-                    <a:cs typeface="Roboto Condensed" panose="02000000000000000000" pitchFamily="2" charset="0"/>
+                    <a:cs typeface="Roboto Condensed"/>
                   </a:rPr>
                   <a:t>Spectator</a:t>
                 </a:r>
-                <a:endParaRPr lang="en-US" sz="1600" dirty="0">
-                  <a:latin typeface="Roboto Condensed" panose="02000000000000000000" pitchFamily="2" charset="0"/>
+                <a:endParaRPr lang="en-US" sz="1500" dirty="0">
+                  <a:latin typeface="Roboto Condensed"/>
                   <a:ea typeface="Roboto Condensed" panose="02000000000000000000" pitchFamily="2" charset="0"/>
-                  <a:cs typeface="Roboto Condensed" panose="02000000000000000000" pitchFamily="2" charset="0"/>
+                  <a:cs typeface="Roboto Condensed"/>
                 </a:endParaRPr>
               </a:p>
             </p:txBody>
@@ -5870,17 +5871,17 @@
               <a:p>
                 <a:pPr algn="ctr"/>
                 <a:r>
-                  <a:rPr lang="en-US" sz="1600" dirty="0" smtClean="0">
-                    <a:latin typeface="Roboto Condensed" panose="02000000000000000000" pitchFamily="2" charset="0"/>
+                  <a:rPr lang="en-US" sz="1500" dirty="0" smtClean="0">
+                    <a:latin typeface="Roboto Condensed"/>
                     <a:ea typeface="Roboto Condensed" panose="02000000000000000000" pitchFamily="2" charset="0"/>
-                    <a:cs typeface="Roboto Condensed" panose="02000000000000000000" pitchFamily="2" charset="0"/>
+                    <a:cs typeface="Roboto Condensed"/>
                   </a:rPr>
                   <a:t>Participatory</a:t>
                 </a:r>
-                <a:endParaRPr lang="en-US" sz="1600" dirty="0">
-                  <a:latin typeface="Roboto Condensed" panose="02000000000000000000" pitchFamily="2" charset="0"/>
+                <a:endParaRPr lang="en-US" sz="1500" dirty="0">
+                  <a:latin typeface="Roboto Condensed"/>
                   <a:ea typeface="Roboto Condensed" panose="02000000000000000000" pitchFamily="2" charset="0"/>
-                  <a:cs typeface="Roboto Condensed" panose="02000000000000000000" pitchFamily="2" charset="0"/>
+                  <a:cs typeface="Roboto Condensed"/>
                 </a:endParaRPr>
               </a:p>
             </p:txBody>
@@ -5926,17 +5927,17 @@
               <a:p>
                 <a:pPr algn="ctr"/>
                 <a:r>
-                  <a:rPr lang="en-US" sz="1600" dirty="0" smtClean="0">
-                    <a:latin typeface="Roboto Condensed" panose="02000000000000000000" pitchFamily="2" charset="0"/>
+                  <a:rPr lang="en-US" sz="1500" dirty="0" smtClean="0">
+                    <a:latin typeface="Roboto Condensed"/>
                     <a:ea typeface="Roboto Condensed" panose="02000000000000000000" pitchFamily="2" charset="0"/>
-                    <a:cs typeface="Roboto Condensed" panose="02000000000000000000" pitchFamily="2" charset="0"/>
+                    <a:cs typeface="Roboto Condensed"/>
                   </a:rPr>
                   <a:t>Expressive</a:t>
                 </a:r>
-                <a:endParaRPr lang="en-US" sz="1600" dirty="0">
-                  <a:latin typeface="Roboto Condensed" panose="02000000000000000000" pitchFamily="2" charset="0"/>
+                <a:endParaRPr lang="en-US" sz="1500" dirty="0">
+                  <a:latin typeface="Roboto Condensed"/>
                   <a:ea typeface="Roboto Condensed" panose="02000000000000000000" pitchFamily="2" charset="0"/>
-                  <a:cs typeface="Roboto Condensed" panose="02000000000000000000" pitchFamily="2" charset="0"/>
+                  <a:cs typeface="Roboto Condensed"/>
                 </a:endParaRPr>
               </a:p>
             </p:txBody>
@@ -5982,17 +5983,17 @@
               <a:p>
                 <a:pPr algn="ctr"/>
                 <a:r>
-                  <a:rPr lang="en-US" sz="1600" dirty="0" smtClean="0">
-                    <a:latin typeface="Roboto Condensed" panose="02000000000000000000" pitchFamily="2" charset="0"/>
+                  <a:rPr lang="en-US" sz="1500" dirty="0" smtClean="0">
+                    <a:latin typeface="Roboto Condensed"/>
                     <a:ea typeface="Roboto Condensed" panose="02000000000000000000" pitchFamily="2" charset="0"/>
-                    <a:cs typeface="Roboto Condensed" panose="02000000000000000000" pitchFamily="2" charset="0"/>
+                    <a:cs typeface="Roboto Condensed"/>
                   </a:rPr>
                   <a:t>Aggressive</a:t>
                 </a:r>
-                <a:endParaRPr lang="en-US" sz="1600" dirty="0">
-                  <a:latin typeface="Roboto Condensed" panose="02000000000000000000" pitchFamily="2" charset="0"/>
+                <a:endParaRPr lang="en-US" sz="1500" dirty="0">
+                  <a:latin typeface="Roboto Condensed"/>
                   <a:ea typeface="Roboto Condensed" panose="02000000000000000000" pitchFamily="2" charset="0"/>
-                  <a:cs typeface="Roboto Condensed" panose="02000000000000000000" pitchFamily="2" charset="0"/>
+                  <a:cs typeface="Roboto Condensed"/>
                 </a:endParaRPr>
               </a:p>
             </p:txBody>
@@ -6038,17 +6039,17 @@
               <a:p>
                 <a:pPr algn="ctr"/>
                 <a:r>
-                  <a:rPr lang="en-US" sz="1600" dirty="0" smtClean="0">
-                    <a:latin typeface="Roboto Condensed" panose="02000000000000000000" pitchFamily="2" charset="0"/>
+                  <a:rPr lang="en-US" sz="1500" dirty="0" smtClean="0">
+                    <a:latin typeface="Roboto Condensed"/>
                     <a:ea typeface="Roboto Condensed" panose="02000000000000000000" pitchFamily="2" charset="0"/>
-                    <a:cs typeface="Roboto Condensed" panose="02000000000000000000" pitchFamily="2" charset="0"/>
+                    <a:cs typeface="Roboto Condensed"/>
                   </a:rPr>
                   <a:t>Demonstrator</a:t>
                 </a:r>
-                <a:endParaRPr lang="en-US" sz="1600" dirty="0">
-                  <a:latin typeface="Roboto Condensed" panose="02000000000000000000" pitchFamily="2" charset="0"/>
+                <a:endParaRPr lang="en-US" sz="1500" dirty="0">
+                  <a:latin typeface="Roboto Condensed"/>
                   <a:ea typeface="Roboto Condensed" panose="02000000000000000000" pitchFamily="2" charset="0"/>
-                  <a:cs typeface="Roboto Condensed" panose="02000000000000000000" pitchFamily="2" charset="0"/>
+                  <a:cs typeface="Roboto Condensed"/>
                 </a:endParaRPr>
               </a:p>
             </p:txBody>
@@ -6094,17 +6095,17 @@
               <a:p>
                 <a:pPr algn="ctr"/>
                 <a:r>
-                  <a:rPr lang="en-US" sz="1600" dirty="0" smtClean="0">
-                    <a:latin typeface="Roboto Condensed" panose="02000000000000000000" pitchFamily="2" charset="0"/>
+                  <a:rPr lang="en-US" sz="1500" dirty="0" smtClean="0">
+                    <a:latin typeface="Roboto Condensed"/>
                     <a:ea typeface="Roboto Condensed" panose="02000000000000000000" pitchFamily="2" charset="0"/>
-                    <a:cs typeface="Roboto Condensed" panose="02000000000000000000" pitchFamily="2" charset="0"/>
+                    <a:cs typeface="Roboto Condensed"/>
                   </a:rPr>
                   <a:t>Escaping</a:t>
                 </a:r>
-                <a:endParaRPr lang="en-US" sz="1600" dirty="0">
-                  <a:latin typeface="Roboto Condensed" panose="02000000000000000000" pitchFamily="2" charset="0"/>
+                <a:endParaRPr lang="en-US" sz="1500" dirty="0">
+                  <a:latin typeface="Roboto Condensed"/>
                   <a:ea typeface="Roboto Condensed" panose="02000000000000000000" pitchFamily="2" charset="0"/>
-                  <a:cs typeface="Roboto Condensed" panose="02000000000000000000" pitchFamily="2" charset="0"/>
+                  <a:cs typeface="Roboto Condensed"/>
                 </a:endParaRPr>
               </a:p>
             </p:txBody>
@@ -6150,17 +6151,17 @@
               <a:p>
                 <a:pPr algn="ctr"/>
                 <a:r>
-                  <a:rPr lang="en-US" sz="1600" dirty="0" smtClean="0">
-                    <a:latin typeface="Roboto Condensed" panose="02000000000000000000" pitchFamily="2" charset="0"/>
+                  <a:rPr lang="en-US" sz="1500" dirty="0" smtClean="0">
+                    <a:latin typeface="Roboto Condensed"/>
                     <a:ea typeface="Roboto Condensed" panose="02000000000000000000" pitchFamily="2" charset="0"/>
-                    <a:cs typeface="Roboto Condensed" panose="02000000000000000000" pitchFamily="2" charset="0"/>
+                    <a:cs typeface="Roboto Condensed"/>
                   </a:rPr>
                   <a:t>Dense</a:t>
                 </a:r>
-                <a:endParaRPr lang="en-US" sz="1600" dirty="0">
-                  <a:latin typeface="Roboto Condensed" panose="02000000000000000000" pitchFamily="2" charset="0"/>
+                <a:endParaRPr lang="en-US" sz="1500" dirty="0">
+                  <a:latin typeface="Roboto Condensed"/>
                   <a:ea typeface="Roboto Condensed" panose="02000000000000000000" pitchFamily="2" charset="0"/>
-                  <a:cs typeface="Roboto Condensed" panose="02000000000000000000" pitchFamily="2" charset="0"/>
+                  <a:cs typeface="Roboto Condensed"/>
                 </a:endParaRPr>
               </a:p>
             </p:txBody>
@@ -6206,17 +6207,17 @@
               <a:p>
                 <a:pPr algn="ctr"/>
                 <a:r>
-                  <a:rPr lang="en-US" sz="1600" dirty="0" smtClean="0">
-                    <a:latin typeface="Roboto Condensed" panose="02000000000000000000" pitchFamily="2" charset="0"/>
+                  <a:rPr lang="en-US" sz="1500" dirty="0" smtClean="0">
+                    <a:latin typeface="Roboto Condensed"/>
                     <a:ea typeface="Roboto Condensed" panose="02000000000000000000" pitchFamily="2" charset="0"/>
-                    <a:cs typeface="Roboto Condensed" panose="02000000000000000000" pitchFamily="2" charset="0"/>
+                    <a:cs typeface="Roboto Condensed"/>
                   </a:rPr>
                   <a:t>Rushing</a:t>
                 </a:r>
-                <a:endParaRPr lang="en-US" sz="1600" dirty="0">
-                  <a:latin typeface="Roboto Condensed" panose="02000000000000000000" pitchFamily="2" charset="0"/>
+                <a:endParaRPr lang="en-US" sz="1500" dirty="0">
+                  <a:latin typeface="Roboto Condensed"/>
                   <a:ea typeface="Roboto Condensed" panose="02000000000000000000" pitchFamily="2" charset="0"/>
-                  <a:cs typeface="Roboto Condensed" panose="02000000000000000000" pitchFamily="2" charset="0"/>
+                  <a:cs typeface="Roboto Condensed"/>
                 </a:endParaRPr>
               </a:p>
             </p:txBody>
@@ -6262,17 +6263,17 @@
               <a:p>
                 <a:pPr algn="ctr"/>
                 <a:r>
-                  <a:rPr lang="en-US" sz="1600" dirty="0" smtClean="0">
-                    <a:latin typeface="Roboto Condensed" panose="02000000000000000000" pitchFamily="2" charset="0"/>
+                  <a:rPr lang="en-US" sz="1500" dirty="0" smtClean="0">
+                    <a:latin typeface="Roboto Condensed"/>
                     <a:ea typeface="Roboto Condensed" panose="02000000000000000000" pitchFamily="2" charset="0"/>
-                    <a:cs typeface="Roboto Condensed" panose="02000000000000000000" pitchFamily="2" charset="0"/>
+                    <a:cs typeface="Roboto Condensed"/>
                   </a:rPr>
                   <a:t>Violent</a:t>
                 </a:r>
-                <a:endParaRPr lang="en-US" sz="1600" dirty="0">
-                  <a:latin typeface="Roboto Condensed" panose="02000000000000000000" pitchFamily="2" charset="0"/>
+                <a:endParaRPr lang="en-US" sz="1500" dirty="0">
+                  <a:latin typeface="Roboto Condensed"/>
                   <a:ea typeface="Roboto Condensed" panose="02000000000000000000" pitchFamily="2" charset="0"/>
-                  <a:cs typeface="Roboto Condensed" panose="02000000000000000000" pitchFamily="2" charset="0"/>
+                  <a:cs typeface="Roboto Condensed"/>
                 </a:endParaRPr>
               </a:p>
             </p:txBody>
@@ -6316,399 +6317,23 @@
               <a:p>
                 <a:pPr algn="ctr"/>
                 <a:r>
-                  <a:rPr lang="en-US" sz="1600" dirty="0" smtClean="0">
+                  <a:rPr lang="en-US" sz="1500" dirty="0" smtClean="0">
                     <a:solidFill>
                       <a:schemeClr val="tx1"/>
                     </a:solidFill>
-                    <a:latin typeface="Roboto Condensed" panose="02000000000000000000" pitchFamily="2" charset="0"/>
+                    <a:latin typeface="Roboto Condensed"/>
                     <a:ea typeface="Roboto Condensed" panose="02000000000000000000" pitchFamily="2" charset="0"/>
-                    <a:cs typeface="Roboto Condensed" panose="02000000000000000000" pitchFamily="2" charset="0"/>
+                    <a:cs typeface="Roboto Condensed"/>
                   </a:rPr>
                   <a:t>Crowd types</a:t>
                 </a:r>
-                <a:endParaRPr lang="en-US" sz="1600" dirty="0">
+                <a:endParaRPr lang="en-US" sz="1500" dirty="0">
                   <a:solidFill>
                     <a:schemeClr val="tx1"/>
                   </a:solidFill>
-                  <a:latin typeface="Roboto Condensed" panose="02000000000000000000" pitchFamily="2" charset="0"/>
+                  <a:latin typeface="Roboto Condensed"/>
                   <a:ea typeface="Roboto Condensed" panose="02000000000000000000" pitchFamily="2" charset="0"/>
-                  <a:cs typeface="Roboto Condensed" panose="02000000000000000000" pitchFamily="2" charset="0"/>
-                </a:endParaRPr>
-              </a:p>
-            </p:txBody>
-          </p:sp>
-        </p:grpSp>
-        <p:grpSp>
-          <p:nvGrpSpPr>
-            <p:cNvPr id="11" name="Group 10"/>
-            <p:cNvGrpSpPr/>
-            <p:nvPr/>
-          </p:nvGrpSpPr>
-          <p:grpSpPr>
-            <a:xfrm>
-              <a:off x="6318188" y="2426733"/>
-              <a:ext cx="1903217" cy="4297025"/>
-              <a:chOff x="6318188" y="2426733"/>
-              <a:chExt cx="1903217" cy="4297025"/>
-            </a:xfrm>
-          </p:grpSpPr>
-          <p:sp>
-            <p:nvSpPr>
-              <p:cNvPr id="58" name="Rounded Rectangle 57"/>
-              <p:cNvSpPr/>
-              <p:nvPr/>
-            </p:nvSpPr>
-            <p:spPr>
-              <a:xfrm>
-                <a:off x="6318188" y="2426733"/>
-                <a:ext cx="1470267" cy="4297025"/>
-              </a:xfrm>
-              <a:prstGeom prst="roundRect">
-                <a:avLst>
-                  <a:gd name="adj" fmla="val 2912"/>
-                </a:avLst>
-              </a:prstGeom>
-            </p:spPr>
-            <p:style>
-              <a:lnRef idx="2">
-                <a:schemeClr val="accent1"/>
-              </a:lnRef>
-              <a:fillRef idx="1">
-                <a:schemeClr val="lt1"/>
-              </a:fillRef>
-              <a:effectRef idx="0">
-                <a:schemeClr val="accent1"/>
-              </a:effectRef>
-              <a:fontRef idx="minor">
-                <a:schemeClr val="dk1"/>
-              </a:fontRef>
-            </p:style>
-            <p:txBody>
-              <a:bodyPr rtlCol="0" anchor="ctr"/>
-              <a:lstStyle/>
-              <a:p>
-                <a:pPr algn="ctr"/>
-                <a:endParaRPr lang="en-US" sz="1600">
-                  <a:latin typeface="Roboto Condensed" panose="02000000000000000000" pitchFamily="2" charset="0"/>
-                  <a:ea typeface="Roboto Condensed" panose="02000000000000000000" pitchFamily="2" charset="0"/>
-                  <a:cs typeface="Roboto Condensed" panose="02000000000000000000" pitchFamily="2" charset="0"/>
-                </a:endParaRPr>
-              </a:p>
-            </p:txBody>
-          </p:sp>
-          <p:sp>
-            <p:nvSpPr>
-              <p:cNvPr id="59" name="Rectangle 58"/>
-              <p:cNvSpPr/>
-              <p:nvPr/>
-            </p:nvSpPr>
-            <p:spPr>
-              <a:xfrm>
-                <a:off x="6499432" y="2588485"/>
-                <a:ext cx="1091450" cy="390635"/>
-              </a:xfrm>
-              <a:prstGeom prst="rect">
-                <a:avLst/>
-              </a:prstGeom>
-              <a:ln>
-                <a:noFill/>
-              </a:ln>
-            </p:spPr>
-            <p:style>
-              <a:lnRef idx="3">
-                <a:schemeClr val="lt1"/>
-              </a:lnRef>
-              <a:fillRef idx="1">
-                <a:schemeClr val="accent1"/>
-              </a:fillRef>
-              <a:effectRef idx="1">
-                <a:schemeClr val="accent1"/>
-              </a:effectRef>
-              <a:fontRef idx="minor">
-                <a:schemeClr val="lt1"/>
-              </a:fontRef>
-            </p:style>
-            <p:txBody>
-              <a:bodyPr rtlCol="0" anchor="ctr"/>
-              <a:lstStyle/>
-              <a:p>
-                <a:pPr algn="ctr"/>
-                <a:r>
-                  <a:rPr lang="en-US" sz="1600" dirty="0" err="1" smtClean="0">
-                    <a:latin typeface="Roboto Condensed" panose="02000000000000000000" pitchFamily="2" charset="0"/>
-                    <a:ea typeface="Roboto Condensed" panose="02000000000000000000" pitchFamily="2" charset="0"/>
-                    <a:cs typeface="Roboto Condensed" panose="02000000000000000000" pitchFamily="2" charset="0"/>
-                  </a:rPr>
-                  <a:t>Fuzzifier</a:t>
-                </a:r>
-                <a:endParaRPr lang="en-US" sz="1600" dirty="0">
-                  <a:latin typeface="Roboto Condensed" panose="02000000000000000000" pitchFamily="2" charset="0"/>
-                  <a:ea typeface="Roboto Condensed" panose="02000000000000000000" pitchFamily="2" charset="0"/>
-                  <a:cs typeface="Roboto Condensed" panose="02000000000000000000" pitchFamily="2" charset="0"/>
-                </a:endParaRPr>
-              </a:p>
-            </p:txBody>
-          </p:sp>
-          <p:sp>
-            <p:nvSpPr>
-              <p:cNvPr id="60" name="Rectangle 59"/>
-              <p:cNvSpPr/>
-              <p:nvPr/>
-            </p:nvSpPr>
-            <p:spPr>
-              <a:xfrm>
-                <a:off x="6504017" y="3567328"/>
-                <a:ext cx="1091450" cy="1242028"/>
-              </a:xfrm>
-              <a:prstGeom prst="rect">
-                <a:avLst/>
-              </a:prstGeom>
-              <a:ln>
-                <a:noFill/>
-              </a:ln>
-            </p:spPr>
-            <p:style>
-              <a:lnRef idx="3">
-                <a:schemeClr val="lt1"/>
-              </a:lnRef>
-              <a:fillRef idx="1">
-                <a:schemeClr val="accent1"/>
-              </a:fillRef>
-              <a:effectRef idx="1">
-                <a:schemeClr val="accent1"/>
-              </a:effectRef>
-              <a:fontRef idx="minor">
-                <a:schemeClr val="lt1"/>
-              </a:fontRef>
-            </p:style>
-            <p:txBody>
-              <a:bodyPr rtlCol="0" anchor="ctr"/>
-              <a:lstStyle/>
-              <a:p>
-                <a:pPr algn="ctr"/>
-                <a:r>
-                  <a:rPr lang="en-US" sz="1600" dirty="0" smtClean="0">
-                    <a:latin typeface="Roboto Condensed" panose="02000000000000000000" pitchFamily="2" charset="0"/>
-                    <a:ea typeface="Roboto Condensed" panose="02000000000000000000" pitchFamily="2" charset="0"/>
-                    <a:cs typeface="Roboto Condensed" panose="02000000000000000000" pitchFamily="2" charset="0"/>
-                  </a:rPr>
-                  <a:t>Inference Engine</a:t>
-                </a:r>
-                <a:endParaRPr lang="en-US" sz="1600" dirty="0">
-                  <a:latin typeface="Roboto Condensed" panose="02000000000000000000" pitchFamily="2" charset="0"/>
-                  <a:ea typeface="Roboto Condensed" panose="02000000000000000000" pitchFamily="2" charset="0"/>
-                  <a:cs typeface="Roboto Condensed" panose="02000000000000000000" pitchFamily="2" charset="0"/>
-                </a:endParaRPr>
-              </a:p>
-            </p:txBody>
-          </p:sp>
-          <p:sp>
-            <p:nvSpPr>
-              <p:cNvPr id="3" name="Flowchart: Magnetic Disk 2"/>
-              <p:cNvSpPr/>
-              <p:nvPr/>
-            </p:nvSpPr>
-            <p:spPr>
-              <a:xfrm>
-                <a:off x="6502567" y="5397683"/>
-                <a:ext cx="1089776" cy="1139304"/>
-              </a:xfrm>
-              <a:prstGeom prst="flowChartMagneticDisk">
-                <a:avLst/>
-              </a:prstGeom>
-              <a:ln>
-                <a:solidFill>
-                  <a:schemeClr val="bg1"/>
-                </a:solidFill>
-              </a:ln>
-            </p:spPr>
-            <p:style>
-              <a:lnRef idx="3">
-                <a:schemeClr val="lt1"/>
-              </a:lnRef>
-              <a:fillRef idx="1">
-                <a:schemeClr val="accent1"/>
-              </a:fillRef>
-              <a:effectRef idx="1">
-                <a:schemeClr val="accent1"/>
-              </a:effectRef>
-              <a:fontRef idx="minor">
-                <a:schemeClr val="lt1"/>
-              </a:fontRef>
-            </p:style>
-            <p:txBody>
-              <a:bodyPr rtlCol="0" anchor="ctr"/>
-              <a:lstStyle/>
-              <a:p>
-                <a:pPr algn="ctr"/>
-                <a:r>
-                  <a:rPr lang="en-US" sz="1600" dirty="0" smtClean="0">
-                    <a:latin typeface="Roboto Condensed" panose="02000000000000000000" pitchFamily="2" charset="0"/>
-                    <a:ea typeface="Roboto Condensed" panose="02000000000000000000" pitchFamily="2" charset="0"/>
-                    <a:cs typeface="Roboto Condensed" panose="02000000000000000000" pitchFamily="2" charset="0"/>
-                  </a:rPr>
-                  <a:t>Rule repository</a:t>
-                </a:r>
-                <a:endParaRPr lang="en-US" sz="1600" dirty="0">
-                  <a:latin typeface="Roboto Condensed" panose="02000000000000000000" pitchFamily="2" charset="0"/>
-                  <a:ea typeface="Roboto Condensed" panose="02000000000000000000" pitchFamily="2" charset="0"/>
-                  <a:cs typeface="Roboto Condensed" panose="02000000000000000000" pitchFamily="2" charset="0"/>
-                </a:endParaRPr>
-              </a:p>
-            </p:txBody>
-          </p:sp>
-          <p:sp>
-            <p:nvSpPr>
-              <p:cNvPr id="77" name="Down Arrow 76"/>
-              <p:cNvSpPr/>
-              <p:nvPr/>
-            </p:nvSpPr>
-            <p:spPr>
-              <a:xfrm>
-                <a:off x="6764574" y="3076921"/>
-                <a:ext cx="589013" cy="398099"/>
-              </a:xfrm>
-              <a:prstGeom prst="downArrow">
-                <a:avLst/>
-              </a:prstGeom>
-              <a:solidFill>
-                <a:schemeClr val="accent1">
-                  <a:lumMod val="60000"/>
-                  <a:lumOff val="40000"/>
-                </a:schemeClr>
-              </a:solidFill>
-            </p:spPr>
-            <p:style>
-              <a:lnRef idx="3">
-                <a:schemeClr val="lt1"/>
-              </a:lnRef>
-              <a:fillRef idx="1">
-                <a:schemeClr val="accent3"/>
-              </a:fillRef>
-              <a:effectRef idx="1">
-                <a:schemeClr val="accent3"/>
-              </a:effectRef>
-              <a:fontRef idx="minor">
-                <a:schemeClr val="lt1"/>
-              </a:fontRef>
-            </p:style>
-            <p:txBody>
-              <a:bodyPr rtlCol="0" anchor="ctr"/>
-              <a:lstStyle/>
-              <a:p>
-                <a:pPr algn="ctr"/>
-                <a:endParaRPr lang="en-US" sz="1600">
-                  <a:latin typeface="Roboto Condensed" panose="02000000000000000000" pitchFamily="2" charset="0"/>
-                  <a:ea typeface="Roboto Condensed" panose="02000000000000000000" pitchFamily="2" charset="0"/>
-                  <a:cs typeface="Roboto Condensed" panose="02000000000000000000" pitchFamily="2" charset="0"/>
-                </a:endParaRPr>
-              </a:p>
-            </p:txBody>
-          </p:sp>
-          <p:sp>
-            <p:nvSpPr>
-              <p:cNvPr id="79" name="Down Arrow 78"/>
-              <p:cNvSpPr/>
-              <p:nvPr/>
-            </p:nvSpPr>
-            <p:spPr>
-              <a:xfrm rot="10800000">
-                <a:off x="6764759" y="4889241"/>
-                <a:ext cx="561349" cy="417718"/>
-              </a:xfrm>
-              <a:prstGeom prst="downArrow">
-                <a:avLst/>
-              </a:prstGeom>
-              <a:solidFill>
-                <a:schemeClr val="accent1">
-                  <a:lumMod val="60000"/>
-                  <a:lumOff val="40000"/>
-                </a:schemeClr>
-              </a:solidFill>
-            </p:spPr>
-            <p:style>
-              <a:lnRef idx="3">
-                <a:schemeClr val="lt1"/>
-              </a:lnRef>
-              <a:fillRef idx="1">
-                <a:schemeClr val="accent3"/>
-              </a:fillRef>
-              <a:effectRef idx="1">
-                <a:schemeClr val="accent3"/>
-              </a:effectRef>
-              <a:fontRef idx="minor">
-                <a:schemeClr val="lt1"/>
-              </a:fontRef>
-            </p:style>
-            <p:txBody>
-              <a:bodyPr rtlCol="0" anchor="ctr"/>
-              <a:lstStyle/>
-              <a:p>
-                <a:pPr algn="ctr"/>
-                <a:endParaRPr lang="en-US" sz="1600">
-                  <a:latin typeface="Roboto Condensed" panose="02000000000000000000" pitchFamily="2" charset="0"/>
-                  <a:ea typeface="Roboto Condensed" panose="02000000000000000000" pitchFamily="2" charset="0"/>
-                  <a:cs typeface="Roboto Condensed" panose="02000000000000000000" pitchFamily="2" charset="0"/>
-                </a:endParaRPr>
-              </a:p>
-            </p:txBody>
-          </p:sp>
-          <p:sp>
-            <p:nvSpPr>
-              <p:cNvPr id="88" name="Rectangle 87"/>
-              <p:cNvSpPr/>
-              <p:nvPr/>
-            </p:nvSpPr>
-            <p:spPr>
-              <a:xfrm rot="5400000">
-                <a:off x="5823422" y="4325774"/>
-                <a:ext cx="4289296" cy="506671"/>
-              </a:xfrm>
-              <a:prstGeom prst="rect">
-                <a:avLst/>
-              </a:prstGeom>
-              <a:noFill/>
-              <a:ln>
-                <a:noFill/>
-              </a:ln>
-            </p:spPr>
-            <p:style>
-              <a:lnRef idx="3">
-                <a:schemeClr val="lt1"/>
-              </a:lnRef>
-              <a:fillRef idx="1">
-                <a:schemeClr val="accent6"/>
-              </a:fillRef>
-              <a:effectRef idx="1">
-                <a:schemeClr val="accent6"/>
-              </a:effectRef>
-              <a:fontRef idx="minor">
-                <a:schemeClr val="lt1"/>
-              </a:fontRef>
-            </p:style>
-            <p:txBody>
-              <a:bodyPr rtlCol="0" anchor="ctr"/>
-              <a:lstStyle/>
-              <a:p>
-                <a:pPr algn="ctr"/>
-                <a:r>
-                  <a:rPr lang="en-US" sz="1600" dirty="0" smtClean="0">
-                    <a:solidFill>
-                      <a:schemeClr val="tx1"/>
-                    </a:solidFill>
-                    <a:latin typeface="Roboto Condensed" panose="02000000000000000000" pitchFamily="2" charset="0"/>
-                    <a:ea typeface="Roboto Condensed" panose="02000000000000000000" pitchFamily="2" charset="0"/>
-                    <a:cs typeface="Roboto Condensed" panose="02000000000000000000" pitchFamily="2" charset="0"/>
-                  </a:rPr>
-                  <a:t>Rule-based reasoning</a:t>
-                </a:r>
-                <a:endParaRPr lang="en-US" sz="1600" dirty="0">
-                  <a:solidFill>
-                    <a:schemeClr val="tx1"/>
-                  </a:solidFill>
-                  <a:latin typeface="Roboto Condensed" panose="02000000000000000000" pitchFamily="2" charset="0"/>
-                  <a:ea typeface="Roboto Condensed" panose="02000000000000000000" pitchFamily="2" charset="0"/>
-                  <a:cs typeface="Roboto Condensed" panose="02000000000000000000" pitchFamily="2" charset="0"/>
+                  <a:cs typeface="Roboto Condensed"/>
                 </a:endParaRPr>
               </a:p>
             </p:txBody>
@@ -6772,10 +6397,10 @@
               <a:lstStyle/>
               <a:p>
                 <a:pPr algn="ctr"/>
-                <a:endParaRPr lang="en-US" sz="1600">
-                  <a:latin typeface="Roboto Condensed" panose="02000000000000000000" pitchFamily="2" charset="0"/>
+                <a:endParaRPr lang="en-US" sz="1500">
+                  <a:latin typeface="Roboto Condensed"/>
                   <a:ea typeface="Roboto Condensed" panose="02000000000000000000" pitchFamily="2" charset="0"/>
-                  <a:cs typeface="Roboto Condensed" panose="02000000000000000000" pitchFamily="2" charset="0"/>
+                  <a:cs typeface="Roboto Condensed"/>
                 </a:endParaRPr>
               </a:p>
             </p:txBody>
@@ -6818,17 +6443,17 @@
               <a:p>
                 <a:pPr algn="ctr"/>
                 <a:r>
-                  <a:rPr lang="en-US" sz="1600" dirty="0" smtClean="0">
-                    <a:latin typeface="Roboto Condensed" panose="02000000000000000000" pitchFamily="2" charset="0"/>
+                  <a:rPr lang="en-US" sz="1500" dirty="0" smtClean="0">
+                    <a:latin typeface="Roboto Condensed"/>
                     <a:ea typeface="Roboto Condensed" panose="02000000000000000000" pitchFamily="2" charset="0"/>
-                    <a:cs typeface="Roboto Condensed" panose="02000000000000000000" pitchFamily="2" charset="0"/>
+                    <a:cs typeface="Roboto Condensed"/>
                   </a:rPr>
                   <a:t>Social media</a:t>
                 </a:r>
-                <a:endParaRPr lang="en-US" sz="1600" dirty="0">
-                  <a:latin typeface="Roboto Condensed" panose="02000000000000000000" pitchFamily="2" charset="0"/>
+                <a:endParaRPr lang="en-US" sz="1500" dirty="0">
+                  <a:latin typeface="Roboto Condensed"/>
                   <a:ea typeface="Roboto Condensed" panose="02000000000000000000" pitchFamily="2" charset="0"/>
-                  <a:cs typeface="Roboto Condensed" panose="02000000000000000000" pitchFamily="2" charset="0"/>
+                  <a:cs typeface="Roboto Condensed"/>
                 </a:endParaRPr>
               </a:p>
             </p:txBody>
@@ -6836,7 +6461,7 @@
         </p:grpSp>
         <p:grpSp>
           <p:nvGrpSpPr>
-            <p:cNvPr id="12" name="Group 11"/>
+            <p:cNvPr id="18" name="Group 17"/>
             <p:cNvGrpSpPr/>
             <p:nvPr/>
           </p:nvGrpSpPr>
@@ -6844,8 +6469,8 @@
             <a:xfrm>
               <a:off x="1314929" y="1480799"/>
               <a:ext cx="6473526" cy="763146"/>
-              <a:chOff x="734120" y="909697"/>
-              <a:chExt cx="9106566" cy="918177"/>
+              <a:chOff x="1314929" y="1480799"/>
+              <a:chExt cx="6473526" cy="763146"/>
             </a:xfrm>
           </p:grpSpPr>
           <p:sp>
@@ -6856,8 +6481,8 @@
             </p:nvSpPr>
             <p:spPr>
               <a:xfrm>
-                <a:off x="734120" y="909697"/>
-                <a:ext cx="9106566" cy="918177"/>
+                <a:off x="1314929" y="1480799"/>
+                <a:ext cx="6473526" cy="763146"/>
               </a:xfrm>
               <a:prstGeom prst="roundRect">
                 <a:avLst>
@@ -6884,10 +6509,10 @@
               <a:lstStyle/>
               <a:p>
                 <a:pPr algn="ctr"/>
-                <a:endParaRPr lang="en-US" sz="1600">
-                  <a:latin typeface="Roboto Condensed" panose="02000000000000000000" pitchFamily="2" charset="0"/>
+                <a:endParaRPr lang="en-US" sz="1500">
+                  <a:latin typeface="Roboto Condensed"/>
                   <a:ea typeface="Roboto Condensed" panose="02000000000000000000" pitchFamily="2" charset="0"/>
-                  <a:cs typeface="Roboto Condensed" panose="02000000000000000000" pitchFamily="2" charset="0"/>
+                  <a:cs typeface="Roboto Condensed"/>
                 </a:endParaRPr>
               </a:p>
             </p:txBody>
@@ -6900,8 +6525,8 @@
             </p:nvSpPr>
             <p:spPr>
               <a:xfrm>
-                <a:off x="957939" y="1131787"/>
-                <a:ext cx="4168592" cy="473995"/>
+                <a:off x="1474034" y="1665390"/>
+                <a:ext cx="2963300" cy="393963"/>
               </a:xfrm>
               <a:prstGeom prst="rect">
                 <a:avLst/>
@@ -6933,17 +6558,17 @@
               <a:p>
                 <a:pPr algn="ctr"/>
                 <a:r>
-                  <a:rPr lang="en-US" sz="1600" dirty="0" smtClean="0">
-                    <a:latin typeface="Roboto Condensed" panose="02000000000000000000" pitchFamily="2" charset="0"/>
+                  <a:rPr lang="en-US" sz="1500" dirty="0" smtClean="0">
+                    <a:latin typeface="Roboto Condensed"/>
                     <a:ea typeface="Roboto Condensed" panose="02000000000000000000" pitchFamily="2" charset="0"/>
-                    <a:cs typeface="Roboto Condensed" panose="02000000000000000000" pitchFamily="2" charset="0"/>
+                    <a:cs typeface="Roboto Condensed"/>
                   </a:rPr>
                   <a:t>Emotion Analysis</a:t>
                 </a:r>
-                <a:endParaRPr lang="en-US" sz="1600" dirty="0">
-                  <a:latin typeface="Roboto Condensed" panose="02000000000000000000" pitchFamily="2" charset="0"/>
+                <a:endParaRPr lang="en-US" sz="1500" dirty="0">
+                  <a:latin typeface="Roboto Condensed"/>
                   <a:ea typeface="Roboto Condensed" panose="02000000000000000000" pitchFamily="2" charset="0"/>
-                  <a:cs typeface="Roboto Condensed" panose="02000000000000000000" pitchFamily="2" charset="0"/>
+                  <a:cs typeface="Roboto Condensed"/>
                 </a:endParaRPr>
               </a:p>
             </p:txBody>
@@ -6956,8 +6581,8 @@
             </p:nvSpPr>
             <p:spPr>
               <a:xfrm>
-                <a:off x="5983178" y="1133585"/>
-                <a:ext cx="3581628" cy="473995"/>
+                <a:off x="4631983" y="1666884"/>
+                <a:ext cx="2960359" cy="393963"/>
               </a:xfrm>
               <a:prstGeom prst="rect">
                 <a:avLst/>
@@ -6989,31 +6614,476 @@
               <a:p>
                 <a:pPr algn="ctr"/>
                 <a:r>
-                  <a:rPr lang="en-US" sz="1600" dirty="0" smtClean="0">
-                    <a:latin typeface="Roboto Condensed" panose="02000000000000000000" pitchFamily="2" charset="0"/>
+                  <a:rPr lang="en-US" sz="1500" dirty="0" smtClean="0">
+                    <a:latin typeface="Roboto Condensed"/>
                     <a:ea typeface="Roboto Condensed" panose="02000000000000000000" pitchFamily="2" charset="0"/>
-                    <a:cs typeface="Roboto Condensed" panose="02000000000000000000" pitchFamily="2" charset="0"/>
+                    <a:cs typeface="Roboto Condensed"/>
                   </a:rPr>
-                  <a:t>Emotional Word Corpus</a:t>
+                  <a:t>Emotional Bag-of-Words</a:t>
                 </a:r>
-                <a:endParaRPr lang="en-US" sz="1600" dirty="0">
-                  <a:latin typeface="Roboto Condensed" panose="02000000000000000000" pitchFamily="2" charset="0"/>
+                <a:endParaRPr lang="en-US" sz="1500" dirty="0">
+                  <a:latin typeface="Roboto Condensed"/>
                   <a:ea typeface="Roboto Condensed" panose="02000000000000000000" pitchFamily="2" charset="0"/>
-                  <a:cs typeface="Roboto Condensed" panose="02000000000000000000" pitchFamily="2" charset="0"/>
+                  <a:cs typeface="Roboto Condensed"/>
+                </a:endParaRPr>
+              </a:p>
+            </p:txBody>
+          </p:sp>
+        </p:grpSp>
+        <p:sp>
+          <p:nvSpPr>
+            <p:cNvPr id="94" name="Rectangle 93"/>
+            <p:cNvSpPr/>
+            <p:nvPr/>
+          </p:nvSpPr>
+          <p:spPr>
+            <a:xfrm rot="16200000">
+              <a:off x="499309" y="3493600"/>
+              <a:ext cx="1000579" cy="531641"/>
+            </a:xfrm>
+            <a:prstGeom prst="rect">
+              <a:avLst/>
+            </a:prstGeom>
+            <a:noFill/>
+            <a:ln>
+              <a:noFill/>
+            </a:ln>
+          </p:spPr>
+          <p:style>
+            <a:lnRef idx="3">
+              <a:schemeClr val="lt1"/>
+            </a:lnRef>
+            <a:fillRef idx="1">
+              <a:schemeClr val="accent6"/>
+            </a:fillRef>
+            <a:effectRef idx="1">
+              <a:schemeClr val="accent6"/>
+            </a:effectRef>
+            <a:fontRef idx="minor">
+              <a:schemeClr val="lt1"/>
+            </a:fontRef>
+          </p:style>
+          <p:txBody>
+            <a:bodyPr rtlCol="0" anchor="ctr"/>
+            <a:lstStyle/>
+            <a:p>
+              <a:pPr algn="ctr"/>
+              <a:r>
+                <a:rPr lang="en-US" sz="1500" dirty="0" smtClean="0">
+                  <a:solidFill>
+                    <a:schemeClr val="tx1"/>
+                  </a:solidFill>
+                  <a:latin typeface="Roboto Condensed"/>
+                  <a:ea typeface="Roboto Condensed" panose="02000000000000000000" pitchFamily="2" charset="0"/>
+                  <a:cs typeface="Roboto Condensed"/>
+                </a:rPr>
+                <a:t>Mapping</a:t>
+              </a:r>
+              <a:endParaRPr lang="en-US" sz="1500" dirty="0">
+                <a:solidFill>
+                  <a:schemeClr val="tx1"/>
+                </a:solidFill>
+                <a:latin typeface="Roboto Condensed"/>
+                <a:ea typeface="Roboto Condensed" panose="02000000000000000000" pitchFamily="2" charset="0"/>
+                <a:cs typeface="Roboto Condensed"/>
+              </a:endParaRPr>
+            </a:p>
+          </p:txBody>
+        </p:sp>
+        <p:sp>
+          <p:nvSpPr>
+            <p:cNvPr id="49" name="Down Arrow 48"/>
+            <p:cNvSpPr/>
+            <p:nvPr/>
+          </p:nvSpPr>
+          <p:spPr>
+            <a:xfrm>
+              <a:off x="4260717" y="1200506"/>
+              <a:ext cx="589013" cy="398099"/>
+            </a:xfrm>
+            <a:prstGeom prst="downArrow">
+              <a:avLst/>
+            </a:prstGeom>
+            <a:solidFill>
+              <a:schemeClr val="accent4">
+                <a:lumMod val="60000"/>
+                <a:lumOff val="40000"/>
+              </a:schemeClr>
+            </a:solidFill>
+          </p:spPr>
+          <p:style>
+            <a:lnRef idx="3">
+              <a:schemeClr val="lt1"/>
+            </a:lnRef>
+            <a:fillRef idx="1">
+              <a:schemeClr val="accent3"/>
+            </a:fillRef>
+            <a:effectRef idx="1">
+              <a:schemeClr val="accent3"/>
+            </a:effectRef>
+            <a:fontRef idx="minor">
+              <a:schemeClr val="lt1"/>
+            </a:fontRef>
+          </p:style>
+          <p:txBody>
+            <a:bodyPr rtlCol="0" anchor="ctr"/>
+            <a:lstStyle/>
+            <a:p>
+              <a:pPr algn="ctr"/>
+              <a:endParaRPr lang="en-US" sz="1500">
+                <a:latin typeface="Roboto Condensed"/>
+                <a:ea typeface="Roboto Condensed" panose="02000000000000000000" pitchFamily="2" charset="0"/>
+                <a:cs typeface="Roboto Condensed"/>
+              </a:endParaRPr>
+            </a:p>
+          </p:txBody>
+        </p:sp>
+        <p:sp>
+          <p:nvSpPr>
+            <p:cNvPr id="17" name="Down Arrow 16"/>
+            <p:cNvSpPr/>
+            <p:nvPr/>
+          </p:nvSpPr>
+          <p:spPr>
+            <a:xfrm>
+              <a:off x="4258387" y="2137776"/>
+              <a:ext cx="589013" cy="398099"/>
+            </a:xfrm>
+            <a:prstGeom prst="downArrow">
+              <a:avLst/>
+            </a:prstGeom>
+            <a:solidFill>
+              <a:schemeClr val="accent4">
+                <a:lumMod val="60000"/>
+                <a:lumOff val="40000"/>
+              </a:schemeClr>
+            </a:solidFill>
+          </p:spPr>
+          <p:style>
+            <a:lnRef idx="3">
+              <a:schemeClr val="lt1"/>
+            </a:lnRef>
+            <a:fillRef idx="1">
+              <a:schemeClr val="accent3"/>
+            </a:fillRef>
+            <a:effectRef idx="1">
+              <a:schemeClr val="accent3"/>
+            </a:effectRef>
+            <a:fontRef idx="minor">
+              <a:schemeClr val="lt1"/>
+            </a:fontRef>
+          </p:style>
+          <p:txBody>
+            <a:bodyPr rtlCol="0" anchor="ctr"/>
+            <a:lstStyle/>
+            <a:p>
+              <a:pPr algn="ctr"/>
+              <a:endParaRPr lang="en-US" sz="1500">
+                <a:latin typeface="Roboto Condensed"/>
+                <a:ea typeface="Roboto Condensed" panose="02000000000000000000" pitchFamily="2" charset="0"/>
+                <a:cs typeface="Roboto Condensed"/>
+              </a:endParaRPr>
+            </a:p>
+          </p:txBody>
+        </p:sp>
+        <p:grpSp>
+          <p:nvGrpSpPr>
+            <p:cNvPr id="14" name="Group 13"/>
+            <p:cNvGrpSpPr/>
+            <p:nvPr/>
+          </p:nvGrpSpPr>
+          <p:grpSpPr>
+            <a:xfrm>
+              <a:off x="6318188" y="2426733"/>
+              <a:ext cx="1903217" cy="4297025"/>
+              <a:chOff x="6318188" y="2426733"/>
+              <a:chExt cx="1903217" cy="4297025"/>
+            </a:xfrm>
+          </p:grpSpPr>
+          <p:sp>
+            <p:nvSpPr>
+              <p:cNvPr id="58" name="Rounded Rectangle 57"/>
+              <p:cNvSpPr/>
+              <p:nvPr/>
+            </p:nvSpPr>
+            <p:spPr>
+              <a:xfrm>
+                <a:off x="6318188" y="2426733"/>
+                <a:ext cx="1470267" cy="4297025"/>
+              </a:xfrm>
+              <a:prstGeom prst="roundRect">
+                <a:avLst>
+                  <a:gd name="adj" fmla="val 2912"/>
+                </a:avLst>
+              </a:prstGeom>
+            </p:spPr>
+            <p:style>
+              <a:lnRef idx="2">
+                <a:schemeClr val="accent1"/>
+              </a:lnRef>
+              <a:fillRef idx="1">
+                <a:schemeClr val="lt1"/>
+              </a:fillRef>
+              <a:effectRef idx="0">
+                <a:schemeClr val="accent1"/>
+              </a:effectRef>
+              <a:fontRef idx="minor">
+                <a:schemeClr val="dk1"/>
+              </a:fontRef>
+            </p:style>
+            <p:txBody>
+              <a:bodyPr rtlCol="0" anchor="ctr"/>
+              <a:lstStyle/>
+              <a:p>
+                <a:pPr algn="ctr"/>
+                <a:endParaRPr lang="en-US" sz="1500">
+                  <a:latin typeface="Roboto Condensed"/>
+                  <a:ea typeface="Roboto Condensed" panose="02000000000000000000" pitchFamily="2" charset="0"/>
+                  <a:cs typeface="Roboto Condensed"/>
                 </a:endParaRPr>
               </a:p>
             </p:txBody>
           </p:sp>
           <p:sp>
             <p:nvSpPr>
-              <p:cNvPr id="92" name="Down Arrow 91"/>
+              <p:cNvPr id="59" name="Rectangle 58"/>
+              <p:cNvSpPr/>
+              <p:nvPr/>
+            </p:nvSpPr>
+            <p:spPr>
+              <a:xfrm>
+                <a:off x="6499432" y="2588485"/>
+                <a:ext cx="1091450" cy="549269"/>
+              </a:xfrm>
+              <a:prstGeom prst="rect">
+                <a:avLst/>
+              </a:prstGeom>
+              <a:solidFill>
+                <a:schemeClr val="accent6"/>
+              </a:solidFill>
+              <a:ln>
+                <a:noFill/>
+              </a:ln>
+            </p:spPr>
+            <p:style>
+              <a:lnRef idx="3">
+                <a:schemeClr val="lt1"/>
+              </a:lnRef>
+              <a:fillRef idx="1">
+                <a:schemeClr val="accent1"/>
+              </a:fillRef>
+              <a:effectRef idx="1">
+                <a:schemeClr val="accent1"/>
+              </a:effectRef>
+              <a:fontRef idx="minor">
+                <a:schemeClr val="lt1"/>
+              </a:fontRef>
+            </p:style>
+            <p:txBody>
+              <a:bodyPr rtlCol="0" anchor="ctr"/>
+              <a:lstStyle/>
+              <a:p>
+                <a:pPr algn="ctr"/>
+                <a:r>
+                  <a:rPr lang="en-US" sz="1500" dirty="0" smtClean="0">
+                    <a:latin typeface="Roboto Condensed"/>
+                    <a:ea typeface="Roboto Condensed" panose="02000000000000000000" pitchFamily="2" charset="0"/>
+                    <a:cs typeface="Roboto Condensed"/>
+                  </a:rPr>
+                  <a:t>Level of intensity</a:t>
+                </a:r>
+                <a:endParaRPr lang="en-US" sz="1500" dirty="0">
+                  <a:latin typeface="Roboto Condensed"/>
+                  <a:ea typeface="Roboto Condensed" panose="02000000000000000000" pitchFamily="2" charset="0"/>
+                  <a:cs typeface="Roboto Condensed"/>
+                </a:endParaRPr>
+              </a:p>
+            </p:txBody>
+          </p:sp>
+          <p:sp>
+            <p:nvSpPr>
+              <p:cNvPr id="60" name="Rectangle 59"/>
+              <p:cNvSpPr/>
+              <p:nvPr/>
+            </p:nvSpPr>
+            <p:spPr>
+              <a:xfrm>
+                <a:off x="6513357" y="5024141"/>
+                <a:ext cx="1091450" cy="1568877"/>
+              </a:xfrm>
+              <a:prstGeom prst="rect">
+                <a:avLst/>
+              </a:prstGeom>
+              <a:solidFill>
+                <a:schemeClr val="accent6"/>
+              </a:solidFill>
+              <a:ln>
+                <a:noFill/>
+              </a:ln>
+            </p:spPr>
+            <p:style>
+              <a:lnRef idx="3">
+                <a:schemeClr val="lt1"/>
+              </a:lnRef>
+              <a:fillRef idx="1">
+                <a:schemeClr val="accent1"/>
+              </a:fillRef>
+              <a:effectRef idx="1">
+                <a:schemeClr val="accent1"/>
+              </a:effectRef>
+              <a:fontRef idx="minor">
+                <a:schemeClr val="lt1"/>
+              </a:fontRef>
+            </p:style>
+            <p:txBody>
+              <a:bodyPr rtlCol="0" anchor="ctr"/>
+              <a:lstStyle/>
+              <a:p>
+                <a:pPr algn="ctr"/>
+                <a:r>
+                  <a:rPr lang="en-US" sz="1500" dirty="0" smtClean="0">
+                    <a:latin typeface="Roboto Condensed"/>
+                    <a:ea typeface="Roboto Condensed" panose="02000000000000000000" pitchFamily="2" charset="0"/>
+                    <a:cs typeface="Roboto Condensed"/>
+                  </a:rPr>
+                  <a:t>Rule-based reasoning</a:t>
+                </a:r>
+                <a:endParaRPr lang="en-US" sz="1500" dirty="0">
+                  <a:latin typeface="Roboto Condensed"/>
+                  <a:ea typeface="Roboto Condensed" panose="02000000000000000000" pitchFamily="2" charset="0"/>
+                  <a:cs typeface="Roboto Condensed"/>
+                </a:endParaRPr>
+              </a:p>
+            </p:txBody>
+          </p:sp>
+          <p:sp>
+            <p:nvSpPr>
+              <p:cNvPr id="3" name="Flowchart: Magnetic Disk 2"/>
+              <p:cNvSpPr/>
+              <p:nvPr/>
+            </p:nvSpPr>
+            <p:spPr>
+              <a:xfrm>
+                <a:off x="6493228" y="3315181"/>
+                <a:ext cx="1089776" cy="1055258"/>
+              </a:xfrm>
+              <a:prstGeom prst="flowChartMagneticDisk">
+                <a:avLst/>
+              </a:prstGeom>
+              <a:solidFill>
+                <a:schemeClr val="accent6"/>
+              </a:solidFill>
+              <a:ln>
+                <a:solidFill>
+                  <a:schemeClr val="bg1"/>
+                </a:solidFill>
+              </a:ln>
+            </p:spPr>
+            <p:style>
+              <a:lnRef idx="3">
+                <a:schemeClr val="lt1"/>
+              </a:lnRef>
+              <a:fillRef idx="1">
+                <a:schemeClr val="accent1"/>
+              </a:fillRef>
+              <a:effectRef idx="1">
+                <a:schemeClr val="accent1"/>
+              </a:effectRef>
+              <a:fontRef idx="minor">
+                <a:schemeClr val="lt1"/>
+              </a:fontRef>
+            </p:style>
+            <p:txBody>
+              <a:bodyPr rtlCol="0" anchor="ctr"/>
+              <a:lstStyle/>
+              <a:p>
+                <a:pPr algn="ctr"/>
+                <a:r>
+                  <a:rPr lang="en-US" sz="1500" dirty="0" smtClean="0">
+                    <a:latin typeface="Roboto Condensed"/>
+                    <a:ea typeface="Roboto Condensed" panose="02000000000000000000" pitchFamily="2" charset="0"/>
+                    <a:cs typeface="Roboto Condensed"/>
+                  </a:rPr>
+                  <a:t>Rule repository</a:t>
+                </a:r>
+                <a:endParaRPr lang="en-US" sz="1500" dirty="0">
+                  <a:latin typeface="Roboto Condensed"/>
+                  <a:ea typeface="Roboto Condensed" panose="02000000000000000000" pitchFamily="2" charset="0"/>
+                  <a:cs typeface="Roboto Condensed"/>
+                </a:endParaRPr>
+              </a:p>
+            </p:txBody>
+          </p:sp>
+          <p:sp>
+            <p:nvSpPr>
+              <p:cNvPr id="88" name="Rectangle 87"/>
               <p:cNvSpPr/>
               <p:nvPr/>
             </p:nvSpPr>
             <p:spPr>
               <a:xfrm rot="5400000">
-                <a:off x="5192546" y="1123126"/>
-                <a:ext cx="675385" cy="478972"/>
+                <a:off x="5823422" y="4325774"/>
+                <a:ext cx="4289296" cy="506671"/>
+              </a:xfrm>
+              <a:prstGeom prst="rect">
+                <a:avLst/>
+              </a:prstGeom>
+              <a:noFill/>
+              <a:ln>
+                <a:noFill/>
+              </a:ln>
+            </p:spPr>
+            <p:style>
+              <a:lnRef idx="3">
+                <a:schemeClr val="lt1"/>
+              </a:lnRef>
+              <a:fillRef idx="1">
+                <a:schemeClr val="accent6"/>
+              </a:fillRef>
+              <a:effectRef idx="1">
+                <a:schemeClr val="accent6"/>
+              </a:effectRef>
+              <a:fontRef idx="minor">
+                <a:schemeClr val="lt1"/>
+              </a:fontRef>
+            </p:style>
+            <p:txBody>
+              <a:bodyPr rtlCol="0" anchor="ctr"/>
+              <a:lstStyle/>
+              <a:p>
+                <a:pPr algn="ctr"/>
+                <a:r>
+                  <a:rPr lang="en-US" sz="1500" dirty="0" smtClean="0">
+                    <a:solidFill>
+                      <a:schemeClr val="tx1"/>
+                    </a:solidFill>
+                    <a:latin typeface="Roboto Condensed"/>
+                    <a:ea typeface="Roboto Condensed" panose="02000000000000000000" pitchFamily="2" charset="0"/>
+                    <a:cs typeface="Roboto Condensed"/>
+                  </a:rPr>
+                  <a:t>Rule-based reasoning</a:t>
+                </a:r>
+                <a:endParaRPr lang="en-US" sz="1500" dirty="0">
+                  <a:solidFill>
+                    <a:schemeClr val="tx1"/>
+                  </a:solidFill>
+                  <a:latin typeface="Roboto Condensed"/>
+                  <a:ea typeface="Roboto Condensed" panose="02000000000000000000" pitchFamily="2" charset="0"/>
+                  <a:cs typeface="Roboto Condensed"/>
+                </a:endParaRPr>
+              </a:p>
+            </p:txBody>
+          </p:sp>
+          <p:sp>
+            <p:nvSpPr>
+              <p:cNvPr id="52" name="Down Arrow 51"/>
+              <p:cNvSpPr/>
+              <p:nvPr/>
+            </p:nvSpPr>
+            <p:spPr>
+              <a:xfrm>
+                <a:off x="6738446" y="4499996"/>
+                <a:ext cx="589013" cy="398099"/>
               </a:xfrm>
               <a:prstGeom prst="downArrow">
                 <a:avLst/>
@@ -7044,10 +7114,10 @@
               <a:lstStyle/>
               <a:p>
                 <a:pPr algn="ctr"/>
-                <a:endParaRPr lang="en-US" sz="1600">
-                  <a:latin typeface="Roboto Condensed" panose="02000000000000000000" pitchFamily="2" charset="0"/>
+                <a:endParaRPr lang="en-US" sz="1500">
+                  <a:latin typeface="Roboto Condensed"/>
                   <a:ea typeface="Roboto Condensed" panose="02000000000000000000" pitchFamily="2" charset="0"/>
-                  <a:cs typeface="Roboto Condensed" panose="02000000000000000000" pitchFamily="2" charset="0"/>
+                  <a:cs typeface="Roboto Condensed"/>
                 </a:endParaRPr>
               </a:p>
             </p:txBody>
@@ -7055,13 +7125,13 @@
         </p:grpSp>
         <p:sp>
           <p:nvSpPr>
-            <p:cNvPr id="93" name="Down Arrow 92"/>
+            <p:cNvPr id="53" name="Down Arrow 52"/>
             <p:cNvSpPr/>
             <p:nvPr/>
           </p:nvSpPr>
           <p:spPr>
-            <a:xfrm rot="16200000">
-              <a:off x="5940982" y="3547145"/>
+            <a:xfrm rot="5400000">
+              <a:off x="5924629" y="5600509"/>
               <a:ext cx="561349" cy="417718"/>
             </a:xfrm>
             <a:prstGeom prst="downArrow">
@@ -7093,166 +7163,10 @@
             <a:lstStyle/>
             <a:p>
               <a:pPr algn="ctr"/>
-              <a:endParaRPr lang="en-US" sz="1600">
-                <a:latin typeface="Roboto Condensed" panose="02000000000000000000" pitchFamily="2" charset="0"/>
+              <a:endParaRPr lang="en-US" sz="1500" b="1" dirty="0">
+                <a:latin typeface="Roboto Condensed"/>
                 <a:ea typeface="Roboto Condensed" panose="02000000000000000000" pitchFamily="2" charset="0"/>
-                <a:cs typeface="Roboto Condensed" panose="02000000000000000000" pitchFamily="2" charset="0"/>
-              </a:endParaRPr>
-            </a:p>
-          </p:txBody>
-        </p:sp>
-        <p:sp>
-          <p:nvSpPr>
-            <p:cNvPr id="94" name="Rectangle 93"/>
-            <p:cNvSpPr/>
-            <p:nvPr/>
-          </p:nvSpPr>
-          <p:spPr>
-            <a:xfrm rot="16200000">
-              <a:off x="499309" y="3493600"/>
-              <a:ext cx="1000579" cy="531641"/>
-            </a:xfrm>
-            <a:prstGeom prst="rect">
-              <a:avLst/>
-            </a:prstGeom>
-            <a:noFill/>
-            <a:ln>
-              <a:noFill/>
-            </a:ln>
-          </p:spPr>
-          <p:style>
-            <a:lnRef idx="3">
-              <a:schemeClr val="lt1"/>
-            </a:lnRef>
-            <a:fillRef idx="1">
-              <a:schemeClr val="accent6"/>
-            </a:fillRef>
-            <a:effectRef idx="1">
-              <a:schemeClr val="accent6"/>
-            </a:effectRef>
-            <a:fontRef idx="minor">
-              <a:schemeClr val="lt1"/>
-            </a:fontRef>
-          </p:style>
-          <p:txBody>
-            <a:bodyPr rtlCol="0" anchor="ctr"/>
-            <a:lstStyle/>
-            <a:p>
-              <a:pPr algn="ctr"/>
-              <a:r>
-                <a:rPr lang="en-US" sz="1600" dirty="0" smtClean="0">
-                  <a:solidFill>
-                    <a:schemeClr val="tx1"/>
-                  </a:solidFill>
-                  <a:latin typeface="Roboto Condensed" panose="02000000000000000000" pitchFamily="2" charset="0"/>
-                  <a:ea typeface="Roboto Condensed" panose="02000000000000000000" pitchFamily="2" charset="0"/>
-                  <a:cs typeface="Roboto Condensed" panose="02000000000000000000" pitchFamily="2" charset="0"/>
-                </a:rPr>
-                <a:t>Mapping</a:t>
-              </a:r>
-              <a:endParaRPr lang="en-US" sz="1600" dirty="0">
-                <a:solidFill>
-                  <a:schemeClr val="tx1"/>
-                </a:solidFill>
-                <a:latin typeface="Roboto Condensed" panose="02000000000000000000" pitchFamily="2" charset="0"/>
-                <a:ea typeface="Roboto Condensed" panose="02000000000000000000" pitchFamily="2" charset="0"/>
-                <a:cs typeface="Roboto Condensed" panose="02000000000000000000" pitchFamily="2" charset="0"/>
-              </a:endParaRPr>
-            </a:p>
-          </p:txBody>
-        </p:sp>
-        <p:sp>
-          <p:nvSpPr>
-            <p:cNvPr id="80" name="Down Arrow 79"/>
-            <p:cNvSpPr/>
-            <p:nvPr/>
-          </p:nvSpPr>
-          <p:spPr>
-            <a:xfrm rot="5400000">
-              <a:off x="5949655" y="4413022"/>
-              <a:ext cx="561349" cy="417718"/>
-            </a:xfrm>
-            <a:prstGeom prst="downArrow">
-              <a:avLst/>
-            </a:prstGeom>
-            <a:solidFill>
-              <a:schemeClr val="accent4">
-                <a:lumMod val="60000"/>
-                <a:lumOff val="40000"/>
-              </a:schemeClr>
-            </a:solidFill>
-          </p:spPr>
-          <p:style>
-            <a:lnRef idx="3">
-              <a:schemeClr val="lt1"/>
-            </a:lnRef>
-            <a:fillRef idx="1">
-              <a:schemeClr val="accent3"/>
-            </a:fillRef>
-            <a:effectRef idx="1">
-              <a:schemeClr val="accent3"/>
-            </a:effectRef>
-            <a:fontRef idx="minor">
-              <a:schemeClr val="lt1"/>
-            </a:fontRef>
-          </p:style>
-          <p:txBody>
-            <a:bodyPr rtlCol="0" anchor="ctr"/>
-            <a:lstStyle/>
-            <a:p>
-              <a:pPr algn="ctr"/>
-              <a:endParaRPr lang="en-US" sz="1600">
-                <a:latin typeface="Roboto Condensed" panose="02000000000000000000" pitchFamily="2" charset="0"/>
-                <a:ea typeface="Roboto Condensed" panose="02000000000000000000" pitchFamily="2" charset="0"/>
-                <a:cs typeface="Roboto Condensed" panose="02000000000000000000" pitchFamily="2" charset="0"/>
-              </a:endParaRPr>
-            </a:p>
-          </p:txBody>
-        </p:sp>
-        <p:sp>
-          <p:nvSpPr>
-            <p:cNvPr id="49" name="Down Arrow 48"/>
-            <p:cNvSpPr/>
-            <p:nvPr/>
-          </p:nvSpPr>
-          <p:spPr>
-            <a:xfrm>
-              <a:off x="2654464" y="1181829"/>
-              <a:ext cx="589013" cy="398099"/>
-            </a:xfrm>
-            <a:prstGeom prst="downArrow">
-              <a:avLst/>
-            </a:prstGeom>
-            <a:solidFill>
-              <a:schemeClr val="accent4">
-                <a:lumMod val="60000"/>
-                <a:lumOff val="40000"/>
-              </a:schemeClr>
-            </a:solidFill>
-          </p:spPr>
-          <p:style>
-            <a:lnRef idx="3">
-              <a:schemeClr val="lt1"/>
-            </a:lnRef>
-            <a:fillRef idx="1">
-              <a:schemeClr val="accent3"/>
-            </a:fillRef>
-            <a:effectRef idx="1">
-              <a:schemeClr val="accent3"/>
-            </a:effectRef>
-            <a:fontRef idx="minor">
-              <a:schemeClr val="lt1"/>
-            </a:fontRef>
-          </p:style>
-          <p:txBody>
-            <a:bodyPr rtlCol="0" anchor="ctr"/>
-            <a:lstStyle/>
-            <a:p>
-              <a:pPr algn="ctr"/>
-              <a:endParaRPr lang="en-US" sz="1600">
-                <a:latin typeface="Roboto Condensed" panose="02000000000000000000" pitchFamily="2" charset="0"/>
-                <a:ea typeface="Roboto Condensed" panose="02000000000000000000" pitchFamily="2" charset="0"/>
-                <a:cs typeface="Roboto Condensed" panose="02000000000000000000" pitchFamily="2" charset="0"/>
+                <a:cs typeface="Roboto Condensed"/>
               </a:endParaRPr>
             </a:p>
           </p:txBody>
@@ -7297,24 +7211,24 @@
             <a:lstStyle/>
             <a:p>
               <a:pPr algn="ctr"/>
-              <a:endParaRPr lang="en-US" sz="1600">
-                <a:latin typeface="Roboto Condensed" panose="02000000000000000000" pitchFamily="2" charset="0"/>
+              <a:endParaRPr lang="en-US" sz="1500">
+                <a:latin typeface="Roboto Condensed"/>
                 <a:ea typeface="Roboto Condensed" panose="02000000000000000000" pitchFamily="2" charset="0"/>
-                <a:cs typeface="Roboto Condensed" panose="02000000000000000000" pitchFamily="2" charset="0"/>
+                <a:cs typeface="Roboto Condensed"/>
               </a:endParaRPr>
             </a:p>
           </p:txBody>
         </p:sp>
         <p:sp>
           <p:nvSpPr>
-            <p:cNvPr id="17" name="Down Arrow 16"/>
+            <p:cNvPr id="93" name="Down Arrow 92"/>
             <p:cNvSpPr/>
             <p:nvPr/>
           </p:nvSpPr>
           <p:spPr>
-            <a:xfrm>
-              <a:off x="2661474" y="2128437"/>
-              <a:ext cx="589013" cy="398099"/>
+            <a:xfrm rot="16200000">
+              <a:off x="5940983" y="3500452"/>
+              <a:ext cx="561349" cy="417718"/>
             </a:xfrm>
             <a:prstGeom prst="downArrow">
               <a:avLst/>
@@ -7345,10 +7259,10 @@
             <a:lstStyle/>
             <a:p>
               <a:pPr algn="ctr"/>
-              <a:endParaRPr lang="en-US" sz="1600">
-                <a:latin typeface="Roboto Condensed" panose="02000000000000000000" pitchFamily="2" charset="0"/>
+              <a:endParaRPr lang="en-US" sz="1500">
+                <a:latin typeface="Roboto Condensed"/>
                 <a:ea typeface="Roboto Condensed" panose="02000000000000000000" pitchFamily="2" charset="0"/>
-                <a:cs typeface="Roboto Condensed" panose="02000000000000000000" pitchFamily="2" charset="0"/>
+                <a:cs typeface="Roboto Condensed"/>
               </a:endParaRPr>
             </a:p>
           </p:txBody>
@@ -8000,53 +7914,640 @@
       </p:grpSpPr>
       <p:grpSp>
         <p:nvGrpSpPr>
-          <p:cNvPr id="70" name="Group 69"/>
+          <p:cNvPr id="6" name="Group 5"/>
           <p:cNvGrpSpPr/>
           <p:nvPr/>
         </p:nvGrpSpPr>
         <p:grpSpPr>
           <a:xfrm>
-            <a:off x="1830380" y="494943"/>
-            <a:ext cx="6891943" cy="5948659"/>
-            <a:chOff x="1830380" y="494943"/>
-            <a:chExt cx="6891943" cy="5948659"/>
+            <a:off x="93378" y="1142999"/>
+            <a:ext cx="9660224" cy="4478809"/>
+            <a:chOff x="93378" y="1142999"/>
+            <a:chExt cx="9660224" cy="4478809"/>
           </a:xfrm>
         </p:grpSpPr>
         <p:grpSp>
           <p:nvGrpSpPr>
-            <p:cNvPr id="62" name="Group 61"/>
+            <p:cNvPr id="70" name="Group 69"/>
             <p:cNvGrpSpPr/>
             <p:nvPr/>
           </p:nvGrpSpPr>
           <p:grpSpPr>
             <a:xfrm>
-              <a:off x="1830380" y="494943"/>
-              <a:ext cx="6891943" cy="5948659"/>
-              <a:chOff x="1662284" y="569652"/>
+              <a:off x="93378" y="1142999"/>
+              <a:ext cx="5189017" cy="4478809"/>
+              <a:chOff x="1830380" y="494943"/>
               <a:chExt cx="6891943" cy="5948659"/>
             </a:xfrm>
-            <a:solidFill>
-              <a:srgbClr val="ED7D31"/>
-            </a:solidFill>
+          </p:grpSpPr>
+          <p:grpSp>
+            <p:nvGrpSpPr>
+              <p:cNvPr id="62" name="Group 61"/>
+              <p:cNvGrpSpPr/>
+              <p:nvPr/>
+            </p:nvGrpSpPr>
+            <p:grpSpPr>
+              <a:xfrm>
+                <a:off x="1830380" y="494943"/>
+                <a:ext cx="6891943" cy="5948659"/>
+                <a:chOff x="1662284" y="569652"/>
+                <a:chExt cx="6891943" cy="5948659"/>
+              </a:xfrm>
+              <a:solidFill>
+                <a:srgbClr val="ED7D31"/>
+              </a:solidFill>
+            </p:grpSpPr>
+            <p:sp>
+              <p:nvSpPr>
+                <p:cNvPr id="55" name="Isosceles Triangle 54"/>
+                <p:cNvSpPr/>
+                <p:nvPr/>
+              </p:nvSpPr>
+              <p:spPr>
+                <a:xfrm>
+                  <a:off x="3147134" y="3539313"/>
+                  <a:ext cx="3931581" cy="2978998"/>
+                </a:xfrm>
+                <a:prstGeom prst="triangle">
+                  <a:avLst>
+                    <a:gd name="adj" fmla="val 49525"/>
+                  </a:avLst>
+                </a:prstGeom>
+                <a:solidFill>
+                  <a:schemeClr val="accent1"/>
+                </a:solidFill>
+              </p:spPr>
+              <p:style>
+                <a:lnRef idx="3">
+                  <a:schemeClr val="lt1"/>
+                </a:lnRef>
+                <a:fillRef idx="1">
+                  <a:schemeClr val="accent2"/>
+                </a:fillRef>
+                <a:effectRef idx="1">
+                  <a:schemeClr val="accent2"/>
+                </a:effectRef>
+                <a:fontRef idx="minor">
+                  <a:schemeClr val="lt1"/>
+                </a:fontRef>
+              </p:style>
+              <p:txBody>
+                <a:bodyPr rtlCol="0" anchor="ctr"/>
+                <a:lstStyle/>
+                <a:p>
+                  <a:pPr algn="ctr"/>
+                  <a:endParaRPr lang="en-US" sz="2800" dirty="0">
+                    <a:latin typeface="Roboto Condensed"/>
+                    <a:cs typeface="Roboto Condensed"/>
+                  </a:endParaRPr>
+                </a:p>
+              </p:txBody>
+            </p:sp>
+            <p:sp>
+              <p:nvSpPr>
+                <p:cNvPr id="56" name="Isosceles Triangle 55"/>
+                <p:cNvSpPr/>
+                <p:nvPr/>
+              </p:nvSpPr>
+              <p:spPr>
+                <a:xfrm rot="10800000">
+                  <a:off x="3131437" y="572635"/>
+                  <a:ext cx="3922243" cy="2978998"/>
+                </a:xfrm>
+                <a:prstGeom prst="triangle">
+                  <a:avLst>
+                    <a:gd name="adj" fmla="val 49762"/>
+                  </a:avLst>
+                </a:prstGeom>
+                <a:solidFill>
+                  <a:srgbClr val="FF6600"/>
+                </a:solidFill>
+              </p:spPr>
+              <p:style>
+                <a:lnRef idx="3">
+                  <a:schemeClr val="lt1"/>
+                </a:lnRef>
+                <a:fillRef idx="1">
+                  <a:schemeClr val="accent1"/>
+                </a:fillRef>
+                <a:effectRef idx="1">
+                  <a:schemeClr val="accent1"/>
+                </a:effectRef>
+                <a:fontRef idx="minor">
+                  <a:schemeClr val="lt1"/>
+                </a:fontRef>
+              </p:style>
+              <p:txBody>
+                <a:bodyPr rtlCol="0" anchor="ctr"/>
+                <a:lstStyle/>
+                <a:p>
+                  <a:pPr algn="ctr"/>
+                  <a:endParaRPr lang="en-US" sz="2800" dirty="0">
+                    <a:latin typeface="Roboto Condensed"/>
+                    <a:cs typeface="Roboto Condensed"/>
+                  </a:endParaRPr>
+                </a:p>
+              </p:txBody>
+            </p:sp>
+            <p:sp>
+              <p:nvSpPr>
+                <p:cNvPr id="58" name="Isosceles Triangle 57"/>
+                <p:cNvSpPr/>
+                <p:nvPr/>
+              </p:nvSpPr>
+              <p:spPr>
+                <a:xfrm>
+                  <a:off x="1665266" y="578990"/>
+                  <a:ext cx="3442990" cy="2963306"/>
+                </a:xfrm>
+                <a:prstGeom prst="triangle">
+                  <a:avLst>
+                    <a:gd name="adj" fmla="val 42439"/>
+                  </a:avLst>
+                </a:prstGeom>
+                <a:solidFill>
+                  <a:schemeClr val="accent4">
+                    <a:lumMod val="60000"/>
+                    <a:lumOff val="40000"/>
+                  </a:schemeClr>
+                </a:solidFill>
+              </p:spPr>
+              <p:style>
+                <a:lnRef idx="3">
+                  <a:schemeClr val="lt1"/>
+                </a:lnRef>
+                <a:fillRef idx="1">
+                  <a:schemeClr val="accent4"/>
+                </a:fillRef>
+                <a:effectRef idx="1">
+                  <a:schemeClr val="accent4"/>
+                </a:effectRef>
+                <a:fontRef idx="minor">
+                  <a:schemeClr val="lt1"/>
+                </a:fontRef>
+              </p:style>
+              <p:txBody>
+                <a:bodyPr rtlCol="0" anchor="ctr"/>
+                <a:lstStyle/>
+                <a:p>
+                  <a:pPr algn="ctr"/>
+                  <a:endParaRPr lang="en-US" sz="2800" dirty="0">
+                    <a:latin typeface="Roboto Condensed"/>
+                    <a:cs typeface="Roboto Condensed"/>
+                  </a:endParaRPr>
+                </a:p>
+              </p:txBody>
+            </p:sp>
+            <p:sp>
+              <p:nvSpPr>
+                <p:cNvPr id="59" name="Isosceles Triangle 58"/>
+                <p:cNvSpPr/>
+                <p:nvPr/>
+              </p:nvSpPr>
+              <p:spPr>
+                <a:xfrm rot="10800000">
+                  <a:off x="5089578" y="3542294"/>
+                  <a:ext cx="3464649" cy="2963306"/>
+                </a:xfrm>
+                <a:prstGeom prst="triangle">
+                  <a:avLst>
+                    <a:gd name="adj" fmla="val 42978"/>
+                  </a:avLst>
+                </a:prstGeom>
+                <a:solidFill>
+                  <a:schemeClr val="bg2">
+                    <a:lumMod val="90000"/>
+                  </a:schemeClr>
+                </a:solidFill>
+              </p:spPr>
+              <p:style>
+                <a:lnRef idx="3">
+                  <a:schemeClr val="lt1"/>
+                </a:lnRef>
+                <a:fillRef idx="1">
+                  <a:schemeClr val="accent5"/>
+                </a:fillRef>
+                <a:effectRef idx="1">
+                  <a:schemeClr val="accent5"/>
+                </a:effectRef>
+                <a:fontRef idx="minor">
+                  <a:schemeClr val="lt1"/>
+                </a:fontRef>
+              </p:style>
+              <p:txBody>
+                <a:bodyPr rtlCol="0" anchor="ctr"/>
+                <a:lstStyle/>
+                <a:p>
+                  <a:pPr algn="ctr"/>
+                  <a:endParaRPr lang="en-US" sz="2800">
+                    <a:latin typeface="Roboto Condensed"/>
+                    <a:cs typeface="Roboto Condensed"/>
+                  </a:endParaRPr>
+                </a:p>
+              </p:txBody>
+            </p:sp>
+            <p:sp>
+              <p:nvSpPr>
+                <p:cNvPr id="60" name="Isosceles Triangle 59"/>
+                <p:cNvSpPr/>
+                <p:nvPr/>
+              </p:nvSpPr>
+              <p:spPr>
+                <a:xfrm rot="10800000">
+                  <a:off x="1662284" y="3548650"/>
+                  <a:ext cx="3427294" cy="2969660"/>
+                </a:xfrm>
+                <a:prstGeom prst="triangle">
+                  <a:avLst>
+                    <a:gd name="adj" fmla="val 56874"/>
+                  </a:avLst>
+                </a:prstGeom>
+                <a:solidFill>
+                  <a:schemeClr val="accent2">
+                    <a:lumMod val="75000"/>
+                  </a:schemeClr>
+                </a:solidFill>
+              </p:spPr>
+              <p:style>
+                <a:lnRef idx="3">
+                  <a:schemeClr val="lt1"/>
+                </a:lnRef>
+                <a:fillRef idx="1">
+                  <a:schemeClr val="accent3"/>
+                </a:fillRef>
+                <a:effectRef idx="1">
+                  <a:schemeClr val="accent3"/>
+                </a:effectRef>
+                <a:fontRef idx="minor">
+                  <a:schemeClr val="lt1"/>
+                </a:fontRef>
+              </p:style>
+              <p:txBody>
+                <a:bodyPr rtlCol="0" anchor="ctr"/>
+                <a:lstStyle/>
+                <a:p>
+                  <a:pPr algn="ctr"/>
+                  <a:endParaRPr lang="en-US" sz="2800">
+                    <a:latin typeface="Roboto Condensed"/>
+                    <a:cs typeface="Roboto Condensed"/>
+                  </a:endParaRPr>
+                </a:p>
+              </p:txBody>
+            </p:sp>
+            <p:sp>
+              <p:nvSpPr>
+                <p:cNvPr id="61" name="Isosceles Triangle 60"/>
+                <p:cNvSpPr/>
+                <p:nvPr/>
+              </p:nvSpPr>
+              <p:spPr>
+                <a:xfrm>
+                  <a:off x="5108255" y="569652"/>
+                  <a:ext cx="3445971" cy="2966289"/>
+                </a:xfrm>
+                <a:prstGeom prst="triangle">
+                  <a:avLst>
+                    <a:gd name="adj" fmla="val 56531"/>
+                  </a:avLst>
+                </a:prstGeom>
+                <a:solidFill>
+                  <a:schemeClr val="accent6"/>
+                </a:solidFill>
+              </p:spPr>
+              <p:style>
+                <a:lnRef idx="3">
+                  <a:schemeClr val="lt1"/>
+                </a:lnRef>
+                <a:fillRef idx="1">
+                  <a:schemeClr val="accent6"/>
+                </a:fillRef>
+                <a:effectRef idx="1">
+                  <a:schemeClr val="accent6"/>
+                </a:effectRef>
+                <a:fontRef idx="minor">
+                  <a:schemeClr val="lt1"/>
+                </a:fontRef>
+              </p:style>
+              <p:txBody>
+                <a:bodyPr rtlCol="0" anchor="ctr"/>
+                <a:lstStyle/>
+                <a:p>
+                  <a:pPr algn="ctr"/>
+                  <a:endParaRPr lang="en-US" sz="2800" dirty="0">
+                    <a:latin typeface="Roboto Condensed"/>
+                    <a:cs typeface="Roboto Condensed"/>
+                  </a:endParaRPr>
+                </a:p>
+              </p:txBody>
+            </p:sp>
+          </p:grpSp>
+          <p:sp>
+            <p:nvSpPr>
+              <p:cNvPr id="64" name="TextBox 63"/>
+              <p:cNvSpPr txBox="1"/>
+              <p:nvPr/>
+            </p:nvSpPr>
+            <p:spPr>
+              <a:xfrm>
+                <a:off x="4608750" y="1214012"/>
+                <a:ext cx="1525622" cy="694930"/>
+              </a:xfrm>
+              <a:prstGeom prst="rect">
+                <a:avLst/>
+              </a:prstGeom>
+              <a:noFill/>
+              <a:ln>
+                <a:noFill/>
+              </a:ln>
+            </p:spPr>
+            <p:txBody>
+              <a:bodyPr wrap="square" rtlCol="0">
+                <a:spAutoFit/>
+              </a:bodyPr>
+              <a:lstStyle/>
+              <a:p>
+                <a:pPr algn="ctr"/>
+                <a:r>
+                  <a:rPr lang="en-US" sz="2800" dirty="0" smtClean="0">
+                    <a:solidFill>
+                      <a:schemeClr val="bg1"/>
+                    </a:solidFill>
+                    <a:latin typeface="Roboto Condensed"/>
+                    <a:cs typeface="Roboto Condensed"/>
+                  </a:rPr>
+                  <a:t>Anger</a:t>
+                </a:r>
+                <a:endParaRPr lang="en-US" sz="2800" dirty="0">
+                  <a:solidFill>
+                    <a:schemeClr val="bg1"/>
+                  </a:solidFill>
+                  <a:latin typeface="Roboto Condensed"/>
+                  <a:cs typeface="Roboto Condensed"/>
+                </a:endParaRPr>
+              </a:p>
+            </p:txBody>
+          </p:sp>
+          <p:sp>
+            <p:nvSpPr>
+              <p:cNvPr id="65" name="TextBox 64"/>
+              <p:cNvSpPr txBox="1"/>
+              <p:nvPr/>
+            </p:nvSpPr>
+            <p:spPr>
+              <a:xfrm>
+                <a:off x="4789092" y="5274636"/>
+                <a:ext cx="1134422" cy="694930"/>
+              </a:xfrm>
+              <a:prstGeom prst="rect">
+                <a:avLst/>
+              </a:prstGeom>
+              <a:noFill/>
+              <a:ln>
+                <a:noFill/>
+              </a:ln>
+            </p:spPr>
+            <p:txBody>
+              <a:bodyPr wrap="square" rtlCol="0">
+                <a:spAutoFit/>
+              </a:bodyPr>
+              <a:lstStyle/>
+              <a:p>
+                <a:pPr algn="ctr"/>
+                <a:r>
+                  <a:rPr lang="en-US" sz="2800" dirty="0" smtClean="0">
+                    <a:solidFill>
+                      <a:schemeClr val="bg1"/>
+                    </a:solidFill>
+                    <a:latin typeface="Roboto Condensed"/>
+                    <a:cs typeface="Roboto Condensed"/>
+                  </a:rPr>
+                  <a:t>Fear</a:t>
+                </a:r>
+                <a:endParaRPr lang="en-US" sz="2800" dirty="0">
+                  <a:solidFill>
+                    <a:schemeClr val="bg1"/>
+                  </a:solidFill>
+                  <a:latin typeface="Roboto Condensed"/>
+                  <a:cs typeface="Roboto Condensed"/>
+                </a:endParaRPr>
+              </a:p>
+            </p:txBody>
+          </p:sp>
+          <p:sp>
+            <p:nvSpPr>
+              <p:cNvPr id="66" name="TextBox 65"/>
+              <p:cNvSpPr txBox="1"/>
+              <p:nvPr/>
+            </p:nvSpPr>
+            <p:spPr>
+              <a:xfrm>
+                <a:off x="6291782" y="2293912"/>
+                <a:ext cx="1876750" cy="694930"/>
+              </a:xfrm>
+              <a:prstGeom prst="rect">
+                <a:avLst/>
+              </a:prstGeom>
+              <a:noFill/>
+              <a:ln>
+                <a:noFill/>
+              </a:ln>
+            </p:spPr>
+            <p:txBody>
+              <a:bodyPr wrap="square" rtlCol="0">
+                <a:spAutoFit/>
+              </a:bodyPr>
+              <a:lstStyle/>
+              <a:p>
+                <a:pPr algn="ctr"/>
+                <a:r>
+                  <a:rPr lang="en-US" sz="2800" dirty="0" smtClean="0">
+                    <a:solidFill>
+                      <a:schemeClr val="bg1"/>
+                    </a:solidFill>
+                    <a:latin typeface="Roboto Condensed"/>
+                    <a:cs typeface="Roboto Condensed"/>
+                  </a:rPr>
+                  <a:t>Disgust</a:t>
+                </a:r>
+                <a:endParaRPr lang="en-US" sz="2800" dirty="0">
+                  <a:solidFill>
+                    <a:schemeClr val="bg1"/>
+                  </a:solidFill>
+                  <a:latin typeface="Roboto Condensed"/>
+                  <a:cs typeface="Roboto Condensed"/>
+                </a:endParaRPr>
+              </a:p>
+            </p:txBody>
+          </p:sp>
+          <p:sp>
+            <p:nvSpPr>
+              <p:cNvPr id="67" name="TextBox 66"/>
+              <p:cNvSpPr txBox="1"/>
+              <p:nvPr/>
+            </p:nvSpPr>
+            <p:spPr>
+              <a:xfrm>
+                <a:off x="2264502" y="2306315"/>
+                <a:ext cx="2468282" cy="694930"/>
+              </a:xfrm>
+              <a:prstGeom prst="rect">
+                <a:avLst/>
+              </a:prstGeom>
+              <a:noFill/>
+              <a:ln>
+                <a:noFill/>
+              </a:ln>
+            </p:spPr>
+            <p:txBody>
+              <a:bodyPr wrap="square" rtlCol="0">
+                <a:spAutoFit/>
+              </a:bodyPr>
+              <a:lstStyle/>
+              <a:p>
+                <a:pPr algn="ctr"/>
+                <a:r>
+                  <a:rPr lang="en-US" sz="2800" dirty="0" smtClean="0">
+                    <a:solidFill>
+                      <a:srgbClr val="000000"/>
+                    </a:solidFill>
+                    <a:latin typeface="Roboto Condensed"/>
+                    <a:cs typeface="Roboto Condensed"/>
+                  </a:rPr>
+                  <a:t>Happiness</a:t>
+                </a:r>
+                <a:endParaRPr lang="en-US" sz="2800" dirty="0">
+                  <a:solidFill>
+                    <a:srgbClr val="000000"/>
+                  </a:solidFill>
+                  <a:latin typeface="Roboto Condensed"/>
+                  <a:cs typeface="Roboto Condensed"/>
+                </a:endParaRPr>
+              </a:p>
+            </p:txBody>
+          </p:sp>
+          <p:sp>
+            <p:nvSpPr>
+              <p:cNvPr id="68" name="TextBox 67"/>
+              <p:cNvSpPr txBox="1"/>
+              <p:nvPr/>
+            </p:nvSpPr>
+            <p:spPr>
+              <a:xfrm>
+                <a:off x="6246583" y="4332701"/>
+                <a:ext cx="1822722" cy="694930"/>
+              </a:xfrm>
+              <a:prstGeom prst="rect">
+                <a:avLst/>
+              </a:prstGeom>
+              <a:noFill/>
+              <a:ln>
+                <a:noFill/>
+              </a:ln>
+            </p:spPr>
+            <p:txBody>
+              <a:bodyPr wrap="square" rtlCol="0">
+                <a:spAutoFit/>
+              </a:bodyPr>
+              <a:lstStyle/>
+              <a:p>
+                <a:pPr algn="ctr"/>
+                <a:r>
+                  <a:rPr lang="en-US" sz="2800" dirty="0" smtClean="0">
+                    <a:solidFill>
+                      <a:srgbClr val="000000"/>
+                    </a:solidFill>
+                    <a:latin typeface="Roboto Condensed"/>
+                    <a:cs typeface="Roboto Condensed"/>
+                  </a:rPr>
+                  <a:t>Sadness</a:t>
+                </a:r>
+                <a:endParaRPr lang="en-US" sz="2800" dirty="0">
+                  <a:solidFill>
+                    <a:srgbClr val="000000"/>
+                  </a:solidFill>
+                  <a:latin typeface="Roboto Condensed"/>
+                  <a:cs typeface="Roboto Condensed"/>
+                </a:endParaRPr>
+              </a:p>
+            </p:txBody>
+          </p:sp>
+          <p:sp>
+            <p:nvSpPr>
+              <p:cNvPr id="69" name="TextBox 68"/>
+              <p:cNvSpPr txBox="1"/>
+              <p:nvPr/>
+            </p:nvSpPr>
+            <p:spPr>
+              <a:xfrm>
+                <a:off x="2571383" y="4320296"/>
+                <a:ext cx="1801701" cy="694930"/>
+              </a:xfrm>
+              <a:prstGeom prst="rect">
+                <a:avLst/>
+              </a:prstGeom>
+              <a:noFill/>
+              <a:ln>
+                <a:noFill/>
+              </a:ln>
+            </p:spPr>
+            <p:txBody>
+              <a:bodyPr wrap="square" rtlCol="0">
+                <a:spAutoFit/>
+              </a:bodyPr>
+              <a:lstStyle/>
+              <a:p>
+                <a:pPr algn="ctr"/>
+                <a:r>
+                  <a:rPr lang="en-US" sz="2800" dirty="0" smtClean="0">
+                    <a:solidFill>
+                      <a:schemeClr val="bg1"/>
+                    </a:solidFill>
+                    <a:latin typeface="Roboto Condensed"/>
+                    <a:cs typeface="Roboto Condensed"/>
+                  </a:rPr>
+                  <a:t>Surprise</a:t>
+                </a:r>
+                <a:endParaRPr lang="en-US" sz="2800" dirty="0">
+                  <a:solidFill>
+                    <a:schemeClr val="bg1"/>
+                  </a:solidFill>
+                  <a:latin typeface="Roboto Condensed"/>
+                  <a:cs typeface="Roboto Condensed"/>
+                </a:endParaRPr>
+              </a:p>
+            </p:txBody>
+          </p:sp>
+        </p:grpSp>
+        <p:grpSp>
+          <p:nvGrpSpPr>
+            <p:cNvPr id="5" name="Group 4"/>
+            <p:cNvGrpSpPr/>
+            <p:nvPr/>
+          </p:nvGrpSpPr>
+          <p:grpSpPr>
+            <a:xfrm>
+              <a:off x="6256915" y="1700048"/>
+              <a:ext cx="3496687" cy="3367421"/>
+              <a:chOff x="6256913" y="2045148"/>
+              <a:chExt cx="2779549" cy="2676794"/>
+            </a:xfrm>
           </p:grpSpPr>
           <p:sp>
             <p:nvSpPr>
-              <p:cNvPr id="55" name="Isosceles Triangle 54"/>
+              <p:cNvPr id="4" name="Rectangle 3"/>
               <p:cNvSpPr/>
               <p:nvPr/>
             </p:nvSpPr>
             <p:spPr>
               <a:xfrm>
-                <a:off x="3147134" y="3539313"/>
-                <a:ext cx="3931581" cy="2978998"/>
+                <a:off x="6256913" y="2045148"/>
+                <a:ext cx="1372786" cy="1326075"/>
               </a:xfrm>
-              <a:prstGeom prst="triangle">
-                <a:avLst>
-                  <a:gd name="adj" fmla="val 49525"/>
-                </a:avLst>
+              <a:prstGeom prst="rect">
+                <a:avLst/>
               </a:prstGeom>
               <a:solidFill>
-                <a:schemeClr val="accent1"/>
+                <a:srgbClr val="FF6600"/>
               </a:solidFill>
             </p:spPr>
             <p:style>
@@ -8068,28 +8569,87 @@
               <a:lstStyle/>
               <a:p>
                 <a:pPr algn="ctr"/>
-                <a:endParaRPr lang="en-US" dirty="0"/>
+                <a:r>
+                  <a:rPr lang="en-US" sz="2800" dirty="0" smtClean="0">
+                    <a:latin typeface="Roboto Condensed"/>
+                    <a:cs typeface="Roboto Condensed"/>
+                  </a:rPr>
+                  <a:t>Anger</a:t>
+                </a:r>
+                <a:endParaRPr lang="en-US" sz="2800" dirty="0">
+                  <a:latin typeface="Roboto Condensed"/>
+                  <a:cs typeface="Roboto Condensed"/>
+                </a:endParaRPr>
               </a:p>
             </p:txBody>
           </p:sp>
           <p:sp>
             <p:nvSpPr>
-              <p:cNvPr id="56" name="Isosceles Triangle 55"/>
+              <p:cNvPr id="19" name="Rectangle 18"/>
               <p:cNvSpPr/>
               <p:nvPr/>
             </p:nvSpPr>
             <p:spPr>
-              <a:xfrm rot="10800000">
-                <a:off x="3131437" y="572635"/>
-                <a:ext cx="3922243" cy="2978998"/>
+              <a:xfrm>
+                <a:off x="7660694" y="2048132"/>
+                <a:ext cx="1372786" cy="1326075"/>
               </a:xfrm>
-              <a:prstGeom prst="triangle">
-                <a:avLst>
-                  <a:gd name="adj" fmla="val 49762"/>
-                </a:avLst>
+              <a:prstGeom prst="rect">
+                <a:avLst/>
+              </a:prstGeom>
+            </p:spPr>
+            <p:style>
+              <a:lnRef idx="3">
+                <a:schemeClr val="lt1"/>
+              </a:lnRef>
+              <a:fillRef idx="1">
+                <a:schemeClr val="accent1"/>
+              </a:fillRef>
+              <a:effectRef idx="1">
+                <a:schemeClr val="accent1"/>
+              </a:effectRef>
+              <a:fontRef idx="minor">
+                <a:schemeClr val="lt1"/>
+              </a:fontRef>
+            </p:style>
+            <p:txBody>
+              <a:bodyPr rtlCol="0" anchor="ctr"/>
+              <a:lstStyle/>
+              <a:p>
+                <a:pPr algn="ctr"/>
+                <a:r>
+                  <a:rPr lang="en-US" sz="2800" dirty="0" smtClean="0">
+                    <a:latin typeface="Roboto Condensed"/>
+                    <a:cs typeface="Roboto Condensed"/>
+                  </a:rPr>
+                  <a:t>Fear</a:t>
+                </a:r>
+                <a:endParaRPr lang="en-US" sz="2800" dirty="0">
+                  <a:latin typeface="Roboto Condensed"/>
+                  <a:cs typeface="Roboto Condensed"/>
+                </a:endParaRPr>
+              </a:p>
+            </p:txBody>
+          </p:sp>
+          <p:sp>
+            <p:nvSpPr>
+              <p:cNvPr id="21" name="Rectangle 20"/>
+              <p:cNvSpPr/>
+              <p:nvPr/>
+            </p:nvSpPr>
+            <p:spPr>
+              <a:xfrm>
+                <a:off x="6259895" y="3392883"/>
+                <a:ext cx="1372786" cy="1326075"/>
+              </a:xfrm>
+              <a:prstGeom prst="rect">
+                <a:avLst/>
               </a:prstGeom>
               <a:solidFill>
-                <a:srgbClr val="FF6600"/>
+                <a:schemeClr val="accent4">
+                  <a:lumMod val="60000"/>
+                  <a:lumOff val="40000"/>
+                </a:schemeClr>
               </a:solidFill>
             </p:spPr>
             <p:style>
@@ -8111,71 +8671,39 @@
               <a:lstStyle/>
               <a:p>
                 <a:pPr algn="ctr"/>
-                <a:endParaRPr lang="en-US" dirty="0"/>
+                <a:r>
+                  <a:rPr lang="en-US" sz="2800" dirty="0" smtClean="0">
+                    <a:solidFill>
+                      <a:srgbClr val="000000"/>
+                    </a:solidFill>
+                    <a:latin typeface="Roboto Condensed"/>
+                    <a:cs typeface="Roboto Condensed"/>
+                  </a:rPr>
+                  <a:t>Happiness</a:t>
+                </a:r>
+                <a:endParaRPr lang="en-US" sz="2800" dirty="0">
+                  <a:solidFill>
+                    <a:srgbClr val="000000"/>
+                  </a:solidFill>
+                  <a:latin typeface="Roboto Condensed"/>
+                  <a:cs typeface="Roboto Condensed"/>
+                </a:endParaRPr>
               </a:p>
             </p:txBody>
           </p:sp>
           <p:sp>
             <p:nvSpPr>
-              <p:cNvPr id="58" name="Isosceles Triangle 57"/>
+              <p:cNvPr id="22" name="Rectangle 21"/>
               <p:cNvSpPr/>
               <p:nvPr/>
             </p:nvSpPr>
             <p:spPr>
               <a:xfrm>
-                <a:off x="1665266" y="578990"/>
-                <a:ext cx="3442990" cy="2963306"/>
+                <a:off x="7663676" y="3395867"/>
+                <a:ext cx="1372786" cy="1326075"/>
               </a:xfrm>
-              <a:prstGeom prst="triangle">
-                <a:avLst>
-                  <a:gd name="adj" fmla="val 42439"/>
-                </a:avLst>
-              </a:prstGeom>
-              <a:solidFill>
-                <a:schemeClr val="accent4">
-                  <a:lumMod val="60000"/>
-                  <a:lumOff val="40000"/>
-                </a:schemeClr>
-              </a:solidFill>
-            </p:spPr>
-            <p:style>
-              <a:lnRef idx="3">
-                <a:schemeClr val="lt1"/>
-              </a:lnRef>
-              <a:fillRef idx="1">
-                <a:schemeClr val="accent4"/>
-              </a:fillRef>
-              <a:effectRef idx="1">
-                <a:schemeClr val="accent4"/>
-              </a:effectRef>
-              <a:fontRef idx="minor">
-                <a:schemeClr val="lt1"/>
-              </a:fontRef>
-            </p:style>
-            <p:txBody>
-              <a:bodyPr rtlCol="0" anchor="ctr"/>
-              <a:lstStyle/>
-              <a:p>
-                <a:pPr algn="ctr"/>
-                <a:endParaRPr lang="en-US" dirty="0"/>
-              </a:p>
-            </p:txBody>
-          </p:sp>
-          <p:sp>
-            <p:nvSpPr>
-              <p:cNvPr id="59" name="Isosceles Triangle 58"/>
-              <p:cNvSpPr/>
-              <p:nvPr/>
-            </p:nvSpPr>
-            <p:spPr>
-              <a:xfrm rot="10800000">
-                <a:off x="5089578" y="3542294"/>
-                <a:ext cx="3464649" cy="2963306"/>
-              </a:xfrm>
-              <a:prstGeom prst="triangle">
-                <a:avLst>
-                  <a:gd name="adj" fmla="val 42978"/>
-                </a:avLst>
+              <a:prstGeom prst="rect">
+                <a:avLst/>
               </a:prstGeom>
               <a:solidFill>
                 <a:schemeClr val="bg2">
@@ -8188,10 +8716,10 @@
                 <a:schemeClr val="lt1"/>
               </a:lnRef>
               <a:fillRef idx="1">
-                <a:schemeClr val="accent5"/>
+                <a:schemeClr val="accent1"/>
               </a:fillRef>
               <a:effectRef idx="1">
-                <a:schemeClr val="accent5"/>
+                <a:schemeClr val="accent1"/>
               </a:effectRef>
               <a:fontRef idx="minor">
                 <a:schemeClr val="lt1"/>
@@ -8202,364 +8730,78 @@
               <a:lstStyle/>
               <a:p>
                 <a:pPr algn="ctr"/>
-                <a:endParaRPr lang="en-US"/>
-              </a:p>
-            </p:txBody>
-          </p:sp>
-          <p:sp>
-            <p:nvSpPr>
-              <p:cNvPr id="60" name="Isosceles Triangle 59"/>
-              <p:cNvSpPr/>
-              <p:nvPr/>
-            </p:nvSpPr>
-            <p:spPr>
-              <a:xfrm rot="10800000">
-                <a:off x="1662284" y="3548650"/>
-                <a:ext cx="3427294" cy="2969660"/>
-              </a:xfrm>
-              <a:prstGeom prst="triangle">
-                <a:avLst>
-                  <a:gd name="adj" fmla="val 56874"/>
-                </a:avLst>
-              </a:prstGeom>
-              <a:solidFill>
-                <a:schemeClr val="accent2">
-                  <a:lumMod val="75000"/>
-                </a:schemeClr>
-              </a:solidFill>
-            </p:spPr>
-            <p:style>
-              <a:lnRef idx="3">
-                <a:schemeClr val="lt1"/>
-              </a:lnRef>
-              <a:fillRef idx="1">
-                <a:schemeClr val="accent3"/>
-              </a:fillRef>
-              <a:effectRef idx="1">
-                <a:schemeClr val="accent3"/>
-              </a:effectRef>
-              <a:fontRef idx="minor">
-                <a:schemeClr val="lt1"/>
-              </a:fontRef>
-            </p:style>
-            <p:txBody>
-              <a:bodyPr rtlCol="0" anchor="ctr"/>
-              <a:lstStyle/>
-              <a:p>
-                <a:pPr algn="ctr"/>
-                <a:endParaRPr lang="en-US"/>
-              </a:p>
-            </p:txBody>
-          </p:sp>
-          <p:sp>
-            <p:nvSpPr>
-              <p:cNvPr id="61" name="Isosceles Triangle 60"/>
-              <p:cNvSpPr/>
-              <p:nvPr/>
-            </p:nvSpPr>
-            <p:spPr>
-              <a:xfrm>
-                <a:off x="5108255" y="569652"/>
-                <a:ext cx="3445971" cy="2966289"/>
-              </a:xfrm>
-              <a:prstGeom prst="triangle">
-                <a:avLst>
-                  <a:gd name="adj" fmla="val 56531"/>
-                </a:avLst>
-              </a:prstGeom>
-              <a:solidFill>
-                <a:schemeClr val="accent6"/>
-              </a:solidFill>
-            </p:spPr>
-            <p:style>
-              <a:lnRef idx="3">
-                <a:schemeClr val="lt1"/>
-              </a:lnRef>
-              <a:fillRef idx="1">
-                <a:schemeClr val="accent6"/>
-              </a:fillRef>
-              <a:effectRef idx="1">
-                <a:schemeClr val="accent6"/>
-              </a:effectRef>
-              <a:fontRef idx="minor">
-                <a:schemeClr val="lt1"/>
-              </a:fontRef>
-            </p:style>
-            <p:txBody>
-              <a:bodyPr rtlCol="0" anchor="ctr"/>
-              <a:lstStyle/>
-              <a:p>
-                <a:pPr algn="ctr"/>
-                <a:endParaRPr lang="en-US" dirty="0"/>
+                <a:r>
+                  <a:rPr lang="en-US" sz="2800" dirty="0" smtClean="0">
+                    <a:solidFill>
+                      <a:schemeClr val="tx1"/>
+                    </a:solidFill>
+                    <a:latin typeface="Roboto Condensed"/>
+                    <a:cs typeface="Roboto Condensed"/>
+                  </a:rPr>
+                  <a:t>Sadness</a:t>
+                </a:r>
+                <a:endParaRPr lang="en-US" sz="2800" dirty="0">
+                  <a:solidFill>
+                    <a:schemeClr val="tx1"/>
+                  </a:solidFill>
+                  <a:latin typeface="Roboto Condensed"/>
+                  <a:cs typeface="Roboto Condensed"/>
+                </a:endParaRPr>
               </a:p>
             </p:txBody>
           </p:sp>
         </p:grpSp>
         <p:sp>
           <p:nvSpPr>
-            <p:cNvPr id="64" name="TextBox 63"/>
-            <p:cNvSpPr txBox="1"/>
+            <p:cNvPr id="24" name="Down Arrow 23"/>
+            <p:cNvSpPr/>
             <p:nvPr/>
           </p:nvSpPr>
           <p:spPr>
-            <a:xfrm>
-              <a:off x="4809419" y="1214012"/>
-              <a:ext cx="902811" cy="461665"/>
+            <a:xfrm rot="16200000">
+              <a:off x="5260996" y="3066352"/>
+              <a:ext cx="1104666" cy="625690"/>
             </a:xfrm>
-            <a:prstGeom prst="rect">
-              <a:avLst/>
+            <a:prstGeom prst="downArrow">
+              <a:avLst>
+                <a:gd name="adj1" fmla="val 61835"/>
+                <a:gd name="adj2" fmla="val 55971"/>
+              </a:avLst>
             </a:prstGeom>
-            <a:noFill/>
+            <a:solidFill>
+              <a:schemeClr val="accent1">
+                <a:lumMod val="40000"/>
+                <a:lumOff val="60000"/>
+              </a:schemeClr>
+            </a:solidFill>
             <a:ln>
-              <a:noFill/>
+              <a:solidFill>
+                <a:schemeClr val="bg1"/>
+              </a:solidFill>
             </a:ln>
           </p:spPr>
+          <p:style>
+            <a:lnRef idx="3">
+              <a:schemeClr val="lt1"/>
+            </a:lnRef>
+            <a:fillRef idx="1">
+              <a:schemeClr val="accent3"/>
+            </a:fillRef>
+            <a:effectRef idx="1">
+              <a:schemeClr val="accent3"/>
+            </a:effectRef>
+            <a:fontRef idx="minor">
+              <a:schemeClr val="lt1"/>
+            </a:fontRef>
+          </p:style>
           <p:txBody>
-            <a:bodyPr wrap="none" rtlCol="0">
-              <a:spAutoFit/>
-            </a:bodyPr>
+            <a:bodyPr rtlCol="0" anchor="ctr"/>
             <a:lstStyle/>
             <a:p>
-              <a:r>
-                <a:rPr lang="en-US" sz="2400" dirty="0" smtClean="0">
-                  <a:solidFill>
-                    <a:schemeClr val="bg1"/>
-                  </a:solidFill>
-                  <a:latin typeface="Roboto Condensed"/>
-                  <a:cs typeface="Roboto Condensed"/>
-                </a:rPr>
-                <a:t>Anger</a:t>
-              </a:r>
-              <a:endParaRPr lang="en-US" sz="2400" dirty="0">
-                <a:solidFill>
-                  <a:schemeClr val="bg1"/>
-                </a:solidFill>
+              <a:pPr algn="ctr"/>
+              <a:endParaRPr lang="en-US" sz="1500">
                 <a:latin typeface="Roboto Condensed"/>
-                <a:cs typeface="Roboto Condensed"/>
-              </a:endParaRPr>
-            </a:p>
-          </p:txBody>
-        </p:sp>
-        <p:sp>
-          <p:nvSpPr>
-            <p:cNvPr id="65" name="TextBox 64"/>
-            <p:cNvSpPr txBox="1"/>
-            <p:nvPr/>
-          </p:nvSpPr>
-          <p:spPr>
-            <a:xfrm>
-              <a:off x="4812400" y="5297943"/>
-              <a:ext cx="714559" cy="461665"/>
-            </a:xfrm>
-            <a:prstGeom prst="rect">
-              <a:avLst/>
-            </a:prstGeom>
-            <a:noFill/>
-            <a:ln>
-              <a:noFill/>
-            </a:ln>
-          </p:spPr>
-          <p:txBody>
-            <a:bodyPr wrap="none" rtlCol="0">
-              <a:spAutoFit/>
-            </a:bodyPr>
-            <a:lstStyle/>
-            <a:p>
-              <a:r>
-                <a:rPr lang="en-US" sz="2400" dirty="0" smtClean="0">
-                  <a:solidFill>
-                    <a:schemeClr val="bg1"/>
-                  </a:solidFill>
-                  <a:latin typeface="Roboto Condensed"/>
-                  <a:cs typeface="Roboto Condensed"/>
-                </a:rPr>
-                <a:t>Fear</a:t>
-              </a:r>
-              <a:endParaRPr lang="en-US" sz="2400" dirty="0">
-                <a:solidFill>
-                  <a:schemeClr val="bg1"/>
-                </a:solidFill>
-                <a:latin typeface="Roboto Condensed"/>
-                <a:cs typeface="Roboto Condensed"/>
-              </a:endParaRPr>
-            </a:p>
-          </p:txBody>
-        </p:sp>
-        <p:sp>
-          <p:nvSpPr>
-            <p:cNvPr id="66" name="TextBox 65"/>
-            <p:cNvSpPr txBox="1"/>
-            <p:nvPr/>
-          </p:nvSpPr>
-          <p:spPr>
-            <a:xfrm>
-              <a:off x="6627084" y="2293913"/>
-              <a:ext cx="1186743" cy="461665"/>
-            </a:xfrm>
-            <a:prstGeom prst="rect">
-              <a:avLst/>
-            </a:prstGeom>
-            <a:noFill/>
-            <a:ln>
-              <a:noFill/>
-            </a:ln>
-          </p:spPr>
-          <p:txBody>
-            <a:bodyPr wrap="none" rtlCol="0">
-              <a:spAutoFit/>
-            </a:bodyPr>
-            <a:lstStyle/>
-            <a:p>
-              <a:r>
-                <a:rPr lang="en-US" sz="2400" dirty="0" smtClean="0">
-                  <a:solidFill>
-                    <a:schemeClr val="bg1"/>
-                  </a:solidFill>
-                  <a:latin typeface="Roboto Condensed"/>
-                  <a:cs typeface="Roboto Condensed"/>
-                </a:rPr>
-                <a:t>Surprise</a:t>
-              </a:r>
-              <a:endParaRPr lang="en-US" sz="2400" dirty="0">
-                <a:solidFill>
-                  <a:schemeClr val="bg1"/>
-                </a:solidFill>
-                <a:latin typeface="Roboto Condensed"/>
-                <a:cs typeface="Roboto Condensed"/>
-              </a:endParaRPr>
-            </a:p>
-          </p:txBody>
-        </p:sp>
-        <p:sp>
-          <p:nvSpPr>
-            <p:cNvPr id="67" name="TextBox 66"/>
-            <p:cNvSpPr txBox="1"/>
-            <p:nvPr/>
-          </p:nvSpPr>
-          <p:spPr>
-            <a:xfrm>
-              <a:off x="2938308" y="2293911"/>
-              <a:ext cx="613870" cy="461665"/>
-            </a:xfrm>
-            <a:prstGeom prst="rect">
-              <a:avLst/>
-            </a:prstGeom>
-            <a:noFill/>
-            <a:ln>
-              <a:noFill/>
-            </a:ln>
-          </p:spPr>
-          <p:txBody>
-            <a:bodyPr wrap="none" rtlCol="0">
-              <a:spAutoFit/>
-            </a:bodyPr>
-            <a:lstStyle/>
-            <a:p>
-              <a:r>
-                <a:rPr lang="en-US" sz="2400" dirty="0" smtClean="0">
-                  <a:solidFill>
-                    <a:srgbClr val="000000"/>
-                  </a:solidFill>
-                  <a:latin typeface="Roboto Condensed"/>
-                  <a:cs typeface="Roboto Condensed"/>
-                </a:rPr>
-                <a:t>Joy</a:t>
-              </a:r>
-              <a:endParaRPr lang="en-US" sz="2400" dirty="0">
-                <a:solidFill>
-                  <a:srgbClr val="000000"/>
-                </a:solidFill>
-                <a:latin typeface="Roboto Condensed"/>
-                <a:cs typeface="Roboto Condensed"/>
-              </a:endParaRPr>
-            </a:p>
-          </p:txBody>
-        </p:sp>
-        <p:sp>
-          <p:nvSpPr>
-            <p:cNvPr id="68" name="TextBox 67"/>
-            <p:cNvSpPr txBox="1"/>
-            <p:nvPr/>
-          </p:nvSpPr>
-          <p:spPr>
-            <a:xfrm>
-              <a:off x="6639404" y="4332701"/>
-              <a:ext cx="1217701" cy="461665"/>
-            </a:xfrm>
-            <a:prstGeom prst="rect">
-              <a:avLst/>
-            </a:prstGeom>
-            <a:noFill/>
-            <a:ln>
-              <a:noFill/>
-            </a:ln>
-          </p:spPr>
-          <p:txBody>
-            <a:bodyPr wrap="none" rtlCol="0">
-              <a:spAutoFit/>
-            </a:bodyPr>
-            <a:lstStyle/>
-            <a:p>
-              <a:r>
-                <a:rPr lang="en-US" sz="2400" dirty="0" smtClean="0">
-                  <a:solidFill>
-                    <a:srgbClr val="000000"/>
-                  </a:solidFill>
-                  <a:latin typeface="Roboto Condensed"/>
-                  <a:cs typeface="Roboto Condensed"/>
-                </a:rPr>
-                <a:t>Sadness</a:t>
-              </a:r>
-              <a:endParaRPr lang="en-US" sz="2400" dirty="0">
-                <a:solidFill>
-                  <a:srgbClr val="000000"/>
-                </a:solidFill>
-                <a:latin typeface="Roboto Condensed"/>
-                <a:cs typeface="Roboto Condensed"/>
-              </a:endParaRPr>
-            </a:p>
-          </p:txBody>
-        </p:sp>
-        <p:sp>
-          <p:nvSpPr>
-            <p:cNvPr id="69" name="TextBox 68"/>
-            <p:cNvSpPr txBox="1"/>
-            <p:nvPr/>
-          </p:nvSpPr>
-          <p:spPr>
-            <a:xfrm>
-              <a:off x="2707821" y="4332700"/>
-              <a:ext cx="1102585" cy="461665"/>
-            </a:xfrm>
-            <a:prstGeom prst="rect">
-              <a:avLst/>
-            </a:prstGeom>
-            <a:noFill/>
-            <a:ln>
-              <a:noFill/>
-            </a:ln>
-          </p:spPr>
-          <p:txBody>
-            <a:bodyPr wrap="none" rtlCol="0">
-              <a:spAutoFit/>
-            </a:bodyPr>
-            <a:lstStyle/>
-            <a:p>
-              <a:r>
-                <a:rPr lang="en-US" sz="2400" dirty="0" smtClean="0">
-                  <a:solidFill>
-                    <a:schemeClr val="bg1"/>
-                  </a:solidFill>
-                  <a:latin typeface="Roboto Condensed"/>
-                  <a:cs typeface="Roboto Condensed"/>
-                </a:rPr>
-                <a:t>Disgust</a:t>
-              </a:r>
-              <a:endParaRPr lang="en-US" sz="2400" dirty="0">
-                <a:solidFill>
-                  <a:schemeClr val="bg1"/>
-                </a:solidFill>
-                <a:latin typeface="Roboto Condensed"/>
+                <a:ea typeface="Roboto Condensed" panose="02000000000000000000" pitchFamily="2" charset="0"/>
                 <a:cs typeface="Roboto Condensed"/>
               </a:endParaRPr>
             </a:p>
@@ -9703,6 +9945,1597 @@
 </p:sld>
 </file>
 
+<file path=ppt/slides/slide6.xml><?xml version="1.0" encoding="utf-8"?>
+<p:sld xmlns:a="http://schemas.openxmlformats.org/drawingml/2006/main" xmlns:r="http://schemas.openxmlformats.org/officeDocument/2006/relationships" xmlns:p="http://schemas.openxmlformats.org/presentationml/2006/main">
+  <p:cSld>
+    <p:spTree>
+      <p:nvGrpSpPr>
+        <p:cNvPr id="1" name=""/>
+        <p:cNvGrpSpPr/>
+        <p:nvPr/>
+      </p:nvGrpSpPr>
+      <p:grpSpPr>
+        <a:xfrm>
+          <a:off x="0" y="0"/>
+          <a:ext cx="0" cy="0"/>
+          <a:chOff x="0" y="0"/>
+          <a:chExt cx="0" cy="0"/>
+        </a:xfrm>
+      </p:grpSpPr>
+      <p:grpSp>
+        <p:nvGrpSpPr>
+          <p:cNvPr id="75" name="Group 74"/>
+          <p:cNvGrpSpPr/>
+          <p:nvPr/>
+        </p:nvGrpSpPr>
+        <p:grpSpPr>
+          <a:xfrm>
+            <a:off x="1634266" y="644360"/>
+            <a:ext cx="7461604" cy="6060332"/>
+            <a:chOff x="1279396" y="186771"/>
+            <a:chExt cx="7461604" cy="6060332"/>
+          </a:xfrm>
+        </p:grpSpPr>
+        <p:grpSp>
+          <p:nvGrpSpPr>
+            <p:cNvPr id="70" name="Group 69"/>
+            <p:cNvGrpSpPr/>
+            <p:nvPr/>
+          </p:nvGrpSpPr>
+          <p:grpSpPr>
+            <a:xfrm>
+              <a:off x="1279396" y="1578220"/>
+              <a:ext cx="7461604" cy="3629320"/>
+              <a:chOff x="1092623" y="1615574"/>
+              <a:chExt cx="7461604" cy="3629320"/>
+            </a:xfrm>
+          </p:grpSpPr>
+          <p:sp>
+            <p:nvSpPr>
+              <p:cNvPr id="4" name="Flowchart: Magnetic Disk 2"/>
+              <p:cNvSpPr/>
+              <p:nvPr/>
+            </p:nvSpPr>
+            <p:spPr>
+              <a:xfrm>
+                <a:off x="1092623" y="2857596"/>
+                <a:ext cx="1129985" cy="961873"/>
+              </a:xfrm>
+              <a:prstGeom prst="flowChartMagneticDisk">
+                <a:avLst/>
+              </a:prstGeom>
+              <a:solidFill>
+                <a:schemeClr val="accent6"/>
+              </a:solidFill>
+              <a:ln>
+                <a:solidFill>
+                  <a:schemeClr val="bg1"/>
+                </a:solidFill>
+              </a:ln>
+            </p:spPr>
+            <p:style>
+              <a:lnRef idx="3">
+                <a:schemeClr val="lt1"/>
+              </a:lnRef>
+              <a:fillRef idx="1">
+                <a:schemeClr val="accent1"/>
+              </a:fillRef>
+              <a:effectRef idx="1">
+                <a:schemeClr val="accent1"/>
+              </a:effectRef>
+              <a:fontRef idx="minor">
+                <a:schemeClr val="lt1"/>
+              </a:fontRef>
+            </p:style>
+            <p:txBody>
+              <a:bodyPr rtlCol="0" anchor="ctr"/>
+              <a:lstStyle/>
+              <a:p>
+                <a:pPr algn="ctr"/>
+                <a:r>
+                  <a:rPr lang="en-US" sz="1500" dirty="0" smtClean="0">
+                    <a:latin typeface="Roboto Condensed"/>
+                    <a:ea typeface="Roboto Condensed" panose="02000000000000000000" pitchFamily="2" charset="0"/>
+                    <a:cs typeface="Roboto Condensed"/>
+                  </a:rPr>
+                  <a:t>Training set</a:t>
+                </a:r>
+                <a:endParaRPr lang="en-US" sz="1500" dirty="0">
+                  <a:latin typeface="Roboto Condensed"/>
+                  <a:ea typeface="Roboto Condensed" panose="02000000000000000000" pitchFamily="2" charset="0"/>
+                  <a:cs typeface="Roboto Condensed"/>
+                </a:endParaRPr>
+              </a:p>
+            </p:txBody>
+          </p:sp>
+          <p:sp>
+            <p:nvSpPr>
+              <p:cNvPr id="8" name="Rectangle 7"/>
+              <p:cNvSpPr/>
+              <p:nvPr/>
+            </p:nvSpPr>
+            <p:spPr>
+              <a:xfrm>
+                <a:off x="2456076" y="2082497"/>
+                <a:ext cx="1186007" cy="553959"/>
+              </a:xfrm>
+              <a:prstGeom prst="rect">
+                <a:avLst/>
+              </a:prstGeom>
+              <a:solidFill>
+                <a:schemeClr val="accent6"/>
+              </a:solidFill>
+              <a:ln>
+                <a:noFill/>
+              </a:ln>
+            </p:spPr>
+            <p:style>
+              <a:lnRef idx="3">
+                <a:schemeClr val="lt1"/>
+              </a:lnRef>
+              <a:fillRef idx="1">
+                <a:schemeClr val="accent1"/>
+              </a:fillRef>
+              <a:effectRef idx="1">
+                <a:schemeClr val="accent1"/>
+              </a:effectRef>
+              <a:fontRef idx="minor">
+                <a:schemeClr val="lt1"/>
+              </a:fontRef>
+            </p:style>
+            <p:txBody>
+              <a:bodyPr rtlCol="0" anchor="ctr"/>
+              <a:lstStyle/>
+              <a:p>
+                <a:pPr algn="ctr"/>
+                <a:r>
+                  <a:rPr lang="en-US" sz="1500" dirty="0" smtClean="0">
+                    <a:latin typeface="Roboto Condensed"/>
+                    <a:ea typeface="Roboto Condensed" panose="02000000000000000000" pitchFamily="2" charset="0"/>
+                    <a:cs typeface="Roboto Condensed"/>
+                  </a:rPr>
+                  <a:t>Fear </a:t>
+                </a:r>
+              </a:p>
+              <a:p>
+                <a:pPr algn="ctr"/>
+                <a:r>
+                  <a:rPr lang="en-US" sz="1500" dirty="0" smtClean="0">
+                    <a:latin typeface="Roboto Condensed"/>
+                    <a:ea typeface="Roboto Condensed" panose="02000000000000000000" pitchFamily="2" charset="0"/>
+                    <a:cs typeface="Roboto Condensed"/>
+                  </a:rPr>
+                  <a:t>BOW</a:t>
+                </a:r>
+              </a:p>
+            </p:txBody>
+          </p:sp>
+          <p:sp>
+            <p:nvSpPr>
+              <p:cNvPr id="16" name="Rectangle 15"/>
+              <p:cNvSpPr/>
+              <p:nvPr/>
+            </p:nvSpPr>
+            <p:spPr>
+              <a:xfrm>
+                <a:off x="2459057" y="2739179"/>
+                <a:ext cx="1183026" cy="553959"/>
+              </a:xfrm>
+              <a:prstGeom prst="rect">
+                <a:avLst/>
+              </a:prstGeom>
+              <a:solidFill>
+                <a:schemeClr val="accent6"/>
+              </a:solidFill>
+              <a:ln>
+                <a:noFill/>
+              </a:ln>
+            </p:spPr>
+            <p:style>
+              <a:lnRef idx="3">
+                <a:schemeClr val="lt1"/>
+              </a:lnRef>
+              <a:fillRef idx="1">
+                <a:schemeClr val="accent1"/>
+              </a:fillRef>
+              <a:effectRef idx="1">
+                <a:schemeClr val="accent1"/>
+              </a:effectRef>
+              <a:fontRef idx="minor">
+                <a:schemeClr val="lt1"/>
+              </a:fontRef>
+            </p:style>
+            <p:txBody>
+              <a:bodyPr rtlCol="0" anchor="ctr"/>
+              <a:lstStyle/>
+              <a:p>
+                <a:pPr algn="ctr"/>
+                <a:r>
+                  <a:rPr lang="en-US" sz="1500" dirty="0" smtClean="0">
+                    <a:latin typeface="Roboto Condensed"/>
+                    <a:ea typeface="Roboto Condensed" panose="02000000000000000000" pitchFamily="2" charset="0"/>
+                    <a:cs typeface="Roboto Condensed"/>
+                  </a:rPr>
+                  <a:t>Anger</a:t>
+                </a:r>
+                <a:br>
+                  <a:rPr lang="en-US" sz="1500" dirty="0" smtClean="0">
+                    <a:latin typeface="Roboto Condensed"/>
+                    <a:ea typeface="Roboto Condensed" panose="02000000000000000000" pitchFamily="2" charset="0"/>
+                    <a:cs typeface="Roboto Condensed"/>
+                  </a:rPr>
+                </a:br>
+                <a:r>
+                  <a:rPr lang="en-US" sz="1500" dirty="0" smtClean="0">
+                    <a:latin typeface="Roboto Condensed"/>
+                    <a:ea typeface="Roboto Condensed" panose="02000000000000000000" pitchFamily="2" charset="0"/>
+                    <a:cs typeface="Roboto Condensed"/>
+                  </a:rPr>
+                  <a:t>BOW </a:t>
+                </a:r>
+              </a:p>
+            </p:txBody>
+          </p:sp>
+          <p:sp>
+            <p:nvSpPr>
+              <p:cNvPr id="17" name="Rectangle 16"/>
+              <p:cNvSpPr/>
+              <p:nvPr/>
+            </p:nvSpPr>
+            <p:spPr>
+              <a:xfrm>
+                <a:off x="2459057" y="3392878"/>
+                <a:ext cx="1183026" cy="553959"/>
+              </a:xfrm>
+              <a:prstGeom prst="rect">
+                <a:avLst/>
+              </a:prstGeom>
+              <a:solidFill>
+                <a:schemeClr val="accent6"/>
+              </a:solidFill>
+              <a:ln>
+                <a:noFill/>
+              </a:ln>
+            </p:spPr>
+            <p:style>
+              <a:lnRef idx="3">
+                <a:schemeClr val="lt1"/>
+              </a:lnRef>
+              <a:fillRef idx="1">
+                <a:schemeClr val="accent1"/>
+              </a:fillRef>
+              <a:effectRef idx="1">
+                <a:schemeClr val="accent1"/>
+              </a:effectRef>
+              <a:fontRef idx="minor">
+                <a:schemeClr val="lt1"/>
+              </a:fontRef>
+            </p:style>
+            <p:txBody>
+              <a:bodyPr rtlCol="0" anchor="ctr"/>
+              <a:lstStyle/>
+              <a:p>
+                <a:pPr algn="ctr"/>
+                <a:r>
+                  <a:rPr lang="en-US" sz="1500" dirty="0" smtClean="0">
+                    <a:latin typeface="Roboto Condensed"/>
+                    <a:ea typeface="Roboto Condensed" panose="02000000000000000000" pitchFamily="2" charset="0"/>
+                    <a:cs typeface="Roboto Condensed"/>
+                  </a:rPr>
+                  <a:t>Happiness</a:t>
+                </a:r>
+              </a:p>
+              <a:p>
+                <a:pPr algn="ctr"/>
+                <a:r>
+                  <a:rPr lang="en-US" sz="1500" dirty="0" smtClean="0">
+                    <a:latin typeface="Roboto Condensed"/>
+                    <a:ea typeface="Roboto Condensed" panose="02000000000000000000" pitchFamily="2" charset="0"/>
+                    <a:cs typeface="Roboto Condensed"/>
+                  </a:rPr>
+                  <a:t>BOW</a:t>
+                </a:r>
+              </a:p>
+            </p:txBody>
+          </p:sp>
+          <p:sp>
+            <p:nvSpPr>
+              <p:cNvPr id="18" name="Rectangle 17"/>
+              <p:cNvSpPr/>
+              <p:nvPr/>
+            </p:nvSpPr>
+            <p:spPr>
+              <a:xfrm>
+                <a:off x="2452699" y="4049559"/>
+                <a:ext cx="1189384" cy="553959"/>
+              </a:xfrm>
+              <a:prstGeom prst="rect">
+                <a:avLst/>
+              </a:prstGeom>
+              <a:solidFill>
+                <a:schemeClr val="accent6"/>
+              </a:solidFill>
+              <a:ln>
+                <a:noFill/>
+              </a:ln>
+            </p:spPr>
+            <p:style>
+              <a:lnRef idx="3">
+                <a:schemeClr val="lt1"/>
+              </a:lnRef>
+              <a:fillRef idx="1">
+                <a:schemeClr val="accent1"/>
+              </a:fillRef>
+              <a:effectRef idx="1">
+                <a:schemeClr val="accent1"/>
+              </a:effectRef>
+              <a:fontRef idx="minor">
+                <a:schemeClr val="lt1"/>
+              </a:fontRef>
+            </p:style>
+            <p:txBody>
+              <a:bodyPr rtlCol="0" anchor="ctr"/>
+              <a:lstStyle/>
+              <a:p>
+                <a:pPr algn="ctr"/>
+                <a:r>
+                  <a:rPr lang="en-US" sz="1500" dirty="0" smtClean="0">
+                    <a:latin typeface="Roboto Condensed"/>
+                    <a:ea typeface="Roboto Condensed" panose="02000000000000000000" pitchFamily="2" charset="0"/>
+                    <a:cs typeface="Roboto Condensed"/>
+                  </a:rPr>
+                  <a:t>Sadness</a:t>
+                </a:r>
+              </a:p>
+              <a:p>
+                <a:pPr algn="ctr"/>
+                <a:r>
+                  <a:rPr lang="en-US" sz="1500" dirty="0" smtClean="0">
+                    <a:latin typeface="Roboto Condensed"/>
+                    <a:ea typeface="Roboto Condensed" panose="02000000000000000000" pitchFamily="2" charset="0"/>
+                    <a:cs typeface="Roboto Condensed"/>
+                  </a:rPr>
+                  <a:t>BOW</a:t>
+                </a:r>
+              </a:p>
+            </p:txBody>
+          </p:sp>
+          <p:sp>
+            <p:nvSpPr>
+              <p:cNvPr id="22" name="Rectangle 21"/>
+              <p:cNvSpPr/>
+              <p:nvPr/>
+            </p:nvSpPr>
+            <p:spPr>
+              <a:xfrm>
+                <a:off x="6144849" y="4818691"/>
+                <a:ext cx="2409378" cy="426203"/>
+              </a:xfrm>
+              <a:prstGeom prst="rect">
+                <a:avLst/>
+              </a:prstGeom>
+              <a:noFill/>
+              <a:ln>
+                <a:noFill/>
+              </a:ln>
+            </p:spPr>
+            <p:style>
+              <a:lnRef idx="3">
+                <a:schemeClr val="lt1"/>
+              </a:lnRef>
+              <a:fillRef idx="1">
+                <a:schemeClr val="accent1"/>
+              </a:fillRef>
+              <a:effectRef idx="1">
+                <a:schemeClr val="accent1"/>
+              </a:effectRef>
+              <a:fontRef idx="minor">
+                <a:schemeClr val="lt1"/>
+              </a:fontRef>
+            </p:style>
+            <p:txBody>
+              <a:bodyPr rtlCol="0" anchor="ctr"/>
+              <a:lstStyle/>
+              <a:p>
+                <a:pPr algn="ctr"/>
+                <a:r>
+                  <a:rPr lang="en-US" sz="1500" dirty="0" smtClean="0">
+                    <a:solidFill>
+                      <a:srgbClr val="000000"/>
+                    </a:solidFill>
+                    <a:latin typeface="Roboto Condensed"/>
+                    <a:ea typeface="Roboto Condensed" panose="02000000000000000000" pitchFamily="2" charset="0"/>
+                    <a:cs typeface="Roboto Condensed"/>
+                  </a:rPr>
+                  <a:t>Dominant </a:t>
+                </a:r>
+                <a:r>
+                  <a:rPr lang="en-US" sz="1500" dirty="0">
+                    <a:solidFill>
+                      <a:srgbClr val="000000"/>
+                    </a:solidFill>
+                    <a:latin typeface="Roboto Condensed"/>
+                    <a:ea typeface="Roboto Condensed" panose="02000000000000000000" pitchFamily="2" charset="0"/>
+                    <a:cs typeface="Roboto Condensed"/>
+                  </a:rPr>
+                  <a:t>e</a:t>
+                </a:r>
+                <a:r>
+                  <a:rPr lang="en-US" sz="1500" dirty="0" smtClean="0">
+                    <a:solidFill>
+                      <a:srgbClr val="000000"/>
+                    </a:solidFill>
+                    <a:latin typeface="Roboto Condensed"/>
+                    <a:ea typeface="Roboto Condensed" panose="02000000000000000000" pitchFamily="2" charset="0"/>
+                    <a:cs typeface="Roboto Condensed"/>
+                  </a:rPr>
+                  <a:t>motion in a tweet</a:t>
+                </a:r>
+                <a:endParaRPr lang="en-US" sz="1500" dirty="0" smtClean="0">
+                  <a:solidFill>
+                    <a:srgbClr val="000000"/>
+                  </a:solidFill>
+                  <a:latin typeface="Roboto Condensed"/>
+                  <a:ea typeface="Roboto Condensed" panose="02000000000000000000" pitchFamily="2" charset="0"/>
+                  <a:cs typeface="Roboto Condensed"/>
+                </a:endParaRPr>
+              </a:p>
+            </p:txBody>
+          </p:sp>
+          <p:sp>
+            <p:nvSpPr>
+              <p:cNvPr id="28" name="Rectangle 27"/>
+              <p:cNvSpPr/>
+              <p:nvPr/>
+            </p:nvSpPr>
+            <p:spPr>
+              <a:xfrm>
+                <a:off x="6630071" y="3987170"/>
+                <a:ext cx="1531544" cy="553959"/>
+              </a:xfrm>
+              <a:prstGeom prst="rect">
+                <a:avLst/>
+              </a:prstGeom>
+              <a:solidFill>
+                <a:schemeClr val="accent2"/>
+              </a:solidFill>
+              <a:ln>
+                <a:noFill/>
+              </a:ln>
+            </p:spPr>
+            <p:style>
+              <a:lnRef idx="3">
+                <a:schemeClr val="lt1"/>
+              </a:lnRef>
+              <a:fillRef idx="1">
+                <a:schemeClr val="accent1"/>
+              </a:fillRef>
+              <a:effectRef idx="1">
+                <a:schemeClr val="accent1"/>
+              </a:effectRef>
+              <a:fontRef idx="minor">
+                <a:schemeClr val="lt1"/>
+              </a:fontRef>
+            </p:style>
+            <p:txBody>
+              <a:bodyPr rtlCol="0" anchor="ctr"/>
+              <a:lstStyle/>
+              <a:p>
+                <a:pPr algn="ctr"/>
+                <a:r>
+                  <a:rPr lang="en-US" sz="1500" dirty="0" smtClean="0">
+                    <a:solidFill>
+                      <a:schemeClr val="bg1"/>
+                    </a:solidFill>
+                    <a:latin typeface="Roboto Condensed"/>
+                    <a:ea typeface="Roboto Condensed" panose="02000000000000000000" pitchFamily="2" charset="0"/>
+                    <a:cs typeface="Roboto Condensed"/>
+                  </a:rPr>
+                  <a:t>Voting System</a:t>
+                </a:r>
+              </a:p>
+            </p:txBody>
+          </p:sp>
+          <p:sp>
+            <p:nvSpPr>
+              <p:cNvPr id="29" name="Rectangle 28"/>
+              <p:cNvSpPr/>
+              <p:nvPr/>
+            </p:nvSpPr>
+            <p:spPr>
+              <a:xfrm>
+                <a:off x="6633056" y="2253193"/>
+                <a:ext cx="1531544" cy="553959"/>
+              </a:xfrm>
+              <a:prstGeom prst="rect">
+                <a:avLst/>
+              </a:prstGeom>
+              <a:solidFill>
+                <a:schemeClr val="accent2"/>
+              </a:solidFill>
+              <a:ln>
+                <a:noFill/>
+              </a:ln>
+            </p:spPr>
+            <p:style>
+              <a:lnRef idx="3">
+                <a:schemeClr val="lt1"/>
+              </a:lnRef>
+              <a:fillRef idx="1">
+                <a:schemeClr val="accent1"/>
+              </a:fillRef>
+              <a:effectRef idx="1">
+                <a:schemeClr val="accent1"/>
+              </a:effectRef>
+              <a:fontRef idx="minor">
+                <a:schemeClr val="lt1"/>
+              </a:fontRef>
+            </p:style>
+            <p:txBody>
+              <a:bodyPr rtlCol="0" anchor="ctr"/>
+              <a:lstStyle/>
+              <a:p>
+                <a:pPr algn="ctr"/>
+                <a:r>
+                  <a:rPr lang="en-US" sz="1500" dirty="0" err="1" smtClean="0">
+                    <a:solidFill>
+                      <a:schemeClr val="bg1"/>
+                    </a:solidFill>
+                    <a:latin typeface="Roboto Condensed"/>
+                    <a:ea typeface="Roboto Condensed" panose="02000000000000000000" pitchFamily="2" charset="0"/>
+                    <a:cs typeface="Roboto Condensed"/>
+                  </a:rPr>
+                  <a:t>Tokenizer</a:t>
+                </a:r>
+                <a:endParaRPr lang="en-US" sz="1500" dirty="0" smtClean="0">
+                  <a:solidFill>
+                    <a:schemeClr val="bg1"/>
+                  </a:solidFill>
+                  <a:latin typeface="Roboto Condensed"/>
+                  <a:ea typeface="Roboto Condensed" panose="02000000000000000000" pitchFamily="2" charset="0"/>
+                  <a:cs typeface="Roboto Condensed"/>
+                </a:endParaRPr>
+              </a:p>
+            </p:txBody>
+          </p:sp>
+          <p:sp>
+            <p:nvSpPr>
+              <p:cNvPr id="31" name="Rectangle 30"/>
+              <p:cNvSpPr/>
+              <p:nvPr/>
+            </p:nvSpPr>
+            <p:spPr>
+              <a:xfrm>
+                <a:off x="6627093" y="1615574"/>
+                <a:ext cx="1531544" cy="382492"/>
+              </a:xfrm>
+              <a:prstGeom prst="rect">
+                <a:avLst/>
+              </a:prstGeom>
+              <a:noFill/>
+              <a:ln>
+                <a:noFill/>
+              </a:ln>
+            </p:spPr>
+            <p:style>
+              <a:lnRef idx="3">
+                <a:schemeClr val="lt1"/>
+              </a:lnRef>
+              <a:fillRef idx="1">
+                <a:schemeClr val="accent1"/>
+              </a:fillRef>
+              <a:effectRef idx="1">
+                <a:schemeClr val="accent1"/>
+              </a:effectRef>
+              <a:fontRef idx="minor">
+                <a:schemeClr val="lt1"/>
+              </a:fontRef>
+            </p:style>
+            <p:txBody>
+              <a:bodyPr rtlCol="0" anchor="ctr"/>
+              <a:lstStyle/>
+              <a:p>
+                <a:pPr algn="ctr"/>
+                <a:r>
+                  <a:rPr lang="en-US" sz="1500" dirty="0" smtClean="0">
+                    <a:solidFill>
+                      <a:srgbClr val="000000"/>
+                    </a:solidFill>
+                    <a:latin typeface="Roboto Condensed"/>
+                    <a:ea typeface="Roboto Condensed" panose="02000000000000000000" pitchFamily="2" charset="0"/>
+                    <a:cs typeface="Roboto Condensed"/>
+                  </a:rPr>
+                  <a:t>Tweet</a:t>
+                </a:r>
+              </a:p>
+            </p:txBody>
+          </p:sp>
+          <p:sp>
+            <p:nvSpPr>
+              <p:cNvPr id="36" name="Right Arrow 35"/>
+              <p:cNvSpPr/>
+              <p:nvPr/>
+            </p:nvSpPr>
+            <p:spPr>
+              <a:xfrm>
+                <a:off x="3727421" y="2757856"/>
+                <a:ext cx="1271752" cy="483933"/>
+              </a:xfrm>
+              <a:prstGeom prst="rightArrow">
+                <a:avLst>
+                  <a:gd name="adj1" fmla="val 56965"/>
+                  <a:gd name="adj2" fmla="val 50999"/>
+                </a:avLst>
+              </a:prstGeom>
+              <a:solidFill>
+                <a:schemeClr val="accent2">
+                  <a:lumMod val="40000"/>
+                  <a:lumOff val="60000"/>
+                </a:schemeClr>
+              </a:solidFill>
+              <a:ln>
+                <a:noFill/>
+              </a:ln>
+            </p:spPr>
+            <p:style>
+              <a:lnRef idx="3">
+                <a:schemeClr val="lt1"/>
+              </a:lnRef>
+              <a:fillRef idx="1">
+                <a:schemeClr val="accent1"/>
+              </a:fillRef>
+              <a:effectRef idx="1">
+                <a:schemeClr val="accent1"/>
+              </a:effectRef>
+              <a:fontRef idx="minor">
+                <a:schemeClr val="lt1"/>
+              </a:fontRef>
+            </p:style>
+            <p:txBody>
+              <a:bodyPr rtlCol="0" anchor="ctr"/>
+              <a:lstStyle/>
+              <a:p>
+                <a:pPr algn="ctr"/>
+                <a:endParaRPr lang="en-US"/>
+              </a:p>
+            </p:txBody>
+          </p:sp>
+          <p:sp>
+            <p:nvSpPr>
+              <p:cNvPr id="37" name="Right Arrow 36"/>
+              <p:cNvSpPr/>
+              <p:nvPr/>
+            </p:nvSpPr>
+            <p:spPr>
+              <a:xfrm>
+                <a:off x="3727421" y="3420893"/>
+                <a:ext cx="1271752" cy="483933"/>
+              </a:xfrm>
+              <a:prstGeom prst="rightArrow">
+                <a:avLst>
+                  <a:gd name="adj1" fmla="val 56965"/>
+                  <a:gd name="adj2" fmla="val 50999"/>
+                </a:avLst>
+              </a:prstGeom>
+              <a:solidFill>
+                <a:schemeClr val="accent2">
+                  <a:lumMod val="40000"/>
+                  <a:lumOff val="60000"/>
+                </a:schemeClr>
+              </a:solidFill>
+              <a:ln>
+                <a:noFill/>
+              </a:ln>
+            </p:spPr>
+            <p:style>
+              <a:lnRef idx="3">
+                <a:schemeClr val="lt1"/>
+              </a:lnRef>
+              <a:fillRef idx="1">
+                <a:schemeClr val="accent1"/>
+              </a:fillRef>
+              <a:effectRef idx="1">
+                <a:schemeClr val="accent1"/>
+              </a:effectRef>
+              <a:fontRef idx="minor">
+                <a:schemeClr val="lt1"/>
+              </a:fontRef>
+            </p:style>
+            <p:txBody>
+              <a:bodyPr rtlCol="0" anchor="ctr"/>
+              <a:lstStyle/>
+              <a:p>
+                <a:pPr algn="ctr"/>
+                <a:endParaRPr lang="en-US"/>
+              </a:p>
+            </p:txBody>
+          </p:sp>
+          <p:sp>
+            <p:nvSpPr>
+              <p:cNvPr id="38" name="Right Arrow 37"/>
+              <p:cNvSpPr/>
+              <p:nvPr/>
+            </p:nvSpPr>
+            <p:spPr>
+              <a:xfrm>
+                <a:off x="3727421" y="4083931"/>
+                <a:ext cx="1271752" cy="483933"/>
+              </a:xfrm>
+              <a:prstGeom prst="rightArrow">
+                <a:avLst>
+                  <a:gd name="adj1" fmla="val 56965"/>
+                  <a:gd name="adj2" fmla="val 50999"/>
+                </a:avLst>
+              </a:prstGeom>
+              <a:solidFill>
+                <a:schemeClr val="accent2">
+                  <a:lumMod val="40000"/>
+                  <a:lumOff val="60000"/>
+                </a:schemeClr>
+              </a:solidFill>
+              <a:ln>
+                <a:noFill/>
+              </a:ln>
+            </p:spPr>
+            <p:style>
+              <a:lnRef idx="3">
+                <a:schemeClr val="lt1"/>
+              </a:lnRef>
+              <a:fillRef idx="1">
+                <a:schemeClr val="accent1"/>
+              </a:fillRef>
+              <a:effectRef idx="1">
+                <a:schemeClr val="accent1"/>
+              </a:effectRef>
+              <a:fontRef idx="minor">
+                <a:schemeClr val="lt1"/>
+              </a:fontRef>
+            </p:style>
+            <p:txBody>
+              <a:bodyPr rtlCol="0" anchor="ctr"/>
+              <a:lstStyle/>
+              <a:p>
+                <a:pPr algn="ctr"/>
+                <a:endParaRPr lang="en-US"/>
+              </a:p>
+            </p:txBody>
+          </p:sp>
+          <p:sp>
+            <p:nvSpPr>
+              <p:cNvPr id="35" name="Right Arrow 34"/>
+              <p:cNvSpPr/>
+              <p:nvPr/>
+            </p:nvSpPr>
+            <p:spPr>
+              <a:xfrm>
+                <a:off x="3724440" y="2110513"/>
+                <a:ext cx="1271752" cy="483933"/>
+              </a:xfrm>
+              <a:prstGeom prst="rightArrow">
+                <a:avLst>
+                  <a:gd name="adj1" fmla="val 56965"/>
+                  <a:gd name="adj2" fmla="val 50999"/>
+                </a:avLst>
+              </a:prstGeom>
+              <a:solidFill>
+                <a:schemeClr val="accent2">
+                  <a:lumMod val="40000"/>
+                  <a:lumOff val="60000"/>
+                </a:schemeClr>
+              </a:solidFill>
+              <a:ln>
+                <a:noFill/>
+              </a:ln>
+            </p:spPr>
+            <p:style>
+              <a:lnRef idx="3">
+                <a:schemeClr val="lt1"/>
+              </a:lnRef>
+              <a:fillRef idx="1">
+                <a:schemeClr val="accent1"/>
+              </a:fillRef>
+              <a:effectRef idx="1">
+                <a:schemeClr val="accent1"/>
+              </a:effectRef>
+              <a:fontRef idx="minor">
+                <a:schemeClr val="lt1"/>
+              </a:fontRef>
+            </p:style>
+            <p:txBody>
+              <a:bodyPr rtlCol="0" anchor="ctr"/>
+              <a:lstStyle/>
+              <a:p>
+                <a:pPr algn="ctr"/>
+                <a:endParaRPr lang="en-US"/>
+              </a:p>
+            </p:txBody>
+          </p:sp>
+          <p:sp>
+            <p:nvSpPr>
+              <p:cNvPr id="26" name="Rectangle 25"/>
+              <p:cNvSpPr/>
+              <p:nvPr/>
+            </p:nvSpPr>
+            <p:spPr>
+              <a:xfrm rot="16200000">
+                <a:off x="3049095" y="3021017"/>
+                <a:ext cx="2521408" cy="644370"/>
+              </a:xfrm>
+              <a:prstGeom prst="rect">
+                <a:avLst/>
+              </a:prstGeom>
+              <a:solidFill>
+                <a:schemeClr val="accent6"/>
+              </a:solidFill>
+              <a:ln>
+                <a:solidFill>
+                  <a:srgbClr val="FFFFFF"/>
+                </a:solidFill>
+              </a:ln>
+            </p:spPr>
+            <p:style>
+              <a:lnRef idx="3">
+                <a:schemeClr val="lt1"/>
+              </a:lnRef>
+              <a:fillRef idx="1">
+                <a:schemeClr val="accent1"/>
+              </a:fillRef>
+              <a:effectRef idx="1">
+                <a:schemeClr val="accent1"/>
+              </a:effectRef>
+              <a:fontRef idx="minor">
+                <a:schemeClr val="lt1"/>
+              </a:fontRef>
+            </p:style>
+            <p:txBody>
+              <a:bodyPr rtlCol="0" anchor="ctr"/>
+              <a:lstStyle/>
+              <a:p>
+                <a:pPr algn="ctr"/>
+                <a:r>
+                  <a:rPr lang="en-US" sz="1500" dirty="0" smtClean="0">
+                    <a:latin typeface="Roboto Condensed"/>
+                    <a:ea typeface="Roboto Condensed" panose="02000000000000000000" pitchFamily="2" charset="0"/>
+                    <a:cs typeface="Roboto Condensed"/>
+                  </a:rPr>
+                  <a:t>Association Scoring</a:t>
+                </a:r>
+                <a:endParaRPr lang="en-US" sz="1500" dirty="0">
+                  <a:latin typeface="Roboto Condensed"/>
+                  <a:ea typeface="Roboto Condensed" panose="02000000000000000000" pitchFamily="2" charset="0"/>
+                  <a:cs typeface="Roboto Condensed"/>
+                </a:endParaRPr>
+              </a:p>
+            </p:txBody>
+          </p:sp>
+          <p:sp>
+            <p:nvSpPr>
+              <p:cNvPr id="39" name="Down Arrow 38"/>
+              <p:cNvSpPr/>
+              <p:nvPr/>
+            </p:nvSpPr>
+            <p:spPr>
+              <a:xfrm>
+                <a:off x="6966649" y="1926655"/>
+                <a:ext cx="849821" cy="492037"/>
+              </a:xfrm>
+              <a:prstGeom prst="downArrow">
+                <a:avLst>
+                  <a:gd name="adj1" fmla="val 60989"/>
+                  <a:gd name="adj2" fmla="val 50000"/>
+                </a:avLst>
+              </a:prstGeom>
+              <a:solidFill>
+                <a:schemeClr val="accent2">
+                  <a:lumMod val="20000"/>
+                  <a:lumOff val="80000"/>
+                </a:schemeClr>
+              </a:solidFill>
+              <a:ln/>
+            </p:spPr>
+            <p:style>
+              <a:lnRef idx="3">
+                <a:schemeClr val="lt1"/>
+              </a:lnRef>
+              <a:fillRef idx="1">
+                <a:schemeClr val="accent1"/>
+              </a:fillRef>
+              <a:effectRef idx="1">
+                <a:schemeClr val="accent1"/>
+              </a:effectRef>
+              <a:fontRef idx="minor">
+                <a:schemeClr val="lt1"/>
+              </a:fontRef>
+            </p:style>
+            <p:txBody>
+              <a:bodyPr rtlCol="0" anchor="ctr"/>
+              <a:lstStyle/>
+              <a:p>
+                <a:pPr algn="ctr"/>
+                <a:endParaRPr lang="en-US"/>
+              </a:p>
+            </p:txBody>
+          </p:sp>
+          <p:pic>
+            <p:nvPicPr>
+              <p:cNvPr id="13" name="Picture 12" descr="CodeCogsEqn-9.png"/>
+              <p:cNvPicPr>
+                <a:picLocks noChangeAspect="1"/>
+              </p:cNvPicPr>
+              <p:nvPr/>
+            </p:nvPicPr>
+            <p:blipFill>
+              <a:blip r:embed="rId2">
+                <a:extLst>
+                  <a:ext uri="{28A0092B-C50C-407E-A947-70E740481C1C}">
+                    <a14:useLocalDpi xmlns:a14="http://schemas.microsoft.com/office/drawing/2010/main" val="0"/>
+                  </a:ext>
+                </a:extLst>
+              </a:blip>
+              <a:stretch>
+                <a:fillRect/>
+              </a:stretch>
+            </p:blipFill>
+            <p:spPr>
+              <a:xfrm>
+                <a:off x="5042147" y="4163882"/>
+                <a:ext cx="292757" cy="321088"/>
+              </a:xfrm>
+              <a:prstGeom prst="rect">
+                <a:avLst/>
+              </a:prstGeom>
+            </p:spPr>
+          </p:pic>
+          <p:pic>
+            <p:nvPicPr>
+              <p:cNvPr id="14" name="Picture 13" descr="CodeCogsEqn-8.png"/>
+              <p:cNvPicPr>
+                <a:picLocks noChangeAspect="1"/>
+              </p:cNvPicPr>
+              <p:nvPr/>
+            </p:nvPicPr>
+            <p:blipFill>
+              <a:blip r:embed="rId3">
+                <a:extLst>
+                  <a:ext uri="{28A0092B-C50C-407E-A947-70E740481C1C}">
+                    <a14:useLocalDpi xmlns:a14="http://schemas.microsoft.com/office/drawing/2010/main" val="0"/>
+                  </a:ext>
+                </a:extLst>
+              </a:blip>
+              <a:stretch>
+                <a:fillRect/>
+              </a:stretch>
+            </p:blipFill>
+            <p:spPr>
+              <a:xfrm>
+                <a:off x="5042146" y="3494495"/>
+                <a:ext cx="292757" cy="330532"/>
+              </a:xfrm>
+              <a:prstGeom prst="rect">
+                <a:avLst/>
+              </a:prstGeom>
+            </p:spPr>
+          </p:pic>
+          <p:pic>
+            <p:nvPicPr>
+              <p:cNvPr id="15" name="Picture 14" descr="CodeCogsEqn-7.png"/>
+              <p:cNvPicPr>
+                <a:picLocks noChangeAspect="1"/>
+              </p:cNvPicPr>
+              <p:nvPr/>
+            </p:nvPicPr>
+            <p:blipFill>
+              <a:blip r:embed="rId4">
+                <a:extLst>
+                  <a:ext uri="{28A0092B-C50C-407E-A947-70E740481C1C}">
+                    <a14:useLocalDpi xmlns:a14="http://schemas.microsoft.com/office/drawing/2010/main" val="0"/>
+                  </a:ext>
+                </a:extLst>
+              </a:blip>
+              <a:stretch>
+                <a:fillRect/>
+              </a:stretch>
+            </p:blipFill>
+            <p:spPr>
+              <a:xfrm>
+                <a:off x="5042147" y="2837808"/>
+                <a:ext cx="292757" cy="321088"/>
+              </a:xfrm>
+              <a:prstGeom prst="rect">
+                <a:avLst/>
+              </a:prstGeom>
+            </p:spPr>
+          </p:pic>
+          <p:pic>
+            <p:nvPicPr>
+              <p:cNvPr id="19" name="Picture 18" descr="CodeCogsEqn-6.png"/>
+              <p:cNvPicPr>
+                <a:picLocks noChangeAspect="1"/>
+              </p:cNvPicPr>
+              <p:nvPr/>
+            </p:nvPicPr>
+            <p:blipFill>
+              <a:blip r:embed="rId5">
+                <a:extLst>
+                  <a:ext uri="{28A0092B-C50C-407E-A947-70E740481C1C}">
+                    <a14:useLocalDpi xmlns:a14="http://schemas.microsoft.com/office/drawing/2010/main" val="0"/>
+                  </a:ext>
+                </a:extLst>
+              </a:blip>
+              <a:stretch>
+                <a:fillRect/>
+              </a:stretch>
+            </p:blipFill>
+            <p:spPr>
+              <a:xfrm>
+                <a:off x="5039158" y="2193446"/>
+                <a:ext cx="283313" cy="321088"/>
+              </a:xfrm>
+              <a:prstGeom prst="rect">
+                <a:avLst/>
+              </a:prstGeom>
+            </p:spPr>
+          </p:pic>
+          <p:pic>
+            <p:nvPicPr>
+              <p:cNvPr id="20" name="Picture 19" descr="CodeCogsEqn-5.png"/>
+              <p:cNvPicPr>
+                <a:picLocks noChangeAspect="1"/>
+              </p:cNvPicPr>
+              <p:nvPr/>
+            </p:nvPicPr>
+            <p:blipFill>
+              <a:blip r:embed="rId6">
+                <a:extLst>
+                  <a:ext uri="{28A0092B-C50C-407E-A947-70E740481C1C}">
+                    <a14:useLocalDpi xmlns:a14="http://schemas.microsoft.com/office/drawing/2010/main" val="0"/>
+                  </a:ext>
+                </a:extLst>
+              </a:blip>
+              <a:stretch>
+                <a:fillRect/>
+              </a:stretch>
+            </p:blipFill>
+            <p:spPr>
+              <a:xfrm>
+                <a:off x="6302555" y="3216954"/>
+                <a:ext cx="2182565" cy="363761"/>
+              </a:xfrm>
+              <a:prstGeom prst="rect">
+                <a:avLst/>
+              </a:prstGeom>
+            </p:spPr>
+          </p:pic>
+          <p:cxnSp>
+            <p:nvCxnSpPr>
+              <p:cNvPr id="30" name="Elbow Connector 29"/>
+              <p:cNvCxnSpPr>
+                <a:stCxn id="19" idx="3"/>
+                <a:endCxn id="20" idx="1"/>
+              </p:cNvCxnSpPr>
+              <p:nvPr/>
+            </p:nvCxnSpPr>
+            <p:spPr>
+              <a:xfrm>
+                <a:off x="5322471" y="2353990"/>
+                <a:ext cx="980084" cy="1044845"/>
+              </a:xfrm>
+              <a:prstGeom prst="bentConnector3">
+                <a:avLst/>
+              </a:prstGeom>
+              <a:ln>
+                <a:solidFill>
+                  <a:srgbClr val="000000"/>
+                </a:solidFill>
+                <a:tailEnd type="arrow"/>
+              </a:ln>
+            </p:spPr>
+            <p:style>
+              <a:lnRef idx="2">
+                <a:schemeClr val="accent1"/>
+              </a:lnRef>
+              <a:fillRef idx="0">
+                <a:schemeClr val="accent1"/>
+              </a:fillRef>
+              <a:effectRef idx="1">
+                <a:schemeClr val="accent1"/>
+              </a:effectRef>
+              <a:fontRef idx="minor">
+                <a:schemeClr val="tx1"/>
+              </a:fontRef>
+            </p:style>
+          </p:cxnSp>
+          <p:cxnSp>
+            <p:nvCxnSpPr>
+              <p:cNvPr id="44" name="Elbow Connector 43"/>
+              <p:cNvCxnSpPr>
+                <a:stCxn id="13" idx="3"/>
+              </p:cNvCxnSpPr>
+              <p:nvPr/>
+            </p:nvCxnSpPr>
+            <p:spPr>
+              <a:xfrm flipV="1">
+                <a:off x="5334904" y="3399234"/>
+                <a:ext cx="483090" cy="925192"/>
+              </a:xfrm>
+              <a:prstGeom prst="bentConnector2">
+                <a:avLst/>
+              </a:prstGeom>
+              <a:ln>
+                <a:solidFill>
+                  <a:srgbClr val="000000"/>
+                </a:solidFill>
+              </a:ln>
+            </p:spPr>
+            <p:style>
+              <a:lnRef idx="2">
+                <a:schemeClr val="accent1"/>
+              </a:lnRef>
+              <a:fillRef idx="0">
+                <a:schemeClr val="accent1"/>
+              </a:fillRef>
+              <a:effectRef idx="1">
+                <a:schemeClr val="accent1"/>
+              </a:effectRef>
+              <a:fontRef idx="minor">
+                <a:schemeClr val="tx1"/>
+              </a:fontRef>
+            </p:style>
+          </p:cxnSp>
+          <p:cxnSp>
+            <p:nvCxnSpPr>
+              <p:cNvPr id="50" name="Straight Connector 49"/>
+              <p:cNvCxnSpPr>
+                <a:stCxn id="15" idx="3"/>
+              </p:cNvCxnSpPr>
+              <p:nvPr/>
+            </p:nvCxnSpPr>
+            <p:spPr>
+              <a:xfrm flipV="1">
+                <a:off x="5334904" y="2997676"/>
+                <a:ext cx="492429" cy="676"/>
+              </a:xfrm>
+              <a:prstGeom prst="line">
+                <a:avLst/>
+              </a:prstGeom>
+              <a:ln>
+                <a:solidFill>
+                  <a:srgbClr val="000000"/>
+                </a:solidFill>
+              </a:ln>
+            </p:spPr>
+            <p:style>
+              <a:lnRef idx="2">
+                <a:schemeClr val="accent1"/>
+              </a:lnRef>
+              <a:fillRef idx="0">
+                <a:schemeClr val="accent1"/>
+              </a:fillRef>
+              <a:effectRef idx="1">
+                <a:schemeClr val="accent1"/>
+              </a:effectRef>
+              <a:fontRef idx="minor">
+                <a:schemeClr val="tx1"/>
+              </a:fontRef>
+            </p:style>
+          </p:cxnSp>
+          <p:cxnSp>
+            <p:nvCxnSpPr>
+              <p:cNvPr id="57" name="Straight Connector 56"/>
+              <p:cNvCxnSpPr>
+                <a:stCxn id="14" idx="3"/>
+              </p:cNvCxnSpPr>
+              <p:nvPr/>
+            </p:nvCxnSpPr>
+            <p:spPr>
+              <a:xfrm>
+                <a:off x="5334903" y="3659761"/>
+                <a:ext cx="483091" cy="952"/>
+              </a:xfrm>
+              <a:prstGeom prst="line">
+                <a:avLst/>
+              </a:prstGeom>
+              <a:ln>
+                <a:solidFill>
+                  <a:srgbClr val="000000"/>
+                </a:solidFill>
+              </a:ln>
+            </p:spPr>
+            <p:style>
+              <a:lnRef idx="2">
+                <a:schemeClr val="accent1"/>
+              </a:lnRef>
+              <a:fillRef idx="0">
+                <a:schemeClr val="accent1"/>
+              </a:fillRef>
+              <a:effectRef idx="1">
+                <a:schemeClr val="accent1"/>
+              </a:effectRef>
+              <a:fontRef idx="minor">
+                <a:schemeClr val="tx1"/>
+              </a:fontRef>
+            </p:style>
+          </p:cxnSp>
+          <p:sp>
+            <p:nvSpPr>
+              <p:cNvPr id="59" name="Down Arrow 58"/>
+              <p:cNvSpPr/>
+              <p:nvPr/>
+            </p:nvSpPr>
+            <p:spPr>
+              <a:xfrm>
+                <a:off x="6969630" y="2704738"/>
+                <a:ext cx="849821" cy="492037"/>
+              </a:xfrm>
+              <a:prstGeom prst="downArrow">
+                <a:avLst>
+                  <a:gd name="adj1" fmla="val 60989"/>
+                  <a:gd name="adj2" fmla="val 50000"/>
+                </a:avLst>
+              </a:prstGeom>
+              <a:solidFill>
+                <a:schemeClr val="accent2">
+                  <a:lumMod val="20000"/>
+                  <a:lumOff val="80000"/>
+                </a:schemeClr>
+              </a:solidFill>
+              <a:ln/>
+            </p:spPr>
+            <p:style>
+              <a:lnRef idx="3">
+                <a:schemeClr val="lt1"/>
+              </a:lnRef>
+              <a:fillRef idx="1">
+                <a:schemeClr val="accent1"/>
+              </a:fillRef>
+              <a:effectRef idx="1">
+                <a:schemeClr val="accent1"/>
+              </a:effectRef>
+              <a:fontRef idx="minor">
+                <a:schemeClr val="lt1"/>
+              </a:fontRef>
+            </p:style>
+            <p:txBody>
+              <a:bodyPr rtlCol="0" anchor="ctr"/>
+              <a:lstStyle/>
+              <a:p>
+                <a:pPr algn="ctr"/>
+                <a:endParaRPr lang="en-US"/>
+              </a:p>
+            </p:txBody>
+          </p:sp>
+          <p:sp>
+            <p:nvSpPr>
+              <p:cNvPr id="60" name="Down Arrow 59"/>
+              <p:cNvSpPr/>
+              <p:nvPr/>
+            </p:nvSpPr>
+            <p:spPr>
+              <a:xfrm>
+                <a:off x="6969630" y="3638583"/>
+                <a:ext cx="849821" cy="492037"/>
+              </a:xfrm>
+              <a:prstGeom prst="downArrow">
+                <a:avLst>
+                  <a:gd name="adj1" fmla="val 60989"/>
+                  <a:gd name="adj2" fmla="val 50000"/>
+                </a:avLst>
+              </a:prstGeom>
+              <a:solidFill>
+                <a:schemeClr val="accent2">
+                  <a:lumMod val="20000"/>
+                  <a:lumOff val="80000"/>
+                </a:schemeClr>
+              </a:solidFill>
+              <a:ln/>
+            </p:spPr>
+            <p:style>
+              <a:lnRef idx="3">
+                <a:schemeClr val="lt1"/>
+              </a:lnRef>
+              <a:fillRef idx="1">
+                <a:schemeClr val="accent1"/>
+              </a:fillRef>
+              <a:effectRef idx="1">
+                <a:schemeClr val="accent1"/>
+              </a:effectRef>
+              <a:fontRef idx="minor">
+                <a:schemeClr val="lt1"/>
+              </a:fontRef>
+            </p:style>
+            <p:txBody>
+              <a:bodyPr rtlCol="0" anchor="ctr"/>
+              <a:lstStyle/>
+              <a:p>
+                <a:pPr algn="ctr"/>
+                <a:endParaRPr lang="en-US"/>
+              </a:p>
+            </p:txBody>
+          </p:sp>
+          <p:sp>
+            <p:nvSpPr>
+              <p:cNvPr id="61" name="Down Arrow 60"/>
+              <p:cNvSpPr/>
+              <p:nvPr/>
+            </p:nvSpPr>
+            <p:spPr>
+              <a:xfrm>
+                <a:off x="6978969" y="4432360"/>
+                <a:ext cx="849821" cy="492037"/>
+              </a:xfrm>
+              <a:prstGeom prst="downArrow">
+                <a:avLst>
+                  <a:gd name="adj1" fmla="val 60989"/>
+                  <a:gd name="adj2" fmla="val 50000"/>
+                </a:avLst>
+              </a:prstGeom>
+              <a:solidFill>
+                <a:schemeClr val="accent2">
+                  <a:lumMod val="20000"/>
+                  <a:lumOff val="80000"/>
+                </a:schemeClr>
+              </a:solidFill>
+              <a:ln/>
+            </p:spPr>
+            <p:style>
+              <a:lnRef idx="3">
+                <a:schemeClr val="lt1"/>
+              </a:lnRef>
+              <a:fillRef idx="1">
+                <a:schemeClr val="accent1"/>
+              </a:fillRef>
+              <a:effectRef idx="1">
+                <a:schemeClr val="accent1"/>
+              </a:effectRef>
+              <a:fontRef idx="minor">
+                <a:schemeClr val="lt1"/>
+              </a:fontRef>
+            </p:style>
+            <p:txBody>
+              <a:bodyPr rtlCol="0" anchor="ctr"/>
+              <a:lstStyle/>
+              <a:p>
+                <a:pPr algn="ctr"/>
+                <a:endParaRPr lang="en-US"/>
+              </a:p>
+            </p:txBody>
+          </p:sp>
+        </p:grpSp>
+        <p:sp>
+          <p:nvSpPr>
+            <p:cNvPr id="71" name="Rectangle 70"/>
+            <p:cNvSpPr/>
+            <p:nvPr/>
+          </p:nvSpPr>
+          <p:spPr>
+            <a:xfrm>
+              <a:off x="6578451" y="5649825"/>
+              <a:ext cx="2020134" cy="597278"/>
+            </a:xfrm>
+            <a:prstGeom prst="rect">
+              <a:avLst/>
+            </a:prstGeom>
+            <a:noFill/>
+            <a:ln>
+              <a:noFill/>
+            </a:ln>
+          </p:spPr>
+          <p:style>
+            <a:lnRef idx="3">
+              <a:schemeClr val="lt1"/>
+            </a:lnRef>
+            <a:fillRef idx="1">
+              <a:schemeClr val="accent1"/>
+            </a:fillRef>
+            <a:effectRef idx="1">
+              <a:schemeClr val="accent1"/>
+            </a:effectRef>
+            <a:fontRef idx="minor">
+              <a:schemeClr val="lt1"/>
+            </a:fontRef>
+          </p:style>
+          <p:txBody>
+            <a:bodyPr rtlCol="0" anchor="ctr"/>
+            <a:lstStyle/>
+            <a:p>
+              <a:pPr algn="ctr"/>
+              <a:r>
+                <a:rPr lang="en-US" sz="1500" dirty="0" smtClean="0">
+                  <a:solidFill>
+                    <a:srgbClr val="000000"/>
+                  </a:solidFill>
+                  <a:latin typeface="Roboto Condensed"/>
+                  <a:ea typeface="Roboto Condensed" panose="02000000000000000000" pitchFamily="2" charset="0"/>
+                  <a:cs typeface="Roboto Condensed"/>
+                </a:rPr>
+                <a:t>Distribution of emotions in the crowd</a:t>
+              </a:r>
+              <a:endParaRPr lang="en-US" sz="1500" dirty="0" smtClean="0">
+                <a:solidFill>
+                  <a:srgbClr val="000000"/>
+                </a:solidFill>
+                <a:latin typeface="Roboto Condensed"/>
+                <a:ea typeface="Roboto Condensed" panose="02000000000000000000" pitchFamily="2" charset="0"/>
+                <a:cs typeface="Roboto Condensed"/>
+              </a:endParaRPr>
+            </a:p>
+          </p:txBody>
+        </p:sp>
+        <p:sp>
+          <p:nvSpPr>
+            <p:cNvPr id="72" name="Down Arrow 71"/>
+            <p:cNvSpPr/>
+            <p:nvPr/>
+          </p:nvSpPr>
+          <p:spPr>
+            <a:xfrm>
+              <a:off x="7178062" y="5201105"/>
+              <a:ext cx="849821" cy="492037"/>
+            </a:xfrm>
+            <a:prstGeom prst="downArrow">
+              <a:avLst>
+                <a:gd name="adj1" fmla="val 60989"/>
+                <a:gd name="adj2" fmla="val 50000"/>
+              </a:avLst>
+            </a:prstGeom>
+            <a:solidFill>
+              <a:schemeClr val="accent2">
+                <a:lumMod val="20000"/>
+                <a:lumOff val="80000"/>
+              </a:schemeClr>
+            </a:solidFill>
+            <a:ln/>
+          </p:spPr>
+          <p:style>
+            <a:lnRef idx="3">
+              <a:schemeClr val="lt1"/>
+            </a:lnRef>
+            <a:fillRef idx="1">
+              <a:schemeClr val="accent1"/>
+            </a:fillRef>
+            <a:effectRef idx="1">
+              <a:schemeClr val="accent1"/>
+            </a:effectRef>
+            <a:fontRef idx="minor">
+              <a:schemeClr val="lt1"/>
+            </a:fontRef>
+          </p:style>
+          <p:txBody>
+            <a:bodyPr rtlCol="0" anchor="ctr"/>
+            <a:lstStyle/>
+            <a:p>
+              <a:pPr algn="ctr"/>
+              <a:endParaRPr lang="en-US"/>
+            </a:p>
+          </p:txBody>
+        </p:sp>
+        <p:sp>
+          <p:nvSpPr>
+            <p:cNvPr id="73" name="Flowchart: Magnetic Disk 2"/>
+            <p:cNvSpPr/>
+            <p:nvPr/>
+          </p:nvSpPr>
+          <p:spPr>
+            <a:xfrm>
+              <a:off x="7016323" y="186771"/>
+              <a:ext cx="1129985" cy="955522"/>
+            </a:xfrm>
+            <a:prstGeom prst="flowChartMagneticDisk">
+              <a:avLst/>
+            </a:prstGeom>
+            <a:solidFill>
+              <a:schemeClr val="accent2"/>
+            </a:solidFill>
+            <a:ln>
+              <a:solidFill>
+                <a:schemeClr val="bg1"/>
+              </a:solidFill>
+            </a:ln>
+          </p:spPr>
+          <p:style>
+            <a:lnRef idx="3">
+              <a:schemeClr val="lt1"/>
+            </a:lnRef>
+            <a:fillRef idx="1">
+              <a:schemeClr val="accent1"/>
+            </a:fillRef>
+            <a:effectRef idx="1">
+              <a:schemeClr val="accent1"/>
+            </a:effectRef>
+            <a:fontRef idx="minor">
+              <a:schemeClr val="lt1"/>
+            </a:fontRef>
+          </p:style>
+          <p:txBody>
+            <a:bodyPr rtlCol="0" anchor="ctr"/>
+            <a:lstStyle/>
+            <a:p>
+              <a:pPr algn="ctr"/>
+              <a:r>
+                <a:rPr lang="en-US" sz="1500" dirty="0" smtClean="0">
+                  <a:latin typeface="Roboto Condensed"/>
+                  <a:ea typeface="Roboto Condensed" panose="02000000000000000000" pitchFamily="2" charset="0"/>
+                  <a:cs typeface="Roboto Condensed"/>
+                </a:rPr>
+                <a:t>Collected dataset</a:t>
+              </a:r>
+              <a:endParaRPr lang="en-US" sz="1500" dirty="0">
+                <a:latin typeface="Roboto Condensed"/>
+                <a:ea typeface="Roboto Condensed" panose="02000000000000000000" pitchFamily="2" charset="0"/>
+                <a:cs typeface="Roboto Condensed"/>
+              </a:endParaRPr>
+            </a:p>
+          </p:txBody>
+        </p:sp>
+        <p:sp>
+          <p:nvSpPr>
+            <p:cNvPr id="74" name="Down Arrow 73"/>
+            <p:cNvSpPr/>
+            <p:nvPr/>
+          </p:nvSpPr>
+          <p:spPr>
+            <a:xfrm>
+              <a:off x="7162366" y="1179177"/>
+              <a:ext cx="849821" cy="492037"/>
+            </a:xfrm>
+            <a:prstGeom prst="downArrow">
+              <a:avLst>
+                <a:gd name="adj1" fmla="val 60989"/>
+                <a:gd name="adj2" fmla="val 50000"/>
+              </a:avLst>
+            </a:prstGeom>
+            <a:solidFill>
+              <a:schemeClr val="accent2">
+                <a:lumMod val="20000"/>
+                <a:lumOff val="80000"/>
+              </a:schemeClr>
+            </a:solidFill>
+            <a:ln/>
+          </p:spPr>
+          <p:style>
+            <a:lnRef idx="3">
+              <a:schemeClr val="lt1"/>
+            </a:lnRef>
+            <a:fillRef idx="1">
+              <a:schemeClr val="accent1"/>
+            </a:fillRef>
+            <a:effectRef idx="1">
+              <a:schemeClr val="accent1"/>
+            </a:effectRef>
+            <a:fontRef idx="minor">
+              <a:schemeClr val="lt1"/>
+            </a:fontRef>
+          </p:style>
+          <p:txBody>
+            <a:bodyPr rtlCol="0" anchor="ctr"/>
+            <a:lstStyle/>
+            <a:p>
+              <a:pPr algn="ctr"/>
+              <a:endParaRPr lang="en-US"/>
+            </a:p>
+          </p:txBody>
+        </p:sp>
+      </p:grpSp>
+    </p:spTree>
+    <p:extLst>
+      <p:ext uri="{BB962C8B-B14F-4D97-AF65-F5344CB8AC3E}">
+        <p14:creationId xmlns:p14="http://schemas.microsoft.com/office/powerpoint/2010/main" val="1058762162"/>
+      </p:ext>
+    </p:extLst>
+  </p:cSld>
+  <p:clrMapOvr>
+    <a:masterClrMapping/>
+  </p:clrMapOvr>
+  <p:timing>
+    <p:tnLst>
+      <p:par>
+        <p:cTn xmlns:p14="http://schemas.microsoft.com/office/powerpoint/2010/main" id="1" dur="indefinite" restart="never" nodeType="tmRoot"/>
+      </p:par>
+    </p:tnLst>
+  </p:timing>
+</p:sld>
+</file>
+
 <file path=ppt/theme/theme1.xml><?xml version="1.0" encoding="utf-8"?>
 <a:theme xmlns:a="http://schemas.openxmlformats.org/drawingml/2006/main" name="Office Theme">
   <a:themeElements>

</xml_diff>

<commit_message>
added level of density diagram
</commit_message>
<xml_diff>
--- a/Drawings/Drawing.pptx
+++ b/Drawings/Drawing.pptx
@@ -12,6 +12,7 @@
     <p:sldId id="260" r:id="rId6"/>
     <p:sldId id="261" r:id="rId7"/>
     <p:sldId id="262" r:id="rId8"/>
+    <p:sldId id="263" r:id="rId9"/>
   </p:sldIdLst>
   <p:sldSz cx="9906000" cy="6858000" type="A4"/>
   <p:notesSz cx="6858000" cy="9144000"/>
@@ -112,7 +113,7 @@
   </p:defaultTextStyle>
   <p:extLst>
     <p:ext uri="{EFAFB233-063F-42B5-8137-9DF3F51BA10A}">
-      <p15:sldGuideLst xmlns:p15="http://schemas.microsoft.com/office/powerpoint/2012/main" xmlns=""/>
+      <p15:sldGuideLst xmlns="" xmlns:p15="http://schemas.microsoft.com/office/powerpoint/2012/main"/>
     </p:ext>
   </p:extLst>
 </p:presentation>
@@ -249,7 +250,7 @@
           <a:p>
             <a:fld id="{A8528DE2-31C9-49BB-A893-07DE5C7B4A44}" type="datetimeFigureOut">
               <a:rPr lang="en-US" smtClean="0"/>
-              <a:t>19/05/15</a:t>
+              <a:t>21/05/15</a:t>
             </a:fld>
             <a:endParaRPr lang="en-US"/>
           </a:p>
@@ -419,7 +420,7 @@
           <a:p>
             <a:fld id="{A8528DE2-31C9-49BB-A893-07DE5C7B4A44}" type="datetimeFigureOut">
               <a:rPr lang="en-US" smtClean="0"/>
-              <a:t>19/05/15</a:t>
+              <a:t>21/05/15</a:t>
             </a:fld>
             <a:endParaRPr lang="en-US"/>
           </a:p>
@@ -599,7 +600,7 @@
           <a:p>
             <a:fld id="{A8528DE2-31C9-49BB-A893-07DE5C7B4A44}" type="datetimeFigureOut">
               <a:rPr lang="en-US" smtClean="0"/>
-              <a:t>19/05/15</a:t>
+              <a:t>21/05/15</a:t>
             </a:fld>
             <a:endParaRPr lang="en-US"/>
           </a:p>
@@ -769,7 +770,7 @@
           <a:p>
             <a:fld id="{A8528DE2-31C9-49BB-A893-07DE5C7B4A44}" type="datetimeFigureOut">
               <a:rPr lang="en-US" smtClean="0"/>
-              <a:t>19/05/15</a:t>
+              <a:t>21/05/15</a:t>
             </a:fld>
             <a:endParaRPr lang="en-US"/>
           </a:p>
@@ -1015,7 +1016,7 @@
           <a:p>
             <a:fld id="{A8528DE2-31C9-49BB-A893-07DE5C7B4A44}" type="datetimeFigureOut">
               <a:rPr lang="en-US" smtClean="0"/>
-              <a:t>19/05/15</a:t>
+              <a:t>21/05/15</a:t>
             </a:fld>
             <a:endParaRPr lang="en-US"/>
           </a:p>
@@ -1247,7 +1248,7 @@
           <a:p>
             <a:fld id="{A8528DE2-31C9-49BB-A893-07DE5C7B4A44}" type="datetimeFigureOut">
               <a:rPr lang="en-US" smtClean="0"/>
-              <a:t>19/05/15</a:t>
+              <a:t>21/05/15</a:t>
             </a:fld>
             <a:endParaRPr lang="en-US"/>
           </a:p>
@@ -1614,7 +1615,7 @@
           <a:p>
             <a:fld id="{A8528DE2-31C9-49BB-A893-07DE5C7B4A44}" type="datetimeFigureOut">
               <a:rPr lang="en-US" smtClean="0"/>
-              <a:t>19/05/15</a:t>
+              <a:t>21/05/15</a:t>
             </a:fld>
             <a:endParaRPr lang="en-US"/>
           </a:p>
@@ -1732,7 +1733,7 @@
           <a:p>
             <a:fld id="{A8528DE2-31C9-49BB-A893-07DE5C7B4A44}" type="datetimeFigureOut">
               <a:rPr lang="en-US" smtClean="0"/>
-              <a:t>19/05/15</a:t>
+              <a:t>21/05/15</a:t>
             </a:fld>
             <a:endParaRPr lang="en-US"/>
           </a:p>
@@ -1827,7 +1828,7 @@
           <a:p>
             <a:fld id="{A8528DE2-31C9-49BB-A893-07DE5C7B4A44}" type="datetimeFigureOut">
               <a:rPr lang="en-US" smtClean="0"/>
-              <a:t>19/05/15</a:t>
+              <a:t>21/05/15</a:t>
             </a:fld>
             <a:endParaRPr lang="en-US"/>
           </a:p>
@@ -2104,7 +2105,7 @@
           <a:p>
             <a:fld id="{A8528DE2-31C9-49BB-A893-07DE5C7B4A44}" type="datetimeFigureOut">
               <a:rPr lang="en-US" smtClean="0"/>
-              <a:t>19/05/15</a:t>
+              <a:t>21/05/15</a:t>
             </a:fld>
             <a:endParaRPr lang="en-US"/>
           </a:p>
@@ -2357,7 +2358,7 @@
           <a:p>
             <a:fld id="{A8528DE2-31C9-49BB-A893-07DE5C7B4A44}" type="datetimeFigureOut">
               <a:rPr lang="en-US" smtClean="0"/>
-              <a:t>19/05/15</a:t>
+              <a:t>21/05/15</a:t>
             </a:fld>
             <a:endParaRPr lang="en-US"/>
           </a:p>
@@ -2570,7 +2571,7 @@
           <a:p>
             <a:fld id="{A8528DE2-31C9-49BB-A893-07DE5C7B4A44}" type="datetimeFigureOut">
               <a:rPr lang="en-US" smtClean="0"/>
-              <a:t>19/05/15</a:t>
+              <a:t>21/05/15</a:t>
             </a:fld>
             <a:endParaRPr lang="en-US"/>
           </a:p>
@@ -11931,6 +11932,482 @@
 </p:sld>
 </file>
 
+<file path=ppt/slides/slide8.xml><?xml version="1.0" encoding="utf-8"?>
+<p:sld xmlns:a="http://schemas.openxmlformats.org/drawingml/2006/main" xmlns:r="http://schemas.openxmlformats.org/officeDocument/2006/relationships" xmlns:p="http://schemas.openxmlformats.org/presentationml/2006/main">
+  <p:cSld>
+    <p:spTree>
+      <p:nvGrpSpPr>
+        <p:cNvPr id="1" name=""/>
+        <p:cNvGrpSpPr/>
+        <p:nvPr/>
+      </p:nvGrpSpPr>
+      <p:grpSpPr>
+        <a:xfrm>
+          <a:off x="0" y="0"/>
+          <a:ext cx="0" cy="0"/>
+          <a:chOff x="0" y="0"/>
+          <a:chExt cx="0" cy="0"/>
+        </a:xfrm>
+      </p:grpSpPr>
+      <p:grpSp>
+        <p:nvGrpSpPr>
+          <p:cNvPr id="17" name="Group 16"/>
+          <p:cNvGrpSpPr/>
+          <p:nvPr/>
+        </p:nvGrpSpPr>
+        <p:grpSpPr>
+          <a:xfrm>
+            <a:off x="3098225" y="2091835"/>
+            <a:ext cx="2960392" cy="2353043"/>
+            <a:chOff x="3098225" y="2091835"/>
+            <a:chExt cx="2960392" cy="2353043"/>
+          </a:xfrm>
+        </p:grpSpPr>
+        <p:sp>
+          <p:nvSpPr>
+            <p:cNvPr id="4" name="Rectangle 3"/>
+            <p:cNvSpPr/>
+            <p:nvPr/>
+          </p:nvSpPr>
+          <p:spPr>
+            <a:xfrm>
+              <a:off x="3523665" y="2091835"/>
+              <a:ext cx="1186007" cy="2353043"/>
+            </a:xfrm>
+            <a:prstGeom prst="rect">
+              <a:avLst/>
+            </a:prstGeom>
+            <a:gradFill flip="none" rotWithShape="1">
+              <a:gsLst>
+                <a:gs pos="0">
+                  <a:schemeClr val="accent2"/>
+                </a:gs>
+                <a:gs pos="100000">
+                  <a:schemeClr val="bg1"/>
+                </a:gs>
+              </a:gsLst>
+              <a:lin ang="5400000" scaled="0"/>
+              <a:tileRect/>
+            </a:gradFill>
+            <a:ln w="12700">
+              <a:solidFill>
+                <a:schemeClr val="tx1"/>
+              </a:solidFill>
+            </a:ln>
+          </p:spPr>
+          <p:style>
+            <a:lnRef idx="3">
+              <a:schemeClr val="lt1"/>
+            </a:lnRef>
+            <a:fillRef idx="1">
+              <a:schemeClr val="accent1"/>
+            </a:fillRef>
+            <a:effectRef idx="1">
+              <a:schemeClr val="accent1"/>
+            </a:effectRef>
+            <a:fontRef idx="minor">
+              <a:schemeClr val="lt1"/>
+            </a:fontRef>
+          </p:style>
+          <p:txBody>
+            <a:bodyPr rtlCol="0" anchor="ctr"/>
+            <a:lstStyle/>
+            <a:p>
+              <a:pPr algn="ctr"/>
+              <a:endParaRPr lang="en-US" sz="1500" dirty="0" smtClean="0">
+                <a:latin typeface="Roboto Condensed"/>
+                <a:ea typeface="Roboto Condensed" panose="02000000000000000000" pitchFamily="2" charset="0"/>
+                <a:cs typeface="Roboto Condensed"/>
+              </a:endParaRPr>
+            </a:p>
+          </p:txBody>
+        </p:sp>
+        <p:cxnSp>
+          <p:nvCxnSpPr>
+            <p:cNvPr id="6" name="Straight Connector 5"/>
+            <p:cNvCxnSpPr/>
+            <p:nvPr/>
+          </p:nvCxnSpPr>
+          <p:spPr>
+            <a:xfrm>
+              <a:off x="3099881" y="2817969"/>
+              <a:ext cx="2031713" cy="15719"/>
+            </a:xfrm>
+            <a:prstGeom prst="line">
+              <a:avLst/>
+            </a:prstGeom>
+            <a:ln>
+              <a:solidFill>
+                <a:schemeClr val="tx1"/>
+              </a:solidFill>
+              <a:prstDash val="dash"/>
+            </a:ln>
+          </p:spPr>
+          <p:style>
+            <a:lnRef idx="2">
+              <a:schemeClr val="accent1"/>
+            </a:lnRef>
+            <a:fillRef idx="0">
+              <a:schemeClr val="accent1"/>
+            </a:fillRef>
+            <a:effectRef idx="1">
+              <a:schemeClr val="accent1"/>
+            </a:effectRef>
+            <a:fontRef idx="minor">
+              <a:schemeClr val="tx1"/>
+            </a:fontRef>
+          </p:style>
+        </p:cxnSp>
+        <p:cxnSp>
+          <p:nvCxnSpPr>
+            <p:cNvPr id="7" name="Straight Connector 6"/>
+            <p:cNvCxnSpPr/>
+            <p:nvPr/>
+          </p:nvCxnSpPr>
+          <p:spPr>
+            <a:xfrm>
+              <a:off x="3098225" y="3665468"/>
+              <a:ext cx="2053213" cy="9595"/>
+            </a:xfrm>
+            <a:prstGeom prst="line">
+              <a:avLst/>
+            </a:prstGeom>
+            <a:ln>
+              <a:solidFill>
+                <a:schemeClr val="tx1"/>
+              </a:solidFill>
+              <a:prstDash val="dash"/>
+            </a:ln>
+          </p:spPr>
+          <p:style>
+            <a:lnRef idx="2">
+              <a:schemeClr val="accent1"/>
+            </a:lnRef>
+            <a:fillRef idx="0">
+              <a:schemeClr val="accent1"/>
+            </a:fillRef>
+            <a:effectRef idx="1">
+              <a:schemeClr val="accent1"/>
+            </a:effectRef>
+            <a:fontRef idx="minor">
+              <a:schemeClr val="tx1"/>
+            </a:fontRef>
+          </p:style>
+        </p:cxnSp>
+        <p:sp>
+          <p:nvSpPr>
+            <p:cNvPr id="11" name="Rectangle 10"/>
+            <p:cNvSpPr/>
+            <p:nvPr/>
+          </p:nvSpPr>
+          <p:spPr>
+            <a:xfrm>
+              <a:off x="3729937" y="2269462"/>
+              <a:ext cx="767047" cy="374274"/>
+            </a:xfrm>
+            <a:prstGeom prst="rect">
+              <a:avLst/>
+            </a:prstGeom>
+            <a:noFill/>
+            <a:ln>
+              <a:noFill/>
+            </a:ln>
+          </p:spPr>
+          <p:style>
+            <a:lnRef idx="3">
+              <a:schemeClr val="lt1"/>
+            </a:lnRef>
+            <a:fillRef idx="1">
+              <a:schemeClr val="accent1"/>
+            </a:fillRef>
+            <a:effectRef idx="1">
+              <a:schemeClr val="accent1"/>
+            </a:effectRef>
+            <a:fontRef idx="minor">
+              <a:schemeClr val="lt1"/>
+            </a:fontRef>
+          </p:style>
+          <p:txBody>
+            <a:bodyPr rtlCol="0" anchor="ctr"/>
+            <a:lstStyle/>
+            <a:p>
+              <a:pPr algn="ctr"/>
+              <a:r>
+                <a:rPr lang="en-US" sz="1500" dirty="0" smtClean="0">
+                  <a:solidFill>
+                    <a:schemeClr val="tx1"/>
+                  </a:solidFill>
+                  <a:latin typeface="Roboto Condensed"/>
+                  <a:ea typeface="Roboto Condensed" panose="02000000000000000000" pitchFamily="2" charset="0"/>
+                  <a:cs typeface="Roboto Condensed"/>
+                </a:rPr>
+                <a:t>High</a:t>
+              </a:r>
+              <a:endParaRPr lang="en-US" sz="1500" dirty="0" smtClean="0">
+                <a:solidFill>
+                  <a:schemeClr val="tx1"/>
+                </a:solidFill>
+                <a:latin typeface="Roboto Condensed"/>
+                <a:ea typeface="Roboto Condensed" panose="02000000000000000000" pitchFamily="2" charset="0"/>
+                <a:cs typeface="Roboto Condensed"/>
+              </a:endParaRPr>
+            </a:p>
+          </p:txBody>
+        </p:sp>
+        <p:sp>
+          <p:nvSpPr>
+            <p:cNvPr id="13" name="Rectangle 12"/>
+            <p:cNvSpPr/>
+            <p:nvPr/>
+          </p:nvSpPr>
+          <p:spPr>
+            <a:xfrm>
+              <a:off x="3641650" y="3076316"/>
+              <a:ext cx="933091" cy="374274"/>
+            </a:xfrm>
+            <a:prstGeom prst="rect">
+              <a:avLst/>
+            </a:prstGeom>
+            <a:noFill/>
+            <a:ln>
+              <a:noFill/>
+            </a:ln>
+          </p:spPr>
+          <p:style>
+            <a:lnRef idx="3">
+              <a:schemeClr val="lt1"/>
+            </a:lnRef>
+            <a:fillRef idx="1">
+              <a:schemeClr val="accent1"/>
+            </a:fillRef>
+            <a:effectRef idx="1">
+              <a:schemeClr val="accent1"/>
+            </a:effectRef>
+            <a:fontRef idx="minor">
+              <a:schemeClr val="lt1"/>
+            </a:fontRef>
+          </p:style>
+          <p:txBody>
+            <a:bodyPr rtlCol="0" anchor="ctr"/>
+            <a:lstStyle/>
+            <a:p>
+              <a:pPr algn="ctr"/>
+              <a:r>
+                <a:rPr lang="en-US" sz="1500" dirty="0" smtClean="0">
+                  <a:solidFill>
+                    <a:schemeClr val="tx1"/>
+                  </a:solidFill>
+                  <a:latin typeface="Roboto Condensed"/>
+                  <a:ea typeface="Roboto Condensed" panose="02000000000000000000" pitchFamily="2" charset="0"/>
+                  <a:cs typeface="Roboto Condensed"/>
+                </a:rPr>
+                <a:t>Medium</a:t>
+              </a:r>
+              <a:endParaRPr lang="en-US" sz="1500" dirty="0" smtClean="0">
+                <a:solidFill>
+                  <a:schemeClr val="tx1"/>
+                </a:solidFill>
+                <a:latin typeface="Roboto Condensed"/>
+                <a:ea typeface="Roboto Condensed" panose="02000000000000000000" pitchFamily="2" charset="0"/>
+                <a:cs typeface="Roboto Condensed"/>
+              </a:endParaRPr>
+            </a:p>
+          </p:txBody>
+        </p:sp>
+        <p:sp>
+          <p:nvSpPr>
+            <p:cNvPr id="14" name="Rectangle 13"/>
+            <p:cNvSpPr/>
+            <p:nvPr/>
+          </p:nvSpPr>
+          <p:spPr>
+            <a:xfrm>
+              <a:off x="3733302" y="3879805"/>
+              <a:ext cx="767047" cy="374274"/>
+            </a:xfrm>
+            <a:prstGeom prst="rect">
+              <a:avLst/>
+            </a:prstGeom>
+            <a:noFill/>
+            <a:ln>
+              <a:noFill/>
+            </a:ln>
+          </p:spPr>
+          <p:style>
+            <a:lnRef idx="3">
+              <a:schemeClr val="lt1"/>
+            </a:lnRef>
+            <a:fillRef idx="1">
+              <a:schemeClr val="accent1"/>
+            </a:fillRef>
+            <a:effectRef idx="1">
+              <a:schemeClr val="accent1"/>
+            </a:effectRef>
+            <a:fontRef idx="minor">
+              <a:schemeClr val="lt1"/>
+            </a:fontRef>
+          </p:style>
+          <p:txBody>
+            <a:bodyPr rtlCol="0" anchor="ctr"/>
+            <a:lstStyle/>
+            <a:p>
+              <a:pPr algn="ctr"/>
+              <a:r>
+                <a:rPr lang="en-US" sz="1500" dirty="0" smtClean="0">
+                  <a:solidFill>
+                    <a:schemeClr val="tx1"/>
+                  </a:solidFill>
+                  <a:latin typeface="Roboto Condensed"/>
+                  <a:ea typeface="Roboto Condensed" panose="02000000000000000000" pitchFamily="2" charset="0"/>
+                  <a:cs typeface="Roboto Condensed"/>
+                </a:rPr>
+                <a:t>Low</a:t>
+              </a:r>
+              <a:endParaRPr lang="en-US" sz="1500" dirty="0" smtClean="0">
+                <a:solidFill>
+                  <a:schemeClr val="tx1"/>
+                </a:solidFill>
+                <a:latin typeface="Roboto Condensed"/>
+                <a:ea typeface="Roboto Condensed" panose="02000000000000000000" pitchFamily="2" charset="0"/>
+                <a:cs typeface="Roboto Condensed"/>
+              </a:endParaRPr>
+            </a:p>
+          </p:txBody>
+        </p:sp>
+        <p:sp>
+          <p:nvSpPr>
+            <p:cNvPr id="15" name="Rectangle 14"/>
+            <p:cNvSpPr/>
+            <p:nvPr/>
+          </p:nvSpPr>
+          <p:spPr>
+            <a:xfrm>
+              <a:off x="4893186" y="2881924"/>
+              <a:ext cx="1165431" cy="374274"/>
+            </a:xfrm>
+            <a:prstGeom prst="rect">
+              <a:avLst/>
+            </a:prstGeom>
+            <a:noFill/>
+            <a:ln>
+              <a:noFill/>
+            </a:ln>
+          </p:spPr>
+          <p:style>
+            <a:lnRef idx="3">
+              <a:schemeClr val="lt1"/>
+            </a:lnRef>
+            <a:fillRef idx="1">
+              <a:schemeClr val="accent1"/>
+            </a:fillRef>
+            <a:effectRef idx="1">
+              <a:schemeClr val="accent1"/>
+            </a:effectRef>
+            <a:fontRef idx="minor">
+              <a:schemeClr val="lt1"/>
+            </a:fontRef>
+          </p:style>
+          <p:txBody>
+            <a:bodyPr rtlCol="0" anchor="ctr"/>
+            <a:lstStyle/>
+            <a:p>
+              <a:pPr algn="ctr"/>
+              <a:r>
+                <a:rPr lang="en-US" sz="1500" dirty="0" smtClean="0">
+                  <a:solidFill>
+                    <a:schemeClr val="tx1"/>
+                  </a:solidFill>
+                  <a:latin typeface="Roboto Condensed"/>
+                  <a:ea typeface="Roboto Condensed" panose="02000000000000000000" pitchFamily="2" charset="0"/>
+                  <a:cs typeface="Roboto Condensed"/>
+                </a:rPr>
+                <a:t>Threshold t1</a:t>
+              </a:r>
+              <a:endParaRPr lang="en-US" sz="1500" dirty="0" smtClean="0">
+                <a:solidFill>
+                  <a:schemeClr val="tx1"/>
+                </a:solidFill>
+                <a:latin typeface="Roboto Condensed"/>
+                <a:ea typeface="Roboto Condensed" panose="02000000000000000000" pitchFamily="2" charset="0"/>
+                <a:cs typeface="Roboto Condensed"/>
+              </a:endParaRPr>
+            </a:p>
+          </p:txBody>
+        </p:sp>
+        <p:sp>
+          <p:nvSpPr>
+            <p:cNvPr id="16" name="Rectangle 15"/>
+            <p:cNvSpPr/>
+            <p:nvPr/>
+          </p:nvSpPr>
+          <p:spPr>
+            <a:xfrm>
+              <a:off x="4890072" y="3701737"/>
+              <a:ext cx="1165431" cy="374274"/>
+            </a:xfrm>
+            <a:prstGeom prst="rect">
+              <a:avLst/>
+            </a:prstGeom>
+            <a:noFill/>
+            <a:ln>
+              <a:noFill/>
+            </a:ln>
+          </p:spPr>
+          <p:style>
+            <a:lnRef idx="3">
+              <a:schemeClr val="lt1"/>
+            </a:lnRef>
+            <a:fillRef idx="1">
+              <a:schemeClr val="accent1"/>
+            </a:fillRef>
+            <a:effectRef idx="1">
+              <a:schemeClr val="accent1"/>
+            </a:effectRef>
+            <a:fontRef idx="minor">
+              <a:schemeClr val="lt1"/>
+            </a:fontRef>
+          </p:style>
+          <p:txBody>
+            <a:bodyPr rtlCol="0" anchor="ctr"/>
+            <a:lstStyle/>
+            <a:p>
+              <a:pPr algn="ctr"/>
+              <a:r>
+                <a:rPr lang="en-US" sz="1500" dirty="0" smtClean="0">
+                  <a:solidFill>
+                    <a:schemeClr val="tx1"/>
+                  </a:solidFill>
+                  <a:latin typeface="Roboto Condensed"/>
+                  <a:ea typeface="Roboto Condensed" panose="02000000000000000000" pitchFamily="2" charset="0"/>
+                  <a:cs typeface="Roboto Condensed"/>
+                </a:rPr>
+                <a:t>Threshold t2</a:t>
+              </a:r>
+              <a:endParaRPr lang="en-US" sz="1500" dirty="0" smtClean="0">
+                <a:solidFill>
+                  <a:schemeClr val="tx1"/>
+                </a:solidFill>
+                <a:latin typeface="Roboto Condensed"/>
+                <a:ea typeface="Roboto Condensed" panose="02000000000000000000" pitchFamily="2" charset="0"/>
+                <a:cs typeface="Roboto Condensed"/>
+              </a:endParaRPr>
+            </a:p>
+          </p:txBody>
+        </p:sp>
+      </p:grpSp>
+    </p:spTree>
+    <p:extLst>
+      <p:ext uri="{BB962C8B-B14F-4D97-AF65-F5344CB8AC3E}">
+        <p14:creationId xmlns:p14="http://schemas.microsoft.com/office/powerpoint/2010/main" val="1735976555"/>
+      </p:ext>
+    </p:extLst>
+  </p:cSld>
+  <p:clrMapOvr>
+    <a:masterClrMapping/>
+  </p:clrMapOvr>
+</p:sld>
+</file>
+
 <file path=ppt/theme/theme1.xml><?xml version="1.0" encoding="utf-8"?>
 <a:theme xmlns:a="http://schemas.openxmlformats.org/drawingml/2006/main" name="Office Theme">
   <a:themeElements>
@@ -12186,7 +12663,7 @@
   <a:extraClrSchemeLst/>
   <a:extLst>
     <a:ext uri="{05A4C25C-085E-4340-85A3-A5531E510DB2}">
-      <thm15:themeFamily xmlns:thm15="http://schemas.microsoft.com/office/thememl/2012/main" xmlns="" name="Office Theme" id="{62F939B6-93AF-4DB8-9C6B-D6C7DFDC589F}" vid="{4A3C46E8-61CC-4603-A589-7422A47A8E4A}"/>
+      <thm15:themeFamily xmlns="" xmlns:thm15="http://schemas.microsoft.com/office/thememl/2012/main" name="Office Theme" id="{62F939B6-93AF-4DB8-9C6B-D6C7DFDC589F}" vid="{4A3C46E8-61CC-4603-A589-7422A47A8E4A}"/>
     </a:ext>
   </a:extLst>
 </a:theme>

</xml_diff>

<commit_message>
changed litreview fix lit review a bit to delete old table and add comparison table remove voting system from approach and diagram add conclucsion to eval add missing ref in litreview
</commit_message>
<xml_diff>
--- a/Drawings/Drawing.pptx
+++ b/Drawings/Drawing.pptx
@@ -113,7 +113,7 @@
   </p:defaultTextStyle>
   <p:extLst>
     <p:ext uri="{EFAFB233-063F-42B5-8137-9DF3F51BA10A}">
-      <p15:sldGuideLst xmlns:p15="http://schemas.microsoft.com/office/powerpoint/2012/main" xmlns=""/>
+      <p15:sldGuideLst xmlns="" xmlns:p15="http://schemas.microsoft.com/office/powerpoint/2012/main"/>
     </p:ext>
   </p:extLst>
 </p:presentation>
@@ -250,7 +250,7 @@
           <a:p>
             <a:fld id="{A8528DE2-31C9-49BB-A893-07DE5C7B4A44}" type="datetimeFigureOut">
               <a:rPr lang="en-US" smtClean="0"/>
-              <a:t>22/05/15</a:t>
+              <a:t>2/06/15</a:t>
             </a:fld>
             <a:endParaRPr lang="en-US"/>
           </a:p>
@@ -420,7 +420,7 @@
           <a:p>
             <a:fld id="{A8528DE2-31C9-49BB-A893-07DE5C7B4A44}" type="datetimeFigureOut">
               <a:rPr lang="en-US" smtClean="0"/>
-              <a:t>22/05/15</a:t>
+              <a:t>2/06/15</a:t>
             </a:fld>
             <a:endParaRPr lang="en-US"/>
           </a:p>
@@ -600,7 +600,7 @@
           <a:p>
             <a:fld id="{A8528DE2-31C9-49BB-A893-07DE5C7B4A44}" type="datetimeFigureOut">
               <a:rPr lang="en-US" smtClean="0"/>
-              <a:t>22/05/15</a:t>
+              <a:t>2/06/15</a:t>
             </a:fld>
             <a:endParaRPr lang="en-US"/>
           </a:p>
@@ -770,7 +770,7 @@
           <a:p>
             <a:fld id="{A8528DE2-31C9-49BB-A893-07DE5C7B4A44}" type="datetimeFigureOut">
               <a:rPr lang="en-US" smtClean="0"/>
-              <a:t>22/05/15</a:t>
+              <a:t>2/06/15</a:t>
             </a:fld>
             <a:endParaRPr lang="en-US"/>
           </a:p>
@@ -1016,7 +1016,7 @@
           <a:p>
             <a:fld id="{A8528DE2-31C9-49BB-A893-07DE5C7B4A44}" type="datetimeFigureOut">
               <a:rPr lang="en-US" smtClean="0"/>
-              <a:t>22/05/15</a:t>
+              <a:t>2/06/15</a:t>
             </a:fld>
             <a:endParaRPr lang="en-US"/>
           </a:p>
@@ -1248,7 +1248,7 @@
           <a:p>
             <a:fld id="{A8528DE2-31C9-49BB-A893-07DE5C7B4A44}" type="datetimeFigureOut">
               <a:rPr lang="en-US" smtClean="0"/>
-              <a:t>22/05/15</a:t>
+              <a:t>2/06/15</a:t>
             </a:fld>
             <a:endParaRPr lang="en-US"/>
           </a:p>
@@ -1615,7 +1615,7 @@
           <a:p>
             <a:fld id="{A8528DE2-31C9-49BB-A893-07DE5C7B4A44}" type="datetimeFigureOut">
               <a:rPr lang="en-US" smtClean="0"/>
-              <a:t>22/05/15</a:t>
+              <a:t>2/06/15</a:t>
             </a:fld>
             <a:endParaRPr lang="en-US"/>
           </a:p>
@@ -1733,7 +1733,7 @@
           <a:p>
             <a:fld id="{A8528DE2-31C9-49BB-A893-07DE5C7B4A44}" type="datetimeFigureOut">
               <a:rPr lang="en-US" smtClean="0"/>
-              <a:t>22/05/15</a:t>
+              <a:t>2/06/15</a:t>
             </a:fld>
             <a:endParaRPr lang="en-US"/>
           </a:p>
@@ -1828,7 +1828,7 @@
           <a:p>
             <a:fld id="{A8528DE2-31C9-49BB-A893-07DE5C7B4A44}" type="datetimeFigureOut">
               <a:rPr lang="en-US" smtClean="0"/>
-              <a:t>22/05/15</a:t>
+              <a:t>2/06/15</a:t>
             </a:fld>
             <a:endParaRPr lang="en-US"/>
           </a:p>
@@ -2105,7 +2105,7 @@
           <a:p>
             <a:fld id="{A8528DE2-31C9-49BB-A893-07DE5C7B4A44}" type="datetimeFigureOut">
               <a:rPr lang="en-US" smtClean="0"/>
-              <a:t>22/05/15</a:t>
+              <a:t>2/06/15</a:t>
             </a:fld>
             <a:endParaRPr lang="en-US"/>
           </a:p>
@@ -2358,7 +2358,7 @@
           <a:p>
             <a:fld id="{A8528DE2-31C9-49BB-A893-07DE5C7B4A44}" type="datetimeFigureOut">
               <a:rPr lang="en-US" smtClean="0"/>
-              <a:t>22/05/15</a:t>
+              <a:t>2/06/15</a:t>
             </a:fld>
             <a:endParaRPr lang="en-US"/>
           </a:p>
@@ -2571,7 +2571,7 @@
           <a:p>
             <a:fld id="{A8528DE2-31C9-49BB-A893-07DE5C7B4A44}" type="datetimeFigureOut">
               <a:rPr lang="en-US" smtClean="0"/>
-              <a:t>22/05/15</a:t>
+              <a:t>2/06/15</a:t>
             </a:fld>
             <a:endParaRPr lang="en-US"/>
           </a:p>
@@ -9966,18 +9966,142 @@
       </p:grpSpPr>
       <p:grpSp>
         <p:nvGrpSpPr>
-          <p:cNvPr id="10" name="Group 9"/>
+          <p:cNvPr id="11" name="Group 10"/>
           <p:cNvGrpSpPr/>
           <p:nvPr/>
         </p:nvGrpSpPr>
         <p:grpSpPr>
           <a:xfrm>
-            <a:off x="1634266" y="644360"/>
-            <a:ext cx="7461604" cy="6060332"/>
-            <a:chOff x="1634266" y="644360"/>
-            <a:chExt cx="7461604" cy="6060332"/>
+            <a:off x="1494186" y="448253"/>
+            <a:ext cx="7433534" cy="5904183"/>
+            <a:chOff x="1634266" y="700394"/>
+            <a:chExt cx="7433534" cy="5904183"/>
           </a:xfrm>
         </p:grpSpPr>
+        <p:sp>
+          <p:nvSpPr>
+            <p:cNvPr id="43" name="Rectangle 42"/>
+            <p:cNvSpPr/>
+            <p:nvPr/>
+          </p:nvSpPr>
+          <p:spPr>
+            <a:xfrm>
+              <a:off x="7053680" y="6050618"/>
+              <a:ext cx="1783687" cy="553959"/>
+            </a:xfrm>
+            <a:prstGeom prst="rect">
+              <a:avLst/>
+            </a:prstGeom>
+            <a:solidFill>
+              <a:schemeClr val="accent2"/>
+            </a:solidFill>
+            <a:ln>
+              <a:noFill/>
+            </a:ln>
+          </p:spPr>
+          <p:style>
+            <a:lnRef idx="3">
+              <a:schemeClr val="lt1"/>
+            </a:lnRef>
+            <a:fillRef idx="1">
+              <a:schemeClr val="accent1"/>
+            </a:fillRef>
+            <a:effectRef idx="1">
+              <a:schemeClr val="accent1"/>
+            </a:effectRef>
+            <a:fontRef idx="minor">
+              <a:schemeClr val="lt1"/>
+            </a:fontRef>
+          </p:style>
+          <p:txBody>
+            <a:bodyPr rtlCol="0" anchor="ctr"/>
+            <a:lstStyle/>
+            <a:p>
+              <a:pPr algn="ctr"/>
+              <a:r>
+                <a:rPr lang="en-US" sz="1500" dirty="0" smtClean="0">
+                  <a:solidFill>
+                    <a:schemeClr val="bg1"/>
+                  </a:solidFill>
+                  <a:latin typeface="Roboto Condensed"/>
+                  <a:ea typeface="Roboto Condensed" panose="02000000000000000000" pitchFamily="2" charset="0"/>
+                  <a:cs typeface="Roboto Condensed"/>
+                </a:rPr>
+                <a:t>Emotion Distribution in the crowd</a:t>
+              </a:r>
+              <a:endParaRPr lang="en-US" sz="1500" dirty="0" smtClean="0">
+                <a:solidFill>
+                  <a:schemeClr val="bg1"/>
+                </a:solidFill>
+                <a:latin typeface="Roboto Condensed"/>
+                <a:ea typeface="Roboto Condensed" panose="02000000000000000000" pitchFamily="2" charset="0"/>
+                <a:cs typeface="Roboto Condensed"/>
+              </a:endParaRPr>
+            </a:p>
+          </p:txBody>
+        </p:sp>
+        <p:sp>
+          <p:nvSpPr>
+            <p:cNvPr id="40" name="Rectangle 39"/>
+            <p:cNvSpPr/>
+            <p:nvPr/>
+          </p:nvSpPr>
+          <p:spPr>
+            <a:xfrm>
+              <a:off x="7050699" y="5179146"/>
+              <a:ext cx="1783687" cy="553959"/>
+            </a:xfrm>
+            <a:prstGeom prst="rect">
+              <a:avLst/>
+            </a:prstGeom>
+            <a:solidFill>
+              <a:schemeClr val="accent2"/>
+            </a:solidFill>
+            <a:ln>
+              <a:noFill/>
+            </a:ln>
+          </p:spPr>
+          <p:style>
+            <a:lnRef idx="3">
+              <a:schemeClr val="lt1"/>
+            </a:lnRef>
+            <a:fillRef idx="1">
+              <a:schemeClr val="accent1"/>
+            </a:fillRef>
+            <a:effectRef idx="1">
+              <a:schemeClr val="accent1"/>
+            </a:effectRef>
+            <a:fontRef idx="minor">
+              <a:schemeClr val="lt1"/>
+            </a:fontRef>
+          </p:style>
+          <p:txBody>
+            <a:bodyPr rtlCol="0" anchor="ctr"/>
+            <a:lstStyle/>
+            <a:p>
+              <a:pPr algn="ctr"/>
+              <a:r>
+                <a:rPr lang="en-US" sz="1500" dirty="0" smtClean="0">
+                  <a:solidFill>
+                    <a:schemeClr val="bg1"/>
+                  </a:solidFill>
+                  <a:latin typeface="Roboto Condensed"/>
+                  <a:ea typeface="Roboto Condensed" panose="02000000000000000000" pitchFamily="2" charset="0"/>
+                  <a:cs typeface="Roboto Condensed"/>
+                </a:rPr>
+                <a:t>Emotion in a tweet</a:t>
+              </a:r>
+              <a:endParaRPr lang="en-US" sz="1500" dirty="0" smtClean="0">
+                <a:solidFill>
+                  <a:schemeClr val="bg1"/>
+                </a:solidFill>
+                <a:latin typeface="Roboto Condensed"/>
+                <a:ea typeface="Roboto Condensed" panose="02000000000000000000" pitchFamily="2" charset="0"/>
+                <a:cs typeface="Roboto Condensed"/>
+              </a:endParaRPr>
+            </a:p>
+          </p:txBody>
+        </p:sp>
         <p:grpSp>
           <p:nvGrpSpPr>
             <p:cNvPr id="70" name="Group 69"/>
@@ -9987,9 +10111,9 @@
           <p:grpSpPr>
             <a:xfrm>
               <a:off x="1634266" y="2035809"/>
-              <a:ext cx="7461604" cy="3629320"/>
+              <a:ext cx="7200121" cy="3308823"/>
               <a:chOff x="1092623" y="1615574"/>
-              <a:chExt cx="7461604" cy="3629320"/>
+              <a:chExt cx="7200121" cy="3308823"/>
             </a:xfrm>
           </p:grpSpPr>
           <p:sp>
@@ -10304,142 +10428,14 @@
           </p:sp>
           <p:sp>
             <p:nvSpPr>
-              <p:cNvPr id="22" name="Rectangle 21"/>
-              <p:cNvSpPr/>
-              <p:nvPr/>
-            </p:nvSpPr>
-            <p:spPr>
-              <a:xfrm>
-                <a:off x="6144849" y="4818691"/>
-                <a:ext cx="2409378" cy="426203"/>
-              </a:xfrm>
-              <a:prstGeom prst="rect">
-                <a:avLst/>
-              </a:prstGeom>
-              <a:noFill/>
-              <a:ln>
-                <a:noFill/>
-              </a:ln>
-            </p:spPr>
-            <p:style>
-              <a:lnRef idx="3">
-                <a:schemeClr val="lt1"/>
-              </a:lnRef>
-              <a:fillRef idx="1">
-                <a:schemeClr val="accent1"/>
-              </a:fillRef>
-              <a:effectRef idx="1">
-                <a:schemeClr val="accent1"/>
-              </a:effectRef>
-              <a:fontRef idx="minor">
-                <a:schemeClr val="lt1"/>
-              </a:fontRef>
-            </p:style>
-            <p:txBody>
-              <a:bodyPr rtlCol="0" anchor="ctr"/>
-              <a:lstStyle/>
-              <a:p>
-                <a:pPr algn="ctr"/>
-                <a:r>
-                  <a:rPr lang="en-US" sz="1500" dirty="0" smtClean="0">
-                    <a:solidFill>
-                      <a:srgbClr val="000000"/>
-                    </a:solidFill>
-                    <a:latin typeface="Roboto Condensed"/>
-                    <a:ea typeface="Roboto Condensed" panose="02000000000000000000" pitchFamily="2" charset="0"/>
-                    <a:cs typeface="Roboto Condensed"/>
-                  </a:rPr>
-                  <a:t>Dominant </a:t>
-                </a:r>
-                <a:r>
-                  <a:rPr lang="en-US" sz="1500" dirty="0">
-                    <a:solidFill>
-                      <a:srgbClr val="000000"/>
-                    </a:solidFill>
-                    <a:latin typeface="Roboto Condensed"/>
-                    <a:ea typeface="Roboto Condensed" panose="02000000000000000000" pitchFamily="2" charset="0"/>
-                    <a:cs typeface="Roboto Condensed"/>
-                  </a:rPr>
-                  <a:t>e</a:t>
-                </a:r>
-                <a:r>
-                  <a:rPr lang="en-US" sz="1500" dirty="0" smtClean="0">
-                    <a:solidFill>
-                      <a:srgbClr val="000000"/>
-                    </a:solidFill>
-                    <a:latin typeface="Roboto Condensed"/>
-                    <a:ea typeface="Roboto Condensed" panose="02000000000000000000" pitchFamily="2" charset="0"/>
-                    <a:cs typeface="Roboto Condensed"/>
-                  </a:rPr>
-                  <a:t>motion in a tweet</a:t>
-                </a:r>
-              </a:p>
-            </p:txBody>
-          </p:sp>
-          <p:sp>
-            <p:nvSpPr>
-              <p:cNvPr id="28" name="Rectangle 27"/>
-              <p:cNvSpPr/>
-              <p:nvPr/>
-            </p:nvSpPr>
-            <p:spPr>
-              <a:xfrm>
-                <a:off x="6630071" y="3987170"/>
-                <a:ext cx="1531544" cy="553959"/>
-              </a:xfrm>
-              <a:prstGeom prst="rect">
-                <a:avLst/>
-              </a:prstGeom>
-              <a:solidFill>
-                <a:schemeClr val="accent2"/>
-              </a:solidFill>
-              <a:ln>
-                <a:noFill/>
-              </a:ln>
-            </p:spPr>
-            <p:style>
-              <a:lnRef idx="3">
-                <a:schemeClr val="lt1"/>
-              </a:lnRef>
-              <a:fillRef idx="1">
-                <a:schemeClr val="accent1"/>
-              </a:fillRef>
-              <a:effectRef idx="1">
-                <a:schemeClr val="accent1"/>
-              </a:effectRef>
-              <a:fontRef idx="minor">
-                <a:schemeClr val="lt1"/>
-              </a:fontRef>
-            </p:style>
-            <p:txBody>
-              <a:bodyPr rtlCol="0" anchor="ctr"/>
-              <a:lstStyle/>
-              <a:p>
-                <a:pPr algn="ctr"/>
-                <a:r>
-                  <a:rPr lang="en-US" sz="1500" dirty="0" smtClean="0">
-                    <a:solidFill>
-                      <a:schemeClr val="bg1"/>
-                    </a:solidFill>
-                    <a:latin typeface="Roboto Condensed"/>
-                    <a:ea typeface="Roboto Condensed" panose="02000000000000000000" pitchFamily="2" charset="0"/>
-                    <a:cs typeface="Roboto Condensed"/>
-                  </a:rPr>
-                  <a:t>Voting System</a:t>
-                </a:r>
-              </a:p>
-            </p:txBody>
-          </p:sp>
-          <p:sp>
-            <p:nvSpPr>
               <p:cNvPr id="29" name="Rectangle 28"/>
               <p:cNvSpPr/>
               <p:nvPr/>
             </p:nvSpPr>
             <p:spPr>
               <a:xfrm>
-                <a:off x="6633056" y="2253193"/>
-                <a:ext cx="1531544" cy="553959"/>
+                <a:off x="6509057" y="2309227"/>
+                <a:ext cx="1783687" cy="553959"/>
               </a:xfrm>
               <a:prstGeom prst="rect">
                 <a:avLst/>
@@ -10810,7 +10806,7 @@
             </p:nvSpPr>
             <p:spPr>
               <a:xfrm>
-                <a:off x="6966649" y="1926655"/>
+                <a:off x="6966649" y="1982689"/>
                 <a:ext cx="849821" cy="492037"/>
               </a:xfrm>
               <a:prstGeom prst="downArrow">
@@ -10999,7 +10995,7 @@
             </p:nvSpPr>
             <p:spPr>
               <a:xfrm>
-                <a:off x="6969630" y="2704738"/>
+                <a:off x="6969630" y="2760772"/>
                 <a:ext cx="849821" cy="492037"/>
               </a:xfrm>
               <a:prstGeom prst="downArrow">
@@ -11047,7 +11043,7 @@
             </p:nvSpPr>
             <p:spPr>
               <a:xfrm>
-                <a:off x="6969630" y="3638583"/>
+                <a:off x="6969630" y="3619905"/>
                 <a:ext cx="849821" cy="492037"/>
               </a:xfrm>
               <a:prstGeom prst="downArrow">
@@ -11138,58 +11134,6 @@
         </p:grpSp>
         <p:sp>
           <p:nvSpPr>
-            <p:cNvPr id="71" name="Rectangle 70"/>
-            <p:cNvSpPr/>
-            <p:nvPr/>
-          </p:nvSpPr>
-          <p:spPr>
-            <a:xfrm>
-              <a:off x="6933321" y="6107414"/>
-              <a:ext cx="2020134" cy="597278"/>
-            </a:xfrm>
-            <a:prstGeom prst="rect">
-              <a:avLst/>
-            </a:prstGeom>
-            <a:noFill/>
-            <a:ln>
-              <a:noFill/>
-            </a:ln>
-          </p:spPr>
-          <p:style>
-            <a:lnRef idx="3">
-              <a:schemeClr val="lt1"/>
-            </a:lnRef>
-            <a:fillRef idx="1">
-              <a:schemeClr val="accent1"/>
-            </a:fillRef>
-            <a:effectRef idx="1">
-              <a:schemeClr val="accent1"/>
-            </a:effectRef>
-            <a:fontRef idx="minor">
-              <a:schemeClr val="lt1"/>
-            </a:fontRef>
-          </p:style>
-          <p:txBody>
-            <a:bodyPr rtlCol="0" anchor="ctr"/>
-            <a:lstStyle/>
-            <a:p>
-              <a:pPr algn="ctr"/>
-              <a:r>
-                <a:rPr lang="en-US" sz="1500" dirty="0" smtClean="0">
-                  <a:solidFill>
-                    <a:srgbClr val="000000"/>
-                  </a:solidFill>
-                  <a:latin typeface="Roboto Condensed"/>
-                  <a:ea typeface="Roboto Condensed" panose="02000000000000000000" pitchFamily="2" charset="0"/>
-                  <a:cs typeface="Roboto Condensed"/>
-                </a:rPr>
-                <a:t>Distribution of emotions in the crowd</a:t>
-              </a:r>
-            </a:p>
-          </p:txBody>
-        </p:sp>
-        <p:sp>
-          <p:nvSpPr>
             <p:cNvPr id="72" name="Down Arrow 71"/>
             <p:cNvSpPr/>
             <p:nvPr/>
@@ -11244,7 +11188,7 @@
           </p:nvSpPr>
           <p:spPr>
             <a:xfrm>
-              <a:off x="7371193" y="644360"/>
+              <a:off x="7371193" y="700394"/>
               <a:ext cx="1129985" cy="955522"/>
             </a:xfrm>
             <a:prstGeom prst="flowChartMagneticDisk">
@@ -11302,7 +11246,7 @@
           </p:nvSpPr>
           <p:spPr>
             <a:xfrm>
-              <a:off x="7517236" y="1636766"/>
+              <a:off x="7517236" y="1692800"/>
               <a:ext cx="849821" cy="492037"/>
             </a:xfrm>
             <a:prstGeom prst="downArrow">
@@ -11486,6 +11430,36 @@
             <a:xfrm>
               <a:off x="5533759" y="4654073"/>
               <a:ext cx="313363" cy="191500"/>
+            </a:xfrm>
+            <a:prstGeom prst="rect">
+              <a:avLst/>
+            </a:prstGeom>
+          </p:spPr>
+        </p:pic>
+        <p:pic>
+          <p:nvPicPr>
+            <p:cNvPr id="9" name="Picture 8" descr="CodeCogsEqn.png"/>
+            <p:cNvPicPr>
+              <a:picLocks noChangeAspect="1"/>
+            </p:cNvPicPr>
+            <p:nvPr/>
+          </p:nvPicPr>
+          <p:blipFill>
+            <a:blip r:embed="rId7">
+              <a:extLst>
+                <a:ext uri="{28A0092B-C50C-407E-A947-70E740481C1C}">
+                  <a14:useLocalDpi xmlns:a14="http://schemas.microsoft.com/office/drawing/2010/main" val="0"/>
+                </a:ext>
+              </a:extLst>
+            </a:blip>
+            <a:stretch>
+              <a:fillRect/>
+            </a:stretch>
+          </p:blipFill>
+          <p:spPr>
+            <a:xfrm>
+              <a:off x="6971058" y="4473166"/>
+              <a:ext cx="1935577" cy="333173"/>
             </a:xfrm>
             <a:prstGeom prst="rect">
               <a:avLst/>
@@ -12908,7 +12882,7 @@
   <a:extraClrSchemeLst/>
   <a:extLst>
     <a:ext uri="{05A4C25C-085E-4340-85A3-A5531E510DB2}">
-      <thm15:themeFamily xmlns:thm15="http://schemas.microsoft.com/office/thememl/2012/main" xmlns="" name="Office Theme" id="{62F939B6-93AF-4DB8-9C6B-D6C7DFDC589F}" vid="{4A3C46E8-61CC-4603-A589-7422A47A8E4A}"/>
+      <thm15:themeFamily xmlns="" xmlns:thm15="http://schemas.microsoft.com/office/thememl/2012/main" name="Office Theme" id="{62F939B6-93AF-4DB8-9C6B-D6C7DFDC589F}" vid="{4A3C46E8-61CC-4603-A589-7422A47A8E4A}"/>
     </a:ext>
   </a:extLst>
 </a:theme>

</xml_diff>